<commit_message>
Teil "Konzept" für die Präsentation erstellt
</commit_message>
<xml_diff>
--- a/Dokumentation/PWSafe Präsentation.pptx
+++ b/Dokumentation/PWSafe Präsentation.pptx
@@ -5,18 +5,22 @@
     <p:sldMasterId id="2147483648" r:id="rId1"/>
   </p:sldMasterIdLst>
   <p:notesMasterIdLst>
-    <p:notesMasterId r:id="rId11"/>
+    <p:notesMasterId r:id="rId15"/>
   </p:notesMasterIdLst>
   <p:sldIdLst>
     <p:sldId id="256" r:id="rId2"/>
     <p:sldId id="257" r:id="rId3"/>
     <p:sldId id="258" r:id="rId4"/>
     <p:sldId id="259" r:id="rId5"/>
-    <p:sldId id="260" r:id="rId6"/>
-    <p:sldId id="261" r:id="rId7"/>
-    <p:sldId id="262" r:id="rId8"/>
-    <p:sldId id="263" r:id="rId9"/>
-    <p:sldId id="264" r:id="rId10"/>
+    <p:sldId id="266" r:id="rId6"/>
+    <p:sldId id="268" r:id="rId7"/>
+    <p:sldId id="269" r:id="rId8"/>
+    <p:sldId id="260" r:id="rId9"/>
+    <p:sldId id="261" r:id="rId10"/>
+    <p:sldId id="262" r:id="rId11"/>
+    <p:sldId id="263" r:id="rId12"/>
+    <p:sldId id="264" r:id="rId13"/>
+    <p:sldId id="265" r:id="rId14"/>
   </p:sldIdLst>
   <p:sldSz cx="12192000" cy="6858000"/>
   <p:notesSz cx="6858000" cy="9144000"/>
@@ -117,10 +121,10 @@
   </p:defaultTextStyle>
   <p:extLst>
     <p:ext uri="{EFAFB233-063F-42B5-8137-9DF3F51BA10A}">
-      <p15:sldGuideLst xmlns:p15="http://schemas.microsoft.com/office/powerpoint/2012/main"/>
+      <p15:sldGuideLst xmlns:p15="http://schemas.microsoft.com/office/powerpoint/2012/main" xmlns=""/>
     </p:ext>
     <p:ext uri="{2D200454-40CA-4A62-9FC3-DE9A4176ACB9}">
-      <p15:notesGuideLst xmlns:p15="http://schemas.microsoft.com/office/powerpoint/2012/main"/>
+      <p15:notesGuideLst xmlns:p15="http://schemas.microsoft.com/office/powerpoint/2012/main" xmlns=""/>
     </p:ext>
   </p:extLst>
 </p:presentation>
@@ -208,7 +212,8 @@
           <a:p>
             <a:fld id="{B4AA8B1B-A85F-43ED-A41A-985067DF8577}" type="datetimeFigureOut">
               <a:rPr lang="de-DE" smtClean="0"/>
-              <a:t>07.02.2015</a:t>
+              <a:pPr/>
+              <a:t>08.02.2015</a:t>
             </a:fld>
             <a:endParaRPr lang="de-DE"/>
           </a:p>
@@ -367,6 +372,7 @@
           <a:p>
             <a:fld id="{05D1FABD-69C2-49F9-BD91-F05E017FE538}" type="slidenum">
               <a:rPr lang="de-DE" smtClean="0"/>
+              <a:pPr/>
               <a:t>‹Nr.›</a:t>
             </a:fld>
             <a:endParaRPr lang="de-DE"/>
@@ -376,7 +382,7 @@
     </p:spTree>
     <p:extLst>
       <p:ext uri="{BB962C8B-B14F-4D97-AF65-F5344CB8AC3E}">
-        <p14:creationId xmlns:p14="http://schemas.microsoft.com/office/powerpoint/2010/main" val="2805633478"/>
+        <p14:creationId xmlns:p14="http://schemas.microsoft.com/office/powerpoint/2010/main" xmlns="" val="2805633478"/>
       </p:ext>
     </p:extLst>
   </p:cSld>
@@ -541,6 +547,7 @@
           <a:p>
             <a:fld id="{05D1FABD-69C2-49F9-BD91-F05E017FE538}" type="slidenum">
               <a:rPr lang="de-DE" smtClean="0"/>
+              <a:pPr/>
               <a:t>2</a:t>
             </a:fld>
             <a:endParaRPr lang="de-DE"/>
@@ -550,7 +557,262 @@
     </p:spTree>
     <p:extLst>
       <p:ext uri="{BB962C8B-B14F-4D97-AF65-F5344CB8AC3E}">
-        <p14:creationId xmlns:p14="http://schemas.microsoft.com/office/powerpoint/2010/main" val="855943066"/>
+        <p14:creationId xmlns:p14="http://schemas.microsoft.com/office/powerpoint/2010/main" xmlns="" val="855943066"/>
+      </p:ext>
+    </p:extLst>
+  </p:cSld>
+  <p:clrMapOvr>
+    <a:masterClrMapping/>
+  </p:clrMapOvr>
+</p:notes>
+</file>
+
+<file path=ppt/notesSlides/notesSlide10.xml><?xml version="1.0" encoding="utf-8"?>
+<p:notes xmlns:a="http://schemas.openxmlformats.org/drawingml/2006/main" xmlns:r="http://schemas.openxmlformats.org/officeDocument/2006/relationships" xmlns:p="http://schemas.openxmlformats.org/presentationml/2006/main">
+  <p:cSld>
+    <p:spTree>
+      <p:nvGrpSpPr>
+        <p:cNvPr id="1" name=""/>
+        <p:cNvGrpSpPr/>
+        <p:nvPr/>
+      </p:nvGrpSpPr>
+      <p:grpSpPr>
+        <a:xfrm>
+          <a:off x="0" y="0"/>
+          <a:ext cx="0" cy="0"/>
+          <a:chOff x="0" y="0"/>
+          <a:chExt cx="0" cy="0"/>
+        </a:xfrm>
+      </p:grpSpPr>
+      <p:sp>
+        <p:nvSpPr>
+          <p:cNvPr id="2" name="Folienbildplatzhalter 1"/>
+          <p:cNvSpPr>
+            <a:spLocks noGrp="1" noRot="1" noChangeAspect="1"/>
+          </p:cNvSpPr>
+          <p:nvPr>
+            <p:ph type="sldImg"/>
+          </p:nvPr>
+        </p:nvSpPr>
+        <p:spPr/>
+      </p:sp>
+      <p:sp>
+        <p:nvSpPr>
+          <p:cNvPr id="3" name="Notizenplatzhalter 2"/>
+          <p:cNvSpPr>
+            <a:spLocks noGrp="1"/>
+          </p:cNvSpPr>
+          <p:nvPr>
+            <p:ph type="body" idx="1"/>
+          </p:nvPr>
+        </p:nvSpPr>
+        <p:spPr/>
+        <p:txBody>
+          <a:bodyPr/>
+          <a:lstStyle/>
+          <a:p>
+            <a:endParaRPr lang="de-DE"/>
+          </a:p>
+        </p:txBody>
+      </p:sp>
+      <p:sp>
+        <p:nvSpPr>
+          <p:cNvPr id="4" name="Foliennummernplatzhalter 3"/>
+          <p:cNvSpPr>
+            <a:spLocks noGrp="1"/>
+          </p:cNvSpPr>
+          <p:nvPr>
+            <p:ph type="sldNum" sz="quarter" idx="10"/>
+          </p:nvPr>
+        </p:nvSpPr>
+        <p:spPr/>
+        <p:txBody>
+          <a:bodyPr/>
+          <a:lstStyle/>
+          <a:p>
+            <a:fld id="{05D1FABD-69C2-49F9-BD91-F05E017FE538}" type="slidenum">
+              <a:rPr lang="de-DE" smtClean="0"/>
+              <a:pPr/>
+              <a:t>11</a:t>
+            </a:fld>
+            <a:endParaRPr lang="de-DE"/>
+          </a:p>
+        </p:txBody>
+      </p:sp>
+    </p:spTree>
+    <p:extLst>
+      <p:ext uri="{BB962C8B-B14F-4D97-AF65-F5344CB8AC3E}">
+        <p14:creationId xmlns:p14="http://schemas.microsoft.com/office/powerpoint/2010/main" xmlns="" val="3297351362"/>
+      </p:ext>
+    </p:extLst>
+  </p:cSld>
+  <p:clrMapOvr>
+    <a:masterClrMapping/>
+  </p:clrMapOvr>
+</p:notes>
+</file>
+
+<file path=ppt/notesSlides/notesSlide11.xml><?xml version="1.0" encoding="utf-8"?>
+<p:notes xmlns:a="http://schemas.openxmlformats.org/drawingml/2006/main" xmlns:r="http://schemas.openxmlformats.org/officeDocument/2006/relationships" xmlns:p="http://schemas.openxmlformats.org/presentationml/2006/main">
+  <p:cSld>
+    <p:spTree>
+      <p:nvGrpSpPr>
+        <p:cNvPr id="1" name=""/>
+        <p:cNvGrpSpPr/>
+        <p:nvPr/>
+      </p:nvGrpSpPr>
+      <p:grpSpPr>
+        <a:xfrm>
+          <a:off x="0" y="0"/>
+          <a:ext cx="0" cy="0"/>
+          <a:chOff x="0" y="0"/>
+          <a:chExt cx="0" cy="0"/>
+        </a:xfrm>
+      </p:grpSpPr>
+      <p:sp>
+        <p:nvSpPr>
+          <p:cNvPr id="2" name="Folienbildplatzhalter 1"/>
+          <p:cNvSpPr>
+            <a:spLocks noGrp="1" noRot="1" noChangeAspect="1"/>
+          </p:cNvSpPr>
+          <p:nvPr>
+            <p:ph type="sldImg"/>
+          </p:nvPr>
+        </p:nvSpPr>
+        <p:spPr/>
+      </p:sp>
+      <p:sp>
+        <p:nvSpPr>
+          <p:cNvPr id="3" name="Notizenplatzhalter 2"/>
+          <p:cNvSpPr>
+            <a:spLocks noGrp="1"/>
+          </p:cNvSpPr>
+          <p:nvPr>
+            <p:ph type="body" idx="1"/>
+          </p:nvPr>
+        </p:nvSpPr>
+        <p:spPr/>
+        <p:txBody>
+          <a:bodyPr/>
+          <a:lstStyle/>
+          <a:p>
+            <a:endParaRPr lang="de-DE"/>
+          </a:p>
+        </p:txBody>
+      </p:sp>
+      <p:sp>
+        <p:nvSpPr>
+          <p:cNvPr id="4" name="Foliennummernplatzhalter 3"/>
+          <p:cNvSpPr>
+            <a:spLocks noGrp="1"/>
+          </p:cNvSpPr>
+          <p:nvPr>
+            <p:ph type="sldNum" sz="quarter" idx="10"/>
+          </p:nvPr>
+        </p:nvSpPr>
+        <p:spPr/>
+        <p:txBody>
+          <a:bodyPr/>
+          <a:lstStyle/>
+          <a:p>
+            <a:fld id="{05D1FABD-69C2-49F9-BD91-F05E017FE538}" type="slidenum">
+              <a:rPr lang="de-DE" smtClean="0"/>
+              <a:pPr/>
+              <a:t>12</a:t>
+            </a:fld>
+            <a:endParaRPr lang="de-DE"/>
+          </a:p>
+        </p:txBody>
+      </p:sp>
+    </p:spTree>
+    <p:extLst>
+      <p:ext uri="{BB962C8B-B14F-4D97-AF65-F5344CB8AC3E}">
+        <p14:creationId xmlns:p14="http://schemas.microsoft.com/office/powerpoint/2010/main" xmlns="" val="784737350"/>
+      </p:ext>
+    </p:extLst>
+  </p:cSld>
+  <p:clrMapOvr>
+    <a:masterClrMapping/>
+  </p:clrMapOvr>
+</p:notes>
+</file>
+
+<file path=ppt/notesSlides/notesSlide12.xml><?xml version="1.0" encoding="utf-8"?>
+<p:notes xmlns:a="http://schemas.openxmlformats.org/drawingml/2006/main" xmlns:r="http://schemas.openxmlformats.org/officeDocument/2006/relationships" xmlns:p="http://schemas.openxmlformats.org/presentationml/2006/main">
+  <p:cSld>
+    <p:spTree>
+      <p:nvGrpSpPr>
+        <p:cNvPr id="1" name=""/>
+        <p:cNvGrpSpPr/>
+        <p:nvPr/>
+      </p:nvGrpSpPr>
+      <p:grpSpPr>
+        <a:xfrm>
+          <a:off x="0" y="0"/>
+          <a:ext cx="0" cy="0"/>
+          <a:chOff x="0" y="0"/>
+          <a:chExt cx="0" cy="0"/>
+        </a:xfrm>
+      </p:grpSpPr>
+      <p:sp>
+        <p:nvSpPr>
+          <p:cNvPr id="2" name="Folienbildplatzhalter 1"/>
+          <p:cNvSpPr>
+            <a:spLocks noGrp="1" noRot="1" noChangeAspect="1"/>
+          </p:cNvSpPr>
+          <p:nvPr>
+            <p:ph type="sldImg"/>
+          </p:nvPr>
+        </p:nvSpPr>
+        <p:spPr/>
+      </p:sp>
+      <p:sp>
+        <p:nvSpPr>
+          <p:cNvPr id="3" name="Notizenplatzhalter 2"/>
+          <p:cNvSpPr>
+            <a:spLocks noGrp="1"/>
+          </p:cNvSpPr>
+          <p:nvPr>
+            <p:ph type="body" idx="1"/>
+          </p:nvPr>
+        </p:nvSpPr>
+        <p:spPr/>
+        <p:txBody>
+          <a:bodyPr/>
+          <a:lstStyle/>
+          <a:p>
+            <a:endParaRPr lang="de-DE"/>
+          </a:p>
+        </p:txBody>
+      </p:sp>
+      <p:sp>
+        <p:nvSpPr>
+          <p:cNvPr id="4" name="Foliennummernplatzhalter 3"/>
+          <p:cNvSpPr>
+            <a:spLocks noGrp="1"/>
+          </p:cNvSpPr>
+          <p:nvPr>
+            <p:ph type="sldNum" sz="quarter" idx="10"/>
+          </p:nvPr>
+        </p:nvSpPr>
+        <p:spPr/>
+        <p:txBody>
+          <a:bodyPr/>
+          <a:lstStyle/>
+          <a:p>
+            <a:fld id="{05D1FABD-69C2-49F9-BD91-F05E017FE538}" type="slidenum">
+              <a:rPr lang="de-DE" smtClean="0"/>
+              <a:pPr/>
+              <a:t>13</a:t>
+            </a:fld>
+            <a:endParaRPr lang="de-DE"/>
+          </a:p>
+        </p:txBody>
+      </p:sp>
+    </p:spTree>
+    <p:extLst>
+      <p:ext uri="{BB962C8B-B14F-4D97-AF65-F5344CB8AC3E}">
+        <p14:creationId xmlns:p14="http://schemas.microsoft.com/office/powerpoint/2010/main" xmlns="" val="1066156749"/>
       </p:ext>
     </p:extLst>
   </p:cSld>
@@ -625,6 +887,7 @@
           <a:p>
             <a:fld id="{05D1FABD-69C2-49F9-BD91-F05E017FE538}" type="slidenum">
               <a:rPr lang="de-DE" smtClean="0"/>
+              <a:pPr/>
               <a:t>3</a:t>
             </a:fld>
             <a:endParaRPr lang="de-DE"/>
@@ -634,7 +897,7 @@
     </p:spTree>
     <p:extLst>
       <p:ext uri="{BB962C8B-B14F-4D97-AF65-F5344CB8AC3E}">
-        <p14:creationId xmlns:p14="http://schemas.microsoft.com/office/powerpoint/2010/main" val="930434972"/>
+        <p14:creationId xmlns:p14="http://schemas.microsoft.com/office/powerpoint/2010/main" xmlns="" val="930434972"/>
       </p:ext>
     </p:extLst>
   </p:cSld>
@@ -688,7 +951,26 @@
           <a:bodyPr/>
           <a:lstStyle/>
           <a:p>
-            <a:endParaRPr lang="de-DE"/>
+            <a:r>
+              <a:rPr lang="de-DE" dirty="0" smtClean="0"/>
+              <a:t>Grundlage</a:t>
+            </a:r>
+            <a:r>
+              <a:rPr lang="de-DE" baseline="0" dirty="0" smtClean="0"/>
+              <a:t> der Studie: 17 </a:t>
+            </a:r>
+            <a:r>
+              <a:rPr lang="de-DE" baseline="0" dirty="0" err="1" smtClean="0"/>
+              <a:t>Apps</a:t>
+            </a:r>
+            <a:endParaRPr lang="de-DE" baseline="0" dirty="0" smtClean="0"/>
+          </a:p>
+          <a:p>
+            <a:r>
+              <a:rPr lang="de-DE" baseline="0" dirty="0" smtClean="0"/>
+              <a:t>Innerhalb eines Tages geknackt</a:t>
+            </a:r>
+            <a:endParaRPr lang="de-DE" dirty="0"/>
           </a:p>
         </p:txBody>
       </p:sp>
@@ -709,6 +991,7 @@
           <a:p>
             <a:fld id="{05D1FABD-69C2-49F9-BD91-F05E017FE538}" type="slidenum">
               <a:rPr lang="de-DE" smtClean="0"/>
+              <a:pPr/>
               <a:t>4</a:t>
             </a:fld>
             <a:endParaRPr lang="de-DE"/>
@@ -718,7 +1001,7 @@
     </p:spTree>
     <p:extLst>
       <p:ext uri="{BB962C8B-B14F-4D97-AF65-F5344CB8AC3E}">
-        <p14:creationId xmlns:p14="http://schemas.microsoft.com/office/powerpoint/2010/main" val="1928648976"/>
+        <p14:creationId xmlns:p14="http://schemas.microsoft.com/office/powerpoint/2010/main" xmlns="" val="1928648976"/>
       </p:ext>
     </p:extLst>
   </p:cSld>
@@ -772,7 +1055,7 @@
           <a:bodyPr/>
           <a:lstStyle/>
           <a:p>
-            <a:endParaRPr lang="de-DE"/>
+            <a:endParaRPr lang="de-DE" dirty="0"/>
           </a:p>
         </p:txBody>
       </p:sp>
@@ -793,6 +1076,7 @@
           <a:p>
             <a:fld id="{05D1FABD-69C2-49F9-BD91-F05E017FE538}" type="slidenum">
               <a:rPr lang="de-DE" smtClean="0"/>
+              <a:pPr/>
               <a:t>5</a:t>
             </a:fld>
             <a:endParaRPr lang="de-DE"/>
@@ -802,7 +1086,7 @@
     </p:spTree>
     <p:extLst>
       <p:ext uri="{BB962C8B-B14F-4D97-AF65-F5344CB8AC3E}">
-        <p14:creationId xmlns:p14="http://schemas.microsoft.com/office/powerpoint/2010/main" val="1705752707"/>
+        <p14:creationId xmlns:p14="http://schemas.microsoft.com/office/powerpoint/2010/main" xmlns="" val="1928648976"/>
       </p:ext>
     </p:extLst>
   </p:cSld>
@@ -856,7 +1140,7 @@
           <a:bodyPr/>
           <a:lstStyle/>
           <a:p>
-            <a:endParaRPr lang="de-DE"/>
+            <a:endParaRPr lang="de-DE" dirty="0"/>
           </a:p>
         </p:txBody>
       </p:sp>
@@ -877,6 +1161,7 @@
           <a:p>
             <a:fld id="{05D1FABD-69C2-49F9-BD91-F05E017FE538}" type="slidenum">
               <a:rPr lang="de-DE" smtClean="0"/>
+              <a:pPr/>
               <a:t>6</a:t>
             </a:fld>
             <a:endParaRPr lang="de-DE"/>
@@ -886,7 +1171,7 @@
     </p:spTree>
     <p:extLst>
       <p:ext uri="{BB962C8B-B14F-4D97-AF65-F5344CB8AC3E}">
-        <p14:creationId xmlns:p14="http://schemas.microsoft.com/office/powerpoint/2010/main" val="4219797847"/>
+        <p14:creationId xmlns:p14="http://schemas.microsoft.com/office/powerpoint/2010/main" xmlns="" val="1928648976"/>
       </p:ext>
     </p:extLst>
   </p:cSld>
@@ -940,7 +1225,7 @@
           <a:bodyPr/>
           <a:lstStyle/>
           <a:p>
-            <a:endParaRPr lang="de-DE"/>
+            <a:endParaRPr lang="de-DE" dirty="0"/>
           </a:p>
         </p:txBody>
       </p:sp>
@@ -961,6 +1246,7 @@
           <a:p>
             <a:fld id="{05D1FABD-69C2-49F9-BD91-F05E017FE538}" type="slidenum">
               <a:rPr lang="de-DE" smtClean="0"/>
+              <a:pPr/>
               <a:t>7</a:t>
             </a:fld>
             <a:endParaRPr lang="de-DE"/>
@@ -970,7 +1256,7 @@
     </p:spTree>
     <p:extLst>
       <p:ext uri="{BB962C8B-B14F-4D97-AF65-F5344CB8AC3E}">
-        <p14:creationId xmlns:p14="http://schemas.microsoft.com/office/powerpoint/2010/main" val="1066156749"/>
+        <p14:creationId xmlns:p14="http://schemas.microsoft.com/office/powerpoint/2010/main" xmlns="" val="1928648976"/>
       </p:ext>
     </p:extLst>
   </p:cSld>
@@ -1045,6 +1331,7 @@
           <a:p>
             <a:fld id="{05D1FABD-69C2-49F9-BD91-F05E017FE538}" type="slidenum">
               <a:rPr lang="de-DE" smtClean="0"/>
+              <a:pPr/>
               <a:t>8</a:t>
             </a:fld>
             <a:endParaRPr lang="de-DE"/>
@@ -1054,7 +1341,7 @@
     </p:spTree>
     <p:extLst>
       <p:ext uri="{BB962C8B-B14F-4D97-AF65-F5344CB8AC3E}">
-        <p14:creationId xmlns:p14="http://schemas.microsoft.com/office/powerpoint/2010/main" val="3297351362"/>
+        <p14:creationId xmlns:p14="http://schemas.microsoft.com/office/powerpoint/2010/main" xmlns="" val="1705752707"/>
       </p:ext>
     </p:extLst>
   </p:cSld>
@@ -1129,6 +1416,7 @@
           <a:p>
             <a:fld id="{05D1FABD-69C2-49F9-BD91-F05E017FE538}" type="slidenum">
               <a:rPr lang="de-DE" smtClean="0"/>
+              <a:pPr/>
               <a:t>9</a:t>
             </a:fld>
             <a:endParaRPr lang="de-DE"/>
@@ -1138,7 +1426,92 @@
     </p:spTree>
     <p:extLst>
       <p:ext uri="{BB962C8B-B14F-4D97-AF65-F5344CB8AC3E}">
-        <p14:creationId xmlns:p14="http://schemas.microsoft.com/office/powerpoint/2010/main" val="784737350"/>
+        <p14:creationId xmlns:p14="http://schemas.microsoft.com/office/powerpoint/2010/main" xmlns="" val="4219797847"/>
+      </p:ext>
+    </p:extLst>
+  </p:cSld>
+  <p:clrMapOvr>
+    <a:masterClrMapping/>
+  </p:clrMapOvr>
+</p:notes>
+</file>
+
+<file path=ppt/notesSlides/notesSlide9.xml><?xml version="1.0" encoding="utf-8"?>
+<p:notes xmlns:a="http://schemas.openxmlformats.org/drawingml/2006/main" xmlns:r="http://schemas.openxmlformats.org/officeDocument/2006/relationships" xmlns:p="http://schemas.openxmlformats.org/presentationml/2006/main">
+  <p:cSld>
+    <p:spTree>
+      <p:nvGrpSpPr>
+        <p:cNvPr id="1" name=""/>
+        <p:cNvGrpSpPr/>
+        <p:nvPr/>
+      </p:nvGrpSpPr>
+      <p:grpSpPr>
+        <a:xfrm>
+          <a:off x="0" y="0"/>
+          <a:ext cx="0" cy="0"/>
+          <a:chOff x="0" y="0"/>
+          <a:chExt cx="0" cy="0"/>
+        </a:xfrm>
+      </p:grpSpPr>
+      <p:sp>
+        <p:nvSpPr>
+          <p:cNvPr id="2" name="Folienbildplatzhalter 1"/>
+          <p:cNvSpPr>
+            <a:spLocks noGrp="1" noRot="1" noChangeAspect="1"/>
+          </p:cNvSpPr>
+          <p:nvPr>
+            <p:ph type="sldImg"/>
+          </p:nvPr>
+        </p:nvSpPr>
+        <p:spPr/>
+      </p:sp>
+      <p:sp>
+        <p:nvSpPr>
+          <p:cNvPr id="3" name="Notizenplatzhalter 2"/>
+          <p:cNvSpPr>
+            <a:spLocks noGrp="1"/>
+          </p:cNvSpPr>
+          <p:nvPr>
+            <p:ph type="body" idx="1"/>
+          </p:nvPr>
+        </p:nvSpPr>
+        <p:spPr/>
+        <p:txBody>
+          <a:bodyPr/>
+          <a:lstStyle/>
+          <a:p>
+            <a:endParaRPr lang="de-DE"/>
+          </a:p>
+        </p:txBody>
+      </p:sp>
+      <p:sp>
+        <p:nvSpPr>
+          <p:cNvPr id="4" name="Foliennummernplatzhalter 3"/>
+          <p:cNvSpPr>
+            <a:spLocks noGrp="1"/>
+          </p:cNvSpPr>
+          <p:nvPr>
+            <p:ph type="sldNum" sz="quarter" idx="10"/>
+          </p:nvPr>
+        </p:nvSpPr>
+        <p:spPr/>
+        <p:txBody>
+          <a:bodyPr/>
+          <a:lstStyle/>
+          <a:p>
+            <a:fld id="{05D1FABD-69C2-49F9-BD91-F05E017FE538}" type="slidenum">
+              <a:rPr lang="de-DE" smtClean="0"/>
+              <a:pPr/>
+              <a:t>10</a:t>
+            </a:fld>
+            <a:endParaRPr lang="de-DE"/>
+          </a:p>
+        </p:txBody>
+      </p:sp>
+    </p:spTree>
+    <p:extLst>
+      <p:ext uri="{BB962C8B-B14F-4D97-AF65-F5344CB8AC3E}">
+        <p14:creationId xmlns:p14="http://schemas.microsoft.com/office/powerpoint/2010/main" xmlns="" val="1066156749"/>
       </p:ext>
     </p:extLst>
   </p:cSld>
@@ -1794,7 +2167,8 @@
           <a:p>
             <a:fld id="{9EE47043-14B9-45DE-A7CA-B819D3DB7940}" type="datetime1">
               <a:rPr lang="en-US" smtClean="0"/>
-              <a:t>2/7/2015</a:t>
+              <a:pPr/>
+              <a:t>2/8/2015</a:t>
             </a:fld>
             <a:endParaRPr lang="en-US" dirty="0"/>
           </a:p>
@@ -2914,7 +3288,8 @@
           <a:p>
             <a:fld id="{15FDD389-1C4B-4991-9D1B-BD9CD8DAD448}" type="datetime1">
               <a:rPr lang="en-US" smtClean="0"/>
-              <a:t>2/7/2015</a:t>
+              <a:pPr/>
+              <a:t>2/8/2015</a:t>
             </a:fld>
             <a:endParaRPr lang="en-US" dirty="0"/>
           </a:p>
@@ -3925,7 +4300,8 @@
           <a:p>
             <a:fld id="{DBEDE645-84E4-46C4-8BBB-B45E79B0BDF2}" type="datetime1">
               <a:rPr lang="en-US" smtClean="0"/>
-              <a:t>2/7/2015</a:t>
+              <a:pPr/>
+              <a:t>2/8/2015</a:t>
             </a:fld>
             <a:endParaRPr lang="en-US" dirty="0"/>
           </a:p>
@@ -5095,7 +5471,8 @@
           <a:p>
             <a:fld id="{FD30094F-A1C4-4AA8-B240-0E360656DACC}" type="datetime1">
               <a:rPr lang="en-US" smtClean="0"/>
-              <a:t>2/7/2015</a:t>
+              <a:pPr/>
+              <a:t>2/8/2015</a:t>
             </a:fld>
             <a:endParaRPr lang="en-US" dirty="0"/>
           </a:p>
@@ -6156,7 +6533,8 @@
           <a:p>
             <a:fld id="{114DEC2F-D236-4161-B7A9-058AD50973F4}" type="datetime1">
               <a:rPr lang="en-US" smtClean="0"/>
-              <a:t>2/7/2015</a:t>
+              <a:pPr/>
+              <a:t>2/8/2015</a:t>
             </a:fld>
             <a:endParaRPr lang="en-US" dirty="0"/>
           </a:p>
@@ -6802,7 +7180,8 @@
           <a:p>
             <a:fld id="{7246F925-6776-418A-B9D5-2FE6DDC7FF5E}" type="datetime1">
               <a:rPr lang="en-US" smtClean="0"/>
-              <a:t>2/7/2015</a:t>
+              <a:pPr/>
+              <a:t>2/8/2015</a:t>
             </a:fld>
             <a:endParaRPr lang="en-US" dirty="0"/>
           </a:p>
@@ -7649,7 +8028,8 @@
           <a:p>
             <a:fld id="{AA091E32-8210-42E1-A5E3-AE4F3B2BA67C}" type="datetime1">
               <a:rPr lang="en-US" smtClean="0"/>
-              <a:t>2/7/2015</a:t>
+              <a:pPr/>
+              <a:t>2/8/2015</a:t>
             </a:fld>
             <a:endParaRPr lang="en-US" dirty="0"/>
           </a:p>
@@ -7824,7 +8204,8 @@
           <a:p>
             <a:fld id="{A8F96028-6369-409B-B015-BD4E873D97AE}" type="datetime1">
               <a:rPr lang="en-US" smtClean="0"/>
-              <a:t>2/7/2015</a:t>
+              <a:pPr/>
+              <a:t>2/8/2015</a:t>
             </a:fld>
             <a:endParaRPr lang="en-US" dirty="0"/>
           </a:p>
@@ -8822,7 +9203,8 @@
           <a:p>
             <a:fld id="{1EC1EEDA-5C8D-4FAD-B380-0B1111C6C6FD}" type="datetime1">
               <a:rPr lang="en-US" smtClean="0"/>
-              <a:t>2/7/2015</a:t>
+              <a:pPr/>
+              <a:t>2/8/2015</a:t>
             </a:fld>
             <a:endParaRPr lang="en-US" dirty="0"/>
           </a:p>
@@ -9028,7 +9410,8 @@
           <a:p>
             <a:fld id="{17201E69-94FE-46D8-8C9F-233CA2EAF49D}" type="datetime1">
               <a:rPr lang="en-US" smtClean="0"/>
-              <a:t>2/7/2015</a:t>
+              <a:pPr/>
+              <a:t>2/8/2015</a:t>
             </a:fld>
             <a:endParaRPr lang="en-US" dirty="0"/>
           </a:p>
@@ -10090,7 +10473,8 @@
           <a:p>
             <a:fld id="{9229E780-8742-4F41-A7DD-8A533C34BC62}" type="datetime1">
               <a:rPr lang="en-US" smtClean="0"/>
-              <a:t>2/7/2015</a:t>
+              <a:pPr/>
+              <a:t>2/8/2015</a:t>
             </a:fld>
             <a:endParaRPr lang="en-US" dirty="0"/>
           </a:p>
@@ -10362,7 +10746,8 @@
           <a:p>
             <a:fld id="{3B91D532-264E-494B-BCB4-085A06E95C4C}" type="datetime1">
               <a:rPr lang="en-US" smtClean="0"/>
-              <a:t>2/7/2015</a:t>
+              <a:pPr/>
+              <a:t>2/8/2015</a:t>
             </a:fld>
             <a:endParaRPr lang="en-US" dirty="0"/>
           </a:p>
@@ -10744,7 +11129,8 @@
           <a:p>
             <a:fld id="{13078452-A4DA-42F9-8E52-EBBBBBF20BDF}" type="datetime1">
               <a:rPr lang="en-US" smtClean="0"/>
-              <a:t>2/7/2015</a:t>
+              <a:pPr/>
+              <a:t>2/8/2015</a:t>
             </a:fld>
             <a:endParaRPr lang="en-US" dirty="0"/>
           </a:p>
@@ -10862,7 +11248,8 @@
           <a:p>
             <a:fld id="{1433EC71-6044-490A-9B40-8B48B52B7377}" type="datetime1">
               <a:rPr lang="en-US" smtClean="0"/>
-              <a:t>2/7/2015</a:t>
+              <a:pPr/>
+              <a:t>2/8/2015</a:t>
             </a:fld>
             <a:endParaRPr lang="en-US" dirty="0"/>
           </a:p>
@@ -10957,7 +11344,8 @@
           <a:p>
             <a:fld id="{05B9864E-D461-4420-9A61-69708EA906EF}" type="datetime1">
               <a:rPr lang="en-US" smtClean="0"/>
-              <a:t>2/7/2015</a:t>
+              <a:pPr/>
+              <a:t>2/8/2015</a:t>
             </a:fld>
             <a:endParaRPr lang="en-US" dirty="0"/>
           </a:p>
@@ -12066,7 +12454,8 @@
           <a:p>
             <a:fld id="{B45F0798-91BD-41E8-A317-14713D4B5C46}" type="datetime1">
               <a:rPr lang="en-US" smtClean="0"/>
-              <a:t>2/7/2015</a:t>
+              <a:pPr/>
+              <a:t>2/8/2015</a:t>
             </a:fld>
             <a:endParaRPr lang="en-US" dirty="0"/>
           </a:p>
@@ -13199,7 +13588,8 @@
           <a:p>
             <a:fld id="{2A2492AA-6B4D-44C1-A4C5-776C8CBEDC88}" type="datetime1">
               <a:rPr lang="en-US" smtClean="0"/>
-              <a:t>2/7/2015</a:t>
+              <a:pPr/>
+              <a:t>2/8/2015</a:t>
             </a:fld>
             <a:endParaRPr lang="en-US" dirty="0"/>
           </a:p>
@@ -14227,7 +14617,8 @@
           <a:p>
             <a:fld id="{D718F47C-7328-41EC-B5EF-37975657BEDE}" type="datetime1">
               <a:rPr lang="en-US" smtClean="0"/>
-              <a:t>2/7/2015</a:t>
+              <a:pPr/>
+              <a:t>2/8/2015</a:t>
             </a:fld>
             <a:endParaRPr lang="en-US" dirty="0"/>
           </a:p>
@@ -14830,7 +15221,7 @@
           <a:blip r:embed="rId2">
             <a:extLst>
               <a:ext uri="{28A0092B-C50C-407E-A947-70E740481C1C}">
-                <a14:useLocalDpi xmlns:a14="http://schemas.microsoft.com/office/drawing/2010/main" val="0"/>
+                <a14:useLocalDpi xmlns:a14="http://schemas.microsoft.com/office/drawing/2010/main" xmlns="" val="0"/>
               </a:ext>
             </a:extLst>
           </a:blip>
@@ -14851,7 +15242,663 @@
     </p:spTree>
     <p:extLst>
       <p:ext uri="{BB962C8B-B14F-4D97-AF65-F5344CB8AC3E}">
-        <p14:creationId xmlns:p14="http://schemas.microsoft.com/office/powerpoint/2010/main" val="3428906391"/>
+        <p14:creationId xmlns:p14="http://schemas.microsoft.com/office/powerpoint/2010/main" xmlns="" val="3428906391"/>
+      </p:ext>
+    </p:extLst>
+  </p:cSld>
+  <p:clrMapOvr>
+    <a:masterClrMapping/>
+  </p:clrMapOvr>
+  <p:timing>
+    <p:tnLst>
+      <p:par>
+        <p:cTn id="1" dur="indefinite" restart="never" nodeType="tmRoot"/>
+      </p:par>
+    </p:tnLst>
+  </p:timing>
+</p:sld>
+</file>
+
+<file path=ppt/slides/slide10.xml><?xml version="1.0" encoding="utf-8"?>
+<p:sld xmlns:a="http://schemas.openxmlformats.org/drawingml/2006/main" xmlns:r="http://schemas.openxmlformats.org/officeDocument/2006/relationships" xmlns:p="http://schemas.openxmlformats.org/presentationml/2006/main">
+  <p:cSld>
+    <p:spTree>
+      <p:nvGrpSpPr>
+        <p:cNvPr id="1" name=""/>
+        <p:cNvGrpSpPr/>
+        <p:nvPr/>
+      </p:nvGrpSpPr>
+      <p:grpSpPr>
+        <a:xfrm>
+          <a:off x="0" y="0"/>
+          <a:ext cx="0" cy="0"/>
+          <a:chOff x="0" y="0"/>
+          <a:chExt cx="0" cy="0"/>
+        </a:xfrm>
+      </p:grpSpPr>
+      <p:sp>
+        <p:nvSpPr>
+          <p:cNvPr id="2" name="Titel 1"/>
+          <p:cNvSpPr>
+            <a:spLocks noGrp="1"/>
+          </p:cNvSpPr>
+          <p:nvPr>
+            <p:ph type="title"/>
+          </p:nvPr>
+        </p:nvSpPr>
+        <p:spPr/>
+        <p:txBody>
+          <a:bodyPr/>
+          <a:lstStyle/>
+          <a:p>
+            <a:r>
+              <a:rPr lang="de-DE" dirty="0" smtClean="0"/>
+              <a:t>Reflexion</a:t>
+            </a:r>
+            <a:endParaRPr lang="de-DE" dirty="0"/>
+          </a:p>
+        </p:txBody>
+      </p:sp>
+      <p:sp>
+        <p:nvSpPr>
+          <p:cNvPr id="3" name="Inhaltsplatzhalter 2"/>
+          <p:cNvSpPr>
+            <a:spLocks noGrp="1"/>
+          </p:cNvSpPr>
+          <p:nvPr>
+            <p:ph idx="1"/>
+          </p:nvPr>
+        </p:nvSpPr>
+        <p:spPr/>
+        <p:txBody>
+          <a:bodyPr/>
+          <a:lstStyle/>
+          <a:p>
+            <a:r>
+              <a:rPr lang="de-DE" dirty="0" smtClean="0"/>
+              <a:t>Kurze Werkzeugbewertung</a:t>
+            </a:r>
+          </a:p>
+          <a:p>
+            <a:r>
+              <a:rPr lang="de-DE" dirty="0" smtClean="0"/>
+              <a:t>Vorgehen im Team</a:t>
+            </a:r>
+          </a:p>
+          <a:p>
+            <a:endParaRPr lang="de-DE" dirty="0" smtClean="0"/>
+          </a:p>
+        </p:txBody>
+      </p:sp>
+      <p:pic>
+        <p:nvPicPr>
+          <p:cNvPr id="4" name="Grafik 3"/>
+          <p:cNvPicPr>
+            <a:picLocks noChangeAspect="1"/>
+          </p:cNvPicPr>
+          <p:nvPr/>
+        </p:nvPicPr>
+        <p:blipFill>
+          <a:blip r:embed="rId3">
+            <a:extLst>
+              <a:ext uri="{28A0092B-C50C-407E-A947-70E740481C1C}">
+                <a14:useLocalDpi xmlns:a14="http://schemas.microsoft.com/office/drawing/2010/main" xmlns="" val="0"/>
+              </a:ext>
+            </a:extLst>
+          </a:blip>
+          <a:stretch>
+            <a:fillRect/>
+          </a:stretch>
+        </p:blipFill>
+        <p:spPr>
+          <a:xfrm>
+            <a:off x="11248792" y="5909733"/>
+            <a:ext cx="827314" cy="827314"/>
+          </a:xfrm>
+          <a:prstGeom prst="rect">
+            <a:avLst/>
+          </a:prstGeom>
+        </p:spPr>
+      </p:pic>
+      <p:sp>
+        <p:nvSpPr>
+          <p:cNvPr id="5" name="Foliennummernplatzhalter 4"/>
+          <p:cNvSpPr>
+            <a:spLocks noGrp="1"/>
+          </p:cNvSpPr>
+          <p:nvPr>
+            <p:ph type="sldNum" sz="quarter" idx="12"/>
+          </p:nvPr>
+        </p:nvSpPr>
+        <p:spPr/>
+        <p:txBody>
+          <a:bodyPr/>
+          <a:lstStyle/>
+          <a:p>
+            <a:fld id="{D57F1E4F-1CFF-5643-939E-217C01CDF565}" type="slidenum">
+              <a:rPr lang="en-US" smtClean="0"/>
+              <a:pPr/>
+              <a:t>10</a:t>
+            </a:fld>
+            <a:endParaRPr lang="en-US" dirty="0"/>
+          </a:p>
+        </p:txBody>
+      </p:sp>
+      <p:sp>
+        <p:nvSpPr>
+          <p:cNvPr id="6" name="Textfeld 5"/>
+          <p:cNvSpPr txBox="1"/>
+          <p:nvPr/>
+        </p:nvSpPr>
+        <p:spPr>
+          <a:xfrm>
+            <a:off x="372650" y="6156167"/>
+            <a:ext cx="10876142" cy="338554"/>
+          </a:xfrm>
+          <a:prstGeom prst="rect">
+            <a:avLst/>
+          </a:prstGeom>
+          <a:noFill/>
+        </p:spPr>
+        <p:txBody>
+          <a:bodyPr wrap="square" rtlCol="0">
+            <a:spAutoFit/>
+          </a:bodyPr>
+          <a:lstStyle/>
+          <a:p>
+            <a:r>
+              <a:rPr lang="de-DE" sz="1600" dirty="0" smtClean="0"/>
+              <a:t>13.02.2015  |  Software Engineering I  |  Nadine Feldmann, Lukas Huwe, Michael Kerkhoff, Sebastian Ochtrup</a:t>
+            </a:r>
+            <a:endParaRPr lang="de-DE" sz="1600" dirty="0"/>
+          </a:p>
+        </p:txBody>
+      </p:sp>
+    </p:spTree>
+    <p:extLst>
+      <p:ext uri="{BB962C8B-B14F-4D97-AF65-F5344CB8AC3E}">
+        <p14:creationId xmlns:p14="http://schemas.microsoft.com/office/powerpoint/2010/main" xmlns="" val="3216998357"/>
+      </p:ext>
+    </p:extLst>
+  </p:cSld>
+  <p:clrMapOvr>
+    <a:masterClrMapping/>
+  </p:clrMapOvr>
+  <p:timing>
+    <p:tnLst>
+      <p:par>
+        <p:cTn id="1" dur="indefinite" restart="never" nodeType="tmRoot"/>
+      </p:par>
+    </p:tnLst>
+  </p:timing>
+</p:sld>
+</file>
+
+<file path=ppt/slides/slide11.xml><?xml version="1.0" encoding="utf-8"?>
+<p:sld xmlns:a="http://schemas.openxmlformats.org/drawingml/2006/main" xmlns:r="http://schemas.openxmlformats.org/officeDocument/2006/relationships" xmlns:p="http://schemas.openxmlformats.org/presentationml/2006/main">
+  <p:cSld>
+    <p:spTree>
+      <p:nvGrpSpPr>
+        <p:cNvPr id="1" name=""/>
+        <p:cNvGrpSpPr/>
+        <p:nvPr/>
+      </p:nvGrpSpPr>
+      <p:grpSpPr>
+        <a:xfrm>
+          <a:off x="0" y="0"/>
+          <a:ext cx="0" cy="0"/>
+          <a:chOff x="0" y="0"/>
+          <a:chExt cx="0" cy="0"/>
+        </a:xfrm>
+      </p:grpSpPr>
+      <p:sp>
+        <p:nvSpPr>
+          <p:cNvPr id="2" name="Titel 1"/>
+          <p:cNvSpPr>
+            <a:spLocks noGrp="1"/>
+          </p:cNvSpPr>
+          <p:nvPr>
+            <p:ph type="title"/>
+          </p:nvPr>
+        </p:nvSpPr>
+        <p:spPr>
+          <a:xfrm>
+            <a:off x="1154953" y="2370667"/>
+            <a:ext cx="9469503" cy="1822514"/>
+          </a:xfrm>
+        </p:spPr>
+        <p:txBody>
+          <a:bodyPr/>
+          <a:lstStyle/>
+          <a:p>
+            <a:pPr algn="ctr"/>
+            <a:r>
+              <a:rPr lang="de-DE" sz="5400" dirty="0" smtClean="0"/>
+              <a:t>Noch Fragen?</a:t>
+            </a:r>
+            <a:endParaRPr lang="de-DE" sz="5400" dirty="0"/>
+          </a:p>
+        </p:txBody>
+      </p:sp>
+      <p:sp>
+        <p:nvSpPr>
+          <p:cNvPr id="5" name="Foliennummernplatzhalter 4"/>
+          <p:cNvSpPr>
+            <a:spLocks noGrp="1"/>
+          </p:cNvSpPr>
+          <p:nvPr>
+            <p:ph type="sldNum" sz="quarter" idx="12"/>
+          </p:nvPr>
+        </p:nvSpPr>
+        <p:spPr/>
+        <p:txBody>
+          <a:bodyPr/>
+          <a:lstStyle/>
+          <a:p>
+            <a:fld id="{D57F1E4F-1CFF-5643-939E-217C01CDF565}" type="slidenum">
+              <a:rPr lang="en-US" smtClean="0"/>
+              <a:pPr/>
+              <a:t>11</a:t>
+            </a:fld>
+            <a:endParaRPr lang="en-US" dirty="0"/>
+          </a:p>
+        </p:txBody>
+      </p:sp>
+      <p:pic>
+        <p:nvPicPr>
+          <p:cNvPr id="4" name="Grafik 3"/>
+          <p:cNvPicPr>
+            <a:picLocks noChangeAspect="1"/>
+          </p:cNvPicPr>
+          <p:nvPr/>
+        </p:nvPicPr>
+        <p:blipFill>
+          <a:blip r:embed="rId3">
+            <a:extLst>
+              <a:ext uri="{28A0092B-C50C-407E-A947-70E740481C1C}">
+                <a14:useLocalDpi xmlns:a14="http://schemas.microsoft.com/office/drawing/2010/main" xmlns="" val="0"/>
+              </a:ext>
+            </a:extLst>
+          </a:blip>
+          <a:stretch>
+            <a:fillRect/>
+          </a:stretch>
+        </p:blipFill>
+        <p:spPr>
+          <a:xfrm>
+            <a:off x="11248792" y="5909733"/>
+            <a:ext cx="827314" cy="827314"/>
+          </a:xfrm>
+          <a:prstGeom prst="rect">
+            <a:avLst/>
+          </a:prstGeom>
+        </p:spPr>
+      </p:pic>
+      <p:sp>
+        <p:nvSpPr>
+          <p:cNvPr id="6" name="Textfeld 5"/>
+          <p:cNvSpPr txBox="1"/>
+          <p:nvPr/>
+        </p:nvSpPr>
+        <p:spPr>
+          <a:xfrm>
+            <a:off x="372650" y="6156167"/>
+            <a:ext cx="10876142" cy="338554"/>
+          </a:xfrm>
+          <a:prstGeom prst="rect">
+            <a:avLst/>
+          </a:prstGeom>
+          <a:noFill/>
+        </p:spPr>
+        <p:txBody>
+          <a:bodyPr wrap="square" rtlCol="0">
+            <a:spAutoFit/>
+          </a:bodyPr>
+          <a:lstStyle/>
+          <a:p>
+            <a:r>
+              <a:rPr lang="de-DE" sz="1600" dirty="0" smtClean="0"/>
+              <a:t>13.02.2015  |  Software Engineering I  |  Nadine Feldmann, Lukas Huwe, Michael Kerkhoff, Sebastian Ochtrup</a:t>
+            </a:r>
+            <a:endParaRPr lang="de-DE" sz="1600" dirty="0"/>
+          </a:p>
+        </p:txBody>
+      </p:sp>
+    </p:spTree>
+    <p:extLst>
+      <p:ext uri="{BB962C8B-B14F-4D97-AF65-F5344CB8AC3E}">
+        <p14:creationId xmlns:p14="http://schemas.microsoft.com/office/powerpoint/2010/main" xmlns="" val="1786163146"/>
+      </p:ext>
+    </p:extLst>
+  </p:cSld>
+  <p:clrMapOvr>
+    <a:masterClrMapping/>
+  </p:clrMapOvr>
+  <p:timing>
+    <p:tnLst>
+      <p:par>
+        <p:cTn id="1" dur="indefinite" restart="never" nodeType="tmRoot"/>
+      </p:par>
+    </p:tnLst>
+  </p:timing>
+</p:sld>
+</file>
+
+<file path=ppt/slides/slide12.xml><?xml version="1.0" encoding="utf-8"?>
+<p:sld xmlns:a="http://schemas.openxmlformats.org/drawingml/2006/main" xmlns:r="http://schemas.openxmlformats.org/officeDocument/2006/relationships" xmlns:p="http://schemas.openxmlformats.org/presentationml/2006/main">
+  <p:cSld>
+    <p:spTree>
+      <p:nvGrpSpPr>
+        <p:cNvPr id="1" name=""/>
+        <p:cNvGrpSpPr/>
+        <p:nvPr/>
+      </p:nvGrpSpPr>
+      <p:grpSpPr>
+        <a:xfrm>
+          <a:off x="0" y="0"/>
+          <a:ext cx="0" cy="0"/>
+          <a:chOff x="0" y="0"/>
+          <a:chExt cx="0" cy="0"/>
+        </a:xfrm>
+      </p:grpSpPr>
+      <p:sp>
+        <p:nvSpPr>
+          <p:cNvPr id="2" name="Titel 1"/>
+          <p:cNvSpPr>
+            <a:spLocks noGrp="1"/>
+          </p:cNvSpPr>
+          <p:nvPr>
+            <p:ph type="title"/>
+          </p:nvPr>
+        </p:nvSpPr>
+        <p:spPr>
+          <a:xfrm>
+            <a:off x="1154953" y="2370667"/>
+            <a:ext cx="9469503" cy="1822514"/>
+          </a:xfrm>
+        </p:spPr>
+        <p:txBody>
+          <a:bodyPr/>
+          <a:lstStyle/>
+          <a:p>
+            <a:pPr algn="ctr"/>
+            <a:r>
+              <a:rPr lang="de-DE" dirty="0" smtClean="0"/>
+              <a:t>Vielen Dank für eure Aufmerksamkeit!</a:t>
+            </a:r>
+            <a:endParaRPr lang="de-DE" dirty="0"/>
+          </a:p>
+        </p:txBody>
+      </p:sp>
+      <p:sp>
+        <p:nvSpPr>
+          <p:cNvPr id="5" name="Foliennummernplatzhalter 4"/>
+          <p:cNvSpPr>
+            <a:spLocks noGrp="1"/>
+          </p:cNvSpPr>
+          <p:nvPr>
+            <p:ph type="sldNum" sz="quarter" idx="12"/>
+          </p:nvPr>
+        </p:nvSpPr>
+        <p:spPr/>
+        <p:txBody>
+          <a:bodyPr/>
+          <a:lstStyle/>
+          <a:p>
+            <a:fld id="{D57F1E4F-1CFF-5643-939E-217C01CDF565}" type="slidenum">
+              <a:rPr lang="en-US" smtClean="0"/>
+              <a:pPr/>
+              <a:t>12</a:t>
+            </a:fld>
+            <a:endParaRPr lang="en-US" dirty="0"/>
+          </a:p>
+        </p:txBody>
+      </p:sp>
+      <p:pic>
+        <p:nvPicPr>
+          <p:cNvPr id="4" name="Grafik 3"/>
+          <p:cNvPicPr>
+            <a:picLocks noChangeAspect="1"/>
+          </p:cNvPicPr>
+          <p:nvPr/>
+        </p:nvPicPr>
+        <p:blipFill>
+          <a:blip r:embed="rId3">
+            <a:extLst>
+              <a:ext uri="{28A0092B-C50C-407E-A947-70E740481C1C}">
+                <a14:useLocalDpi xmlns:a14="http://schemas.microsoft.com/office/drawing/2010/main" xmlns="" val="0"/>
+              </a:ext>
+            </a:extLst>
+          </a:blip>
+          <a:stretch>
+            <a:fillRect/>
+          </a:stretch>
+        </p:blipFill>
+        <p:spPr>
+          <a:xfrm>
+            <a:off x="11248792" y="5909733"/>
+            <a:ext cx="827314" cy="827314"/>
+          </a:xfrm>
+          <a:prstGeom prst="rect">
+            <a:avLst/>
+          </a:prstGeom>
+        </p:spPr>
+      </p:pic>
+      <p:sp>
+        <p:nvSpPr>
+          <p:cNvPr id="6" name="Textfeld 5"/>
+          <p:cNvSpPr txBox="1"/>
+          <p:nvPr/>
+        </p:nvSpPr>
+        <p:spPr>
+          <a:xfrm>
+            <a:off x="372650" y="6156167"/>
+            <a:ext cx="10876142" cy="338554"/>
+          </a:xfrm>
+          <a:prstGeom prst="rect">
+            <a:avLst/>
+          </a:prstGeom>
+          <a:noFill/>
+        </p:spPr>
+        <p:txBody>
+          <a:bodyPr wrap="square" rtlCol="0">
+            <a:spAutoFit/>
+          </a:bodyPr>
+          <a:lstStyle/>
+          <a:p>
+            <a:r>
+              <a:rPr lang="de-DE" sz="1600" dirty="0" smtClean="0"/>
+              <a:t>13.02.2015  |  Software Engineering I  |  Nadine Feldmann, Lukas Huwe, Michael Kerkhoff, Sebastian Ochtrup</a:t>
+            </a:r>
+            <a:endParaRPr lang="de-DE" sz="1600" dirty="0"/>
+          </a:p>
+        </p:txBody>
+      </p:sp>
+    </p:spTree>
+    <p:extLst>
+      <p:ext uri="{BB962C8B-B14F-4D97-AF65-F5344CB8AC3E}">
+        <p14:creationId xmlns:p14="http://schemas.microsoft.com/office/powerpoint/2010/main" xmlns="" val="1278744805"/>
+      </p:ext>
+    </p:extLst>
+  </p:cSld>
+  <p:clrMapOvr>
+    <a:masterClrMapping/>
+  </p:clrMapOvr>
+  <p:timing>
+    <p:tnLst>
+      <p:par>
+        <p:cTn id="1" dur="indefinite" restart="never" nodeType="tmRoot"/>
+      </p:par>
+    </p:tnLst>
+  </p:timing>
+</p:sld>
+</file>
+
+<file path=ppt/slides/slide13.xml><?xml version="1.0" encoding="utf-8"?>
+<p:sld xmlns:a="http://schemas.openxmlformats.org/drawingml/2006/main" xmlns:r="http://schemas.openxmlformats.org/officeDocument/2006/relationships" xmlns:p="http://schemas.openxmlformats.org/presentationml/2006/main">
+  <p:cSld>
+    <p:spTree>
+      <p:nvGrpSpPr>
+        <p:cNvPr id="1" name=""/>
+        <p:cNvGrpSpPr/>
+        <p:nvPr/>
+      </p:nvGrpSpPr>
+      <p:grpSpPr>
+        <a:xfrm>
+          <a:off x="0" y="0"/>
+          <a:ext cx="0" cy="0"/>
+          <a:chOff x="0" y="0"/>
+          <a:chExt cx="0" cy="0"/>
+        </a:xfrm>
+      </p:grpSpPr>
+      <p:sp>
+        <p:nvSpPr>
+          <p:cNvPr id="2" name="Titel 1"/>
+          <p:cNvSpPr>
+            <a:spLocks noGrp="1"/>
+          </p:cNvSpPr>
+          <p:nvPr>
+            <p:ph type="title"/>
+          </p:nvPr>
+        </p:nvSpPr>
+        <p:spPr/>
+        <p:txBody>
+          <a:bodyPr/>
+          <a:lstStyle/>
+          <a:p>
+            <a:r>
+              <a:rPr lang="de-DE" dirty="0" smtClean="0"/>
+              <a:t>Quellen</a:t>
+            </a:r>
+            <a:endParaRPr lang="de-DE" dirty="0"/>
+          </a:p>
+        </p:txBody>
+      </p:sp>
+      <p:sp>
+        <p:nvSpPr>
+          <p:cNvPr id="3" name="Inhaltsplatzhalter 2"/>
+          <p:cNvSpPr>
+            <a:spLocks noGrp="1"/>
+          </p:cNvSpPr>
+          <p:nvPr>
+            <p:ph idx="1"/>
+          </p:nvPr>
+        </p:nvSpPr>
+        <p:spPr/>
+        <p:txBody>
+          <a:bodyPr/>
+          <a:lstStyle/>
+          <a:p>
+            <a:r>
+              <a:rPr lang="de-DE" dirty="0" smtClean="0">
+                <a:hlinkClick r:id="rId3"/>
+              </a:rPr>
+              <a:t>www.elcomsoft.com</a:t>
+            </a:r>
+            <a:endParaRPr lang="de-DE" dirty="0" smtClean="0"/>
+          </a:p>
+          <a:p>
+            <a:r>
+              <a:rPr lang="de-DE" dirty="0" smtClean="0">
+                <a:hlinkClick r:id="rId4"/>
+              </a:rPr>
+              <a:t>www.elcomsoft.com/WP/BH-EU-2012-WP.pdf</a:t>
+            </a:r>
+            <a:endParaRPr lang="de-DE" dirty="0" smtClean="0"/>
+          </a:p>
+          <a:p>
+            <a:endParaRPr lang="de-DE" dirty="0" smtClean="0"/>
+          </a:p>
+        </p:txBody>
+      </p:sp>
+      <p:pic>
+        <p:nvPicPr>
+          <p:cNvPr id="4" name="Grafik 3"/>
+          <p:cNvPicPr>
+            <a:picLocks noChangeAspect="1"/>
+          </p:cNvPicPr>
+          <p:nvPr/>
+        </p:nvPicPr>
+        <p:blipFill>
+          <a:blip r:embed="rId5">
+            <a:extLst>
+              <a:ext uri="{28A0092B-C50C-407E-A947-70E740481C1C}">
+                <a14:useLocalDpi xmlns:a14="http://schemas.microsoft.com/office/drawing/2010/main" xmlns="" val="0"/>
+              </a:ext>
+            </a:extLst>
+          </a:blip>
+          <a:stretch>
+            <a:fillRect/>
+          </a:stretch>
+        </p:blipFill>
+        <p:spPr>
+          <a:xfrm>
+            <a:off x="11248792" y="5909733"/>
+            <a:ext cx="827314" cy="827314"/>
+          </a:xfrm>
+          <a:prstGeom prst="rect">
+            <a:avLst/>
+          </a:prstGeom>
+        </p:spPr>
+      </p:pic>
+      <p:sp>
+        <p:nvSpPr>
+          <p:cNvPr id="5" name="Foliennummernplatzhalter 4"/>
+          <p:cNvSpPr>
+            <a:spLocks noGrp="1"/>
+          </p:cNvSpPr>
+          <p:nvPr>
+            <p:ph type="sldNum" sz="quarter" idx="12"/>
+          </p:nvPr>
+        </p:nvSpPr>
+        <p:spPr/>
+        <p:txBody>
+          <a:bodyPr/>
+          <a:lstStyle/>
+          <a:p>
+            <a:fld id="{D57F1E4F-1CFF-5643-939E-217C01CDF565}" type="slidenum">
+              <a:rPr lang="en-US" smtClean="0"/>
+              <a:pPr/>
+              <a:t>13</a:t>
+            </a:fld>
+            <a:endParaRPr lang="en-US" dirty="0"/>
+          </a:p>
+        </p:txBody>
+      </p:sp>
+      <p:sp>
+        <p:nvSpPr>
+          <p:cNvPr id="6" name="Textfeld 5"/>
+          <p:cNvSpPr txBox="1"/>
+          <p:nvPr/>
+        </p:nvSpPr>
+        <p:spPr>
+          <a:xfrm>
+            <a:off x="372650" y="6156167"/>
+            <a:ext cx="10876142" cy="338554"/>
+          </a:xfrm>
+          <a:prstGeom prst="rect">
+            <a:avLst/>
+          </a:prstGeom>
+          <a:noFill/>
+        </p:spPr>
+        <p:txBody>
+          <a:bodyPr wrap="square" rtlCol="0">
+            <a:spAutoFit/>
+          </a:bodyPr>
+          <a:lstStyle/>
+          <a:p>
+            <a:r>
+              <a:rPr lang="de-DE" sz="1600" dirty="0" smtClean="0"/>
+              <a:t>13.02.2015  |  Software Engineering I  |  Nadine Feldmann, Lukas Huwe, Michael Kerkhoff, Sebastian Ochtrup</a:t>
+            </a:r>
+            <a:endParaRPr lang="de-DE" sz="1600" dirty="0"/>
+          </a:p>
+        </p:txBody>
+      </p:sp>
+    </p:spTree>
+    <p:extLst>
+      <p:ext uri="{BB962C8B-B14F-4D97-AF65-F5344CB8AC3E}">
+        <p14:creationId xmlns:p14="http://schemas.microsoft.com/office/powerpoint/2010/main" xmlns="" val="3216998357"/>
       </p:ext>
     </p:extLst>
   </p:cSld>
@@ -14970,7 +16017,7 @@
           <a:blip r:embed="rId3">
             <a:extLst>
               <a:ext uri="{28A0092B-C50C-407E-A947-70E740481C1C}">
-                <a14:useLocalDpi xmlns:a14="http://schemas.microsoft.com/office/drawing/2010/main" val="0"/>
+                <a14:useLocalDpi xmlns:a14="http://schemas.microsoft.com/office/drawing/2010/main" xmlns="" val="0"/>
               </a:ext>
             </a:extLst>
           </a:blip>
@@ -15045,7 +16092,7 @@
     </p:spTree>
     <p:extLst>
       <p:ext uri="{BB962C8B-B14F-4D97-AF65-F5344CB8AC3E}">
-        <p14:creationId xmlns:p14="http://schemas.microsoft.com/office/powerpoint/2010/main" val="2132460779"/>
+        <p14:creationId xmlns:p14="http://schemas.microsoft.com/office/powerpoint/2010/main" xmlns="" val="2132460779"/>
       </p:ext>
     </p:extLst>
   </p:cSld>
@@ -15133,7 +16180,7 @@
           <a:blip r:embed="rId3">
             <a:extLst>
               <a:ext uri="{28A0092B-C50C-407E-A947-70E740481C1C}">
-                <a14:useLocalDpi xmlns:a14="http://schemas.microsoft.com/office/drawing/2010/main" val="0"/>
+                <a14:useLocalDpi xmlns:a14="http://schemas.microsoft.com/office/drawing/2010/main" xmlns="" val="0"/>
               </a:ext>
             </a:extLst>
           </a:blip>
@@ -15208,7 +16255,7 @@
     </p:spTree>
     <p:extLst>
       <p:ext uri="{BB962C8B-B14F-4D97-AF65-F5344CB8AC3E}">
-        <p14:creationId xmlns:p14="http://schemas.microsoft.com/office/powerpoint/2010/main" val="1662249724"/>
+        <p14:creationId xmlns:p14="http://schemas.microsoft.com/office/powerpoint/2010/main" xmlns="" val="1662249724"/>
       </p:ext>
     </p:extLst>
   </p:cSld>
@@ -15280,7 +16327,82 @@
           <a:bodyPr/>
           <a:lstStyle/>
           <a:p>
-            <a:endParaRPr lang="de-DE" dirty="0"/>
+            <a:r>
+              <a:rPr lang="de-DE" dirty="0" smtClean="0"/>
+              <a:t>Zunehmender Gefahrenanstieg</a:t>
+            </a:r>
+            <a:endParaRPr lang="de-DE" dirty="0" smtClean="0"/>
+          </a:p>
+          <a:p>
+            <a:pPr lvl="1"/>
+            <a:r>
+              <a:rPr lang="de-DE" dirty="0" err="1" smtClean="0"/>
+              <a:t>Brute</a:t>
+            </a:r>
+            <a:r>
+              <a:rPr lang="de-DE" dirty="0" smtClean="0"/>
+              <a:t> Force Angriffe sind durch eingeschränkten Schlüsselraum und zunehmende Rechenkapazität immer schneller</a:t>
+            </a:r>
+          </a:p>
+          <a:p>
+            <a:pPr lvl="1"/>
+            <a:r>
+              <a:rPr lang="de-DE" dirty="0" smtClean="0"/>
+              <a:t>Rechenkapazität lässt sich schon heute durch </a:t>
+            </a:r>
+            <a:r>
+              <a:rPr lang="de-DE" dirty="0" err="1" smtClean="0"/>
+              <a:t>Cloud</a:t>
+            </a:r>
+            <a:r>
+              <a:rPr lang="de-DE" dirty="0" smtClean="0"/>
+              <a:t> Computing flexibel </a:t>
+            </a:r>
+            <a:r>
+              <a:rPr lang="de-DE" dirty="0" err="1" smtClean="0"/>
+              <a:t>dazubuchen</a:t>
+            </a:r>
+            <a:endParaRPr lang="de-DE" dirty="0" smtClean="0"/>
+          </a:p>
+          <a:p>
+            <a:pPr lvl="1"/>
+            <a:r>
+              <a:rPr lang="de-DE" dirty="0" smtClean="0"/>
+              <a:t>Durch gezielte Angriffe erhöht sich das Risiko weiter</a:t>
+            </a:r>
+            <a:r>
+              <a:rPr lang="de-DE" dirty="0" smtClean="0"/>
+              <a:t> </a:t>
+            </a:r>
+            <a:r>
+              <a:rPr lang="de-DE" dirty="0" smtClean="0"/>
+              <a:t>(Wörterbuchangriff)</a:t>
+            </a:r>
+          </a:p>
+          <a:p>
+            <a:pPr lvl="1"/>
+            <a:r>
+              <a:rPr lang="de-DE" dirty="0" smtClean="0"/>
+              <a:t>Untersuchungen haben ergeben, dass 40 % aller geschäftlich genutzten Passwörter in Wörterbüchern zu finden sind</a:t>
+            </a:r>
+          </a:p>
+          <a:p>
+            <a:r>
+              <a:rPr lang="de-DE" dirty="0" smtClean="0"/>
+              <a:t>Studie zeigt, dass konventionelle Passwort Manager </a:t>
+            </a:r>
+            <a:r>
+              <a:rPr lang="de-DE" dirty="0" err="1" smtClean="0"/>
+              <a:t>Apps</a:t>
+            </a:r>
+            <a:r>
+              <a:rPr lang="de-DE" dirty="0" smtClean="0"/>
+              <a:t> ausnahmslos in kurzer Zeit geknackt werden können</a:t>
+            </a:r>
+            <a:endParaRPr lang="de-DE" dirty="0" smtClean="0"/>
+          </a:p>
+          <a:p>
+            <a:endParaRPr lang="de-DE" dirty="0" smtClean="0"/>
           </a:p>
         </p:txBody>
       </p:sp>
@@ -15296,7 +16418,7 @@
           <a:blip r:embed="rId3">
             <a:extLst>
               <a:ext uri="{28A0092B-C50C-407E-A947-70E740481C1C}">
-                <a14:useLocalDpi xmlns:a14="http://schemas.microsoft.com/office/drawing/2010/main" val="0"/>
+                <a14:useLocalDpi xmlns:a14="http://schemas.microsoft.com/office/drawing/2010/main" xmlns="" val="0"/>
               </a:ext>
             </a:extLst>
           </a:blip>
@@ -15371,7 +16493,7 @@
     </p:spTree>
     <p:extLst>
       <p:ext uri="{BB962C8B-B14F-4D97-AF65-F5344CB8AC3E}">
-        <p14:creationId xmlns:p14="http://schemas.microsoft.com/office/powerpoint/2010/main" val="4975384"/>
+        <p14:creationId xmlns:p14="http://schemas.microsoft.com/office/powerpoint/2010/main" xmlns="" val="4975384"/>
       </p:ext>
     </p:extLst>
   </p:cSld>
@@ -15422,7 +16544,7 @@
           <a:p>
             <a:r>
               <a:rPr lang="de-DE" dirty="0" smtClean="0"/>
-              <a:t>Werkzeugeinsatz</a:t>
+              <a:t>Konzept</a:t>
             </a:r>
             <a:endParaRPr lang="de-DE" dirty="0"/>
           </a:p>
@@ -15443,7 +16565,37 @@
           <a:bodyPr/>
           <a:lstStyle/>
           <a:p>
-            <a:endParaRPr lang="de-DE" dirty="0"/>
+            <a:r>
+              <a:rPr lang="de-DE" dirty="0" smtClean="0"/>
+              <a:t>Schwächen konventioneller Passwort Manager</a:t>
+            </a:r>
+          </a:p>
+          <a:p>
+            <a:pPr lvl="1"/>
+            <a:r>
+              <a:rPr lang="de-DE" dirty="0" smtClean="0"/>
+              <a:t>Rückmeldung an den Angreifer zur Korrektheit des Passworts</a:t>
+            </a:r>
+          </a:p>
+          <a:p>
+            <a:r>
+              <a:rPr lang="de-DE" dirty="0" smtClean="0"/>
+              <a:t>Der Clou</a:t>
+            </a:r>
+          </a:p>
+          <a:p>
+            <a:pPr lvl="1"/>
+            <a:r>
+              <a:rPr lang="de-DE" dirty="0" smtClean="0"/>
+              <a:t>Unabhängig der Korrektheit des Passworts werden die verwalteten Passwörter mit diesem Schlüssel entschlüsselt</a:t>
+            </a:r>
+          </a:p>
+          <a:p>
+            <a:pPr lvl="1"/>
+            <a:r>
+              <a:rPr lang="de-DE" dirty="0" smtClean="0"/>
+              <a:t>So erhält der Angreifer keine Rückmeldung zur Korrektheit des Passworts und weiß nicht ob der Angriff erfolgreich war</a:t>
+            </a:r>
           </a:p>
         </p:txBody>
       </p:sp>
@@ -15459,7 +16611,7 @@
           <a:blip r:embed="rId3">
             <a:extLst>
               <a:ext uri="{28A0092B-C50C-407E-A947-70E740481C1C}">
-                <a14:useLocalDpi xmlns:a14="http://schemas.microsoft.com/office/drawing/2010/main" val="0"/>
+                <a14:useLocalDpi xmlns:a14="http://schemas.microsoft.com/office/drawing/2010/main" xmlns="" val="0"/>
               </a:ext>
             </a:extLst>
           </a:blip>
@@ -15534,7 +16686,7 @@
     </p:spTree>
     <p:extLst>
       <p:ext uri="{BB962C8B-B14F-4D97-AF65-F5344CB8AC3E}">
-        <p14:creationId xmlns:p14="http://schemas.microsoft.com/office/powerpoint/2010/main" val="14036120"/>
+        <p14:creationId xmlns:p14="http://schemas.microsoft.com/office/powerpoint/2010/main" xmlns="" val="4975384"/>
       </p:ext>
     </p:extLst>
   </p:cSld>
@@ -15585,27 +16737,8 @@
           <a:p>
             <a:r>
               <a:rPr lang="de-DE" dirty="0" smtClean="0"/>
-              <a:t>Demo</a:t>
+              <a:t>Konzept</a:t>
             </a:r>
-            <a:endParaRPr lang="de-DE" dirty="0"/>
-          </a:p>
-        </p:txBody>
-      </p:sp>
-      <p:sp>
-        <p:nvSpPr>
-          <p:cNvPr id="3" name="Inhaltsplatzhalter 2"/>
-          <p:cNvSpPr>
-            <a:spLocks noGrp="1"/>
-          </p:cNvSpPr>
-          <p:nvPr>
-            <p:ph idx="1"/>
-          </p:nvPr>
-        </p:nvSpPr>
-        <p:spPr/>
-        <p:txBody>
-          <a:bodyPr/>
-          <a:lstStyle/>
-          <a:p>
             <a:endParaRPr lang="de-DE" dirty="0"/>
           </a:p>
         </p:txBody>
@@ -15622,7 +16755,7 @@
           <a:blip r:embed="rId3">
             <a:extLst>
               <a:ext uri="{28A0092B-C50C-407E-A947-70E740481C1C}">
-                <a14:useLocalDpi xmlns:a14="http://schemas.microsoft.com/office/drawing/2010/main" val="0"/>
+                <a14:useLocalDpi xmlns:a14="http://schemas.microsoft.com/office/drawing/2010/main" xmlns="" val="0"/>
               </a:ext>
             </a:extLst>
           </a:blip>
@@ -15694,24 +16827,193 @@
           </a:p>
         </p:txBody>
       </p:sp>
+      <p:pic>
+        <p:nvPicPr>
+          <p:cNvPr id="3074" name="Picture 2" descr="http://www.clker.com/cliparts/W/X/S/3/C/f/safe-md.png"/>
+          <p:cNvPicPr>
+            <a:picLocks noChangeAspect="1" noChangeArrowheads="1"/>
+          </p:cNvPicPr>
+          <p:nvPr/>
+        </p:nvPicPr>
+        <p:blipFill>
+          <a:blip r:embed="rId4"/>
+          <a:srcRect/>
+          <a:stretch>
+            <a:fillRect/>
+          </a:stretch>
+        </p:blipFill>
+        <p:spPr bwMode="auto">
+          <a:xfrm>
+            <a:off x="3508375" y="2642054"/>
+            <a:ext cx="2400300" cy="2838450"/>
+          </a:xfrm>
+          <a:prstGeom prst="rect">
+            <a:avLst/>
+          </a:prstGeom>
+          <a:noFill/>
+        </p:spPr>
+      </p:pic>
+      <p:sp>
+        <p:nvSpPr>
+          <p:cNvPr id="10" name="Pfeil nach rechts 9"/>
+          <p:cNvSpPr/>
+          <p:nvPr/>
+        </p:nvSpPr>
+        <p:spPr>
+          <a:xfrm>
+            <a:off x="762000" y="3494315"/>
+            <a:ext cx="2547257" cy="838200"/>
+          </a:xfrm>
+          <a:prstGeom prst="rightArrow">
+            <a:avLst/>
+          </a:prstGeom>
+        </p:spPr>
+        <p:style>
+          <a:lnRef idx="1">
+            <a:schemeClr val="accent1"/>
+          </a:lnRef>
+          <a:fillRef idx="2">
+            <a:schemeClr val="accent1"/>
+          </a:fillRef>
+          <a:effectRef idx="1">
+            <a:schemeClr val="accent1"/>
+          </a:effectRef>
+          <a:fontRef idx="minor">
+            <a:schemeClr val="dk1"/>
+          </a:fontRef>
+        </p:style>
+        <p:txBody>
+          <a:bodyPr rtlCol="0" anchor="ctr"/>
+          <a:lstStyle/>
+          <a:p>
+            <a:pPr algn="ctr"/>
+            <a:r>
+              <a:rPr lang="de-DE" dirty="0" smtClean="0"/>
+              <a:t>Korrektes Passwort</a:t>
+            </a:r>
+            <a:endParaRPr lang="de-DE" dirty="0"/>
+          </a:p>
+        </p:txBody>
+      </p:sp>
+      <p:sp>
+        <p:nvSpPr>
+          <p:cNvPr id="11" name="Pfeil nach rechts 10"/>
+          <p:cNvSpPr/>
+          <p:nvPr/>
+        </p:nvSpPr>
+        <p:spPr>
+          <a:xfrm>
+            <a:off x="6389914" y="3483430"/>
+            <a:ext cx="2547257" cy="838200"/>
+          </a:xfrm>
+          <a:prstGeom prst="rightArrow">
+            <a:avLst/>
+          </a:prstGeom>
+        </p:spPr>
+        <p:style>
+          <a:lnRef idx="2">
+            <a:schemeClr val="accent1">
+              <a:shade val="50000"/>
+            </a:schemeClr>
+          </a:lnRef>
+          <a:fillRef idx="1">
+            <a:schemeClr val="accent1"/>
+          </a:fillRef>
+          <a:effectRef idx="0">
+            <a:schemeClr val="accent1"/>
+          </a:effectRef>
+          <a:fontRef idx="minor">
+            <a:schemeClr val="lt1"/>
+          </a:fontRef>
+        </p:style>
+        <p:txBody>
+          <a:bodyPr rtlCol="0" anchor="ctr"/>
+          <a:lstStyle/>
+          <a:p>
+            <a:pPr algn="ctr"/>
+            <a:endParaRPr lang="de-DE" dirty="0"/>
+          </a:p>
+        </p:txBody>
+      </p:sp>
+      <p:pic>
+        <p:nvPicPr>
+          <p:cNvPr id="3076" name="Picture 4" descr="http://www.clker.com/cliparts/b/W/B/r/n/A/yellow-sticky-md.png"/>
+          <p:cNvPicPr>
+            <a:picLocks noChangeAspect="1" noChangeArrowheads="1"/>
+          </p:cNvPicPr>
+          <p:nvPr/>
+        </p:nvPicPr>
+        <p:blipFill>
+          <a:blip r:embed="rId5"/>
+          <a:srcRect/>
+          <a:stretch>
+            <a:fillRect/>
+          </a:stretch>
+        </p:blipFill>
+        <p:spPr bwMode="auto">
+          <a:xfrm>
+            <a:off x="9410452" y="3015341"/>
+            <a:ext cx="2332966" cy="2169659"/>
+          </a:xfrm>
+          <a:prstGeom prst="rect">
+            <a:avLst/>
+          </a:prstGeom>
+          <a:noFill/>
+        </p:spPr>
+      </p:pic>
+      <p:sp>
+        <p:nvSpPr>
+          <p:cNvPr id="14" name="Textfeld 13"/>
+          <p:cNvSpPr txBox="1"/>
+          <p:nvPr/>
+        </p:nvSpPr>
+        <p:spPr>
+          <a:xfrm>
+            <a:off x="9688287" y="3211285"/>
+            <a:ext cx="1621971" cy="923330"/>
+          </a:xfrm>
+          <a:prstGeom prst="rect">
+            <a:avLst/>
+          </a:prstGeom>
+          <a:noFill/>
+        </p:spPr>
+        <p:txBody>
+          <a:bodyPr wrap="square" rtlCol="0">
+            <a:spAutoFit/>
+          </a:bodyPr>
+          <a:lstStyle/>
+          <a:p>
+            <a:r>
+              <a:rPr lang="de-DE" dirty="0" smtClean="0"/>
+              <a:t>Passwort:</a:t>
+            </a:r>
+          </a:p>
+          <a:p>
+            <a:endParaRPr lang="de-DE" dirty="0" smtClean="0"/>
+          </a:p>
+          <a:p>
+            <a:r>
+              <a:rPr lang="de-DE" dirty="0" smtClean="0"/>
+              <a:t>Top </a:t>
+            </a:r>
+            <a:r>
+              <a:rPr lang="de-DE" dirty="0" err="1" smtClean="0"/>
+              <a:t>secret</a:t>
+            </a:r>
+            <a:endParaRPr lang="de-DE" dirty="0"/>
+          </a:p>
+        </p:txBody>
+      </p:sp>
     </p:spTree>
     <p:extLst>
       <p:ext uri="{BB962C8B-B14F-4D97-AF65-F5344CB8AC3E}">
-        <p14:creationId xmlns:p14="http://schemas.microsoft.com/office/powerpoint/2010/main" val="3667091251"/>
+        <p14:creationId xmlns:p14="http://schemas.microsoft.com/office/powerpoint/2010/main" xmlns="" val="4975384"/>
       </p:ext>
     </p:extLst>
   </p:cSld>
   <p:clrMapOvr>
     <a:masterClrMapping/>
   </p:clrMapOvr>
-  <mc:AlternateContent xmlns:mc="http://schemas.openxmlformats.org/markup-compatibility/2006">
-    <mc:Choice xmlns:p14="http://schemas.microsoft.com/office/powerpoint/2010/main" Requires="p14">
-      <p:transition spd="slow" p14:dur="2000"/>
-    </mc:Choice>
-    <mc:Fallback>
-      <p:transition spd="slow"/>
-    </mc:Fallback>
-  </mc:AlternateContent>
   <p:timing>
     <p:tnLst>
       <p:par>
@@ -15756,41 +17058,9 @@
           <a:p>
             <a:r>
               <a:rPr lang="de-DE" dirty="0" smtClean="0"/>
-              <a:t>Reflexion</a:t>
+              <a:t>Konzept</a:t>
             </a:r>
             <a:endParaRPr lang="de-DE" dirty="0"/>
-          </a:p>
-        </p:txBody>
-      </p:sp>
-      <p:sp>
-        <p:nvSpPr>
-          <p:cNvPr id="3" name="Inhaltsplatzhalter 2"/>
-          <p:cNvSpPr>
-            <a:spLocks noGrp="1"/>
-          </p:cNvSpPr>
-          <p:nvPr>
-            <p:ph idx="1"/>
-          </p:nvPr>
-        </p:nvSpPr>
-        <p:spPr/>
-        <p:txBody>
-          <a:bodyPr/>
-          <a:lstStyle/>
-          <a:p>
-            <a:r>
-              <a:rPr lang="de-DE" dirty="0" smtClean="0"/>
-              <a:t>Kurze Werkzeugbewertung</a:t>
-            </a:r>
-            <a:endParaRPr lang="de-DE" dirty="0" smtClean="0"/>
-          </a:p>
-          <a:p>
-            <a:r>
-              <a:rPr lang="de-DE" dirty="0" smtClean="0"/>
-              <a:t>Vorgehen im Team</a:t>
-            </a:r>
-          </a:p>
-          <a:p>
-            <a:endParaRPr lang="de-DE" dirty="0" smtClean="0"/>
           </a:p>
         </p:txBody>
       </p:sp>
@@ -15806,7 +17076,7 @@
           <a:blip r:embed="rId3">
             <a:extLst>
               <a:ext uri="{28A0092B-C50C-407E-A947-70E740481C1C}">
-                <a14:useLocalDpi xmlns:a14="http://schemas.microsoft.com/office/drawing/2010/main" val="0"/>
+                <a14:useLocalDpi xmlns:a14="http://schemas.microsoft.com/office/drawing/2010/main" xmlns="" val="0"/>
               </a:ext>
             </a:extLst>
           </a:blip>
@@ -15878,10 +17148,191 @@
           </a:p>
         </p:txBody>
       </p:sp>
+      <p:pic>
+        <p:nvPicPr>
+          <p:cNvPr id="3074" name="Picture 2" descr="http://www.clker.com/cliparts/W/X/S/3/C/f/safe-md.png"/>
+          <p:cNvPicPr>
+            <a:picLocks noChangeAspect="1" noChangeArrowheads="1"/>
+          </p:cNvPicPr>
+          <p:nvPr/>
+        </p:nvPicPr>
+        <p:blipFill>
+          <a:blip r:embed="rId4"/>
+          <a:srcRect/>
+          <a:stretch>
+            <a:fillRect/>
+          </a:stretch>
+        </p:blipFill>
+        <p:spPr bwMode="auto">
+          <a:xfrm>
+            <a:off x="3508375" y="2642054"/>
+            <a:ext cx="2400300" cy="2838450"/>
+          </a:xfrm>
+          <a:prstGeom prst="rect">
+            <a:avLst/>
+          </a:prstGeom>
+          <a:noFill/>
+        </p:spPr>
+      </p:pic>
+      <p:sp>
+        <p:nvSpPr>
+          <p:cNvPr id="10" name="Pfeil nach rechts 9"/>
+          <p:cNvSpPr/>
+          <p:nvPr/>
+        </p:nvSpPr>
+        <p:spPr>
+          <a:xfrm>
+            <a:off x="762000" y="3494315"/>
+            <a:ext cx="2547257" cy="838200"/>
+          </a:xfrm>
+          <a:prstGeom prst="rightArrow">
+            <a:avLst/>
+          </a:prstGeom>
+        </p:spPr>
+        <p:style>
+          <a:lnRef idx="1">
+            <a:schemeClr val="accent3"/>
+          </a:lnRef>
+          <a:fillRef idx="2">
+            <a:schemeClr val="accent3"/>
+          </a:fillRef>
+          <a:effectRef idx="1">
+            <a:schemeClr val="accent3"/>
+          </a:effectRef>
+          <a:fontRef idx="minor">
+            <a:schemeClr val="dk1"/>
+          </a:fontRef>
+        </p:style>
+        <p:txBody>
+          <a:bodyPr rtlCol="0" anchor="ctr"/>
+          <a:lstStyle/>
+          <a:p>
+            <a:pPr algn="ctr"/>
+            <a:r>
+              <a:rPr lang="de-DE" dirty="0" smtClean="0"/>
+              <a:t>Falsches Passwort</a:t>
+            </a:r>
+            <a:endParaRPr lang="de-DE" dirty="0"/>
+          </a:p>
+        </p:txBody>
+      </p:sp>
+      <p:sp>
+        <p:nvSpPr>
+          <p:cNvPr id="11" name="Pfeil nach rechts 10"/>
+          <p:cNvSpPr/>
+          <p:nvPr/>
+        </p:nvSpPr>
+        <p:spPr>
+          <a:xfrm>
+            <a:off x="6389914" y="3483430"/>
+            <a:ext cx="2547257" cy="838200"/>
+          </a:xfrm>
+          <a:prstGeom prst="rightArrow">
+            <a:avLst/>
+          </a:prstGeom>
+        </p:spPr>
+        <p:style>
+          <a:lnRef idx="2">
+            <a:schemeClr val="accent1">
+              <a:shade val="50000"/>
+            </a:schemeClr>
+          </a:lnRef>
+          <a:fillRef idx="1">
+            <a:schemeClr val="accent1"/>
+          </a:fillRef>
+          <a:effectRef idx="0">
+            <a:schemeClr val="accent1"/>
+          </a:effectRef>
+          <a:fontRef idx="minor">
+            <a:schemeClr val="lt1"/>
+          </a:fontRef>
+        </p:style>
+        <p:txBody>
+          <a:bodyPr rtlCol="0" anchor="ctr"/>
+          <a:lstStyle/>
+          <a:p>
+            <a:pPr algn="ctr"/>
+            <a:endParaRPr lang="de-DE" dirty="0"/>
+          </a:p>
+        </p:txBody>
+      </p:sp>
+      <p:pic>
+        <p:nvPicPr>
+          <p:cNvPr id="3076" name="Picture 4" descr="http://www.clker.com/cliparts/b/W/B/r/n/A/yellow-sticky-md.png"/>
+          <p:cNvPicPr>
+            <a:picLocks noChangeAspect="1" noChangeArrowheads="1"/>
+          </p:cNvPicPr>
+          <p:nvPr/>
+        </p:nvPicPr>
+        <p:blipFill>
+          <a:blip r:embed="rId5"/>
+          <a:srcRect/>
+          <a:stretch>
+            <a:fillRect/>
+          </a:stretch>
+        </p:blipFill>
+        <p:spPr bwMode="auto">
+          <a:xfrm>
+            <a:off x="9410452" y="3015341"/>
+            <a:ext cx="2332966" cy="2169659"/>
+          </a:xfrm>
+          <a:prstGeom prst="rect">
+            <a:avLst/>
+          </a:prstGeom>
+          <a:noFill/>
+        </p:spPr>
+      </p:pic>
+      <p:sp>
+        <p:nvSpPr>
+          <p:cNvPr id="14" name="Textfeld 13"/>
+          <p:cNvSpPr txBox="1"/>
+          <p:nvPr/>
+        </p:nvSpPr>
+        <p:spPr>
+          <a:xfrm>
+            <a:off x="9688287" y="3211285"/>
+            <a:ext cx="1621971" cy="923330"/>
+          </a:xfrm>
+          <a:prstGeom prst="rect">
+            <a:avLst/>
+          </a:prstGeom>
+          <a:noFill/>
+        </p:spPr>
+        <p:txBody>
+          <a:bodyPr wrap="square" rtlCol="0">
+            <a:spAutoFit/>
+          </a:bodyPr>
+          <a:lstStyle/>
+          <a:p>
+            <a:r>
+              <a:rPr lang="de-DE" dirty="0" smtClean="0"/>
+              <a:t>Passwort:</a:t>
+            </a:r>
+          </a:p>
+          <a:p>
+            <a:endParaRPr lang="de-DE" dirty="0" smtClean="0"/>
+          </a:p>
+          <a:p>
+            <a:r>
+              <a:rPr lang="de-DE" dirty="0" err="1" smtClean="0"/>
+              <a:t>Jmn</a:t>
+            </a:r>
+            <a:r>
+              <a:rPr lang="de-DE" dirty="0" smtClean="0"/>
+              <a:t> </a:t>
+            </a:r>
+            <a:r>
+              <a:rPr lang="de-DE" dirty="0" err="1" smtClean="0"/>
+              <a:t>fgpdfk</a:t>
+            </a:r>
+            <a:endParaRPr lang="de-DE" dirty="0"/>
+          </a:p>
+        </p:txBody>
+      </p:sp>
     </p:spTree>
     <p:extLst>
       <p:ext uri="{BB962C8B-B14F-4D97-AF65-F5344CB8AC3E}">
-        <p14:creationId xmlns:p14="http://schemas.microsoft.com/office/powerpoint/2010/main" val="3216998357"/>
+        <p14:creationId xmlns:p14="http://schemas.microsoft.com/office/powerpoint/2010/main" xmlns="" val="4975384"/>
       </p:ext>
     </p:extLst>
   </p:cSld>
@@ -15925,33 +17376,27 @@
             <p:ph type="title"/>
           </p:nvPr>
         </p:nvSpPr>
-        <p:spPr>
-          <a:xfrm>
-            <a:off x="1154953" y="2370667"/>
-            <a:ext cx="9469503" cy="1822514"/>
-          </a:xfrm>
-        </p:spPr>
+        <p:spPr/>
         <p:txBody>
           <a:bodyPr/>
           <a:lstStyle/>
           <a:p>
-            <a:pPr algn="ctr"/>
             <a:r>
-              <a:rPr lang="de-DE" sz="5400" dirty="0" smtClean="0"/>
-              <a:t>Noch Fragen?</a:t>
+              <a:rPr lang="de-DE" dirty="0" smtClean="0"/>
+              <a:t>Werkzeugeinsatz</a:t>
             </a:r>
-            <a:endParaRPr lang="de-DE" sz="5400" dirty="0"/>
-          </a:p>
-        </p:txBody>
-      </p:sp>
-      <p:sp>
-        <p:nvSpPr>
-          <p:cNvPr id="5" name="Foliennummernplatzhalter 4"/>
+            <a:endParaRPr lang="de-DE" dirty="0"/>
+          </a:p>
+        </p:txBody>
+      </p:sp>
+      <p:sp>
+        <p:nvSpPr>
+          <p:cNvPr id="3" name="Inhaltsplatzhalter 2"/>
           <p:cNvSpPr>
             <a:spLocks noGrp="1"/>
           </p:cNvSpPr>
           <p:nvPr>
-            <p:ph type="sldNum" sz="quarter" idx="12"/>
+            <p:ph idx="1"/>
           </p:nvPr>
         </p:nvSpPr>
         <p:spPr/>
@@ -15959,12 +17404,7 @@
           <a:bodyPr/>
           <a:lstStyle/>
           <a:p>
-            <a:fld id="{D57F1E4F-1CFF-5643-939E-217C01CDF565}" type="slidenum">
-              <a:rPr lang="en-US" smtClean="0"/>
-              <a:pPr/>
-              <a:t>8</a:t>
-            </a:fld>
-            <a:endParaRPr lang="en-US" dirty="0"/>
+            <a:endParaRPr lang="de-DE" dirty="0"/>
           </a:p>
         </p:txBody>
       </p:sp>
@@ -15980,7 +17420,7 @@
           <a:blip r:embed="rId3">
             <a:extLst>
               <a:ext uri="{28A0092B-C50C-407E-A947-70E740481C1C}">
-                <a14:useLocalDpi xmlns:a14="http://schemas.microsoft.com/office/drawing/2010/main" val="0"/>
+                <a14:useLocalDpi xmlns:a14="http://schemas.microsoft.com/office/drawing/2010/main" xmlns="" val="0"/>
               </a:ext>
             </a:extLst>
           </a:blip>
@@ -16000,6 +17440,30 @@
       </p:pic>
       <p:sp>
         <p:nvSpPr>
+          <p:cNvPr id="5" name="Foliennummernplatzhalter 4"/>
+          <p:cNvSpPr>
+            <a:spLocks noGrp="1"/>
+          </p:cNvSpPr>
+          <p:nvPr>
+            <p:ph type="sldNum" sz="quarter" idx="12"/>
+          </p:nvPr>
+        </p:nvSpPr>
+        <p:spPr/>
+        <p:txBody>
+          <a:bodyPr/>
+          <a:lstStyle/>
+          <a:p>
+            <a:fld id="{D57F1E4F-1CFF-5643-939E-217C01CDF565}" type="slidenum">
+              <a:rPr lang="en-US" smtClean="0"/>
+              <a:pPr/>
+              <a:t>8</a:t>
+            </a:fld>
+            <a:endParaRPr lang="en-US" dirty="0"/>
+          </a:p>
+        </p:txBody>
+      </p:sp>
+      <p:sp>
+        <p:nvSpPr>
           <p:cNvPr id="6" name="Textfeld 5"/>
           <p:cNvSpPr txBox="1"/>
           <p:nvPr/>
@@ -16031,7 +17495,7 @@
     </p:spTree>
     <p:extLst>
       <p:ext uri="{BB962C8B-B14F-4D97-AF65-F5344CB8AC3E}">
-        <p14:creationId xmlns:p14="http://schemas.microsoft.com/office/powerpoint/2010/main" val="1786163146"/>
+        <p14:creationId xmlns:p14="http://schemas.microsoft.com/office/powerpoint/2010/main" xmlns="" val="14036120"/>
       </p:ext>
     </p:extLst>
   </p:cSld>
@@ -16075,20 +17539,14 @@
             <p:ph type="title"/>
           </p:nvPr>
         </p:nvSpPr>
-        <p:spPr>
-          <a:xfrm>
-            <a:off x="1154953" y="2370667"/>
-            <a:ext cx="9469503" cy="1822514"/>
-          </a:xfrm>
-        </p:spPr>
+        <p:spPr/>
         <p:txBody>
           <a:bodyPr/>
           <a:lstStyle/>
           <a:p>
-            <a:pPr algn="ctr"/>
             <a:r>
               <a:rPr lang="de-DE" dirty="0" smtClean="0"/>
-              <a:t>Vielen Dank für eure Aufmerksamkeit!</a:t>
+              <a:t>Demo</a:t>
             </a:r>
             <a:endParaRPr lang="de-DE" dirty="0"/>
           </a:p>
@@ -16096,12 +17554,12 @@
       </p:sp>
       <p:sp>
         <p:nvSpPr>
-          <p:cNvPr id="5" name="Foliennummernplatzhalter 4"/>
+          <p:cNvPr id="3" name="Inhaltsplatzhalter 2"/>
           <p:cNvSpPr>
             <a:spLocks noGrp="1"/>
           </p:cNvSpPr>
           <p:nvPr>
-            <p:ph type="sldNum" sz="quarter" idx="12"/>
+            <p:ph idx="1"/>
           </p:nvPr>
         </p:nvSpPr>
         <p:spPr/>
@@ -16109,12 +17567,7 @@
           <a:bodyPr/>
           <a:lstStyle/>
           <a:p>
-            <a:fld id="{D57F1E4F-1CFF-5643-939E-217C01CDF565}" type="slidenum">
-              <a:rPr lang="en-US" smtClean="0"/>
-              <a:pPr/>
-              <a:t>9</a:t>
-            </a:fld>
-            <a:endParaRPr lang="en-US" dirty="0"/>
+            <a:endParaRPr lang="de-DE" dirty="0"/>
           </a:p>
         </p:txBody>
       </p:sp>
@@ -16130,7 +17583,7 @@
           <a:blip r:embed="rId3">
             <a:extLst>
               <a:ext uri="{28A0092B-C50C-407E-A947-70E740481C1C}">
-                <a14:useLocalDpi xmlns:a14="http://schemas.microsoft.com/office/drawing/2010/main" val="0"/>
+                <a14:useLocalDpi xmlns:a14="http://schemas.microsoft.com/office/drawing/2010/main" xmlns="" val="0"/>
               </a:ext>
             </a:extLst>
           </a:blip>
@@ -16150,6 +17603,30 @@
       </p:pic>
       <p:sp>
         <p:nvSpPr>
+          <p:cNvPr id="5" name="Foliennummernplatzhalter 4"/>
+          <p:cNvSpPr>
+            <a:spLocks noGrp="1"/>
+          </p:cNvSpPr>
+          <p:nvPr>
+            <p:ph type="sldNum" sz="quarter" idx="12"/>
+          </p:nvPr>
+        </p:nvSpPr>
+        <p:spPr/>
+        <p:txBody>
+          <a:bodyPr/>
+          <a:lstStyle/>
+          <a:p>
+            <a:fld id="{D57F1E4F-1CFF-5643-939E-217C01CDF565}" type="slidenum">
+              <a:rPr lang="en-US" smtClean="0"/>
+              <a:pPr/>
+              <a:t>9</a:t>
+            </a:fld>
+            <a:endParaRPr lang="en-US" dirty="0"/>
+          </a:p>
+        </p:txBody>
+      </p:sp>
+      <p:sp>
+        <p:nvSpPr>
           <p:cNvPr id="6" name="Textfeld 5"/>
           <p:cNvSpPr txBox="1"/>
           <p:nvPr/>
@@ -16181,13 +17658,21 @@
     </p:spTree>
     <p:extLst>
       <p:ext uri="{BB962C8B-B14F-4D97-AF65-F5344CB8AC3E}">
-        <p14:creationId xmlns:p14="http://schemas.microsoft.com/office/powerpoint/2010/main" val="1278744805"/>
+        <p14:creationId xmlns:p14="http://schemas.microsoft.com/office/powerpoint/2010/main" xmlns="" val="3667091251"/>
       </p:ext>
     </p:extLst>
   </p:cSld>
   <p:clrMapOvr>
     <a:masterClrMapping/>
   </p:clrMapOvr>
+  <mc:AlternateContent xmlns:mc="http://schemas.openxmlformats.org/markup-compatibility/2006">
+    <mc:Choice xmlns:p14="http://schemas.microsoft.com/office/powerpoint/2010/main" xmlns="" Requires="p14">
+      <p:transition spd="slow" p14:dur="2000"/>
+    </mc:Choice>
+    <mc:Fallback>
+      <p:transition spd="slow"/>
+    </mc:Fallback>
+  </mc:AlternateContent>
   <p:timing>
     <p:tnLst>
       <p:par>
@@ -16241,7 +17726,7 @@
     </a:clrScheme>
     <a:fontScheme name="Ion Boardroom">
       <a:majorFont>
-        <a:latin typeface="Century Gothic" panose="020B0502020202020204"/>
+        <a:latin typeface="Century Gothic"/>
         <a:ea typeface=""/>
         <a:cs typeface=""/>
         <a:font script="Jpan" typeface="メイリオ"/>
@@ -16276,7 +17761,7 @@
         <a:font script="Geor" typeface="Sylfaen"/>
       </a:majorFont>
       <a:minorFont>
-        <a:latin typeface="Century Gothic" panose="020B0502020202020204"/>
+        <a:latin typeface="Century Gothic"/>
         <a:ea typeface=""/>
         <a:cs typeface=""/>
         <a:font script="Jpan" typeface="メイリオ"/>
@@ -16457,7 +17942,7 @@
   <a:extraClrSchemeLst/>
   <a:extLst>
     <a:ext uri="{05A4C25C-085E-4340-85A3-A5531E510DB2}">
-      <thm15:themeFamily xmlns:thm15="http://schemas.microsoft.com/office/thememl/2012/main" name="Ion Boardroom" id="{FC33163D-4339-46B1-8EED-24C834239D99}" vid="{A3AB87EF-B655-4FFF-8D05-F333AD7F2789}"/>
+      <thm15:themeFamily xmlns:thm15="http://schemas.microsoft.com/office/thememl/2012/main" xmlns="" name="Ion Boardroom" id="{FC33163D-4339-46B1-8EED-24C834239D99}" vid="{A3AB87EF-B655-4FFF-8D05-F333AD7F2789}"/>
     </a:ext>
   </a:extLst>
 </a:theme>
@@ -16506,7 +17991,7 @@
     </a:clrScheme>
     <a:fontScheme name="Office">
       <a:majorFont>
-        <a:latin typeface="Calibri Light" panose="020F0302020204030204"/>
+        <a:latin typeface="Calibri Light"/>
         <a:ea typeface=""/>
         <a:cs typeface=""/>
         <a:font script="Jpan" typeface="ＭＳ Ｐゴシック"/>
@@ -16541,7 +18026,7 @@
         <a:font script="Geor" typeface="Sylfaen"/>
       </a:majorFont>
       <a:minorFont>
-        <a:latin typeface="Calibri" panose="020F0502020204030204"/>
+        <a:latin typeface="Calibri"/>
         <a:ea typeface=""/>
         <a:cs typeface=""/>
         <a:font script="Jpan" typeface="ＭＳ Ｐゴシック"/>
@@ -16718,7 +18203,7 @@
   <a:extraClrSchemeLst/>
   <a:extLst>
     <a:ext uri="{05A4C25C-085E-4340-85A3-A5531E510DB2}">
-      <thm15:themeFamily xmlns:thm15="http://schemas.microsoft.com/office/thememl/2012/main" name="Office Theme" id="{62F939B6-93AF-4DB8-9C6B-D6C7DFDC589F}" vid="{4A3C46E8-61CC-4603-A589-7422A47A8E4A}"/>
+      <thm15:themeFamily xmlns:thm15="http://schemas.microsoft.com/office/thememl/2012/main" xmlns="" name="Office Theme" id="{62F939B6-93AF-4DB8-9C6B-D6C7DFDC589F}" vid="{4A3C46E8-61CC-4603-A589-7422A47A8E4A}"/>
     </a:ext>
   </a:extLst>
 </a:theme>

</xml_diff>

<commit_message>
Einfügen von meinem Teil der Präsentation
</commit_message>
<xml_diff>
--- a/Dokumentation/PWSafe Präsentation.pptx
+++ b/Dokumentation/PWSafe Präsentation.pptx
@@ -5,7 +5,7 @@
     <p:sldMasterId id="2147483648" r:id="rId1"/>
   </p:sldMasterIdLst>
   <p:notesMasterIdLst>
-    <p:notesMasterId r:id="rId15"/>
+    <p:notesMasterId r:id="rId19"/>
   </p:notesMasterIdLst>
   <p:sldIdLst>
     <p:sldId id="256" r:id="rId2"/>
@@ -16,11 +16,15 @@
     <p:sldId id="268" r:id="rId7"/>
     <p:sldId id="269" r:id="rId8"/>
     <p:sldId id="260" r:id="rId9"/>
-    <p:sldId id="261" r:id="rId10"/>
-    <p:sldId id="262" r:id="rId11"/>
-    <p:sldId id="263" r:id="rId12"/>
-    <p:sldId id="264" r:id="rId13"/>
-    <p:sldId id="265" r:id="rId14"/>
+    <p:sldId id="270" r:id="rId10"/>
+    <p:sldId id="271" r:id="rId11"/>
+    <p:sldId id="272" r:id="rId12"/>
+    <p:sldId id="273" r:id="rId13"/>
+    <p:sldId id="261" r:id="rId14"/>
+    <p:sldId id="262" r:id="rId15"/>
+    <p:sldId id="263" r:id="rId16"/>
+    <p:sldId id="264" r:id="rId17"/>
+    <p:sldId id="265" r:id="rId18"/>
   </p:sldIdLst>
   <p:sldSz cx="12192000" cy="6858000"/>
   <p:notesSz cx="6858000" cy="9144000"/>
@@ -121,10 +125,21 @@
   </p:defaultTextStyle>
   <p:extLst>
     <p:ext uri="{EFAFB233-063F-42B5-8137-9DF3F51BA10A}">
-      <p15:sldGuideLst xmlns:p15="http://schemas.microsoft.com/office/powerpoint/2012/main" xmlns=""/>
+      <p15:sldGuideLst xmlns:p15="http://schemas.microsoft.com/office/powerpoint/2012/main">
+        <p15:guide id="1" orient="horz" pos="2160">
+          <p15:clr>
+            <a:srgbClr val="A4A3A4"/>
+          </p15:clr>
+        </p15:guide>
+        <p15:guide id="2" pos="3840">
+          <p15:clr>
+            <a:srgbClr val="A4A3A4"/>
+          </p15:clr>
+        </p15:guide>
+      </p15:sldGuideLst>
     </p:ext>
     <p:ext uri="{2D200454-40CA-4A62-9FC3-DE9A4176ACB9}">
-      <p15:notesGuideLst xmlns:p15="http://schemas.microsoft.com/office/powerpoint/2012/main" xmlns=""/>
+      <p15:notesGuideLst xmlns:p15="http://schemas.microsoft.com/office/powerpoint/2012/main"/>
     </p:ext>
   </p:extLst>
 </p:presentation>
@@ -213,7 +228,7 @@
             <a:fld id="{B4AA8B1B-A85F-43ED-A41A-985067DF8577}" type="datetimeFigureOut">
               <a:rPr lang="de-DE" smtClean="0"/>
               <a:pPr/>
-              <a:t>08.02.2015</a:t>
+              <a:t>09.02.2015</a:t>
             </a:fld>
             <a:endParaRPr lang="de-DE"/>
           </a:p>
@@ -382,7 +397,7 @@
     </p:spTree>
     <p:extLst>
       <p:ext uri="{BB962C8B-B14F-4D97-AF65-F5344CB8AC3E}">
-        <p14:creationId xmlns:p14="http://schemas.microsoft.com/office/powerpoint/2010/main" xmlns="" val="2805633478"/>
+        <p14:creationId xmlns:p14="http://schemas.microsoft.com/office/powerpoint/2010/main" val="2805633478"/>
       </p:ext>
     </p:extLst>
   </p:cSld>
@@ -557,7 +572,7 @@
     </p:spTree>
     <p:extLst>
       <p:ext uri="{BB962C8B-B14F-4D97-AF65-F5344CB8AC3E}">
-        <p14:creationId xmlns:p14="http://schemas.microsoft.com/office/powerpoint/2010/main" xmlns="" val="855943066"/>
+        <p14:creationId xmlns:p14="http://schemas.microsoft.com/office/powerpoint/2010/main" val="855943066"/>
       </p:ext>
     </p:extLst>
   </p:cSld>
@@ -642,7 +657,7 @@
     </p:spTree>
     <p:extLst>
       <p:ext uri="{BB962C8B-B14F-4D97-AF65-F5344CB8AC3E}">
-        <p14:creationId xmlns:p14="http://schemas.microsoft.com/office/powerpoint/2010/main" xmlns="" val="3297351362"/>
+        <p14:creationId xmlns:p14="http://schemas.microsoft.com/office/powerpoint/2010/main" val="2145289091"/>
       </p:ext>
     </p:extLst>
   </p:cSld>
@@ -727,7 +742,7 @@
     </p:spTree>
     <p:extLst>
       <p:ext uri="{BB962C8B-B14F-4D97-AF65-F5344CB8AC3E}">
-        <p14:creationId xmlns:p14="http://schemas.microsoft.com/office/powerpoint/2010/main" xmlns="" val="784737350"/>
+        <p14:creationId xmlns:p14="http://schemas.microsoft.com/office/powerpoint/2010/main" val="461146694"/>
       </p:ext>
     </p:extLst>
   </p:cSld>
@@ -812,7 +827,347 @@
     </p:spTree>
     <p:extLst>
       <p:ext uri="{BB962C8B-B14F-4D97-AF65-F5344CB8AC3E}">
-        <p14:creationId xmlns:p14="http://schemas.microsoft.com/office/powerpoint/2010/main" xmlns="" val="1066156749"/>
+        <p14:creationId xmlns:p14="http://schemas.microsoft.com/office/powerpoint/2010/main" val="4219797847"/>
+      </p:ext>
+    </p:extLst>
+  </p:cSld>
+  <p:clrMapOvr>
+    <a:masterClrMapping/>
+  </p:clrMapOvr>
+</p:notes>
+</file>
+
+<file path=ppt/notesSlides/notesSlide13.xml><?xml version="1.0" encoding="utf-8"?>
+<p:notes xmlns:a="http://schemas.openxmlformats.org/drawingml/2006/main" xmlns:r="http://schemas.openxmlformats.org/officeDocument/2006/relationships" xmlns:p="http://schemas.openxmlformats.org/presentationml/2006/main">
+  <p:cSld>
+    <p:spTree>
+      <p:nvGrpSpPr>
+        <p:cNvPr id="1" name=""/>
+        <p:cNvGrpSpPr/>
+        <p:nvPr/>
+      </p:nvGrpSpPr>
+      <p:grpSpPr>
+        <a:xfrm>
+          <a:off x="0" y="0"/>
+          <a:ext cx="0" cy="0"/>
+          <a:chOff x="0" y="0"/>
+          <a:chExt cx="0" cy="0"/>
+        </a:xfrm>
+      </p:grpSpPr>
+      <p:sp>
+        <p:nvSpPr>
+          <p:cNvPr id="2" name="Folienbildplatzhalter 1"/>
+          <p:cNvSpPr>
+            <a:spLocks noGrp="1" noRot="1" noChangeAspect="1"/>
+          </p:cNvSpPr>
+          <p:nvPr>
+            <p:ph type="sldImg"/>
+          </p:nvPr>
+        </p:nvSpPr>
+        <p:spPr/>
+      </p:sp>
+      <p:sp>
+        <p:nvSpPr>
+          <p:cNvPr id="3" name="Notizenplatzhalter 2"/>
+          <p:cNvSpPr>
+            <a:spLocks noGrp="1"/>
+          </p:cNvSpPr>
+          <p:nvPr>
+            <p:ph type="body" idx="1"/>
+          </p:nvPr>
+        </p:nvSpPr>
+        <p:spPr/>
+        <p:txBody>
+          <a:bodyPr/>
+          <a:lstStyle/>
+          <a:p>
+            <a:endParaRPr lang="de-DE"/>
+          </a:p>
+        </p:txBody>
+      </p:sp>
+      <p:sp>
+        <p:nvSpPr>
+          <p:cNvPr id="4" name="Foliennummernplatzhalter 3"/>
+          <p:cNvSpPr>
+            <a:spLocks noGrp="1"/>
+          </p:cNvSpPr>
+          <p:nvPr>
+            <p:ph type="sldNum" sz="quarter" idx="10"/>
+          </p:nvPr>
+        </p:nvSpPr>
+        <p:spPr/>
+        <p:txBody>
+          <a:bodyPr/>
+          <a:lstStyle/>
+          <a:p>
+            <a:fld id="{05D1FABD-69C2-49F9-BD91-F05E017FE538}" type="slidenum">
+              <a:rPr lang="de-DE" smtClean="0"/>
+              <a:pPr/>
+              <a:t>14</a:t>
+            </a:fld>
+            <a:endParaRPr lang="de-DE"/>
+          </a:p>
+        </p:txBody>
+      </p:sp>
+    </p:spTree>
+    <p:extLst>
+      <p:ext uri="{BB962C8B-B14F-4D97-AF65-F5344CB8AC3E}">
+        <p14:creationId xmlns:p14="http://schemas.microsoft.com/office/powerpoint/2010/main" val="1066156749"/>
+      </p:ext>
+    </p:extLst>
+  </p:cSld>
+  <p:clrMapOvr>
+    <a:masterClrMapping/>
+  </p:clrMapOvr>
+</p:notes>
+</file>
+
+<file path=ppt/notesSlides/notesSlide14.xml><?xml version="1.0" encoding="utf-8"?>
+<p:notes xmlns:a="http://schemas.openxmlformats.org/drawingml/2006/main" xmlns:r="http://schemas.openxmlformats.org/officeDocument/2006/relationships" xmlns:p="http://schemas.openxmlformats.org/presentationml/2006/main">
+  <p:cSld>
+    <p:spTree>
+      <p:nvGrpSpPr>
+        <p:cNvPr id="1" name=""/>
+        <p:cNvGrpSpPr/>
+        <p:nvPr/>
+      </p:nvGrpSpPr>
+      <p:grpSpPr>
+        <a:xfrm>
+          <a:off x="0" y="0"/>
+          <a:ext cx="0" cy="0"/>
+          <a:chOff x="0" y="0"/>
+          <a:chExt cx="0" cy="0"/>
+        </a:xfrm>
+      </p:grpSpPr>
+      <p:sp>
+        <p:nvSpPr>
+          <p:cNvPr id="2" name="Folienbildplatzhalter 1"/>
+          <p:cNvSpPr>
+            <a:spLocks noGrp="1" noRot="1" noChangeAspect="1"/>
+          </p:cNvSpPr>
+          <p:nvPr>
+            <p:ph type="sldImg"/>
+          </p:nvPr>
+        </p:nvSpPr>
+        <p:spPr/>
+      </p:sp>
+      <p:sp>
+        <p:nvSpPr>
+          <p:cNvPr id="3" name="Notizenplatzhalter 2"/>
+          <p:cNvSpPr>
+            <a:spLocks noGrp="1"/>
+          </p:cNvSpPr>
+          <p:nvPr>
+            <p:ph type="body" idx="1"/>
+          </p:nvPr>
+        </p:nvSpPr>
+        <p:spPr/>
+        <p:txBody>
+          <a:bodyPr/>
+          <a:lstStyle/>
+          <a:p>
+            <a:endParaRPr lang="de-DE"/>
+          </a:p>
+        </p:txBody>
+      </p:sp>
+      <p:sp>
+        <p:nvSpPr>
+          <p:cNvPr id="4" name="Foliennummernplatzhalter 3"/>
+          <p:cNvSpPr>
+            <a:spLocks noGrp="1"/>
+          </p:cNvSpPr>
+          <p:nvPr>
+            <p:ph type="sldNum" sz="quarter" idx="10"/>
+          </p:nvPr>
+        </p:nvSpPr>
+        <p:spPr/>
+        <p:txBody>
+          <a:bodyPr/>
+          <a:lstStyle/>
+          <a:p>
+            <a:fld id="{05D1FABD-69C2-49F9-BD91-F05E017FE538}" type="slidenum">
+              <a:rPr lang="de-DE" smtClean="0"/>
+              <a:pPr/>
+              <a:t>15</a:t>
+            </a:fld>
+            <a:endParaRPr lang="de-DE"/>
+          </a:p>
+        </p:txBody>
+      </p:sp>
+    </p:spTree>
+    <p:extLst>
+      <p:ext uri="{BB962C8B-B14F-4D97-AF65-F5344CB8AC3E}">
+        <p14:creationId xmlns:p14="http://schemas.microsoft.com/office/powerpoint/2010/main" val="3297351362"/>
+      </p:ext>
+    </p:extLst>
+  </p:cSld>
+  <p:clrMapOvr>
+    <a:masterClrMapping/>
+  </p:clrMapOvr>
+</p:notes>
+</file>
+
+<file path=ppt/notesSlides/notesSlide15.xml><?xml version="1.0" encoding="utf-8"?>
+<p:notes xmlns:a="http://schemas.openxmlformats.org/drawingml/2006/main" xmlns:r="http://schemas.openxmlformats.org/officeDocument/2006/relationships" xmlns:p="http://schemas.openxmlformats.org/presentationml/2006/main">
+  <p:cSld>
+    <p:spTree>
+      <p:nvGrpSpPr>
+        <p:cNvPr id="1" name=""/>
+        <p:cNvGrpSpPr/>
+        <p:nvPr/>
+      </p:nvGrpSpPr>
+      <p:grpSpPr>
+        <a:xfrm>
+          <a:off x="0" y="0"/>
+          <a:ext cx="0" cy="0"/>
+          <a:chOff x="0" y="0"/>
+          <a:chExt cx="0" cy="0"/>
+        </a:xfrm>
+      </p:grpSpPr>
+      <p:sp>
+        <p:nvSpPr>
+          <p:cNvPr id="2" name="Folienbildplatzhalter 1"/>
+          <p:cNvSpPr>
+            <a:spLocks noGrp="1" noRot="1" noChangeAspect="1"/>
+          </p:cNvSpPr>
+          <p:nvPr>
+            <p:ph type="sldImg"/>
+          </p:nvPr>
+        </p:nvSpPr>
+        <p:spPr/>
+      </p:sp>
+      <p:sp>
+        <p:nvSpPr>
+          <p:cNvPr id="3" name="Notizenplatzhalter 2"/>
+          <p:cNvSpPr>
+            <a:spLocks noGrp="1"/>
+          </p:cNvSpPr>
+          <p:nvPr>
+            <p:ph type="body" idx="1"/>
+          </p:nvPr>
+        </p:nvSpPr>
+        <p:spPr/>
+        <p:txBody>
+          <a:bodyPr/>
+          <a:lstStyle/>
+          <a:p>
+            <a:endParaRPr lang="de-DE"/>
+          </a:p>
+        </p:txBody>
+      </p:sp>
+      <p:sp>
+        <p:nvSpPr>
+          <p:cNvPr id="4" name="Foliennummernplatzhalter 3"/>
+          <p:cNvSpPr>
+            <a:spLocks noGrp="1"/>
+          </p:cNvSpPr>
+          <p:nvPr>
+            <p:ph type="sldNum" sz="quarter" idx="10"/>
+          </p:nvPr>
+        </p:nvSpPr>
+        <p:spPr/>
+        <p:txBody>
+          <a:bodyPr/>
+          <a:lstStyle/>
+          <a:p>
+            <a:fld id="{05D1FABD-69C2-49F9-BD91-F05E017FE538}" type="slidenum">
+              <a:rPr lang="de-DE" smtClean="0"/>
+              <a:pPr/>
+              <a:t>16</a:t>
+            </a:fld>
+            <a:endParaRPr lang="de-DE"/>
+          </a:p>
+        </p:txBody>
+      </p:sp>
+    </p:spTree>
+    <p:extLst>
+      <p:ext uri="{BB962C8B-B14F-4D97-AF65-F5344CB8AC3E}">
+        <p14:creationId xmlns:p14="http://schemas.microsoft.com/office/powerpoint/2010/main" val="784737350"/>
+      </p:ext>
+    </p:extLst>
+  </p:cSld>
+  <p:clrMapOvr>
+    <a:masterClrMapping/>
+  </p:clrMapOvr>
+</p:notes>
+</file>
+
+<file path=ppt/notesSlides/notesSlide16.xml><?xml version="1.0" encoding="utf-8"?>
+<p:notes xmlns:a="http://schemas.openxmlformats.org/drawingml/2006/main" xmlns:r="http://schemas.openxmlformats.org/officeDocument/2006/relationships" xmlns:p="http://schemas.openxmlformats.org/presentationml/2006/main">
+  <p:cSld>
+    <p:spTree>
+      <p:nvGrpSpPr>
+        <p:cNvPr id="1" name=""/>
+        <p:cNvGrpSpPr/>
+        <p:nvPr/>
+      </p:nvGrpSpPr>
+      <p:grpSpPr>
+        <a:xfrm>
+          <a:off x="0" y="0"/>
+          <a:ext cx="0" cy="0"/>
+          <a:chOff x="0" y="0"/>
+          <a:chExt cx="0" cy="0"/>
+        </a:xfrm>
+      </p:grpSpPr>
+      <p:sp>
+        <p:nvSpPr>
+          <p:cNvPr id="2" name="Folienbildplatzhalter 1"/>
+          <p:cNvSpPr>
+            <a:spLocks noGrp="1" noRot="1" noChangeAspect="1"/>
+          </p:cNvSpPr>
+          <p:nvPr>
+            <p:ph type="sldImg"/>
+          </p:nvPr>
+        </p:nvSpPr>
+        <p:spPr/>
+      </p:sp>
+      <p:sp>
+        <p:nvSpPr>
+          <p:cNvPr id="3" name="Notizenplatzhalter 2"/>
+          <p:cNvSpPr>
+            <a:spLocks noGrp="1"/>
+          </p:cNvSpPr>
+          <p:nvPr>
+            <p:ph type="body" idx="1"/>
+          </p:nvPr>
+        </p:nvSpPr>
+        <p:spPr/>
+        <p:txBody>
+          <a:bodyPr/>
+          <a:lstStyle/>
+          <a:p>
+            <a:endParaRPr lang="de-DE"/>
+          </a:p>
+        </p:txBody>
+      </p:sp>
+      <p:sp>
+        <p:nvSpPr>
+          <p:cNvPr id="4" name="Foliennummernplatzhalter 3"/>
+          <p:cNvSpPr>
+            <a:spLocks noGrp="1"/>
+          </p:cNvSpPr>
+          <p:nvPr>
+            <p:ph type="sldNum" sz="quarter" idx="10"/>
+          </p:nvPr>
+        </p:nvSpPr>
+        <p:spPr/>
+        <p:txBody>
+          <a:bodyPr/>
+          <a:lstStyle/>
+          <a:p>
+            <a:fld id="{05D1FABD-69C2-49F9-BD91-F05E017FE538}" type="slidenum">
+              <a:rPr lang="de-DE" smtClean="0"/>
+              <a:pPr/>
+              <a:t>17</a:t>
+            </a:fld>
+            <a:endParaRPr lang="de-DE"/>
+          </a:p>
+        </p:txBody>
+      </p:sp>
+    </p:spTree>
+    <p:extLst>
+      <p:ext uri="{BB962C8B-B14F-4D97-AF65-F5344CB8AC3E}">
+        <p14:creationId xmlns:p14="http://schemas.microsoft.com/office/powerpoint/2010/main" val="1066156749"/>
       </p:ext>
     </p:extLst>
   </p:cSld>
@@ -897,7 +1252,7 @@
     </p:spTree>
     <p:extLst>
       <p:ext uri="{BB962C8B-B14F-4D97-AF65-F5344CB8AC3E}">
-        <p14:creationId xmlns:p14="http://schemas.microsoft.com/office/powerpoint/2010/main" xmlns="" val="930434972"/>
+        <p14:creationId xmlns:p14="http://schemas.microsoft.com/office/powerpoint/2010/main" val="930434972"/>
       </p:ext>
     </p:extLst>
   </p:cSld>
@@ -1001,7 +1356,7 @@
     </p:spTree>
     <p:extLst>
       <p:ext uri="{BB962C8B-B14F-4D97-AF65-F5344CB8AC3E}">
-        <p14:creationId xmlns:p14="http://schemas.microsoft.com/office/powerpoint/2010/main" xmlns="" val="1928648976"/>
+        <p14:creationId xmlns:p14="http://schemas.microsoft.com/office/powerpoint/2010/main" val="1928648976"/>
       </p:ext>
     </p:extLst>
   </p:cSld>
@@ -1086,7 +1441,7 @@
     </p:spTree>
     <p:extLst>
       <p:ext uri="{BB962C8B-B14F-4D97-AF65-F5344CB8AC3E}">
-        <p14:creationId xmlns:p14="http://schemas.microsoft.com/office/powerpoint/2010/main" xmlns="" val="1928648976"/>
+        <p14:creationId xmlns:p14="http://schemas.microsoft.com/office/powerpoint/2010/main" val="1928648976"/>
       </p:ext>
     </p:extLst>
   </p:cSld>
@@ -1171,7 +1526,7 @@
     </p:spTree>
     <p:extLst>
       <p:ext uri="{BB962C8B-B14F-4D97-AF65-F5344CB8AC3E}">
-        <p14:creationId xmlns:p14="http://schemas.microsoft.com/office/powerpoint/2010/main" xmlns="" val="1928648976"/>
+        <p14:creationId xmlns:p14="http://schemas.microsoft.com/office/powerpoint/2010/main" val="1928648976"/>
       </p:ext>
     </p:extLst>
   </p:cSld>
@@ -1256,7 +1611,7 @@
     </p:spTree>
     <p:extLst>
       <p:ext uri="{BB962C8B-B14F-4D97-AF65-F5344CB8AC3E}">
-        <p14:creationId xmlns:p14="http://schemas.microsoft.com/office/powerpoint/2010/main" xmlns="" val="1928648976"/>
+        <p14:creationId xmlns:p14="http://schemas.microsoft.com/office/powerpoint/2010/main" val="1928648976"/>
       </p:ext>
     </p:extLst>
   </p:cSld>
@@ -1341,7 +1696,7 @@
     </p:spTree>
     <p:extLst>
       <p:ext uri="{BB962C8B-B14F-4D97-AF65-F5344CB8AC3E}">
-        <p14:creationId xmlns:p14="http://schemas.microsoft.com/office/powerpoint/2010/main" xmlns="" val="1705752707"/>
+        <p14:creationId xmlns:p14="http://schemas.microsoft.com/office/powerpoint/2010/main" val="1705752707"/>
       </p:ext>
     </p:extLst>
   </p:cSld>
@@ -1426,7 +1781,7 @@
     </p:spTree>
     <p:extLst>
       <p:ext uri="{BB962C8B-B14F-4D97-AF65-F5344CB8AC3E}">
-        <p14:creationId xmlns:p14="http://schemas.microsoft.com/office/powerpoint/2010/main" xmlns="" val="4219797847"/>
+        <p14:creationId xmlns:p14="http://schemas.microsoft.com/office/powerpoint/2010/main" val="562466078"/>
       </p:ext>
     </p:extLst>
   </p:cSld>
@@ -1511,7 +1866,7 @@
     </p:spTree>
     <p:extLst>
       <p:ext uri="{BB962C8B-B14F-4D97-AF65-F5344CB8AC3E}">
-        <p14:creationId xmlns:p14="http://schemas.microsoft.com/office/powerpoint/2010/main" xmlns="" val="1066156749"/>
+        <p14:creationId xmlns:p14="http://schemas.microsoft.com/office/powerpoint/2010/main" val="3199242385"/>
       </p:ext>
     </p:extLst>
   </p:cSld>
@@ -2168,7 +2523,7 @@
             <a:fld id="{9EE47043-14B9-45DE-A7CA-B819D3DB7940}" type="datetime1">
               <a:rPr lang="en-US" smtClean="0"/>
               <a:pPr/>
-              <a:t>2/8/2015</a:t>
+              <a:t>2/9/2015</a:t>
             </a:fld>
             <a:endParaRPr lang="en-US" dirty="0"/>
           </a:p>
@@ -3289,7 +3644,7 @@
             <a:fld id="{15FDD389-1C4B-4991-9D1B-BD9CD8DAD448}" type="datetime1">
               <a:rPr lang="en-US" smtClean="0"/>
               <a:pPr/>
-              <a:t>2/8/2015</a:t>
+              <a:t>2/9/2015</a:t>
             </a:fld>
             <a:endParaRPr lang="en-US" dirty="0"/>
           </a:p>
@@ -4301,7 +4656,7 @@
             <a:fld id="{DBEDE645-84E4-46C4-8BBB-B45E79B0BDF2}" type="datetime1">
               <a:rPr lang="en-US" smtClean="0"/>
               <a:pPr/>
-              <a:t>2/8/2015</a:t>
+              <a:t>2/9/2015</a:t>
             </a:fld>
             <a:endParaRPr lang="en-US" dirty="0"/>
           </a:p>
@@ -5472,7 +5827,7 @@
             <a:fld id="{FD30094F-A1C4-4AA8-B240-0E360656DACC}" type="datetime1">
               <a:rPr lang="en-US" smtClean="0"/>
               <a:pPr/>
-              <a:t>2/8/2015</a:t>
+              <a:t>2/9/2015</a:t>
             </a:fld>
             <a:endParaRPr lang="en-US" dirty="0"/>
           </a:p>
@@ -6534,7 +6889,7 @@
             <a:fld id="{114DEC2F-D236-4161-B7A9-058AD50973F4}" type="datetime1">
               <a:rPr lang="en-US" smtClean="0"/>
               <a:pPr/>
-              <a:t>2/8/2015</a:t>
+              <a:t>2/9/2015</a:t>
             </a:fld>
             <a:endParaRPr lang="en-US" dirty="0"/>
           </a:p>
@@ -7181,7 +7536,7 @@
             <a:fld id="{7246F925-6776-418A-B9D5-2FE6DDC7FF5E}" type="datetime1">
               <a:rPr lang="en-US" smtClean="0"/>
               <a:pPr/>
-              <a:t>2/8/2015</a:t>
+              <a:t>2/9/2015</a:t>
             </a:fld>
             <a:endParaRPr lang="en-US" dirty="0"/>
           </a:p>
@@ -8029,7 +8384,7 @@
             <a:fld id="{AA091E32-8210-42E1-A5E3-AE4F3B2BA67C}" type="datetime1">
               <a:rPr lang="en-US" smtClean="0"/>
               <a:pPr/>
-              <a:t>2/8/2015</a:t>
+              <a:t>2/9/2015</a:t>
             </a:fld>
             <a:endParaRPr lang="en-US" dirty="0"/>
           </a:p>
@@ -8205,7 +8560,7 @@
             <a:fld id="{A8F96028-6369-409B-B015-BD4E873D97AE}" type="datetime1">
               <a:rPr lang="en-US" smtClean="0"/>
               <a:pPr/>
-              <a:t>2/8/2015</a:t>
+              <a:t>2/9/2015</a:t>
             </a:fld>
             <a:endParaRPr lang="en-US" dirty="0"/>
           </a:p>
@@ -9204,7 +9559,7 @@
             <a:fld id="{1EC1EEDA-5C8D-4FAD-B380-0B1111C6C6FD}" type="datetime1">
               <a:rPr lang="en-US" smtClean="0"/>
               <a:pPr/>
-              <a:t>2/8/2015</a:t>
+              <a:t>2/9/2015</a:t>
             </a:fld>
             <a:endParaRPr lang="en-US" dirty="0"/>
           </a:p>
@@ -9411,7 +9766,7 @@
             <a:fld id="{17201E69-94FE-46D8-8C9F-233CA2EAF49D}" type="datetime1">
               <a:rPr lang="en-US" smtClean="0"/>
               <a:pPr/>
-              <a:t>2/8/2015</a:t>
+              <a:t>2/9/2015</a:t>
             </a:fld>
             <a:endParaRPr lang="en-US" dirty="0"/>
           </a:p>
@@ -10474,7 +10829,7 @@
             <a:fld id="{9229E780-8742-4F41-A7DD-8A533C34BC62}" type="datetime1">
               <a:rPr lang="en-US" smtClean="0"/>
               <a:pPr/>
-              <a:t>2/8/2015</a:t>
+              <a:t>2/9/2015</a:t>
             </a:fld>
             <a:endParaRPr lang="en-US" dirty="0"/>
           </a:p>
@@ -10747,7 +11102,7 @@
             <a:fld id="{3B91D532-264E-494B-BCB4-085A06E95C4C}" type="datetime1">
               <a:rPr lang="en-US" smtClean="0"/>
               <a:pPr/>
-              <a:t>2/8/2015</a:t>
+              <a:t>2/9/2015</a:t>
             </a:fld>
             <a:endParaRPr lang="en-US" dirty="0"/>
           </a:p>
@@ -11130,7 +11485,7 @@
             <a:fld id="{13078452-A4DA-42F9-8E52-EBBBBBF20BDF}" type="datetime1">
               <a:rPr lang="en-US" smtClean="0"/>
               <a:pPr/>
-              <a:t>2/8/2015</a:t>
+              <a:t>2/9/2015</a:t>
             </a:fld>
             <a:endParaRPr lang="en-US" dirty="0"/>
           </a:p>
@@ -11249,7 +11604,7 @@
             <a:fld id="{1433EC71-6044-490A-9B40-8B48B52B7377}" type="datetime1">
               <a:rPr lang="en-US" smtClean="0"/>
               <a:pPr/>
-              <a:t>2/8/2015</a:t>
+              <a:t>2/9/2015</a:t>
             </a:fld>
             <a:endParaRPr lang="en-US" dirty="0"/>
           </a:p>
@@ -11345,7 +11700,7 @@
             <a:fld id="{05B9864E-D461-4420-9A61-69708EA906EF}" type="datetime1">
               <a:rPr lang="en-US" smtClean="0"/>
               <a:pPr/>
-              <a:t>2/8/2015</a:t>
+              <a:t>2/9/2015</a:t>
             </a:fld>
             <a:endParaRPr lang="en-US" dirty="0"/>
           </a:p>
@@ -12455,7 +12810,7 @@
             <a:fld id="{B45F0798-91BD-41E8-A317-14713D4B5C46}" type="datetime1">
               <a:rPr lang="en-US" smtClean="0"/>
               <a:pPr/>
-              <a:t>2/8/2015</a:t>
+              <a:t>2/9/2015</a:t>
             </a:fld>
             <a:endParaRPr lang="en-US" dirty="0"/>
           </a:p>
@@ -13589,7 +13944,7 @@
             <a:fld id="{2A2492AA-6B4D-44C1-A4C5-776C8CBEDC88}" type="datetime1">
               <a:rPr lang="en-US" smtClean="0"/>
               <a:pPr/>
-              <a:t>2/8/2015</a:t>
+              <a:t>2/9/2015</a:t>
             </a:fld>
             <a:endParaRPr lang="en-US" dirty="0"/>
           </a:p>
@@ -14618,7 +14973,7 @@
             <a:fld id="{D718F47C-7328-41EC-B5EF-37975657BEDE}" type="datetime1">
               <a:rPr lang="en-US" smtClean="0"/>
               <a:pPr/>
-              <a:t>2/8/2015</a:t>
+              <a:t>2/9/2015</a:t>
             </a:fld>
             <a:endParaRPr lang="en-US" dirty="0"/>
           </a:p>
@@ -15221,7 +15576,7 @@
           <a:blip r:embed="rId2">
             <a:extLst>
               <a:ext uri="{28A0092B-C50C-407E-A947-70E740481C1C}">
-                <a14:useLocalDpi xmlns:a14="http://schemas.microsoft.com/office/drawing/2010/main" xmlns="" val="0"/>
+                <a14:useLocalDpi xmlns:a14="http://schemas.microsoft.com/office/drawing/2010/main" val="0"/>
               </a:ext>
             </a:extLst>
           </a:blip>
@@ -15242,7 +15597,7 @@
     </p:spTree>
     <p:extLst>
       <p:ext uri="{BB962C8B-B14F-4D97-AF65-F5344CB8AC3E}">
-        <p14:creationId xmlns:p14="http://schemas.microsoft.com/office/powerpoint/2010/main" xmlns="" val="3428906391"/>
+        <p14:creationId xmlns:p14="http://schemas.microsoft.com/office/powerpoint/2010/main" val="3428906391"/>
       </p:ext>
     </p:extLst>
   </p:cSld>
@@ -15293,7 +15648,7 @@
           <a:p>
             <a:r>
               <a:rPr lang="de-DE" dirty="0" smtClean="0"/>
-              <a:t>Reflexion</a:t>
+              <a:t>Werkzeugeinsatz</a:t>
             </a:r>
             <a:endParaRPr lang="de-DE" dirty="0"/>
           </a:p>
@@ -15315,18 +15670,66 @@
           <a:lstStyle/>
           <a:p>
             <a:r>
+              <a:rPr lang="de-DE" dirty="0" err="1" smtClean="0"/>
+              <a:t>SourceTree</a:t>
+            </a:r>
+            <a:endParaRPr lang="de-DE" dirty="0" smtClean="0"/>
+          </a:p>
+          <a:p>
+            <a:pPr lvl="1"/>
+            <a:r>
               <a:rPr lang="de-DE" dirty="0" smtClean="0"/>
-              <a:t>Kurze Werkzeugbewertung</a:t>
-            </a:r>
-          </a:p>
-          <a:p>
+              <a:t>Kostenfrei und übersichtlich</a:t>
+            </a:r>
+          </a:p>
+          <a:p>
+            <a:pPr lvl="1"/>
             <a:r>
               <a:rPr lang="de-DE" dirty="0" smtClean="0"/>
-              <a:t>Vorgehen im Team</a:t>
-            </a:r>
-          </a:p>
-          <a:p>
+              <a:t>Mit </a:t>
+            </a:r>
+            <a:r>
+              <a:rPr lang="de-DE" dirty="0" err="1" smtClean="0"/>
+              <a:t>GitHub</a:t>
+            </a:r>
+            <a:r>
+              <a:rPr lang="de-DE" dirty="0" smtClean="0"/>
+              <a:t> kompatibel</a:t>
+            </a:r>
+          </a:p>
+          <a:p>
+            <a:pPr lvl="1"/>
+            <a:r>
+              <a:rPr lang="de-DE" dirty="0" smtClean="0"/>
+              <a:t>Visualisierung der </a:t>
+            </a:r>
+            <a:r>
+              <a:rPr lang="de-DE" dirty="0" err="1" smtClean="0"/>
+              <a:t>Branches</a:t>
+            </a:r>
             <a:endParaRPr lang="de-DE" dirty="0" smtClean="0"/>
+          </a:p>
+          <a:p>
+            <a:pPr lvl="1"/>
+            <a:r>
+              <a:rPr lang="de-DE" dirty="0" smtClean="0"/>
+              <a:t>Mehrere </a:t>
+            </a:r>
+            <a:r>
+              <a:rPr lang="de-DE" dirty="0" err="1" smtClean="0"/>
+              <a:t>Repositories</a:t>
+            </a:r>
+            <a:r>
+              <a:rPr lang="de-DE" dirty="0" smtClean="0"/>
+              <a:t> gleichzeitig möglich</a:t>
+            </a:r>
+          </a:p>
+          <a:p>
+            <a:pPr lvl="1"/>
+            <a:r>
+              <a:rPr lang="de-DE" dirty="0" smtClean="0"/>
+              <a:t>Anzeige des geänderten Codes</a:t>
+            </a:r>
           </a:p>
         </p:txBody>
       </p:sp>
@@ -15342,7 +15745,7 @@
           <a:blip r:embed="rId3">
             <a:extLst>
               <a:ext uri="{28A0092B-C50C-407E-A947-70E740481C1C}">
-                <a14:useLocalDpi xmlns:a14="http://schemas.microsoft.com/office/drawing/2010/main" xmlns="" val="0"/>
+                <a14:useLocalDpi xmlns:a14="http://schemas.microsoft.com/office/drawing/2010/main" val="0"/>
               </a:ext>
             </a:extLst>
           </a:blip>
@@ -15414,20 +15817,187 @@
           </a:p>
         </p:txBody>
       </p:sp>
+      <p:pic>
+        <p:nvPicPr>
+          <p:cNvPr id="7" name="Grafik 6"/>
+          <p:cNvPicPr>
+            <a:picLocks noChangeAspect="1"/>
+          </p:cNvPicPr>
+          <p:nvPr/>
+        </p:nvPicPr>
+        <p:blipFill>
+          <a:blip r:embed="rId4"/>
+          <a:stretch>
+            <a:fillRect/>
+          </a:stretch>
+        </p:blipFill>
+        <p:spPr>
+          <a:xfrm>
+            <a:off x="6968529" y="2603500"/>
+            <a:ext cx="4222210" cy="2557922"/>
+          </a:xfrm>
+          <a:prstGeom prst="rect">
+            <a:avLst/>
+          </a:prstGeom>
+        </p:spPr>
+      </p:pic>
+      <p:pic>
+        <p:nvPicPr>
+          <p:cNvPr id="9" name="Grafik 8"/>
+          <p:cNvPicPr>
+            <a:picLocks noChangeAspect="1"/>
+          </p:cNvPicPr>
+          <p:nvPr/>
+        </p:nvPicPr>
+        <p:blipFill>
+          <a:blip r:embed="rId5"/>
+          <a:stretch>
+            <a:fillRect/>
+          </a:stretch>
+        </p:blipFill>
+        <p:spPr>
+          <a:xfrm>
+            <a:off x="676406" y="554655"/>
+            <a:ext cx="10835731" cy="5753257"/>
+          </a:xfrm>
+          <a:prstGeom prst="rect">
+            <a:avLst/>
+          </a:prstGeom>
+        </p:spPr>
+      </p:pic>
     </p:spTree>
     <p:extLst>
       <p:ext uri="{BB962C8B-B14F-4D97-AF65-F5344CB8AC3E}">
-        <p14:creationId xmlns:p14="http://schemas.microsoft.com/office/powerpoint/2010/main" xmlns="" val="3216998357"/>
+        <p14:creationId xmlns:p14="http://schemas.microsoft.com/office/powerpoint/2010/main" val="29256383"/>
       </p:ext>
     </p:extLst>
   </p:cSld>
   <p:clrMapOvr>
     <a:masterClrMapping/>
   </p:clrMapOvr>
+  <mc:AlternateContent xmlns:mc="http://schemas.openxmlformats.org/markup-compatibility/2006">
+    <mc:Choice xmlns:p14="http://schemas.microsoft.com/office/powerpoint/2010/main" Requires="p14">
+      <p:transition spd="slow" p14:dur="2000"/>
+    </mc:Choice>
+    <mc:Fallback>
+      <p:transition spd="slow"/>
+    </mc:Fallback>
+  </mc:AlternateContent>
   <p:timing>
     <p:tnLst>
       <p:par>
-        <p:cTn id="1" dur="indefinite" restart="never" nodeType="tmRoot"/>
+        <p:cTn id="1" dur="indefinite" restart="never" nodeType="tmRoot">
+          <p:childTnLst>
+            <p:seq concurrent="1" nextAc="seek">
+              <p:cTn id="2" dur="indefinite" nodeType="mainSeq">
+                <p:childTnLst>
+                  <p:par>
+                    <p:cTn id="3" fill="hold">
+                      <p:stCondLst>
+                        <p:cond delay="indefinite"/>
+                      </p:stCondLst>
+                      <p:childTnLst>
+                        <p:par>
+                          <p:cTn id="4" fill="hold">
+                            <p:stCondLst>
+                              <p:cond delay="0"/>
+                            </p:stCondLst>
+                            <p:childTnLst>
+                              <p:par>
+                                <p:cTn id="5" presetID="10" presetClass="exit" presetSubtype="0" fill="hold" nodeType="clickEffect">
+                                  <p:stCondLst>
+                                    <p:cond delay="0"/>
+                                  </p:stCondLst>
+                                  <p:childTnLst>
+                                    <p:animEffect transition="out" filter="fade">
+                                      <p:cBhvr>
+                                        <p:cTn id="6" dur="500"/>
+                                        <p:tgtEl>
+                                          <p:spTgt spid="7"/>
+                                        </p:tgtEl>
+                                      </p:cBhvr>
+                                    </p:animEffect>
+                                    <p:set>
+                                      <p:cBhvr>
+                                        <p:cTn id="7" dur="1" fill="hold">
+                                          <p:stCondLst>
+                                            <p:cond delay="499"/>
+                                          </p:stCondLst>
+                                        </p:cTn>
+                                        <p:tgtEl>
+                                          <p:spTgt spid="7"/>
+                                        </p:tgtEl>
+                                        <p:attrNameLst>
+                                          <p:attrName>style.visibility</p:attrName>
+                                        </p:attrNameLst>
+                                      </p:cBhvr>
+                                      <p:to>
+                                        <p:strVal val="hidden"/>
+                                      </p:to>
+                                    </p:set>
+                                  </p:childTnLst>
+                                </p:cTn>
+                              </p:par>
+                              <p:par>
+                                <p:cTn id="8" presetID="10" presetClass="entr" presetSubtype="0" fill="hold" nodeType="withEffect">
+                                  <p:stCondLst>
+                                    <p:cond delay="0"/>
+                                  </p:stCondLst>
+                                  <p:childTnLst>
+                                    <p:set>
+                                      <p:cBhvr>
+                                        <p:cTn id="9" dur="1" fill="hold">
+                                          <p:stCondLst>
+                                            <p:cond delay="0"/>
+                                          </p:stCondLst>
+                                        </p:cTn>
+                                        <p:tgtEl>
+                                          <p:spTgt spid="9"/>
+                                        </p:tgtEl>
+                                        <p:attrNameLst>
+                                          <p:attrName>style.visibility</p:attrName>
+                                        </p:attrNameLst>
+                                      </p:cBhvr>
+                                      <p:to>
+                                        <p:strVal val="visible"/>
+                                      </p:to>
+                                    </p:set>
+                                    <p:animEffect transition="in" filter="fade">
+                                      <p:cBhvr>
+                                        <p:cTn id="10" dur="500"/>
+                                        <p:tgtEl>
+                                          <p:spTgt spid="9"/>
+                                        </p:tgtEl>
+                                      </p:cBhvr>
+                                    </p:animEffect>
+                                  </p:childTnLst>
+                                </p:cTn>
+                              </p:par>
+                            </p:childTnLst>
+                          </p:cTn>
+                        </p:par>
+                      </p:childTnLst>
+                    </p:cTn>
+                  </p:par>
+                </p:childTnLst>
+              </p:cTn>
+              <p:prevCondLst>
+                <p:cond evt="onPrev" delay="0">
+                  <p:tgtEl>
+                    <p:sldTgt/>
+                  </p:tgtEl>
+                </p:cond>
+              </p:prevCondLst>
+              <p:nextCondLst>
+                <p:cond evt="onNext" delay="0">
+                  <p:tgtEl>
+                    <p:sldTgt/>
+                  </p:tgtEl>
+                </p:cond>
+              </p:nextCondLst>
+            </p:seq>
+          </p:childTnLst>
+        </p:cTn>
       </p:par>
     </p:tnLst>
   </p:timing>
@@ -15461,33 +16031,27 @@
             <p:ph type="title"/>
           </p:nvPr>
         </p:nvSpPr>
-        <p:spPr>
-          <a:xfrm>
-            <a:off x="1154953" y="2370667"/>
-            <a:ext cx="9469503" cy="1822514"/>
-          </a:xfrm>
-        </p:spPr>
+        <p:spPr/>
         <p:txBody>
           <a:bodyPr/>
           <a:lstStyle/>
           <a:p>
-            <a:pPr algn="ctr"/>
-            <a:r>
-              <a:rPr lang="de-DE" sz="5400" dirty="0" smtClean="0"/>
-              <a:t>Noch Fragen?</a:t>
-            </a:r>
-            <a:endParaRPr lang="de-DE" sz="5400" dirty="0"/>
-          </a:p>
-        </p:txBody>
-      </p:sp>
-      <p:sp>
-        <p:nvSpPr>
-          <p:cNvPr id="5" name="Foliennummernplatzhalter 4"/>
+            <a:r>
+              <a:rPr lang="de-DE" dirty="0" smtClean="0"/>
+              <a:t>Werkzeugeinsatz</a:t>
+            </a:r>
+            <a:endParaRPr lang="de-DE" dirty="0"/>
+          </a:p>
+        </p:txBody>
+      </p:sp>
+      <p:sp>
+        <p:nvSpPr>
+          <p:cNvPr id="3" name="Inhaltsplatzhalter 2"/>
           <p:cNvSpPr>
             <a:spLocks noGrp="1"/>
           </p:cNvSpPr>
           <p:nvPr>
-            <p:ph type="sldNum" sz="quarter" idx="12"/>
+            <p:ph idx="1"/>
           </p:nvPr>
         </p:nvSpPr>
         <p:spPr/>
@@ -15495,12 +16059,73 @@
           <a:bodyPr/>
           <a:lstStyle/>
           <a:p>
-            <a:fld id="{D57F1E4F-1CFF-5643-939E-217C01CDF565}" type="slidenum">
-              <a:rPr lang="en-US" smtClean="0"/>
-              <a:pPr/>
-              <a:t>11</a:t>
-            </a:fld>
-            <a:endParaRPr lang="en-US" dirty="0"/>
+            <a:r>
+              <a:rPr lang="de-DE" dirty="0" smtClean="0"/>
+              <a:t>Android Studio</a:t>
+            </a:r>
+          </a:p>
+          <a:p>
+            <a:pPr lvl="1"/>
+            <a:r>
+              <a:rPr lang="de-DE" dirty="0" smtClean="0"/>
+              <a:t>Kostenfreie offizielle IDE zur Android Entwicklung</a:t>
+            </a:r>
+          </a:p>
+          <a:p>
+            <a:pPr lvl="1"/>
+            <a:r>
+              <a:rPr lang="de-DE" dirty="0" smtClean="0"/>
+              <a:t>Basiert auf </a:t>
+            </a:r>
+            <a:r>
+              <a:rPr lang="de-DE" dirty="0" err="1" smtClean="0"/>
+              <a:t>IntelliJ</a:t>
+            </a:r>
+            <a:r>
+              <a:rPr lang="de-DE" dirty="0" smtClean="0"/>
+              <a:t> IDEA IDE</a:t>
+            </a:r>
+          </a:p>
+          <a:p>
+            <a:pPr lvl="1"/>
+            <a:r>
+              <a:rPr lang="de-DE" dirty="0" smtClean="0"/>
+              <a:t>Während Projektdurchführung noch im Beta-Status</a:t>
+            </a:r>
+          </a:p>
+          <a:p>
+            <a:pPr lvl="1"/>
+            <a:r>
+              <a:rPr lang="de-DE" dirty="0" smtClean="0"/>
+              <a:t>Grafischer GUI-Editor</a:t>
+            </a:r>
+          </a:p>
+          <a:p>
+            <a:pPr lvl="1"/>
+            <a:r>
+              <a:rPr lang="de-DE" dirty="0" smtClean="0"/>
+              <a:t>Code-</a:t>
+            </a:r>
+            <a:r>
+              <a:rPr lang="de-DE" dirty="0" err="1" smtClean="0"/>
+              <a:t>Highlighting</a:t>
+            </a:r>
+            <a:r>
+              <a:rPr lang="de-DE" dirty="0" smtClean="0"/>
+              <a:t> </a:t>
+            </a:r>
+          </a:p>
+          <a:p>
+            <a:pPr lvl="1"/>
+            <a:r>
+              <a:rPr lang="de-DE" dirty="0" err="1" smtClean="0"/>
+              <a:t>GitHub</a:t>
+            </a:r>
+            <a:r>
+              <a:rPr lang="de-DE" dirty="0" smtClean="0"/>
+              <a:t> Integration möglich</a:t>
+            </a:r>
+            <a:endParaRPr lang="de-DE" dirty="0"/>
           </a:p>
         </p:txBody>
       </p:sp>
@@ -15516,7 +16141,7 @@
           <a:blip r:embed="rId3">
             <a:extLst>
               <a:ext uri="{28A0092B-C50C-407E-A947-70E740481C1C}">
-                <a14:useLocalDpi xmlns:a14="http://schemas.microsoft.com/office/drawing/2010/main" xmlns="" val="0"/>
+                <a14:useLocalDpi xmlns:a14="http://schemas.microsoft.com/office/drawing/2010/main" val="0"/>
               </a:ext>
             </a:extLst>
           </a:blip>
@@ -15536,6 +16161,30 @@
       </p:pic>
       <p:sp>
         <p:nvSpPr>
+          <p:cNvPr id="5" name="Foliennummernplatzhalter 4"/>
+          <p:cNvSpPr>
+            <a:spLocks noGrp="1"/>
+          </p:cNvSpPr>
+          <p:nvPr>
+            <p:ph type="sldNum" sz="quarter" idx="12"/>
+          </p:nvPr>
+        </p:nvSpPr>
+        <p:spPr/>
+        <p:txBody>
+          <a:bodyPr/>
+          <a:lstStyle/>
+          <a:p>
+            <a:fld id="{D57F1E4F-1CFF-5643-939E-217C01CDF565}" type="slidenum">
+              <a:rPr lang="en-US" smtClean="0"/>
+              <a:pPr/>
+              <a:t>11</a:t>
+            </a:fld>
+            <a:endParaRPr lang="en-US" dirty="0"/>
+          </a:p>
+        </p:txBody>
+      </p:sp>
+      <p:sp>
+        <p:nvSpPr>
           <p:cNvPr id="6" name="Textfeld 5"/>
           <p:cNvSpPr txBox="1"/>
           <p:nvPr/>
@@ -15564,10 +16213,88 @@
           </a:p>
         </p:txBody>
       </p:sp>
+      <p:pic>
+        <p:nvPicPr>
+          <p:cNvPr id="7" name="Grafik 6"/>
+          <p:cNvPicPr>
+            <a:picLocks noChangeAspect="1"/>
+          </p:cNvPicPr>
+          <p:nvPr/>
+        </p:nvPicPr>
+        <p:blipFill>
+          <a:blip r:embed="rId4"/>
+          <a:stretch>
+            <a:fillRect/>
+          </a:stretch>
+        </p:blipFill>
+        <p:spPr>
+          <a:xfrm>
+            <a:off x="7675639" y="2648963"/>
+            <a:ext cx="3096000" cy="2328000"/>
+          </a:xfrm>
+          <a:prstGeom prst="rect">
+            <a:avLst/>
+          </a:prstGeom>
+        </p:spPr>
+      </p:pic>
+      <p:pic>
+        <p:nvPicPr>
+          <p:cNvPr id="10" name="Picture 2" descr="Oberflaeche_gestalten"/>
+          <p:cNvPicPr>
+            <a:picLocks noChangeAspect="1" noChangeArrowheads="1"/>
+          </p:cNvPicPr>
+          <p:nvPr/>
+        </p:nvPicPr>
+        <p:blipFill>
+          <a:blip r:embed="rId5">
+            <a:extLst>
+              <a:ext uri="{28A0092B-C50C-407E-A947-70E740481C1C}">
+                <a14:useLocalDpi xmlns:a14="http://schemas.microsoft.com/office/drawing/2010/main" val="0"/>
+              </a:ext>
+            </a:extLst>
+          </a:blip>
+          <a:srcRect/>
+          <a:stretch>
+            <a:fillRect/>
+          </a:stretch>
+        </p:blipFill>
+        <p:spPr bwMode="auto">
+          <a:xfrm>
+            <a:off x="703034" y="667389"/>
+            <a:ext cx="10809104" cy="5511927"/>
+          </a:xfrm>
+          <a:prstGeom prst="rect">
+            <a:avLst/>
+          </a:prstGeom>
+          <a:noFill/>
+          <a:ln>
+            <a:noFill/>
+          </a:ln>
+          <a:extLst>
+            <a:ext uri="{909E8E84-426E-40DD-AFC4-6F175D3DCCD1}">
+              <a14:hiddenFill xmlns:a14="http://schemas.microsoft.com/office/drawing/2010/main">
+                <a:solidFill>
+                  <a:srgbClr val="FFFFFF"/>
+                </a:solidFill>
+              </a14:hiddenFill>
+            </a:ext>
+            <a:ext uri="{91240B29-F687-4F45-9708-019B960494DF}">
+              <a14:hiddenLine xmlns:a14="http://schemas.microsoft.com/office/drawing/2010/main" w="9525">
+                <a:solidFill>
+                  <a:srgbClr val="000000"/>
+                </a:solidFill>
+                <a:miter lim="800000"/>
+                <a:headEnd/>
+                <a:tailEnd/>
+              </a14:hiddenLine>
+            </a:ext>
+          </a:extLst>
+        </p:spPr>
+      </p:pic>
     </p:spTree>
     <p:extLst>
       <p:ext uri="{BB962C8B-B14F-4D97-AF65-F5344CB8AC3E}">
-        <p14:creationId xmlns:p14="http://schemas.microsoft.com/office/powerpoint/2010/main" xmlns="" val="1786163146"/>
+        <p14:creationId xmlns:p14="http://schemas.microsoft.com/office/powerpoint/2010/main" val="3107900357"/>
       </p:ext>
     </p:extLst>
   </p:cSld>
@@ -15577,7 +16304,83 @@
   <p:timing>
     <p:tnLst>
       <p:par>
-        <p:cTn id="1" dur="indefinite" restart="never" nodeType="tmRoot"/>
+        <p:cTn id="1" dur="indefinite" restart="never" nodeType="tmRoot">
+          <p:childTnLst>
+            <p:seq concurrent="1" nextAc="seek">
+              <p:cTn id="2" dur="indefinite" nodeType="mainSeq">
+                <p:childTnLst>
+                  <p:par>
+                    <p:cTn id="3" fill="hold">
+                      <p:stCondLst>
+                        <p:cond delay="indefinite"/>
+                      </p:stCondLst>
+                      <p:childTnLst>
+                        <p:par>
+                          <p:cTn id="4" fill="hold">
+                            <p:stCondLst>
+                              <p:cond delay="0"/>
+                            </p:stCondLst>
+                            <p:childTnLst>
+                              <p:par>
+                                <p:cTn id="5" presetID="10" presetClass="entr" presetSubtype="0" fill="hold" nodeType="clickEffect">
+                                  <p:stCondLst>
+                                    <p:cond delay="0"/>
+                                  </p:stCondLst>
+                                  <p:childTnLst>
+                                    <p:set>
+                                      <p:cBhvr>
+                                        <p:cTn id="6" dur="1" fill="hold">
+                                          <p:stCondLst>
+                                            <p:cond delay="0"/>
+                                          </p:stCondLst>
+                                        </p:cTn>
+                                        <p:tgtEl>
+                                          <p:spTgt spid="10"/>
+                                        </p:tgtEl>
+                                        <p:attrNameLst>
+                                          <p:attrName>style.visibility</p:attrName>
+                                        </p:attrNameLst>
+                                      </p:cBhvr>
+                                      <p:to>
+                                        <p:strVal val="visible"/>
+                                      </p:to>
+                                    </p:set>
+                                    <p:animEffect transition="in" filter="fade">
+                                      <p:cBhvr>
+                                        <p:cTn id="7" dur="500"/>
+                                        <p:tgtEl>
+                                          <p:spTgt spid="10"/>
+                                        </p:tgtEl>
+                                      </p:cBhvr>
+                                    </p:animEffect>
+                                  </p:childTnLst>
+                                </p:cTn>
+                              </p:par>
+                            </p:childTnLst>
+                          </p:cTn>
+                        </p:par>
+                      </p:childTnLst>
+                    </p:cTn>
+                  </p:par>
+                </p:childTnLst>
+              </p:cTn>
+              <p:prevCondLst>
+                <p:cond evt="onPrev" delay="0">
+                  <p:tgtEl>
+                    <p:sldTgt/>
+                  </p:tgtEl>
+                </p:cond>
+              </p:prevCondLst>
+              <p:nextCondLst>
+                <p:cond evt="onNext" delay="0">
+                  <p:tgtEl>
+                    <p:sldTgt/>
+                  </p:tgtEl>
+                </p:cond>
+              </p:nextCondLst>
+            </p:seq>
+          </p:childTnLst>
+        </p:cTn>
       </p:par>
     </p:tnLst>
   </p:timing>
@@ -15611,20 +16414,14 @@
             <p:ph type="title"/>
           </p:nvPr>
         </p:nvSpPr>
-        <p:spPr>
-          <a:xfrm>
-            <a:off x="1154953" y="2370667"/>
-            <a:ext cx="9469503" cy="1822514"/>
-          </a:xfrm>
-        </p:spPr>
+        <p:spPr/>
         <p:txBody>
           <a:bodyPr/>
           <a:lstStyle/>
           <a:p>
-            <a:pPr algn="ctr"/>
             <a:r>
               <a:rPr lang="de-DE" dirty="0" smtClean="0"/>
-              <a:t>Vielen Dank für eure Aufmerksamkeit!</a:t>
+              <a:t>Werkzeugeinsatz</a:t>
             </a:r>
             <a:endParaRPr lang="de-DE" dirty="0"/>
           </a:p>
@@ -15632,12 +16429,12 @@
       </p:sp>
       <p:sp>
         <p:nvSpPr>
-          <p:cNvPr id="5" name="Foliennummernplatzhalter 4"/>
+          <p:cNvPr id="3" name="Inhaltsplatzhalter 2"/>
           <p:cNvSpPr>
             <a:spLocks noGrp="1"/>
           </p:cNvSpPr>
           <p:nvPr>
-            <p:ph type="sldNum" sz="quarter" idx="12"/>
+            <p:ph idx="1"/>
           </p:nvPr>
         </p:nvSpPr>
         <p:spPr/>
@@ -15645,12 +16442,100 @@
           <a:bodyPr/>
           <a:lstStyle/>
           <a:p>
-            <a:fld id="{D57F1E4F-1CFF-5643-939E-217C01CDF565}" type="slidenum">
-              <a:rPr lang="en-US" smtClean="0"/>
-              <a:pPr/>
-              <a:t>12</a:t>
-            </a:fld>
-            <a:endParaRPr lang="en-US" dirty="0"/>
+            <a:r>
+              <a:rPr lang="de-DE" dirty="0" err="1" smtClean="0"/>
+              <a:t>Gradle</a:t>
+            </a:r>
+            <a:endParaRPr lang="de-DE" dirty="0" smtClean="0"/>
+          </a:p>
+          <a:p>
+            <a:pPr lvl="1"/>
+            <a:r>
+              <a:rPr lang="de-DE" dirty="0" smtClean="0"/>
+              <a:t>Auslieferung zusammen mit Android Studio</a:t>
+            </a:r>
+          </a:p>
+          <a:p>
+            <a:pPr lvl="1"/>
+            <a:r>
+              <a:rPr lang="de-DE" dirty="0" smtClean="0"/>
+              <a:t>Keine Konfiguration notwendig</a:t>
+            </a:r>
+          </a:p>
+          <a:p>
+            <a:pPr lvl="1"/>
+            <a:r>
+              <a:rPr lang="de-DE" dirty="0" smtClean="0"/>
+              <a:t>Einstellungsmöglichkeiten über </a:t>
+            </a:r>
+            <a:r>
+              <a:rPr lang="de-DE" dirty="0" err="1" smtClean="0"/>
+              <a:t>build.gradle</a:t>
+            </a:r>
+            <a:r>
+              <a:rPr lang="de-DE" dirty="0" smtClean="0"/>
+              <a:t>-Datei möglich</a:t>
+            </a:r>
+          </a:p>
+          <a:p>
+            <a:r>
+              <a:rPr lang="de-DE" dirty="0" err="1" smtClean="0"/>
+              <a:t>UnitTesting</a:t>
+            </a:r>
+            <a:endParaRPr lang="de-DE" dirty="0" smtClean="0"/>
+          </a:p>
+          <a:p>
+            <a:pPr lvl="1"/>
+            <a:r>
+              <a:rPr lang="de-DE" dirty="0"/>
+              <a:t>Auslieferung zusammen mit Android Studio</a:t>
+            </a:r>
+          </a:p>
+          <a:p>
+            <a:pPr lvl="1"/>
+            <a:r>
+              <a:rPr lang="de-DE" dirty="0" smtClean="0"/>
+              <a:t>Android-SDK stellt eigenes </a:t>
+            </a:r>
+            <a:r>
+              <a:rPr lang="de-DE" dirty="0" err="1" smtClean="0"/>
+              <a:t>Testpackage</a:t>
+            </a:r>
+            <a:r>
+              <a:rPr lang="de-DE" dirty="0" smtClean="0"/>
+              <a:t> </a:t>
+            </a:r>
+            <a:r>
+              <a:rPr lang="de-DE" dirty="0" err="1" smtClean="0"/>
+              <a:t>basierent</a:t>
+            </a:r>
+            <a:r>
+              <a:rPr lang="de-DE" dirty="0" smtClean="0"/>
+              <a:t> auf </a:t>
+            </a:r>
+            <a:r>
+              <a:rPr lang="de-DE" dirty="0" err="1" smtClean="0"/>
+              <a:t>JUnit</a:t>
+            </a:r>
+            <a:r>
+              <a:rPr lang="de-DE" dirty="0" smtClean="0"/>
+              <a:t> bereit</a:t>
+            </a:r>
+          </a:p>
+          <a:p>
+            <a:pPr lvl="1"/>
+            <a:r>
+              <a:rPr lang="de-DE" dirty="0" smtClean="0"/>
+              <a:t>Ausführung der Tests im </a:t>
+            </a:r>
+            <a:r>
+              <a:rPr lang="de-DE" smtClean="0"/>
+              <a:t>Android Emulator</a:t>
+            </a:r>
+            <a:endParaRPr lang="de-DE" dirty="0" smtClean="0"/>
+          </a:p>
+          <a:p>
+            <a:endParaRPr lang="de-DE" dirty="0"/>
           </a:p>
         </p:txBody>
       </p:sp>
@@ -15666,7 +16551,7 @@
           <a:blip r:embed="rId3">
             <a:extLst>
               <a:ext uri="{28A0092B-C50C-407E-A947-70E740481C1C}">
-                <a14:useLocalDpi xmlns:a14="http://schemas.microsoft.com/office/drawing/2010/main" xmlns="" val="0"/>
+                <a14:useLocalDpi xmlns:a14="http://schemas.microsoft.com/office/drawing/2010/main" val="0"/>
               </a:ext>
             </a:extLst>
           </a:blip>
@@ -15686,6 +16571,30 @@
       </p:pic>
       <p:sp>
         <p:nvSpPr>
+          <p:cNvPr id="5" name="Foliennummernplatzhalter 4"/>
+          <p:cNvSpPr>
+            <a:spLocks noGrp="1"/>
+          </p:cNvSpPr>
+          <p:nvPr>
+            <p:ph type="sldNum" sz="quarter" idx="12"/>
+          </p:nvPr>
+        </p:nvSpPr>
+        <p:spPr/>
+        <p:txBody>
+          <a:bodyPr/>
+          <a:lstStyle/>
+          <a:p>
+            <a:fld id="{D57F1E4F-1CFF-5643-939E-217C01CDF565}" type="slidenum">
+              <a:rPr lang="en-US" smtClean="0"/>
+              <a:pPr/>
+              <a:t>12</a:t>
+            </a:fld>
+            <a:endParaRPr lang="en-US" dirty="0"/>
+          </a:p>
+        </p:txBody>
+      </p:sp>
+      <p:sp>
+        <p:nvSpPr>
           <p:cNvPr id="6" name="Textfeld 5"/>
           <p:cNvSpPr txBox="1"/>
           <p:nvPr/>
@@ -15717,7 +16626,7 @@
     </p:spTree>
     <p:extLst>
       <p:ext uri="{BB962C8B-B14F-4D97-AF65-F5344CB8AC3E}">
-        <p14:creationId xmlns:p14="http://schemas.microsoft.com/office/powerpoint/2010/main" xmlns="" val="1278744805"/>
+        <p14:creationId xmlns:p14="http://schemas.microsoft.com/office/powerpoint/2010/main" val="1376954338"/>
       </p:ext>
     </p:extLst>
   </p:cSld>
@@ -15768,7 +16677,7 @@
           <a:p>
             <a:r>
               <a:rPr lang="de-DE" dirty="0" smtClean="0"/>
-              <a:t>Quellen</a:t>
+              <a:t>Demo</a:t>
             </a:r>
             <a:endParaRPr lang="de-DE" dirty="0"/>
           </a:p>
@@ -15789,25 +16698,7 @@
           <a:bodyPr/>
           <a:lstStyle/>
           <a:p>
-            <a:r>
-              <a:rPr lang="de-DE" dirty="0" smtClean="0">
-                <a:hlinkClick r:id="rId3"/>
-              </a:rPr>
-              <a:t>www.elcomsoft.com</a:t>
-            </a:r>
-            <a:endParaRPr lang="de-DE" dirty="0" smtClean="0"/>
-          </a:p>
-          <a:p>
-            <a:r>
-              <a:rPr lang="de-DE" dirty="0" smtClean="0">
-                <a:hlinkClick r:id="rId4"/>
-              </a:rPr>
-              <a:t>www.elcomsoft.com/WP/BH-EU-2012-WP.pdf</a:t>
-            </a:r>
-            <a:endParaRPr lang="de-DE" dirty="0" smtClean="0"/>
-          </a:p>
-          <a:p>
-            <a:endParaRPr lang="de-DE" dirty="0" smtClean="0"/>
+            <a:endParaRPr lang="de-DE" dirty="0"/>
           </a:p>
         </p:txBody>
       </p:sp>
@@ -15820,10 +16711,10 @@
           <p:nvPr/>
         </p:nvPicPr>
         <p:blipFill>
-          <a:blip r:embed="rId5">
+          <a:blip r:embed="rId3">
             <a:extLst>
               <a:ext uri="{28A0092B-C50C-407E-A947-70E740481C1C}">
-                <a14:useLocalDpi xmlns:a14="http://schemas.microsoft.com/office/drawing/2010/main" xmlns="" val="0"/>
+                <a14:useLocalDpi xmlns:a14="http://schemas.microsoft.com/office/drawing/2010/main" val="0"/>
               </a:ext>
             </a:extLst>
           </a:blip>
@@ -15898,7 +16789,671 @@
     </p:spTree>
     <p:extLst>
       <p:ext uri="{BB962C8B-B14F-4D97-AF65-F5344CB8AC3E}">
-        <p14:creationId xmlns:p14="http://schemas.microsoft.com/office/powerpoint/2010/main" xmlns="" val="3216998357"/>
+        <p14:creationId xmlns:p14="http://schemas.microsoft.com/office/powerpoint/2010/main" val="3667091251"/>
+      </p:ext>
+    </p:extLst>
+  </p:cSld>
+  <p:clrMapOvr>
+    <a:masterClrMapping/>
+  </p:clrMapOvr>
+  <mc:AlternateContent xmlns:mc="http://schemas.openxmlformats.org/markup-compatibility/2006" xmlns:p14="http://schemas.microsoft.com/office/powerpoint/2010/main">
+    <mc:Choice Requires="p14">
+      <p:transition spd="slow" p14:dur="2000"/>
+    </mc:Choice>
+    <mc:Fallback xmlns="">
+      <p:transition spd="slow"/>
+    </mc:Fallback>
+  </mc:AlternateContent>
+  <p:timing>
+    <p:tnLst>
+      <p:par>
+        <p:cTn id="1" dur="indefinite" restart="never" nodeType="tmRoot"/>
+      </p:par>
+    </p:tnLst>
+  </p:timing>
+</p:sld>
+</file>
+
+<file path=ppt/slides/slide14.xml><?xml version="1.0" encoding="utf-8"?>
+<p:sld xmlns:a="http://schemas.openxmlformats.org/drawingml/2006/main" xmlns:r="http://schemas.openxmlformats.org/officeDocument/2006/relationships" xmlns:p="http://schemas.openxmlformats.org/presentationml/2006/main">
+  <p:cSld>
+    <p:spTree>
+      <p:nvGrpSpPr>
+        <p:cNvPr id="1" name=""/>
+        <p:cNvGrpSpPr/>
+        <p:nvPr/>
+      </p:nvGrpSpPr>
+      <p:grpSpPr>
+        <a:xfrm>
+          <a:off x="0" y="0"/>
+          <a:ext cx="0" cy="0"/>
+          <a:chOff x="0" y="0"/>
+          <a:chExt cx="0" cy="0"/>
+        </a:xfrm>
+      </p:grpSpPr>
+      <p:sp>
+        <p:nvSpPr>
+          <p:cNvPr id="2" name="Titel 1"/>
+          <p:cNvSpPr>
+            <a:spLocks noGrp="1"/>
+          </p:cNvSpPr>
+          <p:nvPr>
+            <p:ph type="title"/>
+          </p:nvPr>
+        </p:nvSpPr>
+        <p:spPr/>
+        <p:txBody>
+          <a:bodyPr/>
+          <a:lstStyle/>
+          <a:p>
+            <a:r>
+              <a:rPr lang="de-DE" dirty="0" smtClean="0"/>
+              <a:t>Reflexion</a:t>
+            </a:r>
+            <a:endParaRPr lang="de-DE" dirty="0"/>
+          </a:p>
+        </p:txBody>
+      </p:sp>
+      <p:sp>
+        <p:nvSpPr>
+          <p:cNvPr id="3" name="Inhaltsplatzhalter 2"/>
+          <p:cNvSpPr>
+            <a:spLocks noGrp="1"/>
+          </p:cNvSpPr>
+          <p:nvPr>
+            <p:ph idx="1"/>
+          </p:nvPr>
+        </p:nvSpPr>
+        <p:spPr/>
+        <p:txBody>
+          <a:bodyPr/>
+          <a:lstStyle/>
+          <a:p>
+            <a:r>
+              <a:rPr lang="de-DE" dirty="0" smtClean="0"/>
+              <a:t>Kurze Werkzeugbewertung</a:t>
+            </a:r>
+          </a:p>
+          <a:p>
+            <a:r>
+              <a:rPr lang="de-DE" dirty="0" smtClean="0"/>
+              <a:t>Vorgehen im Team</a:t>
+            </a:r>
+          </a:p>
+          <a:p>
+            <a:endParaRPr lang="de-DE" dirty="0" smtClean="0"/>
+          </a:p>
+        </p:txBody>
+      </p:sp>
+      <p:pic>
+        <p:nvPicPr>
+          <p:cNvPr id="4" name="Grafik 3"/>
+          <p:cNvPicPr>
+            <a:picLocks noChangeAspect="1"/>
+          </p:cNvPicPr>
+          <p:nvPr/>
+        </p:nvPicPr>
+        <p:blipFill>
+          <a:blip r:embed="rId3">
+            <a:extLst>
+              <a:ext uri="{28A0092B-C50C-407E-A947-70E740481C1C}">
+                <a14:useLocalDpi xmlns:a14="http://schemas.microsoft.com/office/drawing/2010/main" val="0"/>
+              </a:ext>
+            </a:extLst>
+          </a:blip>
+          <a:stretch>
+            <a:fillRect/>
+          </a:stretch>
+        </p:blipFill>
+        <p:spPr>
+          <a:xfrm>
+            <a:off x="11248792" y="5909733"/>
+            <a:ext cx="827314" cy="827314"/>
+          </a:xfrm>
+          <a:prstGeom prst="rect">
+            <a:avLst/>
+          </a:prstGeom>
+        </p:spPr>
+      </p:pic>
+      <p:sp>
+        <p:nvSpPr>
+          <p:cNvPr id="5" name="Foliennummernplatzhalter 4"/>
+          <p:cNvSpPr>
+            <a:spLocks noGrp="1"/>
+          </p:cNvSpPr>
+          <p:nvPr>
+            <p:ph type="sldNum" sz="quarter" idx="12"/>
+          </p:nvPr>
+        </p:nvSpPr>
+        <p:spPr/>
+        <p:txBody>
+          <a:bodyPr/>
+          <a:lstStyle/>
+          <a:p>
+            <a:fld id="{D57F1E4F-1CFF-5643-939E-217C01CDF565}" type="slidenum">
+              <a:rPr lang="en-US" smtClean="0"/>
+              <a:pPr/>
+              <a:t>14</a:t>
+            </a:fld>
+            <a:endParaRPr lang="en-US" dirty="0"/>
+          </a:p>
+        </p:txBody>
+      </p:sp>
+      <p:sp>
+        <p:nvSpPr>
+          <p:cNvPr id="6" name="Textfeld 5"/>
+          <p:cNvSpPr txBox="1"/>
+          <p:nvPr/>
+        </p:nvSpPr>
+        <p:spPr>
+          <a:xfrm>
+            <a:off x="372650" y="6156167"/>
+            <a:ext cx="10876142" cy="338554"/>
+          </a:xfrm>
+          <a:prstGeom prst="rect">
+            <a:avLst/>
+          </a:prstGeom>
+          <a:noFill/>
+        </p:spPr>
+        <p:txBody>
+          <a:bodyPr wrap="square" rtlCol="0">
+            <a:spAutoFit/>
+          </a:bodyPr>
+          <a:lstStyle/>
+          <a:p>
+            <a:r>
+              <a:rPr lang="de-DE" sz="1600" dirty="0" smtClean="0"/>
+              <a:t>13.02.2015  |  Software Engineering I  |  Nadine Feldmann, Lukas Huwe, Michael Kerkhoff, Sebastian Ochtrup</a:t>
+            </a:r>
+            <a:endParaRPr lang="de-DE" sz="1600" dirty="0"/>
+          </a:p>
+        </p:txBody>
+      </p:sp>
+    </p:spTree>
+    <p:extLst>
+      <p:ext uri="{BB962C8B-B14F-4D97-AF65-F5344CB8AC3E}">
+        <p14:creationId xmlns:p14="http://schemas.microsoft.com/office/powerpoint/2010/main" val="3216998357"/>
+      </p:ext>
+    </p:extLst>
+  </p:cSld>
+  <p:clrMapOvr>
+    <a:masterClrMapping/>
+  </p:clrMapOvr>
+  <p:timing>
+    <p:tnLst>
+      <p:par>
+        <p:cTn id="1" dur="indefinite" restart="never" nodeType="tmRoot"/>
+      </p:par>
+    </p:tnLst>
+  </p:timing>
+</p:sld>
+</file>
+
+<file path=ppt/slides/slide15.xml><?xml version="1.0" encoding="utf-8"?>
+<p:sld xmlns:a="http://schemas.openxmlformats.org/drawingml/2006/main" xmlns:r="http://schemas.openxmlformats.org/officeDocument/2006/relationships" xmlns:p="http://schemas.openxmlformats.org/presentationml/2006/main">
+  <p:cSld>
+    <p:spTree>
+      <p:nvGrpSpPr>
+        <p:cNvPr id="1" name=""/>
+        <p:cNvGrpSpPr/>
+        <p:nvPr/>
+      </p:nvGrpSpPr>
+      <p:grpSpPr>
+        <a:xfrm>
+          <a:off x="0" y="0"/>
+          <a:ext cx="0" cy="0"/>
+          <a:chOff x="0" y="0"/>
+          <a:chExt cx="0" cy="0"/>
+        </a:xfrm>
+      </p:grpSpPr>
+      <p:sp>
+        <p:nvSpPr>
+          <p:cNvPr id="2" name="Titel 1"/>
+          <p:cNvSpPr>
+            <a:spLocks noGrp="1"/>
+          </p:cNvSpPr>
+          <p:nvPr>
+            <p:ph type="title"/>
+          </p:nvPr>
+        </p:nvSpPr>
+        <p:spPr>
+          <a:xfrm>
+            <a:off x="1154953" y="2370667"/>
+            <a:ext cx="9469503" cy="1822514"/>
+          </a:xfrm>
+        </p:spPr>
+        <p:txBody>
+          <a:bodyPr/>
+          <a:lstStyle/>
+          <a:p>
+            <a:pPr algn="ctr"/>
+            <a:r>
+              <a:rPr lang="de-DE" sz="5400" dirty="0" smtClean="0"/>
+              <a:t>Noch Fragen?</a:t>
+            </a:r>
+            <a:endParaRPr lang="de-DE" sz="5400" dirty="0"/>
+          </a:p>
+        </p:txBody>
+      </p:sp>
+      <p:sp>
+        <p:nvSpPr>
+          <p:cNvPr id="5" name="Foliennummernplatzhalter 4"/>
+          <p:cNvSpPr>
+            <a:spLocks noGrp="1"/>
+          </p:cNvSpPr>
+          <p:nvPr>
+            <p:ph type="sldNum" sz="quarter" idx="12"/>
+          </p:nvPr>
+        </p:nvSpPr>
+        <p:spPr/>
+        <p:txBody>
+          <a:bodyPr/>
+          <a:lstStyle/>
+          <a:p>
+            <a:fld id="{D57F1E4F-1CFF-5643-939E-217C01CDF565}" type="slidenum">
+              <a:rPr lang="en-US" smtClean="0"/>
+              <a:pPr/>
+              <a:t>15</a:t>
+            </a:fld>
+            <a:endParaRPr lang="en-US" dirty="0"/>
+          </a:p>
+        </p:txBody>
+      </p:sp>
+      <p:pic>
+        <p:nvPicPr>
+          <p:cNvPr id="4" name="Grafik 3"/>
+          <p:cNvPicPr>
+            <a:picLocks noChangeAspect="1"/>
+          </p:cNvPicPr>
+          <p:nvPr/>
+        </p:nvPicPr>
+        <p:blipFill>
+          <a:blip r:embed="rId3">
+            <a:extLst>
+              <a:ext uri="{28A0092B-C50C-407E-A947-70E740481C1C}">
+                <a14:useLocalDpi xmlns:a14="http://schemas.microsoft.com/office/drawing/2010/main" val="0"/>
+              </a:ext>
+            </a:extLst>
+          </a:blip>
+          <a:stretch>
+            <a:fillRect/>
+          </a:stretch>
+        </p:blipFill>
+        <p:spPr>
+          <a:xfrm>
+            <a:off x="11248792" y="5909733"/>
+            <a:ext cx="827314" cy="827314"/>
+          </a:xfrm>
+          <a:prstGeom prst="rect">
+            <a:avLst/>
+          </a:prstGeom>
+        </p:spPr>
+      </p:pic>
+      <p:sp>
+        <p:nvSpPr>
+          <p:cNvPr id="6" name="Textfeld 5"/>
+          <p:cNvSpPr txBox="1"/>
+          <p:nvPr/>
+        </p:nvSpPr>
+        <p:spPr>
+          <a:xfrm>
+            <a:off x="372650" y="6156167"/>
+            <a:ext cx="10876142" cy="338554"/>
+          </a:xfrm>
+          <a:prstGeom prst="rect">
+            <a:avLst/>
+          </a:prstGeom>
+          <a:noFill/>
+        </p:spPr>
+        <p:txBody>
+          <a:bodyPr wrap="square" rtlCol="0">
+            <a:spAutoFit/>
+          </a:bodyPr>
+          <a:lstStyle/>
+          <a:p>
+            <a:r>
+              <a:rPr lang="de-DE" sz="1600" dirty="0" smtClean="0"/>
+              <a:t>13.02.2015  |  Software Engineering I  |  Nadine Feldmann, Lukas Huwe, Michael Kerkhoff, Sebastian Ochtrup</a:t>
+            </a:r>
+            <a:endParaRPr lang="de-DE" sz="1600" dirty="0"/>
+          </a:p>
+        </p:txBody>
+      </p:sp>
+    </p:spTree>
+    <p:extLst>
+      <p:ext uri="{BB962C8B-B14F-4D97-AF65-F5344CB8AC3E}">
+        <p14:creationId xmlns:p14="http://schemas.microsoft.com/office/powerpoint/2010/main" val="1786163146"/>
+      </p:ext>
+    </p:extLst>
+  </p:cSld>
+  <p:clrMapOvr>
+    <a:masterClrMapping/>
+  </p:clrMapOvr>
+  <p:timing>
+    <p:tnLst>
+      <p:par>
+        <p:cTn id="1" dur="indefinite" restart="never" nodeType="tmRoot"/>
+      </p:par>
+    </p:tnLst>
+  </p:timing>
+</p:sld>
+</file>
+
+<file path=ppt/slides/slide16.xml><?xml version="1.0" encoding="utf-8"?>
+<p:sld xmlns:a="http://schemas.openxmlformats.org/drawingml/2006/main" xmlns:r="http://schemas.openxmlformats.org/officeDocument/2006/relationships" xmlns:p="http://schemas.openxmlformats.org/presentationml/2006/main">
+  <p:cSld>
+    <p:spTree>
+      <p:nvGrpSpPr>
+        <p:cNvPr id="1" name=""/>
+        <p:cNvGrpSpPr/>
+        <p:nvPr/>
+      </p:nvGrpSpPr>
+      <p:grpSpPr>
+        <a:xfrm>
+          <a:off x="0" y="0"/>
+          <a:ext cx="0" cy="0"/>
+          <a:chOff x="0" y="0"/>
+          <a:chExt cx="0" cy="0"/>
+        </a:xfrm>
+      </p:grpSpPr>
+      <p:sp>
+        <p:nvSpPr>
+          <p:cNvPr id="2" name="Titel 1"/>
+          <p:cNvSpPr>
+            <a:spLocks noGrp="1"/>
+          </p:cNvSpPr>
+          <p:nvPr>
+            <p:ph type="title"/>
+          </p:nvPr>
+        </p:nvSpPr>
+        <p:spPr>
+          <a:xfrm>
+            <a:off x="1154953" y="2370667"/>
+            <a:ext cx="9469503" cy="1822514"/>
+          </a:xfrm>
+        </p:spPr>
+        <p:txBody>
+          <a:bodyPr/>
+          <a:lstStyle/>
+          <a:p>
+            <a:pPr algn="ctr"/>
+            <a:r>
+              <a:rPr lang="de-DE" dirty="0" smtClean="0"/>
+              <a:t>Vielen Dank für eure Aufmerksamkeit!</a:t>
+            </a:r>
+            <a:endParaRPr lang="de-DE" dirty="0"/>
+          </a:p>
+        </p:txBody>
+      </p:sp>
+      <p:sp>
+        <p:nvSpPr>
+          <p:cNvPr id="5" name="Foliennummernplatzhalter 4"/>
+          <p:cNvSpPr>
+            <a:spLocks noGrp="1"/>
+          </p:cNvSpPr>
+          <p:nvPr>
+            <p:ph type="sldNum" sz="quarter" idx="12"/>
+          </p:nvPr>
+        </p:nvSpPr>
+        <p:spPr/>
+        <p:txBody>
+          <a:bodyPr/>
+          <a:lstStyle/>
+          <a:p>
+            <a:fld id="{D57F1E4F-1CFF-5643-939E-217C01CDF565}" type="slidenum">
+              <a:rPr lang="en-US" smtClean="0"/>
+              <a:pPr/>
+              <a:t>16</a:t>
+            </a:fld>
+            <a:endParaRPr lang="en-US" dirty="0"/>
+          </a:p>
+        </p:txBody>
+      </p:sp>
+      <p:pic>
+        <p:nvPicPr>
+          <p:cNvPr id="4" name="Grafik 3"/>
+          <p:cNvPicPr>
+            <a:picLocks noChangeAspect="1"/>
+          </p:cNvPicPr>
+          <p:nvPr/>
+        </p:nvPicPr>
+        <p:blipFill>
+          <a:blip r:embed="rId3">
+            <a:extLst>
+              <a:ext uri="{28A0092B-C50C-407E-A947-70E740481C1C}">
+                <a14:useLocalDpi xmlns:a14="http://schemas.microsoft.com/office/drawing/2010/main" val="0"/>
+              </a:ext>
+            </a:extLst>
+          </a:blip>
+          <a:stretch>
+            <a:fillRect/>
+          </a:stretch>
+        </p:blipFill>
+        <p:spPr>
+          <a:xfrm>
+            <a:off x="11248792" y="5909733"/>
+            <a:ext cx="827314" cy="827314"/>
+          </a:xfrm>
+          <a:prstGeom prst="rect">
+            <a:avLst/>
+          </a:prstGeom>
+        </p:spPr>
+      </p:pic>
+      <p:sp>
+        <p:nvSpPr>
+          <p:cNvPr id="6" name="Textfeld 5"/>
+          <p:cNvSpPr txBox="1"/>
+          <p:nvPr/>
+        </p:nvSpPr>
+        <p:spPr>
+          <a:xfrm>
+            <a:off x="372650" y="6156167"/>
+            <a:ext cx="10876142" cy="338554"/>
+          </a:xfrm>
+          <a:prstGeom prst="rect">
+            <a:avLst/>
+          </a:prstGeom>
+          <a:noFill/>
+        </p:spPr>
+        <p:txBody>
+          <a:bodyPr wrap="square" rtlCol="0">
+            <a:spAutoFit/>
+          </a:bodyPr>
+          <a:lstStyle/>
+          <a:p>
+            <a:r>
+              <a:rPr lang="de-DE" sz="1600" dirty="0" smtClean="0"/>
+              <a:t>13.02.2015  |  Software Engineering I  |  Nadine Feldmann, Lukas Huwe, Michael Kerkhoff, Sebastian Ochtrup</a:t>
+            </a:r>
+            <a:endParaRPr lang="de-DE" sz="1600" dirty="0"/>
+          </a:p>
+        </p:txBody>
+      </p:sp>
+    </p:spTree>
+    <p:extLst>
+      <p:ext uri="{BB962C8B-B14F-4D97-AF65-F5344CB8AC3E}">
+        <p14:creationId xmlns:p14="http://schemas.microsoft.com/office/powerpoint/2010/main" val="1278744805"/>
+      </p:ext>
+    </p:extLst>
+  </p:cSld>
+  <p:clrMapOvr>
+    <a:masterClrMapping/>
+  </p:clrMapOvr>
+  <p:timing>
+    <p:tnLst>
+      <p:par>
+        <p:cTn id="1" dur="indefinite" restart="never" nodeType="tmRoot"/>
+      </p:par>
+    </p:tnLst>
+  </p:timing>
+</p:sld>
+</file>
+
+<file path=ppt/slides/slide17.xml><?xml version="1.0" encoding="utf-8"?>
+<p:sld xmlns:a="http://schemas.openxmlformats.org/drawingml/2006/main" xmlns:r="http://schemas.openxmlformats.org/officeDocument/2006/relationships" xmlns:p="http://schemas.openxmlformats.org/presentationml/2006/main">
+  <p:cSld>
+    <p:spTree>
+      <p:nvGrpSpPr>
+        <p:cNvPr id="1" name=""/>
+        <p:cNvGrpSpPr/>
+        <p:nvPr/>
+      </p:nvGrpSpPr>
+      <p:grpSpPr>
+        <a:xfrm>
+          <a:off x="0" y="0"/>
+          <a:ext cx="0" cy="0"/>
+          <a:chOff x="0" y="0"/>
+          <a:chExt cx="0" cy="0"/>
+        </a:xfrm>
+      </p:grpSpPr>
+      <p:sp>
+        <p:nvSpPr>
+          <p:cNvPr id="2" name="Titel 1"/>
+          <p:cNvSpPr>
+            <a:spLocks noGrp="1"/>
+          </p:cNvSpPr>
+          <p:nvPr>
+            <p:ph type="title"/>
+          </p:nvPr>
+        </p:nvSpPr>
+        <p:spPr/>
+        <p:txBody>
+          <a:bodyPr/>
+          <a:lstStyle/>
+          <a:p>
+            <a:r>
+              <a:rPr lang="de-DE" dirty="0" smtClean="0"/>
+              <a:t>Quellen</a:t>
+            </a:r>
+            <a:endParaRPr lang="de-DE" dirty="0"/>
+          </a:p>
+        </p:txBody>
+      </p:sp>
+      <p:sp>
+        <p:nvSpPr>
+          <p:cNvPr id="3" name="Inhaltsplatzhalter 2"/>
+          <p:cNvSpPr>
+            <a:spLocks noGrp="1"/>
+          </p:cNvSpPr>
+          <p:nvPr>
+            <p:ph idx="1"/>
+          </p:nvPr>
+        </p:nvSpPr>
+        <p:spPr/>
+        <p:txBody>
+          <a:bodyPr/>
+          <a:lstStyle/>
+          <a:p>
+            <a:r>
+              <a:rPr lang="de-DE" dirty="0" smtClean="0">
+                <a:hlinkClick r:id="rId3"/>
+              </a:rPr>
+              <a:t>www.elcomsoft.com</a:t>
+            </a:r>
+            <a:endParaRPr lang="de-DE" dirty="0" smtClean="0"/>
+          </a:p>
+          <a:p>
+            <a:r>
+              <a:rPr lang="de-DE" dirty="0" smtClean="0">
+                <a:hlinkClick r:id="rId4"/>
+              </a:rPr>
+              <a:t>www.elcomsoft.com/WP/BH-EU-2012-WP.pdf</a:t>
+            </a:r>
+            <a:endParaRPr lang="de-DE" dirty="0" smtClean="0"/>
+          </a:p>
+          <a:p>
+            <a:endParaRPr lang="de-DE" dirty="0" smtClean="0"/>
+          </a:p>
+        </p:txBody>
+      </p:sp>
+      <p:pic>
+        <p:nvPicPr>
+          <p:cNvPr id="4" name="Grafik 3"/>
+          <p:cNvPicPr>
+            <a:picLocks noChangeAspect="1"/>
+          </p:cNvPicPr>
+          <p:nvPr/>
+        </p:nvPicPr>
+        <p:blipFill>
+          <a:blip r:embed="rId5">
+            <a:extLst>
+              <a:ext uri="{28A0092B-C50C-407E-A947-70E740481C1C}">
+                <a14:useLocalDpi xmlns:a14="http://schemas.microsoft.com/office/drawing/2010/main" val="0"/>
+              </a:ext>
+            </a:extLst>
+          </a:blip>
+          <a:stretch>
+            <a:fillRect/>
+          </a:stretch>
+        </p:blipFill>
+        <p:spPr>
+          <a:xfrm>
+            <a:off x="11248792" y="5909733"/>
+            <a:ext cx="827314" cy="827314"/>
+          </a:xfrm>
+          <a:prstGeom prst="rect">
+            <a:avLst/>
+          </a:prstGeom>
+        </p:spPr>
+      </p:pic>
+      <p:sp>
+        <p:nvSpPr>
+          <p:cNvPr id="5" name="Foliennummernplatzhalter 4"/>
+          <p:cNvSpPr>
+            <a:spLocks noGrp="1"/>
+          </p:cNvSpPr>
+          <p:nvPr>
+            <p:ph type="sldNum" sz="quarter" idx="12"/>
+          </p:nvPr>
+        </p:nvSpPr>
+        <p:spPr/>
+        <p:txBody>
+          <a:bodyPr/>
+          <a:lstStyle/>
+          <a:p>
+            <a:fld id="{D57F1E4F-1CFF-5643-939E-217C01CDF565}" type="slidenum">
+              <a:rPr lang="en-US" smtClean="0"/>
+              <a:pPr/>
+              <a:t>17</a:t>
+            </a:fld>
+            <a:endParaRPr lang="en-US" dirty="0"/>
+          </a:p>
+        </p:txBody>
+      </p:sp>
+      <p:sp>
+        <p:nvSpPr>
+          <p:cNvPr id="6" name="Textfeld 5"/>
+          <p:cNvSpPr txBox="1"/>
+          <p:nvPr/>
+        </p:nvSpPr>
+        <p:spPr>
+          <a:xfrm>
+            <a:off x="372650" y="6156167"/>
+            <a:ext cx="10876142" cy="338554"/>
+          </a:xfrm>
+          <a:prstGeom prst="rect">
+            <a:avLst/>
+          </a:prstGeom>
+          <a:noFill/>
+        </p:spPr>
+        <p:txBody>
+          <a:bodyPr wrap="square" rtlCol="0">
+            <a:spAutoFit/>
+          </a:bodyPr>
+          <a:lstStyle/>
+          <a:p>
+            <a:r>
+              <a:rPr lang="de-DE" sz="1600" dirty="0" smtClean="0"/>
+              <a:t>13.02.2015  |  Software Engineering I  |  Nadine Feldmann, Lukas Huwe, Michael Kerkhoff, Sebastian Ochtrup</a:t>
+            </a:r>
+            <a:endParaRPr lang="de-DE" sz="1600" dirty="0"/>
+          </a:p>
+        </p:txBody>
+      </p:sp>
+    </p:spTree>
+    <p:extLst>
+      <p:ext uri="{BB962C8B-B14F-4D97-AF65-F5344CB8AC3E}">
+        <p14:creationId xmlns:p14="http://schemas.microsoft.com/office/powerpoint/2010/main" val="3216998357"/>
       </p:ext>
     </p:extLst>
   </p:cSld>
@@ -16017,7 +17572,7 @@
           <a:blip r:embed="rId3">
             <a:extLst>
               <a:ext uri="{28A0092B-C50C-407E-A947-70E740481C1C}">
-                <a14:useLocalDpi xmlns:a14="http://schemas.microsoft.com/office/drawing/2010/main" xmlns="" val="0"/>
+                <a14:useLocalDpi xmlns:a14="http://schemas.microsoft.com/office/drawing/2010/main" val="0"/>
               </a:ext>
             </a:extLst>
           </a:blip>
@@ -16092,7 +17647,7 @@
     </p:spTree>
     <p:extLst>
       <p:ext uri="{BB962C8B-B14F-4D97-AF65-F5344CB8AC3E}">
-        <p14:creationId xmlns:p14="http://schemas.microsoft.com/office/powerpoint/2010/main" xmlns="" val="2132460779"/>
+        <p14:creationId xmlns:p14="http://schemas.microsoft.com/office/powerpoint/2010/main" val="2132460779"/>
       </p:ext>
     </p:extLst>
   </p:cSld>
@@ -16180,7 +17735,7 @@
           <a:blip r:embed="rId3">
             <a:extLst>
               <a:ext uri="{28A0092B-C50C-407E-A947-70E740481C1C}">
-                <a14:useLocalDpi xmlns:a14="http://schemas.microsoft.com/office/drawing/2010/main" xmlns="" val="0"/>
+                <a14:useLocalDpi xmlns:a14="http://schemas.microsoft.com/office/drawing/2010/main" val="0"/>
               </a:ext>
             </a:extLst>
           </a:blip>
@@ -16255,7 +17810,7 @@
     </p:spTree>
     <p:extLst>
       <p:ext uri="{BB962C8B-B14F-4D97-AF65-F5344CB8AC3E}">
-        <p14:creationId xmlns:p14="http://schemas.microsoft.com/office/powerpoint/2010/main" xmlns="" val="1662249724"/>
+        <p14:creationId xmlns:p14="http://schemas.microsoft.com/office/powerpoint/2010/main" val="1662249724"/>
       </p:ext>
     </p:extLst>
   </p:cSld>
@@ -16331,7 +17886,6 @@
               <a:rPr lang="de-DE" dirty="0" smtClean="0"/>
               <a:t>Zunehmender Gefahrenanstieg</a:t>
             </a:r>
-            <a:endParaRPr lang="de-DE" dirty="0" smtClean="0"/>
           </a:p>
           <a:p>
             <a:pPr lvl="1"/>
@@ -16368,15 +17922,7 @@
             <a:pPr lvl="1"/>
             <a:r>
               <a:rPr lang="de-DE" dirty="0" smtClean="0"/>
-              <a:t>Durch gezielte Angriffe erhöht sich das Risiko weiter</a:t>
-            </a:r>
-            <a:r>
-              <a:rPr lang="de-DE" dirty="0" smtClean="0"/>
-              <a:t> </a:t>
-            </a:r>
-            <a:r>
-              <a:rPr lang="de-DE" dirty="0" smtClean="0"/>
-              <a:t>(Wörterbuchangriff)</a:t>
+              <a:t>Durch gezielte Angriffe erhöht sich das Risiko weiter (Wörterbuchangriff)</a:t>
             </a:r>
           </a:p>
           <a:p>
@@ -16399,7 +17945,6 @@
               <a:rPr lang="de-DE" dirty="0" smtClean="0"/>
               <a:t> ausnahmslos in kurzer Zeit geknackt werden können</a:t>
             </a:r>
-            <a:endParaRPr lang="de-DE" dirty="0" smtClean="0"/>
           </a:p>
           <a:p>
             <a:endParaRPr lang="de-DE" dirty="0" smtClean="0"/>
@@ -16418,7 +17963,7 @@
           <a:blip r:embed="rId3">
             <a:extLst>
               <a:ext uri="{28A0092B-C50C-407E-A947-70E740481C1C}">
-                <a14:useLocalDpi xmlns:a14="http://schemas.microsoft.com/office/drawing/2010/main" xmlns="" val="0"/>
+                <a14:useLocalDpi xmlns:a14="http://schemas.microsoft.com/office/drawing/2010/main" val="0"/>
               </a:ext>
             </a:extLst>
           </a:blip>
@@ -16493,7 +18038,7 @@
     </p:spTree>
     <p:extLst>
       <p:ext uri="{BB962C8B-B14F-4D97-AF65-F5344CB8AC3E}">
-        <p14:creationId xmlns:p14="http://schemas.microsoft.com/office/powerpoint/2010/main" xmlns="" val="4975384"/>
+        <p14:creationId xmlns:p14="http://schemas.microsoft.com/office/powerpoint/2010/main" val="4975384"/>
       </p:ext>
     </p:extLst>
   </p:cSld>
@@ -16611,7 +18156,7 @@
           <a:blip r:embed="rId3">
             <a:extLst>
               <a:ext uri="{28A0092B-C50C-407E-A947-70E740481C1C}">
-                <a14:useLocalDpi xmlns:a14="http://schemas.microsoft.com/office/drawing/2010/main" xmlns="" val="0"/>
+                <a14:useLocalDpi xmlns:a14="http://schemas.microsoft.com/office/drawing/2010/main" val="0"/>
               </a:ext>
             </a:extLst>
           </a:blip>
@@ -16686,7 +18231,7 @@
     </p:spTree>
     <p:extLst>
       <p:ext uri="{BB962C8B-B14F-4D97-AF65-F5344CB8AC3E}">
-        <p14:creationId xmlns:p14="http://schemas.microsoft.com/office/powerpoint/2010/main" xmlns="" val="4975384"/>
+        <p14:creationId xmlns:p14="http://schemas.microsoft.com/office/powerpoint/2010/main" val="4975384"/>
       </p:ext>
     </p:extLst>
   </p:cSld>
@@ -16755,7 +18300,7 @@
           <a:blip r:embed="rId3">
             <a:extLst>
               <a:ext uri="{28A0092B-C50C-407E-A947-70E740481C1C}">
-                <a14:useLocalDpi xmlns:a14="http://schemas.microsoft.com/office/drawing/2010/main" xmlns="" val="0"/>
+                <a14:useLocalDpi xmlns:a14="http://schemas.microsoft.com/office/drawing/2010/main" val="0"/>
               </a:ext>
             </a:extLst>
           </a:blip>
@@ -17007,7 +18552,7 @@
     </p:spTree>
     <p:extLst>
       <p:ext uri="{BB962C8B-B14F-4D97-AF65-F5344CB8AC3E}">
-        <p14:creationId xmlns:p14="http://schemas.microsoft.com/office/powerpoint/2010/main" xmlns="" val="4975384"/>
+        <p14:creationId xmlns:p14="http://schemas.microsoft.com/office/powerpoint/2010/main" val="4975384"/>
       </p:ext>
     </p:extLst>
   </p:cSld>
@@ -17076,7 +18621,7 @@
           <a:blip r:embed="rId3">
             <a:extLst>
               <a:ext uri="{28A0092B-C50C-407E-A947-70E740481C1C}">
-                <a14:useLocalDpi xmlns:a14="http://schemas.microsoft.com/office/drawing/2010/main" xmlns="" val="0"/>
+                <a14:useLocalDpi xmlns:a14="http://schemas.microsoft.com/office/drawing/2010/main" val="0"/>
               </a:ext>
             </a:extLst>
           </a:blip>
@@ -17332,7 +18877,7 @@
     </p:spTree>
     <p:extLst>
       <p:ext uri="{BB962C8B-B14F-4D97-AF65-F5344CB8AC3E}">
-        <p14:creationId xmlns:p14="http://schemas.microsoft.com/office/powerpoint/2010/main" xmlns="" val="4975384"/>
+        <p14:creationId xmlns:p14="http://schemas.microsoft.com/office/powerpoint/2010/main" val="4975384"/>
       </p:ext>
     </p:extLst>
   </p:cSld>
@@ -17404,6 +18949,48 @@
           <a:bodyPr/>
           <a:lstStyle/>
           <a:p>
+            <a:r>
+              <a:rPr lang="de-DE" dirty="0" err="1" smtClean="0"/>
+              <a:t>Git</a:t>
+            </a:r>
+            <a:r>
+              <a:rPr lang="de-DE" dirty="0" smtClean="0"/>
+              <a:t>/ </a:t>
+            </a:r>
+            <a:r>
+              <a:rPr lang="de-DE" dirty="0" err="1" smtClean="0"/>
+              <a:t>GitHub</a:t>
+            </a:r>
+            <a:endParaRPr lang="de-DE" dirty="0" smtClean="0"/>
+          </a:p>
+          <a:p>
+            <a:r>
+              <a:rPr lang="de-DE" dirty="0" err="1" smtClean="0"/>
+              <a:t>SourceTree</a:t>
+            </a:r>
+            <a:endParaRPr lang="de-DE" dirty="0" smtClean="0"/>
+          </a:p>
+          <a:p>
+            <a:r>
+              <a:rPr lang="de-DE" dirty="0" smtClean="0"/>
+              <a:t>Android Studio</a:t>
+            </a:r>
+          </a:p>
+          <a:p>
+            <a:r>
+              <a:rPr lang="de-DE" dirty="0" err="1" smtClean="0"/>
+              <a:t>Gradle</a:t>
+            </a:r>
+            <a:endParaRPr lang="de-DE" dirty="0" smtClean="0"/>
+          </a:p>
+          <a:p>
+            <a:r>
+              <a:rPr lang="de-DE" dirty="0" err="1" smtClean="0"/>
+              <a:t>UnitTesting</a:t>
+            </a:r>
+            <a:endParaRPr lang="de-DE" dirty="0" smtClean="0"/>
+          </a:p>
+          <a:p>
             <a:endParaRPr lang="de-DE" dirty="0"/>
           </a:p>
         </p:txBody>
@@ -17420,7 +19007,7 @@
           <a:blip r:embed="rId3">
             <a:extLst>
               <a:ext uri="{28A0092B-C50C-407E-A947-70E740481C1C}">
-                <a14:useLocalDpi xmlns:a14="http://schemas.microsoft.com/office/drawing/2010/main" xmlns="" val="0"/>
+                <a14:useLocalDpi xmlns:a14="http://schemas.microsoft.com/office/drawing/2010/main" val="0"/>
               </a:ext>
             </a:extLst>
           </a:blip>
@@ -17495,7 +19082,7 @@
     </p:spTree>
     <p:extLst>
       <p:ext uri="{BB962C8B-B14F-4D97-AF65-F5344CB8AC3E}">
-        <p14:creationId xmlns:p14="http://schemas.microsoft.com/office/powerpoint/2010/main" xmlns="" val="14036120"/>
+        <p14:creationId xmlns:p14="http://schemas.microsoft.com/office/powerpoint/2010/main" val="14036120"/>
       </p:ext>
     </p:extLst>
   </p:cSld>
@@ -17546,7 +19133,7 @@
           <a:p>
             <a:r>
               <a:rPr lang="de-DE" dirty="0" smtClean="0"/>
-              <a:t>Demo</a:t>
+              <a:t>Werkzeugeinsatz</a:t>
             </a:r>
             <a:endParaRPr lang="de-DE" dirty="0"/>
           </a:p>
@@ -17566,6 +19153,71 @@
         <p:txBody>
           <a:bodyPr/>
           <a:lstStyle/>
+          <a:p>
+            <a:r>
+              <a:rPr lang="de-DE" dirty="0" err="1" smtClean="0"/>
+              <a:t>Git</a:t>
+            </a:r>
+            <a:endParaRPr lang="de-DE" dirty="0"/>
+          </a:p>
+          <a:p>
+            <a:pPr lvl="1"/>
+            <a:r>
+              <a:rPr lang="de-DE" dirty="0" smtClean="0"/>
+              <a:t>Dezentrale Speicherung</a:t>
+            </a:r>
+          </a:p>
+          <a:p>
+            <a:pPr lvl="1"/>
+            <a:r>
+              <a:rPr lang="de-DE" dirty="0" smtClean="0"/>
+              <a:t>Einfache Möglichkeit </a:t>
+            </a:r>
+            <a:r>
+              <a:rPr lang="de-DE" dirty="0" err="1" smtClean="0"/>
+              <a:t>Branches</a:t>
+            </a:r>
+            <a:r>
+              <a:rPr lang="de-DE" dirty="0" smtClean="0"/>
+              <a:t> zu bilden</a:t>
+            </a:r>
+            <a:endParaRPr lang="de-DE" dirty="0" smtClean="0"/>
+          </a:p>
+          <a:p>
+            <a:pPr lvl="1"/>
+            <a:r>
+              <a:rPr lang="de-DE" dirty="0" smtClean="0"/>
+              <a:t>Für ¾ der Gruppe neu</a:t>
+            </a:r>
+          </a:p>
+          <a:p>
+            <a:r>
+              <a:rPr lang="de-DE" dirty="0" err="1" smtClean="0"/>
+              <a:t>GitHub</a:t>
+            </a:r>
+            <a:endParaRPr lang="de-DE" dirty="0" smtClean="0"/>
+          </a:p>
+          <a:p>
+            <a:pPr lvl="1"/>
+            <a:r>
+              <a:rPr lang="de-DE" dirty="0" smtClean="0"/>
+              <a:t>Kostenfrei</a:t>
+            </a:r>
+          </a:p>
+          <a:p>
+            <a:pPr lvl="1"/>
+            <a:r>
+              <a:rPr lang="de-DE" dirty="0" smtClean="0"/>
+              <a:t>Einfach und zentral</a:t>
+            </a:r>
+          </a:p>
+          <a:p>
+            <a:pPr lvl="1"/>
+            <a:r>
+              <a:rPr lang="de-DE" dirty="0" smtClean="0"/>
+              <a:t>Unterstützung durch viele Tools</a:t>
+            </a:r>
+          </a:p>
           <a:p>
             <a:endParaRPr lang="de-DE" dirty="0"/>
           </a:p>
@@ -17583,7 +19235,7 @@
           <a:blip r:embed="rId3">
             <a:extLst>
               <a:ext uri="{28A0092B-C50C-407E-A947-70E740481C1C}">
-                <a14:useLocalDpi xmlns:a14="http://schemas.microsoft.com/office/drawing/2010/main" xmlns="" val="0"/>
+                <a14:useLocalDpi xmlns:a14="http://schemas.microsoft.com/office/drawing/2010/main" val="0"/>
               </a:ext>
             </a:extLst>
           </a:blip>
@@ -17655,24 +19307,98 @@
           </a:p>
         </p:txBody>
       </p:sp>
+      <p:pic>
+        <p:nvPicPr>
+          <p:cNvPr id="1026" name="Picture 2" descr="http://git-scm.com/images/logo%402x.png"/>
+          <p:cNvPicPr>
+            <a:picLocks noChangeAspect="1" noChangeArrowheads="1"/>
+          </p:cNvPicPr>
+          <p:nvPr/>
+        </p:nvPicPr>
+        <p:blipFill>
+          <a:blip r:embed="rId4">
+            <a:extLst>
+              <a:ext uri="{28A0092B-C50C-407E-A947-70E740481C1C}">
+                <a14:useLocalDpi xmlns:a14="http://schemas.microsoft.com/office/drawing/2010/main" val="0"/>
+              </a:ext>
+            </a:extLst>
+          </a:blip>
+          <a:srcRect/>
+          <a:stretch>
+            <a:fillRect/>
+          </a:stretch>
+        </p:blipFill>
+        <p:spPr bwMode="auto">
+          <a:xfrm>
+            <a:off x="8257040" y="2424883"/>
+            <a:ext cx="2095500" cy="876300"/>
+          </a:xfrm>
+          <a:prstGeom prst="rect">
+            <a:avLst/>
+          </a:prstGeom>
+          <a:noFill/>
+          <a:extLst>
+            <a:ext uri="{909E8E84-426E-40DD-AFC4-6F175D3DCCD1}">
+              <a14:hiddenFill xmlns:a14="http://schemas.microsoft.com/office/drawing/2010/main">
+                <a:solidFill>
+                  <a:srgbClr val="FFFFFF"/>
+                </a:solidFill>
+              </a14:hiddenFill>
+            </a:ext>
+          </a:extLst>
+        </p:spPr>
+      </p:pic>
+      <p:pic>
+        <p:nvPicPr>
+          <p:cNvPr id="1028" name="Picture 4" descr="https://assets-cdn.github.com/images/modules/logos_page/GitHub-Logo.png"/>
+          <p:cNvPicPr>
+            <a:picLocks noChangeAspect="1" noChangeArrowheads="1"/>
+          </p:cNvPicPr>
+          <p:nvPr/>
+        </p:nvPicPr>
+        <p:blipFill>
+          <a:blip r:embed="rId5">
+            <a:extLst>
+              <a:ext uri="{28A0092B-C50C-407E-A947-70E740481C1C}">
+                <a14:useLocalDpi xmlns:a14="http://schemas.microsoft.com/office/drawing/2010/main" val="0"/>
+              </a:ext>
+            </a:extLst>
+          </a:blip>
+          <a:srcRect/>
+          <a:stretch>
+            <a:fillRect/>
+          </a:stretch>
+        </p:blipFill>
+        <p:spPr bwMode="auto">
+          <a:xfrm>
+            <a:off x="7665929" y="4184677"/>
+            <a:ext cx="2686611" cy="701877"/>
+          </a:xfrm>
+          <a:prstGeom prst="rect">
+            <a:avLst/>
+          </a:prstGeom>
+          <a:noFill/>
+          <a:extLst>
+            <a:ext uri="{909E8E84-426E-40DD-AFC4-6F175D3DCCD1}">
+              <a14:hiddenFill xmlns:a14="http://schemas.microsoft.com/office/drawing/2010/main">
+                <a:solidFill>
+                  <a:srgbClr val="FFFFFF"/>
+                </a:solidFill>
+              </a14:hiddenFill>
+            </a:ext>
+          </a:extLst>
+        </p:spPr>
+      </p:pic>
     </p:spTree>
     <p:extLst>
       <p:ext uri="{BB962C8B-B14F-4D97-AF65-F5344CB8AC3E}">
-        <p14:creationId xmlns:p14="http://schemas.microsoft.com/office/powerpoint/2010/main" xmlns="" val="3667091251"/>
+        <p14:creationId xmlns:p14="http://schemas.microsoft.com/office/powerpoint/2010/main" val="1932109761"/>
       </p:ext>
     </p:extLst>
   </p:cSld>
   <p:clrMapOvr>
     <a:masterClrMapping/>
   </p:clrMapOvr>
-  <mc:AlternateContent xmlns:mc="http://schemas.openxmlformats.org/markup-compatibility/2006">
-    <mc:Choice xmlns:p14="http://schemas.microsoft.com/office/powerpoint/2010/main" xmlns="" Requires="p14">
-      <p:transition spd="slow" p14:dur="2000"/>
-    </mc:Choice>
-    <mc:Fallback>
-      <p:transition spd="slow"/>
-    </mc:Fallback>
-  </mc:AlternateContent>
   <p:timing>
     <p:tnLst>
       <p:par>
@@ -17942,7 +19668,7 @@
   <a:extraClrSchemeLst/>
   <a:extLst>
     <a:ext uri="{05A4C25C-085E-4340-85A3-A5531E510DB2}">
-      <thm15:themeFamily xmlns:thm15="http://schemas.microsoft.com/office/thememl/2012/main" xmlns="" name="Ion Boardroom" id="{FC33163D-4339-46B1-8EED-24C834239D99}" vid="{A3AB87EF-B655-4FFF-8D05-F333AD7F2789}"/>
+      <thm15:themeFamily xmlns:thm15="http://schemas.microsoft.com/office/thememl/2012/main" name="Ion Boardroom" id="{FC33163D-4339-46B1-8EED-24C834239D99}" vid="{A3AB87EF-B655-4FFF-8D05-F333AD7F2789}"/>
     </a:ext>
   </a:extLst>
 </a:theme>
@@ -18203,7 +19929,7 @@
   <a:extraClrSchemeLst/>
   <a:extLst>
     <a:ext uri="{05A4C25C-085E-4340-85A3-A5531E510DB2}">
-      <thm15:themeFamily xmlns:thm15="http://schemas.microsoft.com/office/thememl/2012/main" xmlns="" name="Office Theme" id="{62F939B6-93AF-4DB8-9C6B-D6C7DFDC589F}" vid="{4A3C46E8-61CC-4603-A589-7422A47A8E4A}"/>
+      <thm15:themeFamily xmlns:thm15="http://schemas.microsoft.com/office/thememl/2012/main" name="Office Theme" id="{62F939B6-93AF-4DB8-9C6B-D6C7DFDC589F}" vid="{4A3C46E8-61CC-4603-A589-7422A47A8E4A}"/>
     </a:ext>
   </a:extLst>
 </a:theme>

</xml_diff>

<commit_message>
Präsentation um meinen Teil ergänzt
</commit_message>
<xml_diff>
--- a/Dokumentation/PWSafe Präsentation.pptx
+++ b/Dokumentation/PWSafe Präsentation.pptx
@@ -5,7 +5,7 @@
     <p:sldMasterId id="2147483648" r:id="rId1"/>
   </p:sldMasterIdLst>
   <p:notesMasterIdLst>
-    <p:notesMasterId r:id="rId19"/>
+    <p:notesMasterId r:id="rId29"/>
   </p:notesMasterIdLst>
   <p:sldIdLst>
     <p:sldId id="256" r:id="rId2"/>
@@ -21,10 +21,20 @@
     <p:sldId id="272" r:id="rId12"/>
     <p:sldId id="273" r:id="rId13"/>
     <p:sldId id="261" r:id="rId14"/>
-    <p:sldId id="262" r:id="rId15"/>
-    <p:sldId id="263" r:id="rId16"/>
-    <p:sldId id="264" r:id="rId17"/>
-    <p:sldId id="265" r:id="rId18"/>
+    <p:sldId id="284" r:id="rId15"/>
+    <p:sldId id="274" r:id="rId16"/>
+    <p:sldId id="275" r:id="rId17"/>
+    <p:sldId id="276" r:id="rId18"/>
+    <p:sldId id="277" r:id="rId19"/>
+    <p:sldId id="278" r:id="rId20"/>
+    <p:sldId id="279" r:id="rId21"/>
+    <p:sldId id="280" r:id="rId22"/>
+    <p:sldId id="281" r:id="rId23"/>
+    <p:sldId id="282" r:id="rId24"/>
+    <p:sldId id="283" r:id="rId25"/>
+    <p:sldId id="263" r:id="rId26"/>
+    <p:sldId id="264" r:id="rId27"/>
+    <p:sldId id="265" r:id="rId28"/>
   </p:sldIdLst>
   <p:sldSz cx="12192000" cy="6858000"/>
   <p:notesSz cx="6858000" cy="9144000"/>
@@ -228,7 +238,7 @@
             <a:fld id="{B4AA8B1B-A85F-43ED-A41A-985067DF8577}" type="datetimeFigureOut">
               <a:rPr lang="de-DE" smtClean="0"/>
               <a:pPr/>
-              <a:t>09.02.2015</a:t>
+              <a:t>10.02.2015</a:t>
             </a:fld>
             <a:endParaRPr lang="de-DE"/>
           </a:p>
@@ -902,7 +912,6 @@
           <a:p>
             <a:fld id="{05D1FABD-69C2-49F9-BD91-F05E017FE538}" type="slidenum">
               <a:rPr lang="de-DE" smtClean="0"/>
-              <a:pPr/>
               <a:t>14</a:t>
             </a:fld>
             <a:endParaRPr lang="de-DE"/>
@@ -912,7 +921,7 @@
     </p:spTree>
     <p:extLst>
       <p:ext uri="{BB962C8B-B14F-4D97-AF65-F5344CB8AC3E}">
-        <p14:creationId xmlns:p14="http://schemas.microsoft.com/office/powerpoint/2010/main" val="1066156749"/>
+        <p14:creationId xmlns:p14="http://schemas.microsoft.com/office/powerpoint/2010/main" val="1949970788"/>
       </p:ext>
     </p:extLst>
   </p:cSld>
@@ -987,7 +996,6 @@
           <a:p>
             <a:fld id="{05D1FABD-69C2-49F9-BD91-F05E017FE538}" type="slidenum">
               <a:rPr lang="de-DE" smtClean="0"/>
-              <a:pPr/>
               <a:t>15</a:t>
             </a:fld>
             <a:endParaRPr lang="de-DE"/>
@@ -997,7 +1005,7 @@
     </p:spTree>
     <p:extLst>
       <p:ext uri="{BB962C8B-B14F-4D97-AF65-F5344CB8AC3E}">
-        <p14:creationId xmlns:p14="http://schemas.microsoft.com/office/powerpoint/2010/main" val="3297351362"/>
+        <p14:creationId xmlns:p14="http://schemas.microsoft.com/office/powerpoint/2010/main" val="1223020845"/>
       </p:ext>
     </p:extLst>
   </p:cSld>
@@ -1072,7 +1080,6 @@
           <a:p>
             <a:fld id="{05D1FABD-69C2-49F9-BD91-F05E017FE538}" type="slidenum">
               <a:rPr lang="de-DE" smtClean="0"/>
-              <a:pPr/>
               <a:t>16</a:t>
             </a:fld>
             <a:endParaRPr lang="de-DE"/>
@@ -1082,7 +1089,7 @@
     </p:spTree>
     <p:extLst>
       <p:ext uri="{BB962C8B-B14F-4D97-AF65-F5344CB8AC3E}">
-        <p14:creationId xmlns:p14="http://schemas.microsoft.com/office/powerpoint/2010/main" val="784737350"/>
+        <p14:creationId xmlns:p14="http://schemas.microsoft.com/office/powerpoint/2010/main" val="1120374715"/>
       </p:ext>
     </p:extLst>
   </p:cSld>
@@ -1157,7 +1164,6 @@
           <a:p>
             <a:fld id="{05D1FABD-69C2-49F9-BD91-F05E017FE538}" type="slidenum">
               <a:rPr lang="de-DE" smtClean="0"/>
-              <a:pPr/>
               <a:t>17</a:t>
             </a:fld>
             <a:endParaRPr lang="de-DE"/>
@@ -1167,7 +1173,259 @@
     </p:spTree>
     <p:extLst>
       <p:ext uri="{BB962C8B-B14F-4D97-AF65-F5344CB8AC3E}">
-        <p14:creationId xmlns:p14="http://schemas.microsoft.com/office/powerpoint/2010/main" val="1066156749"/>
+        <p14:creationId xmlns:p14="http://schemas.microsoft.com/office/powerpoint/2010/main" val="229866248"/>
+      </p:ext>
+    </p:extLst>
+  </p:cSld>
+  <p:clrMapOvr>
+    <a:masterClrMapping/>
+  </p:clrMapOvr>
+</p:notes>
+</file>
+
+<file path=ppt/notesSlides/notesSlide17.xml><?xml version="1.0" encoding="utf-8"?>
+<p:notes xmlns:a="http://schemas.openxmlformats.org/drawingml/2006/main" xmlns:r="http://schemas.openxmlformats.org/officeDocument/2006/relationships" xmlns:p="http://schemas.openxmlformats.org/presentationml/2006/main">
+  <p:cSld>
+    <p:spTree>
+      <p:nvGrpSpPr>
+        <p:cNvPr id="1" name=""/>
+        <p:cNvGrpSpPr/>
+        <p:nvPr/>
+      </p:nvGrpSpPr>
+      <p:grpSpPr>
+        <a:xfrm>
+          <a:off x="0" y="0"/>
+          <a:ext cx="0" cy="0"/>
+          <a:chOff x="0" y="0"/>
+          <a:chExt cx="0" cy="0"/>
+        </a:xfrm>
+      </p:grpSpPr>
+      <p:sp>
+        <p:nvSpPr>
+          <p:cNvPr id="2" name="Folienbildplatzhalter 1"/>
+          <p:cNvSpPr>
+            <a:spLocks noGrp="1" noRot="1" noChangeAspect="1"/>
+          </p:cNvSpPr>
+          <p:nvPr>
+            <p:ph type="sldImg"/>
+          </p:nvPr>
+        </p:nvSpPr>
+        <p:spPr/>
+      </p:sp>
+      <p:sp>
+        <p:nvSpPr>
+          <p:cNvPr id="3" name="Notizenplatzhalter 2"/>
+          <p:cNvSpPr>
+            <a:spLocks noGrp="1"/>
+          </p:cNvSpPr>
+          <p:nvPr>
+            <p:ph type="body" idx="1"/>
+          </p:nvPr>
+        </p:nvSpPr>
+        <p:spPr/>
+        <p:txBody>
+          <a:bodyPr/>
+          <a:lstStyle/>
+          <a:p>
+            <a:endParaRPr lang="de-DE"/>
+          </a:p>
+        </p:txBody>
+      </p:sp>
+      <p:sp>
+        <p:nvSpPr>
+          <p:cNvPr id="4" name="Foliennummernplatzhalter 3"/>
+          <p:cNvSpPr>
+            <a:spLocks noGrp="1"/>
+          </p:cNvSpPr>
+          <p:nvPr>
+            <p:ph type="sldNum" sz="quarter" idx="10"/>
+          </p:nvPr>
+        </p:nvSpPr>
+        <p:spPr/>
+        <p:txBody>
+          <a:bodyPr/>
+          <a:lstStyle/>
+          <a:p>
+            <a:fld id="{05D1FABD-69C2-49F9-BD91-F05E017FE538}" type="slidenum">
+              <a:rPr lang="de-DE" smtClean="0"/>
+              <a:t>18</a:t>
+            </a:fld>
+            <a:endParaRPr lang="de-DE"/>
+          </a:p>
+        </p:txBody>
+      </p:sp>
+    </p:spTree>
+    <p:extLst>
+      <p:ext uri="{BB962C8B-B14F-4D97-AF65-F5344CB8AC3E}">
+        <p14:creationId xmlns:p14="http://schemas.microsoft.com/office/powerpoint/2010/main" val="1395052422"/>
+      </p:ext>
+    </p:extLst>
+  </p:cSld>
+  <p:clrMapOvr>
+    <a:masterClrMapping/>
+  </p:clrMapOvr>
+</p:notes>
+</file>
+
+<file path=ppt/notesSlides/notesSlide18.xml><?xml version="1.0" encoding="utf-8"?>
+<p:notes xmlns:a="http://schemas.openxmlformats.org/drawingml/2006/main" xmlns:r="http://schemas.openxmlformats.org/officeDocument/2006/relationships" xmlns:p="http://schemas.openxmlformats.org/presentationml/2006/main">
+  <p:cSld>
+    <p:spTree>
+      <p:nvGrpSpPr>
+        <p:cNvPr id="1" name=""/>
+        <p:cNvGrpSpPr/>
+        <p:nvPr/>
+      </p:nvGrpSpPr>
+      <p:grpSpPr>
+        <a:xfrm>
+          <a:off x="0" y="0"/>
+          <a:ext cx="0" cy="0"/>
+          <a:chOff x="0" y="0"/>
+          <a:chExt cx="0" cy="0"/>
+        </a:xfrm>
+      </p:grpSpPr>
+      <p:sp>
+        <p:nvSpPr>
+          <p:cNvPr id="2" name="Folienbildplatzhalter 1"/>
+          <p:cNvSpPr>
+            <a:spLocks noGrp="1" noRot="1" noChangeAspect="1"/>
+          </p:cNvSpPr>
+          <p:nvPr>
+            <p:ph type="sldImg"/>
+          </p:nvPr>
+        </p:nvSpPr>
+        <p:spPr/>
+      </p:sp>
+      <p:sp>
+        <p:nvSpPr>
+          <p:cNvPr id="3" name="Notizenplatzhalter 2"/>
+          <p:cNvSpPr>
+            <a:spLocks noGrp="1"/>
+          </p:cNvSpPr>
+          <p:nvPr>
+            <p:ph type="body" idx="1"/>
+          </p:nvPr>
+        </p:nvSpPr>
+        <p:spPr/>
+        <p:txBody>
+          <a:bodyPr/>
+          <a:lstStyle/>
+          <a:p>
+            <a:endParaRPr lang="de-DE"/>
+          </a:p>
+        </p:txBody>
+      </p:sp>
+      <p:sp>
+        <p:nvSpPr>
+          <p:cNvPr id="4" name="Foliennummernplatzhalter 3"/>
+          <p:cNvSpPr>
+            <a:spLocks noGrp="1"/>
+          </p:cNvSpPr>
+          <p:nvPr>
+            <p:ph type="sldNum" sz="quarter" idx="10"/>
+          </p:nvPr>
+        </p:nvSpPr>
+        <p:spPr/>
+        <p:txBody>
+          <a:bodyPr/>
+          <a:lstStyle/>
+          <a:p>
+            <a:fld id="{05D1FABD-69C2-49F9-BD91-F05E017FE538}" type="slidenum">
+              <a:rPr lang="de-DE" smtClean="0"/>
+              <a:t>19</a:t>
+            </a:fld>
+            <a:endParaRPr lang="de-DE"/>
+          </a:p>
+        </p:txBody>
+      </p:sp>
+    </p:spTree>
+    <p:extLst>
+      <p:ext uri="{BB962C8B-B14F-4D97-AF65-F5344CB8AC3E}">
+        <p14:creationId xmlns:p14="http://schemas.microsoft.com/office/powerpoint/2010/main" val="3401759754"/>
+      </p:ext>
+    </p:extLst>
+  </p:cSld>
+  <p:clrMapOvr>
+    <a:masterClrMapping/>
+  </p:clrMapOvr>
+</p:notes>
+</file>
+
+<file path=ppt/notesSlides/notesSlide19.xml><?xml version="1.0" encoding="utf-8"?>
+<p:notes xmlns:a="http://schemas.openxmlformats.org/drawingml/2006/main" xmlns:r="http://schemas.openxmlformats.org/officeDocument/2006/relationships" xmlns:p="http://schemas.openxmlformats.org/presentationml/2006/main">
+  <p:cSld>
+    <p:spTree>
+      <p:nvGrpSpPr>
+        <p:cNvPr id="1" name=""/>
+        <p:cNvGrpSpPr/>
+        <p:nvPr/>
+      </p:nvGrpSpPr>
+      <p:grpSpPr>
+        <a:xfrm>
+          <a:off x="0" y="0"/>
+          <a:ext cx="0" cy="0"/>
+          <a:chOff x="0" y="0"/>
+          <a:chExt cx="0" cy="0"/>
+        </a:xfrm>
+      </p:grpSpPr>
+      <p:sp>
+        <p:nvSpPr>
+          <p:cNvPr id="2" name="Folienbildplatzhalter 1"/>
+          <p:cNvSpPr>
+            <a:spLocks noGrp="1" noRot="1" noChangeAspect="1"/>
+          </p:cNvSpPr>
+          <p:nvPr>
+            <p:ph type="sldImg"/>
+          </p:nvPr>
+        </p:nvSpPr>
+        <p:spPr/>
+      </p:sp>
+      <p:sp>
+        <p:nvSpPr>
+          <p:cNvPr id="3" name="Notizenplatzhalter 2"/>
+          <p:cNvSpPr>
+            <a:spLocks noGrp="1"/>
+          </p:cNvSpPr>
+          <p:nvPr>
+            <p:ph type="body" idx="1"/>
+          </p:nvPr>
+        </p:nvSpPr>
+        <p:spPr/>
+        <p:txBody>
+          <a:bodyPr/>
+          <a:lstStyle/>
+          <a:p>
+            <a:endParaRPr lang="de-DE"/>
+          </a:p>
+        </p:txBody>
+      </p:sp>
+      <p:sp>
+        <p:nvSpPr>
+          <p:cNvPr id="4" name="Foliennummernplatzhalter 3"/>
+          <p:cNvSpPr>
+            <a:spLocks noGrp="1"/>
+          </p:cNvSpPr>
+          <p:nvPr>
+            <p:ph type="sldNum" sz="quarter" idx="10"/>
+          </p:nvPr>
+        </p:nvSpPr>
+        <p:spPr/>
+        <p:txBody>
+          <a:bodyPr/>
+          <a:lstStyle/>
+          <a:p>
+            <a:fld id="{05D1FABD-69C2-49F9-BD91-F05E017FE538}" type="slidenum">
+              <a:rPr lang="de-DE" smtClean="0"/>
+              <a:t>20</a:t>
+            </a:fld>
+            <a:endParaRPr lang="de-DE"/>
+          </a:p>
+        </p:txBody>
+      </p:sp>
+    </p:spTree>
+    <p:extLst>
+      <p:ext uri="{BB962C8B-B14F-4D97-AF65-F5344CB8AC3E}">
+        <p14:creationId xmlns:p14="http://schemas.microsoft.com/office/powerpoint/2010/main" val="3922393296"/>
       </p:ext>
     </p:extLst>
   </p:cSld>
@@ -1253,6 +1511,597 @@
     <p:extLst>
       <p:ext uri="{BB962C8B-B14F-4D97-AF65-F5344CB8AC3E}">
         <p14:creationId xmlns:p14="http://schemas.microsoft.com/office/powerpoint/2010/main" val="930434972"/>
+      </p:ext>
+    </p:extLst>
+  </p:cSld>
+  <p:clrMapOvr>
+    <a:masterClrMapping/>
+  </p:clrMapOvr>
+</p:notes>
+</file>
+
+<file path=ppt/notesSlides/notesSlide20.xml><?xml version="1.0" encoding="utf-8"?>
+<p:notes xmlns:a="http://schemas.openxmlformats.org/drawingml/2006/main" xmlns:r="http://schemas.openxmlformats.org/officeDocument/2006/relationships" xmlns:p="http://schemas.openxmlformats.org/presentationml/2006/main">
+  <p:cSld>
+    <p:spTree>
+      <p:nvGrpSpPr>
+        <p:cNvPr id="1" name=""/>
+        <p:cNvGrpSpPr/>
+        <p:nvPr/>
+      </p:nvGrpSpPr>
+      <p:grpSpPr>
+        <a:xfrm>
+          <a:off x="0" y="0"/>
+          <a:ext cx="0" cy="0"/>
+          <a:chOff x="0" y="0"/>
+          <a:chExt cx="0" cy="0"/>
+        </a:xfrm>
+      </p:grpSpPr>
+      <p:sp>
+        <p:nvSpPr>
+          <p:cNvPr id="2" name="Folienbildplatzhalter 1"/>
+          <p:cNvSpPr>
+            <a:spLocks noGrp="1" noRot="1" noChangeAspect="1"/>
+          </p:cNvSpPr>
+          <p:nvPr>
+            <p:ph type="sldImg"/>
+          </p:nvPr>
+        </p:nvSpPr>
+        <p:spPr/>
+      </p:sp>
+      <p:sp>
+        <p:nvSpPr>
+          <p:cNvPr id="3" name="Notizenplatzhalter 2"/>
+          <p:cNvSpPr>
+            <a:spLocks noGrp="1"/>
+          </p:cNvSpPr>
+          <p:nvPr>
+            <p:ph type="body" idx="1"/>
+          </p:nvPr>
+        </p:nvSpPr>
+        <p:spPr/>
+        <p:txBody>
+          <a:bodyPr/>
+          <a:lstStyle/>
+          <a:p>
+            <a:endParaRPr lang="de-DE"/>
+          </a:p>
+        </p:txBody>
+      </p:sp>
+      <p:sp>
+        <p:nvSpPr>
+          <p:cNvPr id="4" name="Foliennummernplatzhalter 3"/>
+          <p:cNvSpPr>
+            <a:spLocks noGrp="1"/>
+          </p:cNvSpPr>
+          <p:nvPr>
+            <p:ph type="sldNum" sz="quarter" idx="10"/>
+          </p:nvPr>
+        </p:nvSpPr>
+        <p:spPr/>
+        <p:txBody>
+          <a:bodyPr/>
+          <a:lstStyle/>
+          <a:p>
+            <a:fld id="{05D1FABD-69C2-49F9-BD91-F05E017FE538}" type="slidenum">
+              <a:rPr lang="de-DE" smtClean="0"/>
+              <a:t>21</a:t>
+            </a:fld>
+            <a:endParaRPr lang="de-DE"/>
+          </a:p>
+        </p:txBody>
+      </p:sp>
+    </p:spTree>
+    <p:extLst>
+      <p:ext uri="{BB962C8B-B14F-4D97-AF65-F5344CB8AC3E}">
+        <p14:creationId xmlns:p14="http://schemas.microsoft.com/office/powerpoint/2010/main" val="2754737602"/>
+      </p:ext>
+    </p:extLst>
+  </p:cSld>
+  <p:clrMapOvr>
+    <a:masterClrMapping/>
+  </p:clrMapOvr>
+</p:notes>
+</file>
+
+<file path=ppt/notesSlides/notesSlide21.xml><?xml version="1.0" encoding="utf-8"?>
+<p:notes xmlns:a="http://schemas.openxmlformats.org/drawingml/2006/main" xmlns:r="http://schemas.openxmlformats.org/officeDocument/2006/relationships" xmlns:p="http://schemas.openxmlformats.org/presentationml/2006/main">
+  <p:cSld>
+    <p:spTree>
+      <p:nvGrpSpPr>
+        <p:cNvPr id="1" name=""/>
+        <p:cNvGrpSpPr/>
+        <p:nvPr/>
+      </p:nvGrpSpPr>
+      <p:grpSpPr>
+        <a:xfrm>
+          <a:off x="0" y="0"/>
+          <a:ext cx="0" cy="0"/>
+          <a:chOff x="0" y="0"/>
+          <a:chExt cx="0" cy="0"/>
+        </a:xfrm>
+      </p:grpSpPr>
+      <p:sp>
+        <p:nvSpPr>
+          <p:cNvPr id="2" name="Folienbildplatzhalter 1"/>
+          <p:cNvSpPr>
+            <a:spLocks noGrp="1" noRot="1" noChangeAspect="1"/>
+          </p:cNvSpPr>
+          <p:nvPr>
+            <p:ph type="sldImg"/>
+          </p:nvPr>
+        </p:nvSpPr>
+        <p:spPr/>
+      </p:sp>
+      <p:sp>
+        <p:nvSpPr>
+          <p:cNvPr id="3" name="Notizenplatzhalter 2"/>
+          <p:cNvSpPr>
+            <a:spLocks noGrp="1"/>
+          </p:cNvSpPr>
+          <p:nvPr>
+            <p:ph type="body" idx="1"/>
+          </p:nvPr>
+        </p:nvSpPr>
+        <p:spPr/>
+        <p:txBody>
+          <a:bodyPr/>
+          <a:lstStyle/>
+          <a:p>
+            <a:endParaRPr lang="de-DE"/>
+          </a:p>
+        </p:txBody>
+      </p:sp>
+      <p:sp>
+        <p:nvSpPr>
+          <p:cNvPr id="4" name="Foliennummernplatzhalter 3"/>
+          <p:cNvSpPr>
+            <a:spLocks noGrp="1"/>
+          </p:cNvSpPr>
+          <p:nvPr>
+            <p:ph type="sldNum" sz="quarter" idx="10"/>
+          </p:nvPr>
+        </p:nvSpPr>
+        <p:spPr/>
+        <p:txBody>
+          <a:bodyPr/>
+          <a:lstStyle/>
+          <a:p>
+            <a:fld id="{05D1FABD-69C2-49F9-BD91-F05E017FE538}" type="slidenum">
+              <a:rPr lang="de-DE" smtClean="0"/>
+              <a:t>22</a:t>
+            </a:fld>
+            <a:endParaRPr lang="de-DE"/>
+          </a:p>
+        </p:txBody>
+      </p:sp>
+    </p:spTree>
+    <p:extLst>
+      <p:ext uri="{BB962C8B-B14F-4D97-AF65-F5344CB8AC3E}">
+        <p14:creationId xmlns:p14="http://schemas.microsoft.com/office/powerpoint/2010/main" val="657275192"/>
+      </p:ext>
+    </p:extLst>
+  </p:cSld>
+  <p:clrMapOvr>
+    <a:masterClrMapping/>
+  </p:clrMapOvr>
+</p:notes>
+</file>
+
+<file path=ppt/notesSlides/notesSlide22.xml><?xml version="1.0" encoding="utf-8"?>
+<p:notes xmlns:a="http://schemas.openxmlformats.org/drawingml/2006/main" xmlns:r="http://schemas.openxmlformats.org/officeDocument/2006/relationships" xmlns:p="http://schemas.openxmlformats.org/presentationml/2006/main">
+  <p:cSld>
+    <p:spTree>
+      <p:nvGrpSpPr>
+        <p:cNvPr id="1" name=""/>
+        <p:cNvGrpSpPr/>
+        <p:nvPr/>
+      </p:nvGrpSpPr>
+      <p:grpSpPr>
+        <a:xfrm>
+          <a:off x="0" y="0"/>
+          <a:ext cx="0" cy="0"/>
+          <a:chOff x="0" y="0"/>
+          <a:chExt cx="0" cy="0"/>
+        </a:xfrm>
+      </p:grpSpPr>
+      <p:sp>
+        <p:nvSpPr>
+          <p:cNvPr id="2" name="Folienbildplatzhalter 1"/>
+          <p:cNvSpPr>
+            <a:spLocks noGrp="1" noRot="1" noChangeAspect="1"/>
+          </p:cNvSpPr>
+          <p:nvPr>
+            <p:ph type="sldImg"/>
+          </p:nvPr>
+        </p:nvSpPr>
+        <p:spPr/>
+      </p:sp>
+      <p:sp>
+        <p:nvSpPr>
+          <p:cNvPr id="3" name="Notizenplatzhalter 2"/>
+          <p:cNvSpPr>
+            <a:spLocks noGrp="1"/>
+          </p:cNvSpPr>
+          <p:nvPr>
+            <p:ph type="body" idx="1"/>
+          </p:nvPr>
+        </p:nvSpPr>
+        <p:spPr/>
+        <p:txBody>
+          <a:bodyPr/>
+          <a:lstStyle/>
+          <a:p>
+            <a:endParaRPr lang="de-DE"/>
+          </a:p>
+        </p:txBody>
+      </p:sp>
+      <p:sp>
+        <p:nvSpPr>
+          <p:cNvPr id="4" name="Foliennummernplatzhalter 3"/>
+          <p:cNvSpPr>
+            <a:spLocks noGrp="1"/>
+          </p:cNvSpPr>
+          <p:nvPr>
+            <p:ph type="sldNum" sz="quarter" idx="10"/>
+          </p:nvPr>
+        </p:nvSpPr>
+        <p:spPr/>
+        <p:txBody>
+          <a:bodyPr/>
+          <a:lstStyle/>
+          <a:p>
+            <a:fld id="{05D1FABD-69C2-49F9-BD91-F05E017FE538}" type="slidenum">
+              <a:rPr lang="de-DE" smtClean="0"/>
+              <a:t>23</a:t>
+            </a:fld>
+            <a:endParaRPr lang="de-DE"/>
+          </a:p>
+        </p:txBody>
+      </p:sp>
+    </p:spTree>
+    <p:extLst>
+      <p:ext uri="{BB962C8B-B14F-4D97-AF65-F5344CB8AC3E}">
+        <p14:creationId xmlns:p14="http://schemas.microsoft.com/office/powerpoint/2010/main" val="183309910"/>
+      </p:ext>
+    </p:extLst>
+  </p:cSld>
+  <p:clrMapOvr>
+    <a:masterClrMapping/>
+  </p:clrMapOvr>
+</p:notes>
+</file>
+
+<file path=ppt/notesSlides/notesSlide23.xml><?xml version="1.0" encoding="utf-8"?>
+<p:notes xmlns:a="http://schemas.openxmlformats.org/drawingml/2006/main" xmlns:r="http://schemas.openxmlformats.org/officeDocument/2006/relationships" xmlns:p="http://schemas.openxmlformats.org/presentationml/2006/main">
+  <p:cSld>
+    <p:spTree>
+      <p:nvGrpSpPr>
+        <p:cNvPr id="1" name=""/>
+        <p:cNvGrpSpPr/>
+        <p:nvPr/>
+      </p:nvGrpSpPr>
+      <p:grpSpPr>
+        <a:xfrm>
+          <a:off x="0" y="0"/>
+          <a:ext cx="0" cy="0"/>
+          <a:chOff x="0" y="0"/>
+          <a:chExt cx="0" cy="0"/>
+        </a:xfrm>
+      </p:grpSpPr>
+      <p:sp>
+        <p:nvSpPr>
+          <p:cNvPr id="2" name="Folienbildplatzhalter 1"/>
+          <p:cNvSpPr>
+            <a:spLocks noGrp="1" noRot="1" noChangeAspect="1"/>
+          </p:cNvSpPr>
+          <p:nvPr>
+            <p:ph type="sldImg"/>
+          </p:nvPr>
+        </p:nvSpPr>
+        <p:spPr/>
+      </p:sp>
+      <p:sp>
+        <p:nvSpPr>
+          <p:cNvPr id="3" name="Notizenplatzhalter 2"/>
+          <p:cNvSpPr>
+            <a:spLocks noGrp="1"/>
+          </p:cNvSpPr>
+          <p:nvPr>
+            <p:ph type="body" idx="1"/>
+          </p:nvPr>
+        </p:nvSpPr>
+        <p:spPr/>
+        <p:txBody>
+          <a:bodyPr/>
+          <a:lstStyle/>
+          <a:p>
+            <a:endParaRPr lang="de-DE"/>
+          </a:p>
+        </p:txBody>
+      </p:sp>
+      <p:sp>
+        <p:nvSpPr>
+          <p:cNvPr id="4" name="Foliennummernplatzhalter 3"/>
+          <p:cNvSpPr>
+            <a:spLocks noGrp="1"/>
+          </p:cNvSpPr>
+          <p:nvPr>
+            <p:ph type="sldNum" sz="quarter" idx="10"/>
+          </p:nvPr>
+        </p:nvSpPr>
+        <p:spPr/>
+        <p:txBody>
+          <a:bodyPr/>
+          <a:lstStyle/>
+          <a:p>
+            <a:fld id="{05D1FABD-69C2-49F9-BD91-F05E017FE538}" type="slidenum">
+              <a:rPr lang="de-DE" smtClean="0"/>
+              <a:t>24</a:t>
+            </a:fld>
+            <a:endParaRPr lang="de-DE"/>
+          </a:p>
+        </p:txBody>
+      </p:sp>
+    </p:spTree>
+    <p:extLst>
+      <p:ext uri="{BB962C8B-B14F-4D97-AF65-F5344CB8AC3E}">
+        <p14:creationId xmlns:p14="http://schemas.microsoft.com/office/powerpoint/2010/main" val="1748681489"/>
+      </p:ext>
+    </p:extLst>
+  </p:cSld>
+  <p:clrMapOvr>
+    <a:masterClrMapping/>
+  </p:clrMapOvr>
+</p:notes>
+</file>
+
+<file path=ppt/notesSlides/notesSlide24.xml><?xml version="1.0" encoding="utf-8"?>
+<p:notes xmlns:a="http://schemas.openxmlformats.org/drawingml/2006/main" xmlns:r="http://schemas.openxmlformats.org/officeDocument/2006/relationships" xmlns:p="http://schemas.openxmlformats.org/presentationml/2006/main">
+  <p:cSld>
+    <p:spTree>
+      <p:nvGrpSpPr>
+        <p:cNvPr id="1" name=""/>
+        <p:cNvGrpSpPr/>
+        <p:nvPr/>
+      </p:nvGrpSpPr>
+      <p:grpSpPr>
+        <a:xfrm>
+          <a:off x="0" y="0"/>
+          <a:ext cx="0" cy="0"/>
+          <a:chOff x="0" y="0"/>
+          <a:chExt cx="0" cy="0"/>
+        </a:xfrm>
+      </p:grpSpPr>
+      <p:sp>
+        <p:nvSpPr>
+          <p:cNvPr id="2" name="Folienbildplatzhalter 1"/>
+          <p:cNvSpPr>
+            <a:spLocks noGrp="1" noRot="1" noChangeAspect="1"/>
+          </p:cNvSpPr>
+          <p:nvPr>
+            <p:ph type="sldImg"/>
+          </p:nvPr>
+        </p:nvSpPr>
+        <p:spPr/>
+      </p:sp>
+      <p:sp>
+        <p:nvSpPr>
+          <p:cNvPr id="3" name="Notizenplatzhalter 2"/>
+          <p:cNvSpPr>
+            <a:spLocks noGrp="1"/>
+          </p:cNvSpPr>
+          <p:nvPr>
+            <p:ph type="body" idx="1"/>
+          </p:nvPr>
+        </p:nvSpPr>
+        <p:spPr/>
+        <p:txBody>
+          <a:bodyPr/>
+          <a:lstStyle/>
+          <a:p>
+            <a:endParaRPr lang="de-DE"/>
+          </a:p>
+        </p:txBody>
+      </p:sp>
+      <p:sp>
+        <p:nvSpPr>
+          <p:cNvPr id="4" name="Foliennummernplatzhalter 3"/>
+          <p:cNvSpPr>
+            <a:spLocks noGrp="1"/>
+          </p:cNvSpPr>
+          <p:nvPr>
+            <p:ph type="sldNum" sz="quarter" idx="10"/>
+          </p:nvPr>
+        </p:nvSpPr>
+        <p:spPr/>
+        <p:txBody>
+          <a:bodyPr/>
+          <a:lstStyle/>
+          <a:p>
+            <a:fld id="{05D1FABD-69C2-49F9-BD91-F05E017FE538}" type="slidenum">
+              <a:rPr lang="de-DE" smtClean="0"/>
+              <a:pPr/>
+              <a:t>25</a:t>
+            </a:fld>
+            <a:endParaRPr lang="de-DE"/>
+          </a:p>
+        </p:txBody>
+      </p:sp>
+    </p:spTree>
+    <p:extLst>
+      <p:ext uri="{BB962C8B-B14F-4D97-AF65-F5344CB8AC3E}">
+        <p14:creationId xmlns:p14="http://schemas.microsoft.com/office/powerpoint/2010/main" val="3297351362"/>
+      </p:ext>
+    </p:extLst>
+  </p:cSld>
+  <p:clrMapOvr>
+    <a:masterClrMapping/>
+  </p:clrMapOvr>
+</p:notes>
+</file>
+
+<file path=ppt/notesSlides/notesSlide25.xml><?xml version="1.0" encoding="utf-8"?>
+<p:notes xmlns:a="http://schemas.openxmlformats.org/drawingml/2006/main" xmlns:r="http://schemas.openxmlformats.org/officeDocument/2006/relationships" xmlns:p="http://schemas.openxmlformats.org/presentationml/2006/main">
+  <p:cSld>
+    <p:spTree>
+      <p:nvGrpSpPr>
+        <p:cNvPr id="1" name=""/>
+        <p:cNvGrpSpPr/>
+        <p:nvPr/>
+      </p:nvGrpSpPr>
+      <p:grpSpPr>
+        <a:xfrm>
+          <a:off x="0" y="0"/>
+          <a:ext cx="0" cy="0"/>
+          <a:chOff x="0" y="0"/>
+          <a:chExt cx="0" cy="0"/>
+        </a:xfrm>
+      </p:grpSpPr>
+      <p:sp>
+        <p:nvSpPr>
+          <p:cNvPr id="2" name="Folienbildplatzhalter 1"/>
+          <p:cNvSpPr>
+            <a:spLocks noGrp="1" noRot="1" noChangeAspect="1"/>
+          </p:cNvSpPr>
+          <p:nvPr>
+            <p:ph type="sldImg"/>
+          </p:nvPr>
+        </p:nvSpPr>
+        <p:spPr/>
+      </p:sp>
+      <p:sp>
+        <p:nvSpPr>
+          <p:cNvPr id="3" name="Notizenplatzhalter 2"/>
+          <p:cNvSpPr>
+            <a:spLocks noGrp="1"/>
+          </p:cNvSpPr>
+          <p:nvPr>
+            <p:ph type="body" idx="1"/>
+          </p:nvPr>
+        </p:nvSpPr>
+        <p:spPr/>
+        <p:txBody>
+          <a:bodyPr/>
+          <a:lstStyle/>
+          <a:p>
+            <a:endParaRPr lang="de-DE"/>
+          </a:p>
+        </p:txBody>
+      </p:sp>
+      <p:sp>
+        <p:nvSpPr>
+          <p:cNvPr id="4" name="Foliennummernplatzhalter 3"/>
+          <p:cNvSpPr>
+            <a:spLocks noGrp="1"/>
+          </p:cNvSpPr>
+          <p:nvPr>
+            <p:ph type="sldNum" sz="quarter" idx="10"/>
+          </p:nvPr>
+        </p:nvSpPr>
+        <p:spPr/>
+        <p:txBody>
+          <a:bodyPr/>
+          <a:lstStyle/>
+          <a:p>
+            <a:fld id="{05D1FABD-69C2-49F9-BD91-F05E017FE538}" type="slidenum">
+              <a:rPr lang="de-DE" smtClean="0"/>
+              <a:pPr/>
+              <a:t>26</a:t>
+            </a:fld>
+            <a:endParaRPr lang="de-DE"/>
+          </a:p>
+        </p:txBody>
+      </p:sp>
+    </p:spTree>
+    <p:extLst>
+      <p:ext uri="{BB962C8B-B14F-4D97-AF65-F5344CB8AC3E}">
+        <p14:creationId xmlns:p14="http://schemas.microsoft.com/office/powerpoint/2010/main" val="784737350"/>
+      </p:ext>
+    </p:extLst>
+  </p:cSld>
+  <p:clrMapOvr>
+    <a:masterClrMapping/>
+  </p:clrMapOvr>
+</p:notes>
+</file>
+
+<file path=ppt/notesSlides/notesSlide26.xml><?xml version="1.0" encoding="utf-8"?>
+<p:notes xmlns:a="http://schemas.openxmlformats.org/drawingml/2006/main" xmlns:r="http://schemas.openxmlformats.org/officeDocument/2006/relationships" xmlns:p="http://schemas.openxmlformats.org/presentationml/2006/main">
+  <p:cSld>
+    <p:spTree>
+      <p:nvGrpSpPr>
+        <p:cNvPr id="1" name=""/>
+        <p:cNvGrpSpPr/>
+        <p:nvPr/>
+      </p:nvGrpSpPr>
+      <p:grpSpPr>
+        <a:xfrm>
+          <a:off x="0" y="0"/>
+          <a:ext cx="0" cy="0"/>
+          <a:chOff x="0" y="0"/>
+          <a:chExt cx="0" cy="0"/>
+        </a:xfrm>
+      </p:grpSpPr>
+      <p:sp>
+        <p:nvSpPr>
+          <p:cNvPr id="2" name="Folienbildplatzhalter 1"/>
+          <p:cNvSpPr>
+            <a:spLocks noGrp="1" noRot="1" noChangeAspect="1"/>
+          </p:cNvSpPr>
+          <p:nvPr>
+            <p:ph type="sldImg"/>
+          </p:nvPr>
+        </p:nvSpPr>
+        <p:spPr/>
+      </p:sp>
+      <p:sp>
+        <p:nvSpPr>
+          <p:cNvPr id="3" name="Notizenplatzhalter 2"/>
+          <p:cNvSpPr>
+            <a:spLocks noGrp="1"/>
+          </p:cNvSpPr>
+          <p:nvPr>
+            <p:ph type="body" idx="1"/>
+          </p:nvPr>
+        </p:nvSpPr>
+        <p:spPr/>
+        <p:txBody>
+          <a:bodyPr/>
+          <a:lstStyle/>
+          <a:p>
+            <a:endParaRPr lang="de-DE"/>
+          </a:p>
+        </p:txBody>
+      </p:sp>
+      <p:sp>
+        <p:nvSpPr>
+          <p:cNvPr id="4" name="Foliennummernplatzhalter 3"/>
+          <p:cNvSpPr>
+            <a:spLocks noGrp="1"/>
+          </p:cNvSpPr>
+          <p:nvPr>
+            <p:ph type="sldNum" sz="quarter" idx="10"/>
+          </p:nvPr>
+        </p:nvSpPr>
+        <p:spPr/>
+        <p:txBody>
+          <a:bodyPr/>
+          <a:lstStyle/>
+          <a:p>
+            <a:fld id="{05D1FABD-69C2-49F9-BD91-F05E017FE538}" type="slidenum">
+              <a:rPr lang="de-DE" smtClean="0"/>
+              <a:pPr/>
+              <a:t>27</a:t>
+            </a:fld>
+            <a:endParaRPr lang="de-DE"/>
+          </a:p>
+        </p:txBody>
+      </p:sp>
+    </p:spTree>
+    <p:extLst>
+      <p:ext uri="{BB962C8B-B14F-4D97-AF65-F5344CB8AC3E}">
+        <p14:creationId xmlns:p14="http://schemas.microsoft.com/office/powerpoint/2010/main" val="1066156749"/>
       </p:ext>
     </p:extLst>
   </p:cSld>
@@ -2523,7 +3372,7 @@
             <a:fld id="{9EE47043-14B9-45DE-A7CA-B819D3DB7940}" type="datetime1">
               <a:rPr lang="en-US" smtClean="0"/>
               <a:pPr/>
-              <a:t>2/9/2015</a:t>
+              <a:t>2/10/2015</a:t>
             </a:fld>
             <a:endParaRPr lang="en-US" dirty="0"/>
           </a:p>
@@ -3644,7 +4493,7 @@
             <a:fld id="{15FDD389-1C4B-4991-9D1B-BD9CD8DAD448}" type="datetime1">
               <a:rPr lang="en-US" smtClean="0"/>
               <a:pPr/>
-              <a:t>2/9/2015</a:t>
+              <a:t>2/10/2015</a:t>
             </a:fld>
             <a:endParaRPr lang="en-US" dirty="0"/>
           </a:p>
@@ -4656,7 +5505,7 @@
             <a:fld id="{DBEDE645-84E4-46C4-8BBB-B45E79B0BDF2}" type="datetime1">
               <a:rPr lang="en-US" smtClean="0"/>
               <a:pPr/>
-              <a:t>2/9/2015</a:t>
+              <a:t>2/10/2015</a:t>
             </a:fld>
             <a:endParaRPr lang="en-US" dirty="0"/>
           </a:p>
@@ -5827,7 +6676,7 @@
             <a:fld id="{FD30094F-A1C4-4AA8-B240-0E360656DACC}" type="datetime1">
               <a:rPr lang="en-US" smtClean="0"/>
               <a:pPr/>
-              <a:t>2/9/2015</a:t>
+              <a:t>2/10/2015</a:t>
             </a:fld>
             <a:endParaRPr lang="en-US" dirty="0"/>
           </a:p>
@@ -6889,7 +7738,7 @@
             <a:fld id="{114DEC2F-D236-4161-B7A9-058AD50973F4}" type="datetime1">
               <a:rPr lang="en-US" smtClean="0"/>
               <a:pPr/>
-              <a:t>2/9/2015</a:t>
+              <a:t>2/10/2015</a:t>
             </a:fld>
             <a:endParaRPr lang="en-US" dirty="0"/>
           </a:p>
@@ -7536,7 +8385,7 @@
             <a:fld id="{7246F925-6776-418A-B9D5-2FE6DDC7FF5E}" type="datetime1">
               <a:rPr lang="en-US" smtClean="0"/>
               <a:pPr/>
-              <a:t>2/9/2015</a:t>
+              <a:t>2/10/2015</a:t>
             </a:fld>
             <a:endParaRPr lang="en-US" dirty="0"/>
           </a:p>
@@ -8384,7 +9233,7 @@
             <a:fld id="{AA091E32-8210-42E1-A5E3-AE4F3B2BA67C}" type="datetime1">
               <a:rPr lang="en-US" smtClean="0"/>
               <a:pPr/>
-              <a:t>2/9/2015</a:t>
+              <a:t>2/10/2015</a:t>
             </a:fld>
             <a:endParaRPr lang="en-US" dirty="0"/>
           </a:p>
@@ -8560,7 +9409,7 @@
             <a:fld id="{A8F96028-6369-409B-B015-BD4E873D97AE}" type="datetime1">
               <a:rPr lang="en-US" smtClean="0"/>
               <a:pPr/>
-              <a:t>2/9/2015</a:t>
+              <a:t>2/10/2015</a:t>
             </a:fld>
             <a:endParaRPr lang="en-US" dirty="0"/>
           </a:p>
@@ -9559,7 +10408,7 @@
             <a:fld id="{1EC1EEDA-5C8D-4FAD-B380-0B1111C6C6FD}" type="datetime1">
               <a:rPr lang="en-US" smtClean="0"/>
               <a:pPr/>
-              <a:t>2/9/2015</a:t>
+              <a:t>2/10/2015</a:t>
             </a:fld>
             <a:endParaRPr lang="en-US" dirty="0"/>
           </a:p>
@@ -9766,7 +10615,7 @@
             <a:fld id="{17201E69-94FE-46D8-8C9F-233CA2EAF49D}" type="datetime1">
               <a:rPr lang="en-US" smtClean="0"/>
               <a:pPr/>
-              <a:t>2/9/2015</a:t>
+              <a:t>2/10/2015</a:t>
             </a:fld>
             <a:endParaRPr lang="en-US" dirty="0"/>
           </a:p>
@@ -10829,7 +11678,7 @@
             <a:fld id="{9229E780-8742-4F41-A7DD-8A533C34BC62}" type="datetime1">
               <a:rPr lang="en-US" smtClean="0"/>
               <a:pPr/>
-              <a:t>2/9/2015</a:t>
+              <a:t>2/10/2015</a:t>
             </a:fld>
             <a:endParaRPr lang="en-US" dirty="0"/>
           </a:p>
@@ -11102,7 +11951,7 @@
             <a:fld id="{3B91D532-264E-494B-BCB4-085A06E95C4C}" type="datetime1">
               <a:rPr lang="en-US" smtClean="0"/>
               <a:pPr/>
-              <a:t>2/9/2015</a:t>
+              <a:t>2/10/2015</a:t>
             </a:fld>
             <a:endParaRPr lang="en-US" dirty="0"/>
           </a:p>
@@ -11485,7 +12334,7 @@
             <a:fld id="{13078452-A4DA-42F9-8E52-EBBBBBF20BDF}" type="datetime1">
               <a:rPr lang="en-US" smtClean="0"/>
               <a:pPr/>
-              <a:t>2/9/2015</a:t>
+              <a:t>2/10/2015</a:t>
             </a:fld>
             <a:endParaRPr lang="en-US" dirty="0"/>
           </a:p>
@@ -11604,7 +12453,7 @@
             <a:fld id="{1433EC71-6044-490A-9B40-8B48B52B7377}" type="datetime1">
               <a:rPr lang="en-US" smtClean="0"/>
               <a:pPr/>
-              <a:t>2/9/2015</a:t>
+              <a:t>2/10/2015</a:t>
             </a:fld>
             <a:endParaRPr lang="en-US" dirty="0"/>
           </a:p>
@@ -11700,7 +12549,7 @@
             <a:fld id="{05B9864E-D461-4420-9A61-69708EA906EF}" type="datetime1">
               <a:rPr lang="en-US" smtClean="0"/>
               <a:pPr/>
-              <a:t>2/9/2015</a:t>
+              <a:t>2/10/2015</a:t>
             </a:fld>
             <a:endParaRPr lang="en-US" dirty="0"/>
           </a:p>
@@ -12810,7 +13659,7 @@
             <a:fld id="{B45F0798-91BD-41E8-A317-14713D4B5C46}" type="datetime1">
               <a:rPr lang="en-US" smtClean="0"/>
               <a:pPr/>
-              <a:t>2/9/2015</a:t>
+              <a:t>2/10/2015</a:t>
             </a:fld>
             <a:endParaRPr lang="en-US" dirty="0"/>
           </a:p>
@@ -13944,7 +14793,7 @@
             <a:fld id="{2A2492AA-6B4D-44C1-A4C5-776C8CBEDC88}" type="datetime1">
               <a:rPr lang="en-US" smtClean="0"/>
               <a:pPr/>
-              <a:t>2/9/2015</a:t>
+              <a:t>2/10/2015</a:t>
             </a:fld>
             <a:endParaRPr lang="en-US" dirty="0"/>
           </a:p>
@@ -14973,7 +15822,7 @@
             <a:fld id="{D718F47C-7328-41EC-B5EF-37975657BEDE}" type="datetime1">
               <a:rPr lang="en-US" smtClean="0"/>
               <a:pPr/>
-              <a:t>2/9/2015</a:t>
+              <a:t>2/10/2015</a:t>
             </a:fld>
             <a:endParaRPr lang="en-US" dirty="0"/>
           </a:p>
@@ -15875,11 +16724,11 @@
   <p:clrMapOvr>
     <a:masterClrMapping/>
   </p:clrMapOvr>
-  <mc:AlternateContent xmlns:mc="http://schemas.openxmlformats.org/markup-compatibility/2006">
-    <mc:Choice xmlns:p14="http://schemas.microsoft.com/office/powerpoint/2010/main" Requires="p14">
+  <mc:AlternateContent xmlns:mc="http://schemas.openxmlformats.org/markup-compatibility/2006" xmlns:p14="http://schemas.microsoft.com/office/powerpoint/2010/main">
+    <mc:Choice Requires="p14">
       <p:transition spd="slow" p14:dur="2000"/>
     </mc:Choice>
-    <mc:Fallback>
+    <mc:Fallback xmlns="">
       <p:transition spd="slow"/>
     </mc:Fallback>
   </mc:AlternateContent>
@@ -16875,6 +17724,64 @@
             </a:r>
           </a:p>
           <a:p>
+            <a:pPr lvl="1"/>
+            <a:r>
+              <a:rPr lang="de-DE" dirty="0" err="1" smtClean="0"/>
+              <a:t>Git</a:t>
+            </a:r>
+            <a:endParaRPr lang="de-DE" dirty="0"/>
+          </a:p>
+          <a:p>
+            <a:pPr lvl="1"/>
+            <a:r>
+              <a:rPr lang="de-DE" dirty="0"/>
+              <a:t>Source </a:t>
+            </a:r>
+            <a:r>
+              <a:rPr lang="de-DE" dirty="0" err="1" smtClean="0"/>
+              <a:t>Tree</a:t>
+            </a:r>
+            <a:endParaRPr lang="de-DE" dirty="0"/>
+          </a:p>
+          <a:p>
+            <a:pPr lvl="1"/>
+            <a:r>
+              <a:rPr lang="de-DE" dirty="0"/>
+              <a:t>Android </a:t>
+            </a:r>
+            <a:r>
+              <a:rPr lang="de-DE" dirty="0" smtClean="0"/>
+              <a:t>Studio</a:t>
+            </a:r>
+            <a:endParaRPr lang="de-DE" dirty="0"/>
+          </a:p>
+          <a:p>
+            <a:pPr lvl="1"/>
+            <a:r>
+              <a:rPr lang="de-DE" dirty="0" err="1" smtClean="0"/>
+              <a:t>Gradle</a:t>
+            </a:r>
+            <a:endParaRPr lang="de-DE" dirty="0"/>
+          </a:p>
+          <a:p>
+            <a:pPr lvl="1"/>
+            <a:r>
+              <a:rPr lang="de-DE" dirty="0"/>
+              <a:t>Unit </a:t>
+            </a:r>
+            <a:r>
+              <a:rPr lang="de-DE" dirty="0" err="1" smtClean="0"/>
+              <a:t>Testing</a:t>
+            </a:r>
+            <a:endParaRPr lang="de-DE" dirty="0"/>
+          </a:p>
+          <a:p>
+            <a:pPr marL="457200" lvl="1" indent="0">
+              <a:buNone/>
+            </a:pPr>
+            <a:endParaRPr lang="de-DE" dirty="0" smtClean="0"/>
+          </a:p>
+          <a:p>
             <a:r>
               <a:rPr lang="de-DE" dirty="0" smtClean="0"/>
               <a:t>Vorgehen im Team</a:t>
@@ -16972,7 +17879,7 @@
     </p:spTree>
     <p:extLst>
       <p:ext uri="{BB962C8B-B14F-4D97-AF65-F5344CB8AC3E}">
-        <p14:creationId xmlns:p14="http://schemas.microsoft.com/office/powerpoint/2010/main" val="3216998357"/>
+        <p14:creationId xmlns:p14="http://schemas.microsoft.com/office/powerpoint/2010/main" val="393556103"/>
       </p:ext>
     </p:extLst>
   </p:cSld>
@@ -17016,46 +17923,97 @@
             <p:ph type="title"/>
           </p:nvPr>
         </p:nvSpPr>
-        <p:spPr>
-          <a:xfrm>
-            <a:off x="1154953" y="2370667"/>
-            <a:ext cx="9469503" cy="1822514"/>
-          </a:xfrm>
-        </p:spPr>
+        <p:spPr/>
         <p:txBody>
           <a:bodyPr/>
           <a:lstStyle/>
           <a:p>
-            <a:pPr algn="ctr"/>
-            <a:r>
-              <a:rPr lang="de-DE" sz="5400" dirty="0" smtClean="0"/>
-              <a:t>Noch Fragen?</a:t>
-            </a:r>
-            <a:endParaRPr lang="de-DE" sz="5400" dirty="0"/>
-          </a:p>
-        </p:txBody>
-      </p:sp>
-      <p:sp>
-        <p:nvSpPr>
-          <p:cNvPr id="5" name="Foliennummernplatzhalter 4"/>
-          <p:cNvSpPr>
-            <a:spLocks noGrp="1"/>
-          </p:cNvSpPr>
-          <p:nvPr>
-            <p:ph type="sldNum" sz="quarter" idx="12"/>
+            <a:r>
+              <a:rPr lang="de-DE" dirty="0"/>
+              <a:t>Reflexion: Werkzeuge</a:t>
+            </a:r>
+          </a:p>
+        </p:txBody>
+      </p:sp>
+      <p:sp>
+        <p:nvSpPr>
+          <p:cNvPr id="3" name="Inhaltsplatzhalter 2"/>
+          <p:cNvSpPr>
+            <a:spLocks noGrp="1"/>
+          </p:cNvSpPr>
+          <p:nvPr>
+            <p:ph idx="1"/>
           </p:nvPr>
         </p:nvSpPr>
         <p:spPr/>
         <p:txBody>
-          <a:bodyPr/>
+          <a:bodyPr>
+            <a:normAutofit/>
+          </a:bodyPr>
           <a:lstStyle/>
           <a:p>
-            <a:fld id="{D57F1E4F-1CFF-5643-939E-217C01CDF565}" type="slidenum">
-              <a:rPr lang="en-US" smtClean="0"/>
-              <a:pPr/>
-              <a:t>15</a:t>
-            </a:fld>
-            <a:endParaRPr lang="en-US" dirty="0"/>
+            <a:pPr marL="0" indent="0">
+              <a:buNone/>
+            </a:pPr>
+            <a:r>
+              <a:rPr lang="de-DE" dirty="0" err="1" smtClean="0"/>
+              <a:t>Git</a:t>
+            </a:r>
+            <a:r>
+              <a:rPr lang="de-DE" dirty="0" smtClean="0"/>
+              <a:t>: </a:t>
+            </a:r>
+          </a:p>
+          <a:p>
+            <a:r>
+              <a:rPr lang="de-DE" dirty="0" smtClean="0"/>
+              <a:t>¾  der Gruppe: </a:t>
+            </a:r>
+            <a:r>
+              <a:rPr lang="de-DE" dirty="0" err="1" smtClean="0"/>
+              <a:t>Git</a:t>
+            </a:r>
+            <a:r>
+              <a:rPr lang="de-DE" dirty="0" smtClean="0"/>
+              <a:t>-Anfänger</a:t>
+            </a:r>
+          </a:p>
+          <a:p>
+            <a:r>
+              <a:rPr lang="de-DE" dirty="0" smtClean="0"/>
+              <a:t>Entdecken eines neuen Tools</a:t>
+            </a:r>
+          </a:p>
+          <a:p>
+            <a:r>
+              <a:rPr lang="de-DE" dirty="0" err="1" smtClean="0"/>
+              <a:t>GitHub</a:t>
+            </a:r>
+            <a:r>
+              <a:rPr lang="de-DE" dirty="0" smtClean="0"/>
+              <a:t> schnell &amp; einfach</a:t>
+            </a:r>
+          </a:p>
+          <a:p>
+            <a:r>
+              <a:rPr lang="de-DE" dirty="0" smtClean="0"/>
+              <a:t>Sehr praktisch: mitgelieferte </a:t>
+            </a:r>
+            <a:r>
+              <a:rPr lang="de-DE" i="1" dirty="0" err="1" smtClean="0"/>
+              <a:t>gitignore</a:t>
+            </a:r>
+            <a:r>
+              <a:rPr lang="de-DE" i="1" dirty="0" smtClean="0"/>
+              <a:t>-Files</a:t>
+            </a:r>
+          </a:p>
+          <a:p>
+            <a:r>
+              <a:rPr lang="de-DE" dirty="0" smtClean="0"/>
+              <a:t>i.d.R. direktes Pushen -&gt; Commit nicht wirklich genutzt</a:t>
+            </a:r>
+            <a:endParaRPr lang="de-DE" dirty="0"/>
           </a:p>
         </p:txBody>
       </p:sp>
@@ -17091,6 +18049,30 @@
       </p:pic>
       <p:sp>
         <p:nvSpPr>
+          <p:cNvPr id="5" name="Foliennummernplatzhalter 4"/>
+          <p:cNvSpPr>
+            <a:spLocks noGrp="1"/>
+          </p:cNvSpPr>
+          <p:nvPr>
+            <p:ph type="sldNum" sz="quarter" idx="12"/>
+          </p:nvPr>
+        </p:nvSpPr>
+        <p:spPr/>
+        <p:txBody>
+          <a:bodyPr/>
+          <a:lstStyle/>
+          <a:p>
+            <a:fld id="{D57F1E4F-1CFF-5643-939E-217C01CDF565}" type="slidenum">
+              <a:rPr lang="en-US" smtClean="0"/>
+              <a:pPr/>
+              <a:t>15</a:t>
+            </a:fld>
+            <a:endParaRPr lang="en-US" dirty="0"/>
+          </a:p>
+        </p:txBody>
+      </p:sp>
+      <p:sp>
+        <p:nvSpPr>
           <p:cNvPr id="6" name="Textfeld 5"/>
           <p:cNvSpPr txBox="1"/>
           <p:nvPr/>
@@ -17122,7 +18104,7 @@
     </p:spTree>
     <p:extLst>
       <p:ext uri="{BB962C8B-B14F-4D97-AF65-F5344CB8AC3E}">
-        <p14:creationId xmlns:p14="http://schemas.microsoft.com/office/powerpoint/2010/main" val="1786163146"/>
+        <p14:creationId xmlns:p14="http://schemas.microsoft.com/office/powerpoint/2010/main" val="898148447"/>
       </p:ext>
     </p:extLst>
   </p:cSld>
@@ -17166,46 +18148,142 @@
             <p:ph type="title"/>
           </p:nvPr>
         </p:nvSpPr>
-        <p:spPr>
-          <a:xfrm>
-            <a:off x="1154953" y="2370667"/>
-            <a:ext cx="9469503" cy="1822514"/>
-          </a:xfrm>
-        </p:spPr>
+        <p:spPr/>
         <p:txBody>
           <a:bodyPr/>
           <a:lstStyle/>
           <a:p>
-            <a:pPr algn="ctr"/>
+            <a:r>
+              <a:rPr lang="de-DE" dirty="0"/>
+              <a:t>Reflexion: Werkzeuge</a:t>
+            </a:r>
+          </a:p>
+        </p:txBody>
+      </p:sp>
+      <p:sp>
+        <p:nvSpPr>
+          <p:cNvPr id="3" name="Inhaltsplatzhalter 2"/>
+          <p:cNvSpPr>
+            <a:spLocks noGrp="1"/>
+          </p:cNvSpPr>
+          <p:nvPr>
+            <p:ph idx="1"/>
+          </p:nvPr>
+        </p:nvSpPr>
+        <p:spPr/>
+        <p:txBody>
+          <a:bodyPr>
+            <a:normAutofit/>
+          </a:bodyPr>
+          <a:lstStyle/>
+          <a:p>
+            <a:pPr marL="0" indent="0">
+              <a:buNone/>
+            </a:pPr>
             <a:r>
               <a:rPr lang="de-DE" dirty="0" smtClean="0"/>
-              <a:t>Vielen Dank für eure Aufmerksamkeit!</a:t>
+              <a:t>Source </a:t>
+            </a:r>
+            <a:r>
+              <a:rPr lang="de-DE" dirty="0" err="1" smtClean="0"/>
+              <a:t>Tree</a:t>
+            </a:r>
+            <a:r>
+              <a:rPr lang="de-DE" dirty="0" smtClean="0"/>
+              <a:t>:</a:t>
+            </a:r>
+          </a:p>
+          <a:p>
+            <a:r>
+              <a:rPr lang="de-DE" dirty="0" smtClean="0"/>
+              <a:t>+ Gute Unterstützt für normalen </a:t>
+            </a:r>
+            <a:r>
+              <a:rPr lang="de-DE" dirty="0"/>
+              <a:t>Ablauf des </a:t>
+            </a:r>
+            <a:r>
+              <a:rPr lang="de-DE" dirty="0" err="1"/>
+              <a:t>Git</a:t>
+            </a:r>
+            <a:r>
+              <a:rPr lang="de-DE" dirty="0"/>
+              <a:t>-Servers </a:t>
+            </a:r>
+            <a:r>
+              <a:rPr lang="de-DE" dirty="0" smtClean="0"/>
+              <a:t>+ Zusatzfunktionen</a:t>
+            </a:r>
+          </a:p>
+          <a:p>
+            <a:r>
+              <a:rPr lang="de-DE" dirty="0" smtClean="0"/>
+              <a:t>+ grafische </a:t>
+            </a:r>
+            <a:r>
+              <a:rPr lang="de-DE" dirty="0"/>
+              <a:t>Darstellung des Projektverlaufes </a:t>
+            </a:r>
+            <a:r>
+              <a:rPr lang="de-DE" dirty="0" smtClean="0"/>
+              <a:t>übersichtlich</a:t>
+            </a:r>
+          </a:p>
+          <a:p>
+            <a:r>
+              <a:rPr lang="de-DE" dirty="0" smtClean="0"/>
+              <a:t>+ Intuitive Nutzung</a:t>
             </a:r>
             <a:endParaRPr lang="de-DE" dirty="0"/>
           </a:p>
-        </p:txBody>
-      </p:sp>
-      <p:sp>
-        <p:nvSpPr>
-          <p:cNvPr id="5" name="Foliennummernplatzhalter 4"/>
-          <p:cNvSpPr>
-            <a:spLocks noGrp="1"/>
-          </p:cNvSpPr>
-          <p:nvPr>
-            <p:ph type="sldNum" sz="quarter" idx="12"/>
-          </p:nvPr>
-        </p:nvSpPr>
-        <p:spPr/>
-        <p:txBody>
-          <a:bodyPr/>
-          <a:lstStyle/>
-          <a:p>
-            <a:fld id="{D57F1E4F-1CFF-5643-939E-217C01CDF565}" type="slidenum">
-              <a:rPr lang="en-US" smtClean="0"/>
-              <a:pPr/>
-              <a:t>16</a:t>
-            </a:fld>
-            <a:endParaRPr lang="en-US" dirty="0"/>
+          <a:p>
+            <a:r>
+              <a:rPr lang="de-DE" dirty="0" smtClean="0"/>
+              <a:t>- keine </a:t>
+            </a:r>
+            <a:r>
+              <a:rPr lang="de-DE" dirty="0" err="1" smtClean="0"/>
+              <a:t>Merge</a:t>
+            </a:r>
+            <a:r>
+              <a:rPr lang="de-DE" dirty="0" smtClean="0"/>
+              <a:t>-Funktion</a:t>
+            </a:r>
+          </a:p>
+          <a:p>
+            <a:r>
+              <a:rPr lang="de-DE" dirty="0" smtClean="0"/>
+              <a:t>- mögliche </a:t>
+            </a:r>
+            <a:r>
+              <a:rPr lang="de-DE" dirty="0" err="1" smtClean="0"/>
+              <a:t>Pulls</a:t>
+            </a:r>
+            <a:r>
+              <a:rPr lang="de-DE" dirty="0" smtClean="0"/>
+              <a:t> nicht immer angezeigt</a:t>
+            </a:r>
+            <a:endParaRPr lang="de-DE" dirty="0"/>
+          </a:p>
+          <a:p>
+            <a:r>
+              <a:rPr lang="de-DE" dirty="0"/>
+              <a:t>Nicht vollumfänglich genutzt (Bsp. </a:t>
+            </a:r>
+            <a:r>
+              <a:rPr lang="de-DE" dirty="0" err="1"/>
+              <a:t>GitFlow</a:t>
+            </a:r>
+            <a:r>
+              <a:rPr lang="de-DE" dirty="0"/>
+              <a:t>)</a:t>
+            </a:r>
+          </a:p>
+          <a:p>
+            <a:endParaRPr lang="de-DE" dirty="0"/>
+          </a:p>
+          <a:p>
+            <a:endParaRPr lang="de-DE" dirty="0" smtClean="0"/>
           </a:p>
         </p:txBody>
       </p:sp>
@@ -17241,6 +18319,30 @@
       </p:pic>
       <p:sp>
         <p:nvSpPr>
+          <p:cNvPr id="5" name="Foliennummernplatzhalter 4"/>
+          <p:cNvSpPr>
+            <a:spLocks noGrp="1"/>
+          </p:cNvSpPr>
+          <p:nvPr>
+            <p:ph type="sldNum" sz="quarter" idx="12"/>
+          </p:nvPr>
+        </p:nvSpPr>
+        <p:spPr/>
+        <p:txBody>
+          <a:bodyPr/>
+          <a:lstStyle/>
+          <a:p>
+            <a:fld id="{D57F1E4F-1CFF-5643-939E-217C01CDF565}" type="slidenum">
+              <a:rPr lang="en-US" smtClean="0"/>
+              <a:pPr/>
+              <a:t>16</a:t>
+            </a:fld>
+            <a:endParaRPr lang="en-US" dirty="0"/>
+          </a:p>
+        </p:txBody>
+      </p:sp>
+      <p:sp>
+        <p:nvSpPr>
           <p:cNvPr id="6" name="Textfeld 5"/>
           <p:cNvSpPr txBox="1"/>
           <p:nvPr/>
@@ -17272,7 +18374,7 @@
     </p:spTree>
     <p:extLst>
       <p:ext uri="{BB962C8B-B14F-4D97-AF65-F5344CB8AC3E}">
-        <p14:creationId xmlns:p14="http://schemas.microsoft.com/office/powerpoint/2010/main" val="1278744805"/>
+        <p14:creationId xmlns:p14="http://schemas.microsoft.com/office/powerpoint/2010/main" val="3641255888"/>
       </p:ext>
     </p:extLst>
   </p:cSld>
@@ -17322,47 +18424,103 @@
           <a:lstStyle/>
           <a:p>
             <a:r>
+              <a:rPr lang="de-DE" dirty="0"/>
+              <a:t>Reflexion: Werkzeuge</a:t>
+            </a:r>
+          </a:p>
+        </p:txBody>
+      </p:sp>
+      <p:sp>
+        <p:nvSpPr>
+          <p:cNvPr id="3" name="Inhaltsplatzhalter 2"/>
+          <p:cNvSpPr>
+            <a:spLocks noGrp="1"/>
+          </p:cNvSpPr>
+          <p:nvPr>
+            <p:ph idx="1"/>
+          </p:nvPr>
+        </p:nvSpPr>
+        <p:spPr/>
+        <p:txBody>
+          <a:bodyPr>
+            <a:normAutofit/>
+          </a:bodyPr>
+          <a:lstStyle/>
+          <a:p>
+            <a:pPr marL="0" indent="0">
+              <a:buNone/>
+            </a:pPr>
+            <a:r>
               <a:rPr lang="de-DE" dirty="0" smtClean="0"/>
-              <a:t>Quellen</a:t>
+              <a:t>Android Studio:</a:t>
+            </a:r>
+          </a:p>
+          <a:p>
+            <a:r>
+              <a:rPr lang="de-DE" dirty="0"/>
+              <a:t>+ viele </a:t>
+            </a:r>
+            <a:r>
+              <a:rPr lang="de-DE" dirty="0" smtClean="0"/>
+              <a:t>hilfreiche </a:t>
+            </a:r>
+            <a:r>
+              <a:rPr lang="de-DE" dirty="0"/>
+              <a:t>Funktionen für Entwicklung von Android Applikationen</a:t>
+            </a:r>
+          </a:p>
+          <a:p>
+            <a:r>
+              <a:rPr lang="de-DE" dirty="0"/>
+              <a:t>+ Emulators -&gt; kein eigenes Android-Gerät für Debugging nötig</a:t>
+            </a:r>
+          </a:p>
+          <a:p>
+            <a:r>
+              <a:rPr lang="de-DE" dirty="0"/>
+              <a:t>+ Integration von </a:t>
+            </a:r>
+            <a:r>
+              <a:rPr lang="de-DE" dirty="0" err="1"/>
+              <a:t>Gradle</a:t>
+            </a:r>
+            <a:r>
+              <a:rPr lang="de-DE" dirty="0"/>
+              <a:t> einfach: </a:t>
+            </a:r>
+            <a:r>
+              <a:rPr lang="de-DE" dirty="0" err="1"/>
+              <a:t>Build</a:t>
+            </a:r>
+            <a:r>
+              <a:rPr lang="de-DE" dirty="0"/>
+              <a:t>-File von Anfang an vordefiniert &amp; dem Projekt </a:t>
+            </a:r>
+            <a:r>
+              <a:rPr lang="de-DE" dirty="0" smtClean="0"/>
+              <a:t>beigefügt</a:t>
+            </a:r>
+          </a:p>
+          <a:p>
+            <a:r>
+              <a:rPr lang="de-DE" dirty="0" smtClean="0"/>
+              <a:t>+ </a:t>
+            </a:r>
+            <a:r>
+              <a:rPr lang="de-DE" dirty="0"/>
+              <a:t>Oberfläche des Android Studios -&gt; gut für schnellen Zugriff auf die wichtigsten Elemente</a:t>
+            </a:r>
+          </a:p>
+          <a:p>
+            <a:r>
+              <a:rPr lang="de-DE" dirty="0"/>
+              <a:t>+ Codeeditor </a:t>
+            </a:r>
+            <a:r>
+              <a:rPr lang="de-DE" dirty="0" smtClean="0"/>
+              <a:t>hilfreich</a:t>
             </a:r>
             <a:endParaRPr lang="de-DE" dirty="0"/>
-          </a:p>
-        </p:txBody>
-      </p:sp>
-      <p:sp>
-        <p:nvSpPr>
-          <p:cNvPr id="3" name="Inhaltsplatzhalter 2"/>
-          <p:cNvSpPr>
-            <a:spLocks noGrp="1"/>
-          </p:cNvSpPr>
-          <p:nvPr>
-            <p:ph idx="1"/>
-          </p:nvPr>
-        </p:nvSpPr>
-        <p:spPr/>
-        <p:txBody>
-          <a:bodyPr/>
-          <a:lstStyle/>
-          <a:p>
-            <a:r>
-              <a:rPr lang="de-DE" dirty="0" smtClean="0">
-                <a:hlinkClick r:id="rId3"/>
-              </a:rPr>
-              <a:t>www.elcomsoft.com</a:t>
-            </a:r>
-            <a:endParaRPr lang="de-DE" dirty="0" smtClean="0"/>
-          </a:p>
-          <a:p>
-            <a:r>
-              <a:rPr lang="de-DE" dirty="0" smtClean="0">
-                <a:hlinkClick r:id="rId4"/>
-              </a:rPr>
-              <a:t>www.elcomsoft.com/WP/BH-EU-2012-WP.pdf</a:t>
-            </a:r>
-            <a:endParaRPr lang="de-DE" dirty="0" smtClean="0"/>
-          </a:p>
-          <a:p>
-            <a:endParaRPr lang="de-DE" dirty="0" smtClean="0"/>
           </a:p>
         </p:txBody>
       </p:sp>
@@ -17375,7 +18533,7 @@
           <p:nvPr/>
         </p:nvPicPr>
         <p:blipFill>
-          <a:blip r:embed="rId5">
+          <a:blip r:embed="rId3">
             <a:extLst>
               <a:ext uri="{28A0092B-C50C-407E-A947-70E740481C1C}">
                 <a14:useLocalDpi xmlns:a14="http://schemas.microsoft.com/office/drawing/2010/main" val="0"/>
@@ -17453,7 +18611,489 @@
     </p:spTree>
     <p:extLst>
       <p:ext uri="{BB962C8B-B14F-4D97-AF65-F5344CB8AC3E}">
-        <p14:creationId xmlns:p14="http://schemas.microsoft.com/office/powerpoint/2010/main" val="3216998357"/>
+        <p14:creationId xmlns:p14="http://schemas.microsoft.com/office/powerpoint/2010/main" val="2949815318"/>
+      </p:ext>
+    </p:extLst>
+  </p:cSld>
+  <p:clrMapOvr>
+    <a:masterClrMapping/>
+  </p:clrMapOvr>
+  <p:timing>
+    <p:tnLst>
+      <p:par>
+        <p:cTn id="1" dur="indefinite" restart="never" nodeType="tmRoot"/>
+      </p:par>
+    </p:tnLst>
+  </p:timing>
+</p:sld>
+</file>
+
+<file path=ppt/slides/slide18.xml><?xml version="1.0" encoding="utf-8"?>
+<p:sld xmlns:a="http://schemas.openxmlformats.org/drawingml/2006/main" xmlns:r="http://schemas.openxmlformats.org/officeDocument/2006/relationships" xmlns:p="http://schemas.openxmlformats.org/presentationml/2006/main">
+  <p:cSld>
+    <p:spTree>
+      <p:nvGrpSpPr>
+        <p:cNvPr id="1" name=""/>
+        <p:cNvGrpSpPr/>
+        <p:nvPr/>
+      </p:nvGrpSpPr>
+      <p:grpSpPr>
+        <a:xfrm>
+          <a:off x="0" y="0"/>
+          <a:ext cx="0" cy="0"/>
+          <a:chOff x="0" y="0"/>
+          <a:chExt cx="0" cy="0"/>
+        </a:xfrm>
+      </p:grpSpPr>
+      <p:sp>
+        <p:nvSpPr>
+          <p:cNvPr id="2" name="Titel 1"/>
+          <p:cNvSpPr>
+            <a:spLocks noGrp="1"/>
+          </p:cNvSpPr>
+          <p:nvPr>
+            <p:ph type="title"/>
+          </p:nvPr>
+        </p:nvSpPr>
+        <p:spPr/>
+        <p:txBody>
+          <a:bodyPr/>
+          <a:lstStyle/>
+          <a:p>
+            <a:r>
+              <a:rPr lang="de-DE" dirty="0"/>
+              <a:t>Reflexion: Werkzeuge</a:t>
+            </a:r>
+          </a:p>
+        </p:txBody>
+      </p:sp>
+      <p:sp>
+        <p:nvSpPr>
+          <p:cNvPr id="3" name="Inhaltsplatzhalter 2"/>
+          <p:cNvSpPr>
+            <a:spLocks noGrp="1"/>
+          </p:cNvSpPr>
+          <p:nvPr>
+            <p:ph idx="1"/>
+          </p:nvPr>
+        </p:nvSpPr>
+        <p:spPr/>
+        <p:txBody>
+          <a:bodyPr>
+            <a:normAutofit fontScale="92500" lnSpcReduction="20000"/>
+          </a:bodyPr>
+          <a:lstStyle/>
+          <a:p>
+            <a:pPr marL="0" indent="0">
+              <a:buNone/>
+            </a:pPr>
+            <a:r>
+              <a:rPr lang="de-DE" dirty="0" smtClean="0"/>
+              <a:t>Android Studio:</a:t>
+            </a:r>
+          </a:p>
+          <a:p>
+            <a:r>
+              <a:rPr lang="de-DE" dirty="0" smtClean="0"/>
+              <a:t>- </a:t>
+            </a:r>
+            <a:r>
+              <a:rPr lang="de-DE" dirty="0"/>
+              <a:t>Android Studio-Update: ohne Hinweis auch </a:t>
+            </a:r>
+            <a:r>
+              <a:rPr lang="de-DE" dirty="0" err="1"/>
+              <a:t>Gradle</a:t>
+            </a:r>
+            <a:r>
+              <a:rPr lang="de-DE" dirty="0"/>
+              <a:t>-Update</a:t>
+            </a:r>
+          </a:p>
+          <a:p>
+            <a:pPr marL="0" indent="0">
+              <a:buNone/>
+            </a:pPr>
+            <a:r>
+              <a:rPr lang="de-DE" dirty="0" smtClean="0"/>
+              <a:t>	-&gt; </a:t>
+            </a:r>
+            <a:r>
+              <a:rPr lang="de-DE" dirty="0" err="1"/>
+              <a:t>Compilefehler</a:t>
+            </a:r>
+            <a:r>
+              <a:rPr lang="de-DE" dirty="0"/>
+              <a:t> innerhalb der </a:t>
+            </a:r>
+            <a:r>
+              <a:rPr lang="de-DE" dirty="0" err="1"/>
+              <a:t>Builddatei</a:t>
+            </a:r>
+            <a:endParaRPr lang="de-DE" dirty="0"/>
+          </a:p>
+          <a:p>
+            <a:r>
+              <a:rPr lang="de-DE" dirty="0"/>
+              <a:t> - Version auch nicht </a:t>
+            </a:r>
+            <a:r>
+              <a:rPr lang="de-DE" dirty="0" smtClean="0"/>
+              <a:t>abwärtskompatibel</a:t>
+            </a:r>
+            <a:endParaRPr lang="de-DE" dirty="0"/>
+          </a:p>
+          <a:p>
+            <a:r>
+              <a:rPr lang="de-DE" dirty="0"/>
+              <a:t>- Erstellung der Benutzeroberfläche relativ kompliziert (korrekte relative Ausrichtung auf verschiedenen Geräten)</a:t>
+            </a:r>
+          </a:p>
+          <a:p>
+            <a:r>
+              <a:rPr lang="de-DE" dirty="0" smtClean="0"/>
+              <a:t>- </a:t>
+            </a:r>
+            <a:r>
+              <a:rPr lang="de-DE" dirty="0"/>
+              <a:t>Emulator sehr langsam, </a:t>
+            </a:r>
+            <a:r>
+              <a:rPr lang="de-DE" dirty="0" smtClean="0"/>
+              <a:t>Konfiguration </a:t>
+            </a:r>
+            <a:r>
+              <a:rPr lang="de-DE" dirty="0"/>
+              <a:t>nicht ganz trivial</a:t>
+            </a:r>
+          </a:p>
+          <a:p>
+            <a:r>
+              <a:rPr lang="de-DE" dirty="0"/>
+              <a:t>- Bug im </a:t>
+            </a:r>
+            <a:r>
+              <a:rPr lang="de-DE" dirty="0" smtClean="0"/>
+              <a:t>Zusammenhang </a:t>
+            </a:r>
+            <a:r>
+              <a:rPr lang="de-DE" dirty="0"/>
+              <a:t>mit </a:t>
+            </a:r>
+            <a:r>
+              <a:rPr lang="de-DE" dirty="0" smtClean="0"/>
+              <a:t>Konfiguration </a:t>
+            </a:r>
+            <a:r>
+              <a:rPr lang="de-DE" dirty="0"/>
+              <a:t>einer SD-Karte</a:t>
+            </a:r>
+          </a:p>
+          <a:p>
+            <a:r>
+              <a:rPr lang="de-DE" dirty="0"/>
+              <a:t>- über den Emulator keinen Zugriff auf die SD-Karte</a:t>
+            </a:r>
+          </a:p>
+          <a:p>
+            <a:r>
+              <a:rPr lang="de-DE" dirty="0"/>
+              <a:t>- Debugging &amp; Testen auf tatsächlicher Hardware deutlich performanter &amp; leichter</a:t>
+            </a:r>
+          </a:p>
+        </p:txBody>
+      </p:sp>
+      <p:pic>
+        <p:nvPicPr>
+          <p:cNvPr id="4" name="Grafik 3"/>
+          <p:cNvPicPr>
+            <a:picLocks noChangeAspect="1"/>
+          </p:cNvPicPr>
+          <p:nvPr/>
+        </p:nvPicPr>
+        <p:blipFill>
+          <a:blip r:embed="rId3">
+            <a:extLst>
+              <a:ext uri="{28A0092B-C50C-407E-A947-70E740481C1C}">
+                <a14:useLocalDpi xmlns:a14="http://schemas.microsoft.com/office/drawing/2010/main" val="0"/>
+              </a:ext>
+            </a:extLst>
+          </a:blip>
+          <a:stretch>
+            <a:fillRect/>
+          </a:stretch>
+        </p:blipFill>
+        <p:spPr>
+          <a:xfrm>
+            <a:off x="11248792" y="5909733"/>
+            <a:ext cx="827314" cy="827314"/>
+          </a:xfrm>
+          <a:prstGeom prst="rect">
+            <a:avLst/>
+          </a:prstGeom>
+        </p:spPr>
+      </p:pic>
+      <p:sp>
+        <p:nvSpPr>
+          <p:cNvPr id="5" name="Foliennummernplatzhalter 4"/>
+          <p:cNvSpPr>
+            <a:spLocks noGrp="1"/>
+          </p:cNvSpPr>
+          <p:nvPr>
+            <p:ph type="sldNum" sz="quarter" idx="12"/>
+          </p:nvPr>
+        </p:nvSpPr>
+        <p:spPr/>
+        <p:txBody>
+          <a:bodyPr/>
+          <a:lstStyle/>
+          <a:p>
+            <a:fld id="{D57F1E4F-1CFF-5643-939E-217C01CDF565}" type="slidenum">
+              <a:rPr lang="en-US" smtClean="0"/>
+              <a:pPr/>
+              <a:t>18</a:t>
+            </a:fld>
+            <a:endParaRPr lang="en-US" dirty="0"/>
+          </a:p>
+        </p:txBody>
+      </p:sp>
+      <p:sp>
+        <p:nvSpPr>
+          <p:cNvPr id="6" name="Textfeld 5"/>
+          <p:cNvSpPr txBox="1"/>
+          <p:nvPr/>
+        </p:nvSpPr>
+        <p:spPr>
+          <a:xfrm>
+            <a:off x="372650" y="6156167"/>
+            <a:ext cx="10876142" cy="338554"/>
+          </a:xfrm>
+          <a:prstGeom prst="rect">
+            <a:avLst/>
+          </a:prstGeom>
+          <a:noFill/>
+        </p:spPr>
+        <p:txBody>
+          <a:bodyPr wrap="square" rtlCol="0">
+            <a:spAutoFit/>
+          </a:bodyPr>
+          <a:lstStyle/>
+          <a:p>
+            <a:r>
+              <a:rPr lang="de-DE" sz="1600" dirty="0" smtClean="0"/>
+              <a:t>13.02.2015  |  Software Engineering I  |  Nadine Feldmann, Lukas Huwe, Michael Kerkhoff, Sebastian Ochtrup</a:t>
+            </a:r>
+            <a:endParaRPr lang="de-DE" sz="1600" dirty="0"/>
+          </a:p>
+        </p:txBody>
+      </p:sp>
+    </p:spTree>
+    <p:extLst>
+      <p:ext uri="{BB962C8B-B14F-4D97-AF65-F5344CB8AC3E}">
+        <p14:creationId xmlns:p14="http://schemas.microsoft.com/office/powerpoint/2010/main" val="1771326033"/>
+      </p:ext>
+    </p:extLst>
+  </p:cSld>
+  <p:clrMapOvr>
+    <a:masterClrMapping/>
+  </p:clrMapOvr>
+  <p:timing>
+    <p:tnLst>
+      <p:par>
+        <p:cTn id="1" dur="indefinite" restart="never" nodeType="tmRoot"/>
+      </p:par>
+    </p:tnLst>
+  </p:timing>
+</p:sld>
+</file>
+
+<file path=ppt/slides/slide19.xml><?xml version="1.0" encoding="utf-8"?>
+<p:sld xmlns:a="http://schemas.openxmlformats.org/drawingml/2006/main" xmlns:r="http://schemas.openxmlformats.org/officeDocument/2006/relationships" xmlns:p="http://schemas.openxmlformats.org/presentationml/2006/main">
+  <p:cSld>
+    <p:spTree>
+      <p:nvGrpSpPr>
+        <p:cNvPr id="1" name=""/>
+        <p:cNvGrpSpPr/>
+        <p:nvPr/>
+      </p:nvGrpSpPr>
+      <p:grpSpPr>
+        <a:xfrm>
+          <a:off x="0" y="0"/>
+          <a:ext cx="0" cy="0"/>
+          <a:chOff x="0" y="0"/>
+          <a:chExt cx="0" cy="0"/>
+        </a:xfrm>
+      </p:grpSpPr>
+      <p:sp>
+        <p:nvSpPr>
+          <p:cNvPr id="2" name="Titel 1"/>
+          <p:cNvSpPr>
+            <a:spLocks noGrp="1"/>
+          </p:cNvSpPr>
+          <p:nvPr>
+            <p:ph type="title"/>
+          </p:nvPr>
+        </p:nvSpPr>
+        <p:spPr/>
+        <p:txBody>
+          <a:bodyPr/>
+          <a:lstStyle/>
+          <a:p>
+            <a:r>
+              <a:rPr lang="de-DE" dirty="0"/>
+              <a:t>Reflexion: Werkzeuge</a:t>
+            </a:r>
+          </a:p>
+        </p:txBody>
+      </p:sp>
+      <p:sp>
+        <p:nvSpPr>
+          <p:cNvPr id="3" name="Inhaltsplatzhalter 2"/>
+          <p:cNvSpPr>
+            <a:spLocks noGrp="1"/>
+          </p:cNvSpPr>
+          <p:nvPr>
+            <p:ph idx="1"/>
+          </p:nvPr>
+        </p:nvSpPr>
+        <p:spPr/>
+        <p:txBody>
+          <a:bodyPr/>
+          <a:lstStyle/>
+          <a:p>
+            <a:pPr marL="0" indent="0">
+              <a:buNone/>
+            </a:pPr>
+            <a:r>
+              <a:rPr lang="de-DE" dirty="0" err="1" smtClean="0"/>
+              <a:t>Gradle</a:t>
+            </a:r>
+            <a:r>
+              <a:rPr lang="de-DE" dirty="0" smtClean="0"/>
+              <a:t>:</a:t>
+            </a:r>
+          </a:p>
+          <a:p>
+            <a:r>
+              <a:rPr lang="de-DE" dirty="0" smtClean="0"/>
+              <a:t>+ funktionierte </a:t>
+            </a:r>
+            <a:r>
+              <a:rPr lang="de-DE" dirty="0"/>
+              <a:t>von Anfang </a:t>
+            </a:r>
+            <a:r>
+              <a:rPr lang="de-DE" dirty="0" smtClean="0"/>
+              <a:t>an</a:t>
+            </a:r>
+          </a:p>
+          <a:p>
+            <a:r>
+              <a:rPr lang="de-DE" dirty="0" smtClean="0"/>
+              <a:t>+ Mit Android Studio sehr pflegeleicht</a:t>
+            </a:r>
+            <a:endParaRPr lang="de-DE" dirty="0"/>
+          </a:p>
+          <a:p>
+            <a:r>
+              <a:rPr lang="de-DE" dirty="0" smtClean="0"/>
+              <a:t>- Nur Update sehr ärgerlich &amp; zeitraubend</a:t>
+            </a:r>
+            <a:endParaRPr lang="de-DE" dirty="0"/>
+          </a:p>
+          <a:p>
+            <a:endParaRPr lang="de-DE" dirty="0" smtClean="0"/>
+          </a:p>
+        </p:txBody>
+      </p:sp>
+      <p:pic>
+        <p:nvPicPr>
+          <p:cNvPr id="4" name="Grafik 3"/>
+          <p:cNvPicPr>
+            <a:picLocks noChangeAspect="1"/>
+          </p:cNvPicPr>
+          <p:nvPr/>
+        </p:nvPicPr>
+        <p:blipFill>
+          <a:blip r:embed="rId3">
+            <a:extLst>
+              <a:ext uri="{28A0092B-C50C-407E-A947-70E740481C1C}">
+                <a14:useLocalDpi xmlns:a14="http://schemas.microsoft.com/office/drawing/2010/main" val="0"/>
+              </a:ext>
+            </a:extLst>
+          </a:blip>
+          <a:stretch>
+            <a:fillRect/>
+          </a:stretch>
+        </p:blipFill>
+        <p:spPr>
+          <a:xfrm>
+            <a:off x="11248792" y="5909733"/>
+            <a:ext cx="827314" cy="827314"/>
+          </a:xfrm>
+          <a:prstGeom prst="rect">
+            <a:avLst/>
+          </a:prstGeom>
+        </p:spPr>
+      </p:pic>
+      <p:sp>
+        <p:nvSpPr>
+          <p:cNvPr id="5" name="Foliennummernplatzhalter 4"/>
+          <p:cNvSpPr>
+            <a:spLocks noGrp="1"/>
+          </p:cNvSpPr>
+          <p:nvPr>
+            <p:ph type="sldNum" sz="quarter" idx="12"/>
+          </p:nvPr>
+        </p:nvSpPr>
+        <p:spPr/>
+        <p:txBody>
+          <a:bodyPr/>
+          <a:lstStyle/>
+          <a:p>
+            <a:fld id="{D57F1E4F-1CFF-5643-939E-217C01CDF565}" type="slidenum">
+              <a:rPr lang="en-US" smtClean="0"/>
+              <a:pPr/>
+              <a:t>19</a:t>
+            </a:fld>
+            <a:endParaRPr lang="en-US" dirty="0"/>
+          </a:p>
+        </p:txBody>
+      </p:sp>
+      <p:sp>
+        <p:nvSpPr>
+          <p:cNvPr id="6" name="Textfeld 5"/>
+          <p:cNvSpPr txBox="1"/>
+          <p:nvPr/>
+        </p:nvSpPr>
+        <p:spPr>
+          <a:xfrm>
+            <a:off x="372650" y="6156167"/>
+            <a:ext cx="10876142" cy="338554"/>
+          </a:xfrm>
+          <a:prstGeom prst="rect">
+            <a:avLst/>
+          </a:prstGeom>
+          <a:noFill/>
+        </p:spPr>
+        <p:txBody>
+          <a:bodyPr wrap="square" rtlCol="0">
+            <a:spAutoFit/>
+          </a:bodyPr>
+          <a:lstStyle/>
+          <a:p>
+            <a:r>
+              <a:rPr lang="de-DE" sz="1600" dirty="0" smtClean="0"/>
+              <a:t>13.02.2015  |  Software Engineering I  |  Nadine Feldmann, Lukas Huwe, Michael Kerkhoff, Sebastian Ochtrup</a:t>
+            </a:r>
+            <a:endParaRPr lang="de-DE" sz="1600" dirty="0"/>
+          </a:p>
+        </p:txBody>
+      </p:sp>
+    </p:spTree>
+    <p:extLst>
+      <p:ext uri="{BB962C8B-B14F-4D97-AF65-F5344CB8AC3E}">
+        <p14:creationId xmlns:p14="http://schemas.microsoft.com/office/powerpoint/2010/main" val="1786185408"/>
       </p:ext>
     </p:extLst>
   </p:cSld>
@@ -17648,6 +19288,1704 @@
     <p:extLst>
       <p:ext uri="{BB962C8B-B14F-4D97-AF65-F5344CB8AC3E}">
         <p14:creationId xmlns:p14="http://schemas.microsoft.com/office/powerpoint/2010/main" val="2132460779"/>
+      </p:ext>
+    </p:extLst>
+  </p:cSld>
+  <p:clrMapOvr>
+    <a:masterClrMapping/>
+  </p:clrMapOvr>
+  <p:timing>
+    <p:tnLst>
+      <p:par>
+        <p:cTn id="1" dur="indefinite" restart="never" nodeType="tmRoot"/>
+      </p:par>
+    </p:tnLst>
+  </p:timing>
+</p:sld>
+</file>
+
+<file path=ppt/slides/slide20.xml><?xml version="1.0" encoding="utf-8"?>
+<p:sld xmlns:a="http://schemas.openxmlformats.org/drawingml/2006/main" xmlns:r="http://schemas.openxmlformats.org/officeDocument/2006/relationships" xmlns:p="http://schemas.openxmlformats.org/presentationml/2006/main">
+  <p:cSld>
+    <p:spTree>
+      <p:nvGrpSpPr>
+        <p:cNvPr id="1" name=""/>
+        <p:cNvGrpSpPr/>
+        <p:nvPr/>
+      </p:nvGrpSpPr>
+      <p:grpSpPr>
+        <a:xfrm>
+          <a:off x="0" y="0"/>
+          <a:ext cx="0" cy="0"/>
+          <a:chOff x="0" y="0"/>
+          <a:chExt cx="0" cy="0"/>
+        </a:xfrm>
+      </p:grpSpPr>
+      <p:sp>
+        <p:nvSpPr>
+          <p:cNvPr id="2" name="Titel 1"/>
+          <p:cNvSpPr>
+            <a:spLocks noGrp="1"/>
+          </p:cNvSpPr>
+          <p:nvPr>
+            <p:ph type="title"/>
+          </p:nvPr>
+        </p:nvSpPr>
+        <p:spPr/>
+        <p:txBody>
+          <a:bodyPr/>
+          <a:lstStyle/>
+          <a:p>
+            <a:r>
+              <a:rPr lang="de-DE" dirty="0"/>
+              <a:t>Reflexion: Werkzeuge</a:t>
+            </a:r>
+          </a:p>
+        </p:txBody>
+      </p:sp>
+      <p:sp>
+        <p:nvSpPr>
+          <p:cNvPr id="3" name="Inhaltsplatzhalter 2"/>
+          <p:cNvSpPr>
+            <a:spLocks noGrp="1"/>
+          </p:cNvSpPr>
+          <p:nvPr>
+            <p:ph idx="1"/>
+          </p:nvPr>
+        </p:nvSpPr>
+        <p:spPr/>
+        <p:txBody>
+          <a:bodyPr/>
+          <a:lstStyle/>
+          <a:p>
+            <a:pPr marL="0" indent="0">
+              <a:buNone/>
+            </a:pPr>
+            <a:r>
+              <a:rPr lang="de-DE" dirty="0" smtClean="0"/>
+              <a:t>Unit </a:t>
+            </a:r>
+            <a:r>
+              <a:rPr lang="de-DE" dirty="0" err="1" smtClean="0"/>
+              <a:t>Testing</a:t>
+            </a:r>
+            <a:r>
+              <a:rPr lang="de-DE" dirty="0" smtClean="0"/>
+              <a:t>:</a:t>
+            </a:r>
+          </a:p>
+          <a:p>
+            <a:r>
+              <a:rPr lang="de-DE" dirty="0" smtClean="0"/>
+              <a:t>Modultests </a:t>
+            </a:r>
+            <a:r>
+              <a:rPr lang="de-DE" dirty="0"/>
+              <a:t>boten sich </a:t>
+            </a:r>
+            <a:r>
+              <a:rPr lang="de-DE" dirty="0" smtClean="0"/>
+              <a:t>nur </a:t>
+            </a:r>
+            <a:r>
+              <a:rPr lang="de-DE" dirty="0"/>
+              <a:t>selten </a:t>
+            </a:r>
+            <a:r>
+              <a:rPr lang="de-DE" dirty="0" smtClean="0"/>
+              <a:t>an (größtenteils Oberflächennavigation)</a:t>
+            </a:r>
+          </a:p>
+          <a:p>
+            <a:r>
+              <a:rPr lang="de-DE" dirty="0" smtClean="0"/>
+              <a:t>+ Implementierte </a:t>
+            </a:r>
+            <a:r>
+              <a:rPr lang="de-DE" dirty="0"/>
+              <a:t>Modultests </a:t>
+            </a:r>
+            <a:r>
+              <a:rPr lang="de-DE" dirty="0" smtClean="0"/>
+              <a:t>sehr </a:t>
+            </a:r>
+            <a:r>
+              <a:rPr lang="de-DE" dirty="0"/>
+              <a:t>schnell </a:t>
+            </a:r>
+            <a:r>
+              <a:rPr lang="de-DE" dirty="0" smtClean="0"/>
+              <a:t>konfiguriert</a:t>
+            </a:r>
+          </a:p>
+          <a:p>
+            <a:r>
+              <a:rPr lang="de-DE" dirty="0" smtClean="0"/>
+              <a:t>+ Unterstützung </a:t>
+            </a:r>
+            <a:r>
+              <a:rPr lang="de-DE" dirty="0"/>
+              <a:t>des Android Studios </a:t>
+            </a:r>
+            <a:r>
+              <a:rPr lang="de-DE" dirty="0" smtClean="0"/>
+              <a:t>sehr </a:t>
+            </a:r>
+            <a:r>
+              <a:rPr lang="de-DE" dirty="0"/>
+              <a:t>gut </a:t>
+            </a:r>
+            <a:r>
+              <a:rPr lang="de-DE" dirty="0" smtClean="0"/>
+              <a:t>&amp; übersichtlich</a:t>
+            </a:r>
+          </a:p>
+          <a:p>
+            <a:r>
+              <a:rPr lang="de-DE" dirty="0" smtClean="0"/>
+              <a:t>- Notwendigkeit </a:t>
+            </a:r>
+            <a:r>
+              <a:rPr lang="de-DE" dirty="0"/>
+              <a:t>des Emulators verlangsamt </a:t>
+            </a:r>
+            <a:r>
+              <a:rPr lang="de-DE" dirty="0" smtClean="0"/>
+              <a:t>Testdurchlauf &amp; </a:t>
+            </a:r>
+            <a:r>
+              <a:rPr lang="de-DE" dirty="0"/>
+              <a:t>mindert die </a:t>
+            </a:r>
+            <a:r>
+              <a:rPr lang="de-DE" dirty="0" smtClean="0"/>
+              <a:t>Motivation</a:t>
+            </a:r>
+            <a:endParaRPr lang="de-DE" dirty="0"/>
+          </a:p>
+          <a:p>
+            <a:endParaRPr lang="de-DE" dirty="0" smtClean="0"/>
+          </a:p>
+        </p:txBody>
+      </p:sp>
+      <p:pic>
+        <p:nvPicPr>
+          <p:cNvPr id="4" name="Grafik 3"/>
+          <p:cNvPicPr>
+            <a:picLocks noChangeAspect="1"/>
+          </p:cNvPicPr>
+          <p:nvPr/>
+        </p:nvPicPr>
+        <p:blipFill>
+          <a:blip r:embed="rId3">
+            <a:extLst>
+              <a:ext uri="{28A0092B-C50C-407E-A947-70E740481C1C}">
+                <a14:useLocalDpi xmlns:a14="http://schemas.microsoft.com/office/drawing/2010/main" val="0"/>
+              </a:ext>
+            </a:extLst>
+          </a:blip>
+          <a:stretch>
+            <a:fillRect/>
+          </a:stretch>
+        </p:blipFill>
+        <p:spPr>
+          <a:xfrm>
+            <a:off x="11248792" y="5909733"/>
+            <a:ext cx="827314" cy="827314"/>
+          </a:xfrm>
+          <a:prstGeom prst="rect">
+            <a:avLst/>
+          </a:prstGeom>
+        </p:spPr>
+      </p:pic>
+      <p:sp>
+        <p:nvSpPr>
+          <p:cNvPr id="5" name="Foliennummernplatzhalter 4"/>
+          <p:cNvSpPr>
+            <a:spLocks noGrp="1"/>
+          </p:cNvSpPr>
+          <p:nvPr>
+            <p:ph type="sldNum" sz="quarter" idx="12"/>
+          </p:nvPr>
+        </p:nvSpPr>
+        <p:spPr/>
+        <p:txBody>
+          <a:bodyPr/>
+          <a:lstStyle/>
+          <a:p>
+            <a:fld id="{D57F1E4F-1CFF-5643-939E-217C01CDF565}" type="slidenum">
+              <a:rPr lang="en-US" smtClean="0"/>
+              <a:pPr/>
+              <a:t>20</a:t>
+            </a:fld>
+            <a:endParaRPr lang="en-US" dirty="0"/>
+          </a:p>
+        </p:txBody>
+      </p:sp>
+      <p:sp>
+        <p:nvSpPr>
+          <p:cNvPr id="6" name="Textfeld 5"/>
+          <p:cNvSpPr txBox="1"/>
+          <p:nvPr/>
+        </p:nvSpPr>
+        <p:spPr>
+          <a:xfrm>
+            <a:off x="372650" y="6156167"/>
+            <a:ext cx="10876142" cy="338554"/>
+          </a:xfrm>
+          <a:prstGeom prst="rect">
+            <a:avLst/>
+          </a:prstGeom>
+          <a:noFill/>
+        </p:spPr>
+        <p:txBody>
+          <a:bodyPr wrap="square" rtlCol="0">
+            <a:spAutoFit/>
+          </a:bodyPr>
+          <a:lstStyle/>
+          <a:p>
+            <a:r>
+              <a:rPr lang="de-DE" sz="1600" dirty="0" smtClean="0"/>
+              <a:t>13.02.2015  |  Software Engineering I  |  Nadine Feldmann, Lukas Huwe, Michael Kerkhoff, Sebastian Ochtrup</a:t>
+            </a:r>
+            <a:endParaRPr lang="de-DE" sz="1600" dirty="0"/>
+          </a:p>
+        </p:txBody>
+      </p:sp>
+    </p:spTree>
+    <p:extLst>
+      <p:ext uri="{BB962C8B-B14F-4D97-AF65-F5344CB8AC3E}">
+        <p14:creationId xmlns:p14="http://schemas.microsoft.com/office/powerpoint/2010/main" val="3312458868"/>
+      </p:ext>
+    </p:extLst>
+  </p:cSld>
+  <p:clrMapOvr>
+    <a:masterClrMapping/>
+  </p:clrMapOvr>
+  <p:timing>
+    <p:tnLst>
+      <p:par>
+        <p:cTn id="1" dur="indefinite" restart="never" nodeType="tmRoot"/>
+      </p:par>
+    </p:tnLst>
+  </p:timing>
+</p:sld>
+</file>
+
+<file path=ppt/slides/slide21.xml><?xml version="1.0" encoding="utf-8"?>
+<p:sld xmlns:a="http://schemas.openxmlformats.org/drawingml/2006/main" xmlns:r="http://schemas.openxmlformats.org/officeDocument/2006/relationships" xmlns:p="http://schemas.openxmlformats.org/presentationml/2006/main">
+  <p:cSld>
+    <p:spTree>
+      <p:nvGrpSpPr>
+        <p:cNvPr id="1" name=""/>
+        <p:cNvGrpSpPr/>
+        <p:nvPr/>
+      </p:nvGrpSpPr>
+      <p:grpSpPr>
+        <a:xfrm>
+          <a:off x="0" y="0"/>
+          <a:ext cx="0" cy="0"/>
+          <a:chOff x="0" y="0"/>
+          <a:chExt cx="0" cy="0"/>
+        </a:xfrm>
+      </p:grpSpPr>
+      <p:sp>
+        <p:nvSpPr>
+          <p:cNvPr id="2" name="Titel 1"/>
+          <p:cNvSpPr>
+            <a:spLocks noGrp="1"/>
+          </p:cNvSpPr>
+          <p:nvPr>
+            <p:ph type="title"/>
+          </p:nvPr>
+        </p:nvSpPr>
+        <p:spPr/>
+        <p:txBody>
+          <a:bodyPr/>
+          <a:lstStyle/>
+          <a:p>
+            <a:r>
+              <a:rPr lang="de-DE" dirty="0" smtClean="0"/>
+              <a:t>Reflexion: Vorgehen</a:t>
+            </a:r>
+            <a:endParaRPr lang="de-DE" dirty="0"/>
+          </a:p>
+        </p:txBody>
+      </p:sp>
+      <p:sp>
+        <p:nvSpPr>
+          <p:cNvPr id="3" name="Inhaltsplatzhalter 2"/>
+          <p:cNvSpPr>
+            <a:spLocks noGrp="1"/>
+          </p:cNvSpPr>
+          <p:nvPr>
+            <p:ph idx="1"/>
+          </p:nvPr>
+        </p:nvSpPr>
+        <p:spPr/>
+        <p:txBody>
+          <a:bodyPr>
+            <a:normAutofit/>
+          </a:bodyPr>
+          <a:lstStyle/>
+          <a:p>
+            <a:pPr marL="0" indent="0">
+              <a:buNone/>
+            </a:pPr>
+            <a:r>
+              <a:rPr lang="de-DE" dirty="0" smtClean="0"/>
+              <a:t>Ausgangspunkt</a:t>
+            </a:r>
+            <a:r>
+              <a:rPr lang="de-DE" dirty="0"/>
+              <a:t>:</a:t>
+            </a:r>
+          </a:p>
+          <a:p>
+            <a:r>
+              <a:rPr lang="de-DE" dirty="0" smtClean="0"/>
+              <a:t>App </a:t>
+            </a:r>
+            <a:r>
+              <a:rPr lang="de-DE" dirty="0"/>
+              <a:t>Entwicklung für alle neu</a:t>
+            </a:r>
+          </a:p>
+          <a:p>
+            <a:pPr marL="0" indent="0">
+              <a:buNone/>
+            </a:pPr>
+            <a:r>
+              <a:rPr lang="de-DE" dirty="0" smtClean="0"/>
+              <a:t>	-&gt;  - Zusätzlicher </a:t>
+            </a:r>
+            <a:r>
+              <a:rPr lang="de-DE" dirty="0"/>
+              <a:t>Einarbeitungsaufwand</a:t>
+            </a:r>
+          </a:p>
+          <a:p>
+            <a:pPr marL="0" indent="0">
+              <a:buNone/>
+            </a:pPr>
+            <a:r>
+              <a:rPr lang="de-DE" dirty="0" smtClean="0"/>
+              <a:t>	-&gt; + Chance</a:t>
+            </a:r>
+            <a:r>
+              <a:rPr lang="de-DE" dirty="0"/>
+              <a:t>, neue Technologie kennenzulernen</a:t>
+            </a:r>
+          </a:p>
+          <a:p>
+            <a:r>
+              <a:rPr lang="de-DE" dirty="0" smtClean="0"/>
+              <a:t>Unterschiedliche </a:t>
+            </a:r>
+            <a:r>
+              <a:rPr lang="de-DE" dirty="0"/>
+              <a:t>Kompetenzen im Team: 3 Anwendungsentwickler + 1 </a:t>
+            </a:r>
+            <a:r>
+              <a:rPr lang="de-DE" dirty="0" smtClean="0"/>
+              <a:t>Systemintegrator</a:t>
+            </a:r>
+            <a:endParaRPr lang="de-DE" dirty="0"/>
+          </a:p>
+        </p:txBody>
+      </p:sp>
+      <p:pic>
+        <p:nvPicPr>
+          <p:cNvPr id="4" name="Grafik 3"/>
+          <p:cNvPicPr>
+            <a:picLocks noChangeAspect="1"/>
+          </p:cNvPicPr>
+          <p:nvPr/>
+        </p:nvPicPr>
+        <p:blipFill>
+          <a:blip r:embed="rId3">
+            <a:extLst>
+              <a:ext uri="{28A0092B-C50C-407E-A947-70E740481C1C}">
+                <a14:useLocalDpi xmlns:a14="http://schemas.microsoft.com/office/drawing/2010/main" val="0"/>
+              </a:ext>
+            </a:extLst>
+          </a:blip>
+          <a:stretch>
+            <a:fillRect/>
+          </a:stretch>
+        </p:blipFill>
+        <p:spPr>
+          <a:xfrm>
+            <a:off x="11248792" y="5909733"/>
+            <a:ext cx="827314" cy="827314"/>
+          </a:xfrm>
+          <a:prstGeom prst="rect">
+            <a:avLst/>
+          </a:prstGeom>
+        </p:spPr>
+      </p:pic>
+      <p:sp>
+        <p:nvSpPr>
+          <p:cNvPr id="5" name="Foliennummernplatzhalter 4"/>
+          <p:cNvSpPr>
+            <a:spLocks noGrp="1"/>
+          </p:cNvSpPr>
+          <p:nvPr>
+            <p:ph type="sldNum" sz="quarter" idx="12"/>
+          </p:nvPr>
+        </p:nvSpPr>
+        <p:spPr/>
+        <p:txBody>
+          <a:bodyPr/>
+          <a:lstStyle/>
+          <a:p>
+            <a:fld id="{D57F1E4F-1CFF-5643-939E-217C01CDF565}" type="slidenum">
+              <a:rPr lang="en-US" smtClean="0"/>
+              <a:pPr/>
+              <a:t>21</a:t>
+            </a:fld>
+            <a:endParaRPr lang="en-US" dirty="0"/>
+          </a:p>
+        </p:txBody>
+      </p:sp>
+      <p:sp>
+        <p:nvSpPr>
+          <p:cNvPr id="6" name="Textfeld 5"/>
+          <p:cNvSpPr txBox="1"/>
+          <p:nvPr/>
+        </p:nvSpPr>
+        <p:spPr>
+          <a:xfrm>
+            <a:off x="372650" y="6156167"/>
+            <a:ext cx="10876142" cy="338554"/>
+          </a:xfrm>
+          <a:prstGeom prst="rect">
+            <a:avLst/>
+          </a:prstGeom>
+          <a:noFill/>
+        </p:spPr>
+        <p:txBody>
+          <a:bodyPr wrap="square" rtlCol="0">
+            <a:spAutoFit/>
+          </a:bodyPr>
+          <a:lstStyle/>
+          <a:p>
+            <a:r>
+              <a:rPr lang="de-DE" sz="1600" dirty="0" smtClean="0"/>
+              <a:t>13.02.2015  |  Software Engineering I  |  Nadine Feldmann, Lukas Huwe, Michael Kerkhoff, Sebastian Ochtrup</a:t>
+            </a:r>
+            <a:endParaRPr lang="de-DE" sz="1600" dirty="0"/>
+          </a:p>
+        </p:txBody>
+      </p:sp>
+    </p:spTree>
+    <p:extLst>
+      <p:ext uri="{BB962C8B-B14F-4D97-AF65-F5344CB8AC3E}">
+        <p14:creationId xmlns:p14="http://schemas.microsoft.com/office/powerpoint/2010/main" val="3197597498"/>
+      </p:ext>
+    </p:extLst>
+  </p:cSld>
+  <p:clrMapOvr>
+    <a:masterClrMapping/>
+  </p:clrMapOvr>
+  <p:timing>
+    <p:tnLst>
+      <p:par>
+        <p:cTn id="1" dur="indefinite" restart="never" nodeType="tmRoot"/>
+      </p:par>
+    </p:tnLst>
+  </p:timing>
+</p:sld>
+</file>
+
+<file path=ppt/slides/slide22.xml><?xml version="1.0" encoding="utf-8"?>
+<p:sld xmlns:a="http://schemas.openxmlformats.org/drawingml/2006/main" xmlns:r="http://schemas.openxmlformats.org/officeDocument/2006/relationships" xmlns:p="http://schemas.openxmlformats.org/presentationml/2006/main">
+  <p:cSld>
+    <p:spTree>
+      <p:nvGrpSpPr>
+        <p:cNvPr id="1" name=""/>
+        <p:cNvGrpSpPr/>
+        <p:nvPr/>
+      </p:nvGrpSpPr>
+      <p:grpSpPr>
+        <a:xfrm>
+          <a:off x="0" y="0"/>
+          <a:ext cx="0" cy="0"/>
+          <a:chOff x="0" y="0"/>
+          <a:chExt cx="0" cy="0"/>
+        </a:xfrm>
+      </p:grpSpPr>
+      <p:sp>
+        <p:nvSpPr>
+          <p:cNvPr id="2" name="Titel 1"/>
+          <p:cNvSpPr>
+            <a:spLocks noGrp="1"/>
+          </p:cNvSpPr>
+          <p:nvPr>
+            <p:ph type="title"/>
+          </p:nvPr>
+        </p:nvSpPr>
+        <p:spPr/>
+        <p:txBody>
+          <a:bodyPr/>
+          <a:lstStyle/>
+          <a:p>
+            <a:r>
+              <a:rPr lang="de-DE" dirty="0"/>
+              <a:t>Reflexion: Vorgehen</a:t>
+            </a:r>
+          </a:p>
+        </p:txBody>
+      </p:sp>
+      <p:sp>
+        <p:nvSpPr>
+          <p:cNvPr id="3" name="Inhaltsplatzhalter 2"/>
+          <p:cNvSpPr>
+            <a:spLocks noGrp="1"/>
+          </p:cNvSpPr>
+          <p:nvPr>
+            <p:ph idx="1"/>
+          </p:nvPr>
+        </p:nvSpPr>
+        <p:spPr/>
+        <p:txBody>
+          <a:bodyPr>
+            <a:normAutofit/>
+          </a:bodyPr>
+          <a:lstStyle/>
+          <a:p>
+            <a:pPr marL="0" indent="0">
+              <a:buNone/>
+            </a:pPr>
+            <a:r>
+              <a:rPr lang="de-DE" dirty="0" smtClean="0"/>
+              <a:t>Verlauf</a:t>
+            </a:r>
+            <a:r>
+              <a:rPr lang="de-DE" dirty="0"/>
+              <a:t>:</a:t>
+            </a:r>
+          </a:p>
+          <a:p>
+            <a:r>
+              <a:rPr lang="de-DE" dirty="0" smtClean="0"/>
+              <a:t>Inkrementelles </a:t>
+            </a:r>
+            <a:r>
+              <a:rPr lang="de-DE" dirty="0"/>
+              <a:t>Vorgehen</a:t>
+            </a:r>
+          </a:p>
+          <a:p>
+            <a:r>
+              <a:rPr lang="de-DE" dirty="0"/>
+              <a:t>+ </a:t>
+            </a:r>
+            <a:r>
+              <a:rPr lang="de-DE" dirty="0" smtClean="0"/>
+              <a:t>Regelmäßige Absprachen</a:t>
+            </a:r>
+            <a:endParaRPr lang="de-DE" dirty="0"/>
+          </a:p>
+          <a:p>
+            <a:r>
+              <a:rPr lang="de-DE" dirty="0"/>
+              <a:t>+ </a:t>
+            </a:r>
+            <a:r>
+              <a:rPr lang="de-DE" dirty="0" smtClean="0"/>
+              <a:t>Jeder </a:t>
+            </a:r>
+            <a:r>
+              <a:rPr lang="de-DE" dirty="0"/>
+              <a:t>konnte etwas beitragen</a:t>
+            </a:r>
+          </a:p>
+          <a:p>
+            <a:r>
+              <a:rPr lang="de-DE" dirty="0"/>
+              <a:t>+ Zwischenzeitliche Tests -&gt; Ermitteln &amp; Beheben von Bugs</a:t>
+            </a:r>
+          </a:p>
+          <a:p>
+            <a:r>
+              <a:rPr lang="de-DE" dirty="0"/>
+              <a:t>+ </a:t>
+            </a:r>
+            <a:r>
+              <a:rPr lang="de-DE" dirty="0" smtClean="0"/>
+              <a:t>Klare </a:t>
+            </a:r>
+            <a:r>
+              <a:rPr lang="de-DE" dirty="0"/>
+              <a:t>Aufgabenteilung + rege Kommunikation </a:t>
+            </a:r>
+            <a:endParaRPr lang="de-DE" dirty="0" smtClean="0"/>
+          </a:p>
+          <a:p>
+            <a:pPr marL="0" indent="0">
+              <a:buNone/>
+            </a:pPr>
+            <a:r>
+              <a:rPr lang="de-DE" dirty="0" smtClean="0"/>
+              <a:t>	-&gt; Nur </a:t>
+            </a:r>
+            <a:r>
+              <a:rPr lang="de-DE" dirty="0"/>
+              <a:t>wenig </a:t>
+            </a:r>
+            <a:r>
+              <a:rPr lang="de-DE" dirty="0" err="1"/>
+              <a:t>Mergekonflikte</a:t>
+            </a:r>
+            <a:endParaRPr lang="de-DE" dirty="0"/>
+          </a:p>
+          <a:p>
+            <a:r>
+              <a:rPr lang="de-DE" dirty="0"/>
+              <a:t>+ </a:t>
+            </a:r>
+            <a:r>
+              <a:rPr lang="de-DE" dirty="0" smtClean="0"/>
+              <a:t>Klare </a:t>
+            </a:r>
+            <a:r>
+              <a:rPr lang="de-DE" dirty="0"/>
+              <a:t>Definition von </a:t>
+            </a:r>
+            <a:r>
+              <a:rPr lang="de-DE" dirty="0" smtClean="0"/>
+              <a:t>Deadlines</a:t>
+            </a:r>
+            <a:endParaRPr lang="de-DE" dirty="0"/>
+          </a:p>
+        </p:txBody>
+      </p:sp>
+      <p:pic>
+        <p:nvPicPr>
+          <p:cNvPr id="4" name="Grafik 3"/>
+          <p:cNvPicPr>
+            <a:picLocks noChangeAspect="1"/>
+          </p:cNvPicPr>
+          <p:nvPr/>
+        </p:nvPicPr>
+        <p:blipFill>
+          <a:blip r:embed="rId3">
+            <a:extLst>
+              <a:ext uri="{28A0092B-C50C-407E-A947-70E740481C1C}">
+                <a14:useLocalDpi xmlns:a14="http://schemas.microsoft.com/office/drawing/2010/main" val="0"/>
+              </a:ext>
+            </a:extLst>
+          </a:blip>
+          <a:stretch>
+            <a:fillRect/>
+          </a:stretch>
+        </p:blipFill>
+        <p:spPr>
+          <a:xfrm>
+            <a:off x="11248792" y="5909733"/>
+            <a:ext cx="827314" cy="827314"/>
+          </a:xfrm>
+          <a:prstGeom prst="rect">
+            <a:avLst/>
+          </a:prstGeom>
+        </p:spPr>
+      </p:pic>
+      <p:sp>
+        <p:nvSpPr>
+          <p:cNvPr id="5" name="Foliennummernplatzhalter 4"/>
+          <p:cNvSpPr>
+            <a:spLocks noGrp="1"/>
+          </p:cNvSpPr>
+          <p:nvPr>
+            <p:ph type="sldNum" sz="quarter" idx="12"/>
+          </p:nvPr>
+        </p:nvSpPr>
+        <p:spPr/>
+        <p:txBody>
+          <a:bodyPr/>
+          <a:lstStyle/>
+          <a:p>
+            <a:fld id="{D57F1E4F-1CFF-5643-939E-217C01CDF565}" type="slidenum">
+              <a:rPr lang="en-US" smtClean="0"/>
+              <a:pPr/>
+              <a:t>22</a:t>
+            </a:fld>
+            <a:endParaRPr lang="en-US" dirty="0"/>
+          </a:p>
+        </p:txBody>
+      </p:sp>
+      <p:sp>
+        <p:nvSpPr>
+          <p:cNvPr id="6" name="Textfeld 5"/>
+          <p:cNvSpPr txBox="1"/>
+          <p:nvPr/>
+        </p:nvSpPr>
+        <p:spPr>
+          <a:xfrm>
+            <a:off x="372650" y="6156167"/>
+            <a:ext cx="10876142" cy="338554"/>
+          </a:xfrm>
+          <a:prstGeom prst="rect">
+            <a:avLst/>
+          </a:prstGeom>
+          <a:noFill/>
+        </p:spPr>
+        <p:txBody>
+          <a:bodyPr wrap="square" rtlCol="0">
+            <a:spAutoFit/>
+          </a:bodyPr>
+          <a:lstStyle/>
+          <a:p>
+            <a:r>
+              <a:rPr lang="de-DE" sz="1600" dirty="0" smtClean="0"/>
+              <a:t>13.02.2015  |  Software Engineering I  |  Nadine Feldmann, Lukas Huwe, Michael Kerkhoff, Sebastian Ochtrup</a:t>
+            </a:r>
+            <a:endParaRPr lang="de-DE" sz="1600" dirty="0"/>
+          </a:p>
+        </p:txBody>
+      </p:sp>
+    </p:spTree>
+    <p:extLst>
+      <p:ext uri="{BB962C8B-B14F-4D97-AF65-F5344CB8AC3E}">
+        <p14:creationId xmlns:p14="http://schemas.microsoft.com/office/powerpoint/2010/main" val="3509070595"/>
+      </p:ext>
+    </p:extLst>
+  </p:cSld>
+  <p:clrMapOvr>
+    <a:masterClrMapping/>
+  </p:clrMapOvr>
+  <p:timing>
+    <p:tnLst>
+      <p:par>
+        <p:cTn id="1" dur="indefinite" restart="never" nodeType="tmRoot"/>
+      </p:par>
+    </p:tnLst>
+  </p:timing>
+</p:sld>
+</file>
+
+<file path=ppt/slides/slide23.xml><?xml version="1.0" encoding="utf-8"?>
+<p:sld xmlns:a="http://schemas.openxmlformats.org/drawingml/2006/main" xmlns:r="http://schemas.openxmlformats.org/officeDocument/2006/relationships" xmlns:p="http://schemas.openxmlformats.org/presentationml/2006/main">
+  <p:cSld>
+    <p:spTree>
+      <p:nvGrpSpPr>
+        <p:cNvPr id="1" name=""/>
+        <p:cNvGrpSpPr/>
+        <p:nvPr/>
+      </p:nvGrpSpPr>
+      <p:grpSpPr>
+        <a:xfrm>
+          <a:off x="0" y="0"/>
+          <a:ext cx="0" cy="0"/>
+          <a:chOff x="0" y="0"/>
+          <a:chExt cx="0" cy="0"/>
+        </a:xfrm>
+      </p:grpSpPr>
+      <p:sp>
+        <p:nvSpPr>
+          <p:cNvPr id="2" name="Titel 1"/>
+          <p:cNvSpPr>
+            <a:spLocks noGrp="1"/>
+          </p:cNvSpPr>
+          <p:nvPr>
+            <p:ph type="title"/>
+          </p:nvPr>
+        </p:nvSpPr>
+        <p:spPr/>
+        <p:txBody>
+          <a:bodyPr/>
+          <a:lstStyle/>
+          <a:p>
+            <a:r>
+              <a:rPr lang="de-DE" dirty="0"/>
+              <a:t>Reflexion: Vorgehen</a:t>
+            </a:r>
+          </a:p>
+        </p:txBody>
+      </p:sp>
+      <p:sp>
+        <p:nvSpPr>
+          <p:cNvPr id="3" name="Inhaltsplatzhalter 2"/>
+          <p:cNvSpPr>
+            <a:spLocks noGrp="1"/>
+          </p:cNvSpPr>
+          <p:nvPr>
+            <p:ph idx="1"/>
+          </p:nvPr>
+        </p:nvSpPr>
+        <p:spPr/>
+        <p:txBody>
+          <a:bodyPr>
+            <a:normAutofit/>
+          </a:bodyPr>
+          <a:lstStyle/>
+          <a:p>
+            <a:pPr marL="0" indent="0">
+              <a:buNone/>
+            </a:pPr>
+            <a:r>
+              <a:rPr lang="de-DE" dirty="0" smtClean="0"/>
+              <a:t>Schwierigkeiten</a:t>
+            </a:r>
+            <a:r>
+              <a:rPr lang="de-DE" dirty="0"/>
+              <a:t>:</a:t>
+            </a:r>
+          </a:p>
+          <a:p>
+            <a:r>
+              <a:rPr lang="de-DE" dirty="0"/>
+              <a:t>- Themenfestlegung zunächst schwierig</a:t>
+            </a:r>
+          </a:p>
+          <a:p>
+            <a:r>
+              <a:rPr lang="de-DE" dirty="0"/>
+              <a:t>- Startschwierigkeiten</a:t>
+            </a:r>
+          </a:p>
+          <a:p>
+            <a:r>
+              <a:rPr lang="de-DE" dirty="0"/>
+              <a:t>- </a:t>
+            </a:r>
+            <a:r>
+              <a:rPr lang="de-DE" dirty="0" smtClean="0"/>
+              <a:t>Mit </a:t>
+            </a:r>
+            <a:r>
+              <a:rPr lang="de-DE" dirty="0"/>
+              <a:t>Tutorials &amp; Foren Einblick verschafft &amp; Gelerntes umgesetzt</a:t>
+            </a:r>
+          </a:p>
+          <a:p>
+            <a:r>
+              <a:rPr lang="de-DE" dirty="0"/>
+              <a:t>- Gestaltung eines einheitlichen Layouts </a:t>
+            </a:r>
+            <a:r>
+              <a:rPr lang="de-DE" dirty="0" smtClean="0"/>
+              <a:t>schwierig </a:t>
+            </a:r>
+            <a:r>
+              <a:rPr lang="de-DE" dirty="0"/>
+              <a:t>(viele Geräte</a:t>
+            </a:r>
+            <a:r>
+              <a:rPr lang="de-DE" dirty="0" smtClean="0"/>
+              <a:t>)</a:t>
+            </a:r>
+          </a:p>
+        </p:txBody>
+      </p:sp>
+      <p:pic>
+        <p:nvPicPr>
+          <p:cNvPr id="4" name="Grafik 3"/>
+          <p:cNvPicPr>
+            <a:picLocks noChangeAspect="1"/>
+          </p:cNvPicPr>
+          <p:nvPr/>
+        </p:nvPicPr>
+        <p:blipFill>
+          <a:blip r:embed="rId3">
+            <a:extLst>
+              <a:ext uri="{28A0092B-C50C-407E-A947-70E740481C1C}">
+                <a14:useLocalDpi xmlns:a14="http://schemas.microsoft.com/office/drawing/2010/main" val="0"/>
+              </a:ext>
+            </a:extLst>
+          </a:blip>
+          <a:stretch>
+            <a:fillRect/>
+          </a:stretch>
+        </p:blipFill>
+        <p:spPr>
+          <a:xfrm>
+            <a:off x="11248792" y="5909733"/>
+            <a:ext cx="827314" cy="827314"/>
+          </a:xfrm>
+          <a:prstGeom prst="rect">
+            <a:avLst/>
+          </a:prstGeom>
+        </p:spPr>
+      </p:pic>
+      <p:sp>
+        <p:nvSpPr>
+          <p:cNvPr id="5" name="Foliennummernplatzhalter 4"/>
+          <p:cNvSpPr>
+            <a:spLocks noGrp="1"/>
+          </p:cNvSpPr>
+          <p:nvPr>
+            <p:ph type="sldNum" sz="quarter" idx="12"/>
+          </p:nvPr>
+        </p:nvSpPr>
+        <p:spPr/>
+        <p:txBody>
+          <a:bodyPr/>
+          <a:lstStyle/>
+          <a:p>
+            <a:fld id="{D57F1E4F-1CFF-5643-939E-217C01CDF565}" type="slidenum">
+              <a:rPr lang="en-US" smtClean="0"/>
+              <a:pPr/>
+              <a:t>23</a:t>
+            </a:fld>
+            <a:endParaRPr lang="en-US" dirty="0"/>
+          </a:p>
+        </p:txBody>
+      </p:sp>
+      <p:sp>
+        <p:nvSpPr>
+          <p:cNvPr id="6" name="Textfeld 5"/>
+          <p:cNvSpPr txBox="1"/>
+          <p:nvPr/>
+        </p:nvSpPr>
+        <p:spPr>
+          <a:xfrm>
+            <a:off x="372650" y="6156167"/>
+            <a:ext cx="10876142" cy="338554"/>
+          </a:xfrm>
+          <a:prstGeom prst="rect">
+            <a:avLst/>
+          </a:prstGeom>
+          <a:noFill/>
+        </p:spPr>
+        <p:txBody>
+          <a:bodyPr wrap="square" rtlCol="0">
+            <a:spAutoFit/>
+          </a:bodyPr>
+          <a:lstStyle/>
+          <a:p>
+            <a:r>
+              <a:rPr lang="de-DE" sz="1600" dirty="0" smtClean="0"/>
+              <a:t>13.02.2015  |  Software Engineering I  |  Nadine Feldmann, Lukas Huwe, Michael Kerkhoff, Sebastian Ochtrup</a:t>
+            </a:r>
+            <a:endParaRPr lang="de-DE" sz="1600" dirty="0"/>
+          </a:p>
+        </p:txBody>
+      </p:sp>
+    </p:spTree>
+    <p:extLst>
+      <p:ext uri="{BB962C8B-B14F-4D97-AF65-F5344CB8AC3E}">
+        <p14:creationId xmlns:p14="http://schemas.microsoft.com/office/powerpoint/2010/main" val="2650556501"/>
+      </p:ext>
+    </p:extLst>
+  </p:cSld>
+  <p:clrMapOvr>
+    <a:masterClrMapping/>
+  </p:clrMapOvr>
+  <p:timing>
+    <p:tnLst>
+      <p:par>
+        <p:cTn id="1" dur="indefinite" restart="never" nodeType="tmRoot"/>
+      </p:par>
+    </p:tnLst>
+  </p:timing>
+</p:sld>
+</file>
+
+<file path=ppt/slides/slide24.xml><?xml version="1.0" encoding="utf-8"?>
+<p:sld xmlns:a="http://schemas.openxmlformats.org/drawingml/2006/main" xmlns:r="http://schemas.openxmlformats.org/officeDocument/2006/relationships" xmlns:p="http://schemas.openxmlformats.org/presentationml/2006/main">
+  <p:cSld>
+    <p:spTree>
+      <p:nvGrpSpPr>
+        <p:cNvPr id="1" name=""/>
+        <p:cNvGrpSpPr/>
+        <p:nvPr/>
+      </p:nvGrpSpPr>
+      <p:grpSpPr>
+        <a:xfrm>
+          <a:off x="0" y="0"/>
+          <a:ext cx="0" cy="0"/>
+          <a:chOff x="0" y="0"/>
+          <a:chExt cx="0" cy="0"/>
+        </a:xfrm>
+      </p:grpSpPr>
+      <p:sp>
+        <p:nvSpPr>
+          <p:cNvPr id="2" name="Titel 1"/>
+          <p:cNvSpPr>
+            <a:spLocks noGrp="1"/>
+          </p:cNvSpPr>
+          <p:nvPr>
+            <p:ph type="title"/>
+          </p:nvPr>
+        </p:nvSpPr>
+        <p:spPr/>
+        <p:txBody>
+          <a:bodyPr/>
+          <a:lstStyle/>
+          <a:p>
+            <a:r>
+              <a:rPr lang="de-DE" dirty="0"/>
+              <a:t>Reflexion: Vorgehen</a:t>
+            </a:r>
+          </a:p>
+        </p:txBody>
+      </p:sp>
+      <p:sp>
+        <p:nvSpPr>
+          <p:cNvPr id="3" name="Inhaltsplatzhalter 2"/>
+          <p:cNvSpPr>
+            <a:spLocks noGrp="1"/>
+          </p:cNvSpPr>
+          <p:nvPr>
+            <p:ph idx="1"/>
+          </p:nvPr>
+        </p:nvSpPr>
+        <p:spPr/>
+        <p:txBody>
+          <a:bodyPr>
+            <a:normAutofit/>
+          </a:bodyPr>
+          <a:lstStyle/>
+          <a:p>
+            <a:pPr marL="0" indent="0">
+              <a:buNone/>
+            </a:pPr>
+            <a:r>
+              <a:rPr lang="de-DE" dirty="0" smtClean="0"/>
+              <a:t>Verbesserungen</a:t>
+            </a:r>
+            <a:r>
+              <a:rPr lang="de-DE" dirty="0"/>
+              <a:t>:</a:t>
+            </a:r>
+          </a:p>
+          <a:p>
+            <a:r>
+              <a:rPr lang="de-DE" dirty="0" smtClean="0"/>
+              <a:t>Rechtzeitige Einarbeitung in </a:t>
+            </a:r>
+            <a:r>
+              <a:rPr lang="de-DE" dirty="0"/>
+              <a:t>das </a:t>
+            </a:r>
+            <a:r>
+              <a:rPr lang="de-DE" dirty="0" smtClean="0"/>
+              <a:t>Thema</a:t>
+            </a:r>
+            <a:endParaRPr lang="de-DE" dirty="0"/>
+          </a:p>
+          <a:p>
+            <a:r>
+              <a:rPr lang="de-DE" dirty="0" smtClean="0"/>
+              <a:t>In </a:t>
+            </a:r>
+            <a:r>
+              <a:rPr lang="de-DE" dirty="0"/>
+              <a:t>der Entwicklungsphase: Ziele anhand fachlicher Anforderungen </a:t>
+            </a:r>
+            <a:r>
+              <a:rPr lang="de-DE" dirty="0" smtClean="0"/>
+              <a:t>definieren</a:t>
+            </a:r>
+            <a:endParaRPr lang="de-DE" dirty="0"/>
+          </a:p>
+          <a:p>
+            <a:pPr marL="0" indent="0">
+              <a:buNone/>
+            </a:pPr>
+            <a:r>
+              <a:rPr lang="de-DE" dirty="0" smtClean="0"/>
+              <a:t>	-&gt; Sich </a:t>
+            </a:r>
+            <a:r>
+              <a:rPr lang="de-DE" dirty="0"/>
+              <a:t>ergebende Aufgaben sinnvoll unter den Projektbeteiligten aufteilen </a:t>
+            </a:r>
+          </a:p>
+          <a:p>
+            <a:pPr marL="0" indent="0">
+              <a:buNone/>
+            </a:pPr>
+            <a:r>
+              <a:rPr lang="de-DE" smtClean="0"/>
+              <a:t>	-&gt; </a:t>
+            </a:r>
+            <a:r>
+              <a:rPr lang="de-DE" dirty="0" smtClean="0"/>
+              <a:t>Weniger </a:t>
+            </a:r>
+            <a:r>
+              <a:rPr lang="de-DE" dirty="0"/>
+              <a:t>technische Abhängigkeiten + konstanter Fokus auf fachliche Anforderungen</a:t>
+            </a:r>
+            <a:endParaRPr lang="de-DE" dirty="0" smtClean="0"/>
+          </a:p>
+          <a:p>
+            <a:endParaRPr lang="de-DE" dirty="0" smtClean="0"/>
+          </a:p>
+        </p:txBody>
+      </p:sp>
+      <p:pic>
+        <p:nvPicPr>
+          <p:cNvPr id="4" name="Grafik 3"/>
+          <p:cNvPicPr>
+            <a:picLocks noChangeAspect="1"/>
+          </p:cNvPicPr>
+          <p:nvPr/>
+        </p:nvPicPr>
+        <p:blipFill>
+          <a:blip r:embed="rId3">
+            <a:extLst>
+              <a:ext uri="{28A0092B-C50C-407E-A947-70E740481C1C}">
+                <a14:useLocalDpi xmlns:a14="http://schemas.microsoft.com/office/drawing/2010/main" val="0"/>
+              </a:ext>
+            </a:extLst>
+          </a:blip>
+          <a:stretch>
+            <a:fillRect/>
+          </a:stretch>
+        </p:blipFill>
+        <p:spPr>
+          <a:xfrm>
+            <a:off x="11248792" y="5909733"/>
+            <a:ext cx="827314" cy="827314"/>
+          </a:xfrm>
+          <a:prstGeom prst="rect">
+            <a:avLst/>
+          </a:prstGeom>
+        </p:spPr>
+      </p:pic>
+      <p:sp>
+        <p:nvSpPr>
+          <p:cNvPr id="5" name="Foliennummernplatzhalter 4"/>
+          <p:cNvSpPr>
+            <a:spLocks noGrp="1"/>
+          </p:cNvSpPr>
+          <p:nvPr>
+            <p:ph type="sldNum" sz="quarter" idx="12"/>
+          </p:nvPr>
+        </p:nvSpPr>
+        <p:spPr/>
+        <p:txBody>
+          <a:bodyPr/>
+          <a:lstStyle/>
+          <a:p>
+            <a:fld id="{D57F1E4F-1CFF-5643-939E-217C01CDF565}" type="slidenum">
+              <a:rPr lang="en-US" smtClean="0"/>
+              <a:pPr/>
+              <a:t>24</a:t>
+            </a:fld>
+            <a:endParaRPr lang="en-US" dirty="0"/>
+          </a:p>
+        </p:txBody>
+      </p:sp>
+      <p:sp>
+        <p:nvSpPr>
+          <p:cNvPr id="6" name="Textfeld 5"/>
+          <p:cNvSpPr txBox="1"/>
+          <p:nvPr/>
+        </p:nvSpPr>
+        <p:spPr>
+          <a:xfrm>
+            <a:off x="372650" y="6156167"/>
+            <a:ext cx="10876142" cy="338554"/>
+          </a:xfrm>
+          <a:prstGeom prst="rect">
+            <a:avLst/>
+          </a:prstGeom>
+          <a:noFill/>
+        </p:spPr>
+        <p:txBody>
+          <a:bodyPr wrap="square" rtlCol="0">
+            <a:spAutoFit/>
+          </a:bodyPr>
+          <a:lstStyle/>
+          <a:p>
+            <a:r>
+              <a:rPr lang="de-DE" sz="1600" dirty="0" smtClean="0"/>
+              <a:t>13.02.2015  |  Software Engineering I  |  Nadine Feldmann, Lukas Huwe, Michael Kerkhoff, Sebastian Ochtrup</a:t>
+            </a:r>
+            <a:endParaRPr lang="de-DE" sz="1600" dirty="0"/>
+          </a:p>
+        </p:txBody>
+      </p:sp>
+    </p:spTree>
+    <p:extLst>
+      <p:ext uri="{BB962C8B-B14F-4D97-AF65-F5344CB8AC3E}">
+        <p14:creationId xmlns:p14="http://schemas.microsoft.com/office/powerpoint/2010/main" val="1648445864"/>
+      </p:ext>
+    </p:extLst>
+  </p:cSld>
+  <p:clrMapOvr>
+    <a:masterClrMapping/>
+  </p:clrMapOvr>
+  <p:timing>
+    <p:tnLst>
+      <p:par>
+        <p:cTn id="1" dur="indefinite" restart="never" nodeType="tmRoot"/>
+      </p:par>
+    </p:tnLst>
+  </p:timing>
+</p:sld>
+</file>
+
+<file path=ppt/slides/slide25.xml><?xml version="1.0" encoding="utf-8"?>
+<p:sld xmlns:a="http://schemas.openxmlformats.org/drawingml/2006/main" xmlns:r="http://schemas.openxmlformats.org/officeDocument/2006/relationships" xmlns:p="http://schemas.openxmlformats.org/presentationml/2006/main">
+  <p:cSld>
+    <p:spTree>
+      <p:nvGrpSpPr>
+        <p:cNvPr id="1" name=""/>
+        <p:cNvGrpSpPr/>
+        <p:nvPr/>
+      </p:nvGrpSpPr>
+      <p:grpSpPr>
+        <a:xfrm>
+          <a:off x="0" y="0"/>
+          <a:ext cx="0" cy="0"/>
+          <a:chOff x="0" y="0"/>
+          <a:chExt cx="0" cy="0"/>
+        </a:xfrm>
+      </p:grpSpPr>
+      <p:sp>
+        <p:nvSpPr>
+          <p:cNvPr id="2" name="Titel 1"/>
+          <p:cNvSpPr>
+            <a:spLocks noGrp="1"/>
+          </p:cNvSpPr>
+          <p:nvPr>
+            <p:ph type="title"/>
+          </p:nvPr>
+        </p:nvSpPr>
+        <p:spPr>
+          <a:xfrm>
+            <a:off x="1154953" y="2370667"/>
+            <a:ext cx="9469503" cy="1822514"/>
+          </a:xfrm>
+        </p:spPr>
+        <p:txBody>
+          <a:bodyPr/>
+          <a:lstStyle/>
+          <a:p>
+            <a:pPr algn="ctr"/>
+            <a:r>
+              <a:rPr lang="de-DE" sz="5400" dirty="0" smtClean="0"/>
+              <a:t>Noch Fragen?</a:t>
+            </a:r>
+            <a:endParaRPr lang="de-DE" sz="5400" dirty="0"/>
+          </a:p>
+        </p:txBody>
+      </p:sp>
+      <p:sp>
+        <p:nvSpPr>
+          <p:cNvPr id="5" name="Foliennummernplatzhalter 4"/>
+          <p:cNvSpPr>
+            <a:spLocks noGrp="1"/>
+          </p:cNvSpPr>
+          <p:nvPr>
+            <p:ph type="sldNum" sz="quarter" idx="12"/>
+          </p:nvPr>
+        </p:nvSpPr>
+        <p:spPr/>
+        <p:txBody>
+          <a:bodyPr/>
+          <a:lstStyle/>
+          <a:p>
+            <a:fld id="{D57F1E4F-1CFF-5643-939E-217C01CDF565}" type="slidenum">
+              <a:rPr lang="en-US" smtClean="0"/>
+              <a:pPr/>
+              <a:t>25</a:t>
+            </a:fld>
+            <a:endParaRPr lang="en-US" dirty="0"/>
+          </a:p>
+        </p:txBody>
+      </p:sp>
+      <p:pic>
+        <p:nvPicPr>
+          <p:cNvPr id="4" name="Grafik 3"/>
+          <p:cNvPicPr>
+            <a:picLocks noChangeAspect="1"/>
+          </p:cNvPicPr>
+          <p:nvPr/>
+        </p:nvPicPr>
+        <p:blipFill>
+          <a:blip r:embed="rId3">
+            <a:extLst>
+              <a:ext uri="{28A0092B-C50C-407E-A947-70E740481C1C}">
+                <a14:useLocalDpi xmlns:a14="http://schemas.microsoft.com/office/drawing/2010/main" val="0"/>
+              </a:ext>
+            </a:extLst>
+          </a:blip>
+          <a:stretch>
+            <a:fillRect/>
+          </a:stretch>
+        </p:blipFill>
+        <p:spPr>
+          <a:xfrm>
+            <a:off x="11248792" y="5909733"/>
+            <a:ext cx="827314" cy="827314"/>
+          </a:xfrm>
+          <a:prstGeom prst="rect">
+            <a:avLst/>
+          </a:prstGeom>
+        </p:spPr>
+      </p:pic>
+      <p:sp>
+        <p:nvSpPr>
+          <p:cNvPr id="6" name="Textfeld 5"/>
+          <p:cNvSpPr txBox="1"/>
+          <p:nvPr/>
+        </p:nvSpPr>
+        <p:spPr>
+          <a:xfrm>
+            <a:off x="372650" y="6156167"/>
+            <a:ext cx="10876142" cy="338554"/>
+          </a:xfrm>
+          <a:prstGeom prst="rect">
+            <a:avLst/>
+          </a:prstGeom>
+          <a:noFill/>
+        </p:spPr>
+        <p:txBody>
+          <a:bodyPr wrap="square" rtlCol="0">
+            <a:spAutoFit/>
+          </a:bodyPr>
+          <a:lstStyle/>
+          <a:p>
+            <a:r>
+              <a:rPr lang="de-DE" sz="1600" dirty="0" smtClean="0"/>
+              <a:t>13.02.2015  |  Software Engineering I  |  Nadine Feldmann, Lukas Huwe, Michael Kerkhoff, Sebastian Ochtrup</a:t>
+            </a:r>
+            <a:endParaRPr lang="de-DE" sz="1600" dirty="0"/>
+          </a:p>
+        </p:txBody>
+      </p:sp>
+    </p:spTree>
+    <p:extLst>
+      <p:ext uri="{BB962C8B-B14F-4D97-AF65-F5344CB8AC3E}">
+        <p14:creationId xmlns:p14="http://schemas.microsoft.com/office/powerpoint/2010/main" val="1786163146"/>
+      </p:ext>
+    </p:extLst>
+  </p:cSld>
+  <p:clrMapOvr>
+    <a:masterClrMapping/>
+  </p:clrMapOvr>
+  <p:timing>
+    <p:tnLst>
+      <p:par>
+        <p:cTn id="1" dur="indefinite" restart="never" nodeType="tmRoot"/>
+      </p:par>
+    </p:tnLst>
+  </p:timing>
+</p:sld>
+</file>
+
+<file path=ppt/slides/slide26.xml><?xml version="1.0" encoding="utf-8"?>
+<p:sld xmlns:a="http://schemas.openxmlformats.org/drawingml/2006/main" xmlns:r="http://schemas.openxmlformats.org/officeDocument/2006/relationships" xmlns:p="http://schemas.openxmlformats.org/presentationml/2006/main">
+  <p:cSld>
+    <p:spTree>
+      <p:nvGrpSpPr>
+        <p:cNvPr id="1" name=""/>
+        <p:cNvGrpSpPr/>
+        <p:nvPr/>
+      </p:nvGrpSpPr>
+      <p:grpSpPr>
+        <a:xfrm>
+          <a:off x="0" y="0"/>
+          <a:ext cx="0" cy="0"/>
+          <a:chOff x="0" y="0"/>
+          <a:chExt cx="0" cy="0"/>
+        </a:xfrm>
+      </p:grpSpPr>
+      <p:sp>
+        <p:nvSpPr>
+          <p:cNvPr id="2" name="Titel 1"/>
+          <p:cNvSpPr>
+            <a:spLocks noGrp="1"/>
+          </p:cNvSpPr>
+          <p:nvPr>
+            <p:ph type="title"/>
+          </p:nvPr>
+        </p:nvSpPr>
+        <p:spPr>
+          <a:xfrm>
+            <a:off x="1154953" y="2370667"/>
+            <a:ext cx="9469503" cy="1822514"/>
+          </a:xfrm>
+        </p:spPr>
+        <p:txBody>
+          <a:bodyPr/>
+          <a:lstStyle/>
+          <a:p>
+            <a:pPr algn="ctr"/>
+            <a:r>
+              <a:rPr lang="de-DE" dirty="0" smtClean="0"/>
+              <a:t>Vielen Dank für eure Aufmerksamkeit!</a:t>
+            </a:r>
+            <a:endParaRPr lang="de-DE" dirty="0"/>
+          </a:p>
+        </p:txBody>
+      </p:sp>
+      <p:sp>
+        <p:nvSpPr>
+          <p:cNvPr id="5" name="Foliennummernplatzhalter 4"/>
+          <p:cNvSpPr>
+            <a:spLocks noGrp="1"/>
+          </p:cNvSpPr>
+          <p:nvPr>
+            <p:ph type="sldNum" sz="quarter" idx="12"/>
+          </p:nvPr>
+        </p:nvSpPr>
+        <p:spPr/>
+        <p:txBody>
+          <a:bodyPr/>
+          <a:lstStyle/>
+          <a:p>
+            <a:fld id="{D57F1E4F-1CFF-5643-939E-217C01CDF565}" type="slidenum">
+              <a:rPr lang="en-US" smtClean="0"/>
+              <a:pPr/>
+              <a:t>26</a:t>
+            </a:fld>
+            <a:endParaRPr lang="en-US" dirty="0"/>
+          </a:p>
+        </p:txBody>
+      </p:sp>
+      <p:pic>
+        <p:nvPicPr>
+          <p:cNvPr id="4" name="Grafik 3"/>
+          <p:cNvPicPr>
+            <a:picLocks noChangeAspect="1"/>
+          </p:cNvPicPr>
+          <p:nvPr/>
+        </p:nvPicPr>
+        <p:blipFill>
+          <a:blip r:embed="rId3">
+            <a:extLst>
+              <a:ext uri="{28A0092B-C50C-407E-A947-70E740481C1C}">
+                <a14:useLocalDpi xmlns:a14="http://schemas.microsoft.com/office/drawing/2010/main" val="0"/>
+              </a:ext>
+            </a:extLst>
+          </a:blip>
+          <a:stretch>
+            <a:fillRect/>
+          </a:stretch>
+        </p:blipFill>
+        <p:spPr>
+          <a:xfrm>
+            <a:off x="11248792" y="5909733"/>
+            <a:ext cx="827314" cy="827314"/>
+          </a:xfrm>
+          <a:prstGeom prst="rect">
+            <a:avLst/>
+          </a:prstGeom>
+        </p:spPr>
+      </p:pic>
+      <p:sp>
+        <p:nvSpPr>
+          <p:cNvPr id="6" name="Textfeld 5"/>
+          <p:cNvSpPr txBox="1"/>
+          <p:nvPr/>
+        </p:nvSpPr>
+        <p:spPr>
+          <a:xfrm>
+            <a:off x="372650" y="6156167"/>
+            <a:ext cx="10876142" cy="338554"/>
+          </a:xfrm>
+          <a:prstGeom prst="rect">
+            <a:avLst/>
+          </a:prstGeom>
+          <a:noFill/>
+        </p:spPr>
+        <p:txBody>
+          <a:bodyPr wrap="square" rtlCol="0">
+            <a:spAutoFit/>
+          </a:bodyPr>
+          <a:lstStyle/>
+          <a:p>
+            <a:r>
+              <a:rPr lang="de-DE" sz="1600" dirty="0" smtClean="0"/>
+              <a:t>13.02.2015  |  Software Engineering I  |  Nadine Feldmann, Lukas Huwe, Michael Kerkhoff, Sebastian Ochtrup</a:t>
+            </a:r>
+            <a:endParaRPr lang="de-DE" sz="1600" dirty="0"/>
+          </a:p>
+        </p:txBody>
+      </p:sp>
+    </p:spTree>
+    <p:extLst>
+      <p:ext uri="{BB962C8B-B14F-4D97-AF65-F5344CB8AC3E}">
+        <p14:creationId xmlns:p14="http://schemas.microsoft.com/office/powerpoint/2010/main" val="1278744805"/>
+      </p:ext>
+    </p:extLst>
+  </p:cSld>
+  <p:clrMapOvr>
+    <a:masterClrMapping/>
+  </p:clrMapOvr>
+  <p:timing>
+    <p:tnLst>
+      <p:par>
+        <p:cTn id="1" dur="indefinite" restart="never" nodeType="tmRoot"/>
+      </p:par>
+    </p:tnLst>
+  </p:timing>
+</p:sld>
+</file>
+
+<file path=ppt/slides/slide27.xml><?xml version="1.0" encoding="utf-8"?>
+<p:sld xmlns:a="http://schemas.openxmlformats.org/drawingml/2006/main" xmlns:r="http://schemas.openxmlformats.org/officeDocument/2006/relationships" xmlns:p="http://schemas.openxmlformats.org/presentationml/2006/main">
+  <p:cSld>
+    <p:spTree>
+      <p:nvGrpSpPr>
+        <p:cNvPr id="1" name=""/>
+        <p:cNvGrpSpPr/>
+        <p:nvPr/>
+      </p:nvGrpSpPr>
+      <p:grpSpPr>
+        <a:xfrm>
+          <a:off x="0" y="0"/>
+          <a:ext cx="0" cy="0"/>
+          <a:chOff x="0" y="0"/>
+          <a:chExt cx="0" cy="0"/>
+        </a:xfrm>
+      </p:grpSpPr>
+      <p:sp>
+        <p:nvSpPr>
+          <p:cNvPr id="2" name="Titel 1"/>
+          <p:cNvSpPr>
+            <a:spLocks noGrp="1"/>
+          </p:cNvSpPr>
+          <p:nvPr>
+            <p:ph type="title"/>
+          </p:nvPr>
+        </p:nvSpPr>
+        <p:spPr/>
+        <p:txBody>
+          <a:bodyPr/>
+          <a:lstStyle/>
+          <a:p>
+            <a:r>
+              <a:rPr lang="de-DE" dirty="0" smtClean="0"/>
+              <a:t>Quellen</a:t>
+            </a:r>
+            <a:endParaRPr lang="de-DE" dirty="0"/>
+          </a:p>
+        </p:txBody>
+      </p:sp>
+      <p:sp>
+        <p:nvSpPr>
+          <p:cNvPr id="3" name="Inhaltsplatzhalter 2"/>
+          <p:cNvSpPr>
+            <a:spLocks noGrp="1"/>
+          </p:cNvSpPr>
+          <p:nvPr>
+            <p:ph idx="1"/>
+          </p:nvPr>
+        </p:nvSpPr>
+        <p:spPr/>
+        <p:txBody>
+          <a:bodyPr/>
+          <a:lstStyle/>
+          <a:p>
+            <a:r>
+              <a:rPr lang="de-DE" dirty="0" smtClean="0">
+                <a:hlinkClick r:id="rId3"/>
+              </a:rPr>
+              <a:t>www.elcomsoft.com</a:t>
+            </a:r>
+            <a:endParaRPr lang="de-DE" dirty="0" smtClean="0"/>
+          </a:p>
+          <a:p>
+            <a:r>
+              <a:rPr lang="de-DE" dirty="0" smtClean="0">
+                <a:hlinkClick r:id="rId4"/>
+              </a:rPr>
+              <a:t>www.elcomsoft.com/WP/BH-EU-2012-WP.pdf</a:t>
+            </a:r>
+            <a:endParaRPr lang="de-DE" dirty="0" smtClean="0"/>
+          </a:p>
+          <a:p>
+            <a:endParaRPr lang="de-DE" dirty="0" smtClean="0"/>
+          </a:p>
+        </p:txBody>
+      </p:sp>
+      <p:pic>
+        <p:nvPicPr>
+          <p:cNvPr id="4" name="Grafik 3"/>
+          <p:cNvPicPr>
+            <a:picLocks noChangeAspect="1"/>
+          </p:cNvPicPr>
+          <p:nvPr/>
+        </p:nvPicPr>
+        <p:blipFill>
+          <a:blip r:embed="rId5">
+            <a:extLst>
+              <a:ext uri="{28A0092B-C50C-407E-A947-70E740481C1C}">
+                <a14:useLocalDpi xmlns:a14="http://schemas.microsoft.com/office/drawing/2010/main" val="0"/>
+              </a:ext>
+            </a:extLst>
+          </a:blip>
+          <a:stretch>
+            <a:fillRect/>
+          </a:stretch>
+        </p:blipFill>
+        <p:spPr>
+          <a:xfrm>
+            <a:off x="11248792" y="5909733"/>
+            <a:ext cx="827314" cy="827314"/>
+          </a:xfrm>
+          <a:prstGeom prst="rect">
+            <a:avLst/>
+          </a:prstGeom>
+        </p:spPr>
+      </p:pic>
+      <p:sp>
+        <p:nvSpPr>
+          <p:cNvPr id="5" name="Foliennummernplatzhalter 4"/>
+          <p:cNvSpPr>
+            <a:spLocks noGrp="1"/>
+          </p:cNvSpPr>
+          <p:nvPr>
+            <p:ph type="sldNum" sz="quarter" idx="12"/>
+          </p:nvPr>
+        </p:nvSpPr>
+        <p:spPr/>
+        <p:txBody>
+          <a:bodyPr/>
+          <a:lstStyle/>
+          <a:p>
+            <a:fld id="{D57F1E4F-1CFF-5643-939E-217C01CDF565}" type="slidenum">
+              <a:rPr lang="en-US" smtClean="0"/>
+              <a:pPr/>
+              <a:t>27</a:t>
+            </a:fld>
+            <a:endParaRPr lang="en-US" dirty="0"/>
+          </a:p>
+        </p:txBody>
+      </p:sp>
+      <p:sp>
+        <p:nvSpPr>
+          <p:cNvPr id="6" name="Textfeld 5"/>
+          <p:cNvSpPr txBox="1"/>
+          <p:nvPr/>
+        </p:nvSpPr>
+        <p:spPr>
+          <a:xfrm>
+            <a:off x="372650" y="6156167"/>
+            <a:ext cx="10876142" cy="338554"/>
+          </a:xfrm>
+          <a:prstGeom prst="rect">
+            <a:avLst/>
+          </a:prstGeom>
+          <a:noFill/>
+        </p:spPr>
+        <p:txBody>
+          <a:bodyPr wrap="square" rtlCol="0">
+            <a:spAutoFit/>
+          </a:bodyPr>
+          <a:lstStyle/>
+          <a:p>
+            <a:r>
+              <a:rPr lang="de-DE" sz="1600" dirty="0" smtClean="0"/>
+              <a:t>13.02.2015  |  Software Engineering I  |  Nadine Feldmann, Lukas Huwe, Michael Kerkhoff, Sebastian Ochtrup</a:t>
+            </a:r>
+            <a:endParaRPr lang="de-DE" sz="1600" dirty="0"/>
+          </a:p>
+        </p:txBody>
+      </p:sp>
+    </p:spTree>
+    <p:extLst>
+      <p:ext uri="{BB962C8B-B14F-4D97-AF65-F5344CB8AC3E}">
+        <p14:creationId xmlns:p14="http://schemas.microsoft.com/office/powerpoint/2010/main" val="3216998357"/>
       </p:ext>
     </p:extLst>
   </p:cSld>
@@ -19181,7 +22519,6 @@
               <a:rPr lang="de-DE" dirty="0" smtClean="0"/>
               <a:t> zu bilden</a:t>
             </a:r>
-            <a:endParaRPr lang="de-DE" dirty="0" smtClean="0"/>
           </a:p>
           <a:p>
             <a:pPr lvl="1"/>

</xml_diff>

<commit_message>
Präsi: Leichte Anpassungen am Reflextions-Teil
</commit_message>
<xml_diff>
--- a/Dokumentation/PWSafe Präsentation.pptx
+++ b/Dokumentation/PWSafe Präsentation.pptx
@@ -128,7 +128,7 @@
   </p:defaultTextStyle>
   <p:extLst>
     <p:ext uri="{EFAFB233-063F-42B5-8137-9DF3F51BA10A}">
-      <p15:sldGuideLst xmlns:p15="http://schemas.microsoft.com/office/powerpoint/2012/main" xmlns="">
+      <p15:sldGuideLst xmlns:p15="http://schemas.microsoft.com/office/powerpoint/2012/main">
         <p15:guide id="1" orient="horz" pos="2160">
           <p15:clr>
             <a:srgbClr val="A4A3A4"/>
@@ -142,7 +142,7 @@
       </p15:sldGuideLst>
     </p:ext>
     <p:ext uri="{2D200454-40CA-4A62-9FC3-DE9A4176ACB9}">
-      <p15:notesGuideLst xmlns:p15="http://schemas.microsoft.com/office/powerpoint/2012/main" xmlns=""/>
+      <p15:notesGuideLst xmlns:p15="http://schemas.microsoft.com/office/powerpoint/2012/main"/>
     </p:ext>
   </p:extLst>
 </p:presentation>
@@ -400,7 +400,7 @@
     </p:spTree>
     <p:extLst>
       <p:ext uri="{BB962C8B-B14F-4D97-AF65-F5344CB8AC3E}">
-        <p14:creationId xmlns:p14="http://schemas.microsoft.com/office/powerpoint/2010/main" xmlns="" val="2805633478"/>
+        <p14:creationId xmlns:p14="http://schemas.microsoft.com/office/powerpoint/2010/main" val="2805633478"/>
       </p:ext>
     </p:extLst>
   </p:cSld>
@@ -575,7 +575,7 @@
     </p:spTree>
     <p:extLst>
       <p:ext uri="{BB962C8B-B14F-4D97-AF65-F5344CB8AC3E}">
-        <p14:creationId xmlns:p14="http://schemas.microsoft.com/office/powerpoint/2010/main" xmlns="" val="2124923709"/>
+        <p14:creationId xmlns:p14="http://schemas.microsoft.com/office/powerpoint/2010/main" val="2124923709"/>
       </p:ext>
     </p:extLst>
   </p:cSld>
@@ -742,7 +742,7 @@
     </p:spTree>
     <p:extLst>
       <p:ext uri="{BB962C8B-B14F-4D97-AF65-F5344CB8AC3E}">
-        <p14:creationId xmlns:p14="http://schemas.microsoft.com/office/powerpoint/2010/main" xmlns="" val="2145289091"/>
+        <p14:creationId xmlns:p14="http://schemas.microsoft.com/office/powerpoint/2010/main" val="2145289091"/>
       </p:ext>
     </p:extLst>
   </p:cSld>
@@ -913,7 +913,7 @@
     </p:spTree>
     <p:extLst>
       <p:ext uri="{BB962C8B-B14F-4D97-AF65-F5344CB8AC3E}">
-        <p14:creationId xmlns:p14="http://schemas.microsoft.com/office/powerpoint/2010/main" xmlns="" val="461146694"/>
+        <p14:creationId xmlns:p14="http://schemas.microsoft.com/office/powerpoint/2010/main" val="461146694"/>
       </p:ext>
     </p:extLst>
   </p:cSld>
@@ -998,7 +998,7 @@
     </p:spTree>
     <p:extLst>
       <p:ext uri="{BB962C8B-B14F-4D97-AF65-F5344CB8AC3E}">
-        <p14:creationId xmlns:p14="http://schemas.microsoft.com/office/powerpoint/2010/main" xmlns="" val="4219797847"/>
+        <p14:creationId xmlns:p14="http://schemas.microsoft.com/office/powerpoint/2010/main" val="4219797847"/>
       </p:ext>
     </p:extLst>
   </p:cSld>
@@ -1083,7 +1083,7 @@
     </p:spTree>
     <p:extLst>
       <p:ext uri="{BB962C8B-B14F-4D97-AF65-F5344CB8AC3E}">
-        <p14:creationId xmlns:p14="http://schemas.microsoft.com/office/powerpoint/2010/main" xmlns="" val="2754737602"/>
+        <p14:creationId xmlns:p14="http://schemas.microsoft.com/office/powerpoint/2010/main" val="2754737602"/>
       </p:ext>
     </p:extLst>
   </p:cSld>
@@ -1168,7 +1168,7 @@
     </p:spTree>
     <p:extLst>
       <p:ext uri="{BB962C8B-B14F-4D97-AF65-F5344CB8AC3E}">
-        <p14:creationId xmlns:p14="http://schemas.microsoft.com/office/powerpoint/2010/main" xmlns="" val="657275192"/>
+        <p14:creationId xmlns:p14="http://schemas.microsoft.com/office/powerpoint/2010/main" val="657275192"/>
       </p:ext>
     </p:extLst>
   </p:cSld>
@@ -1253,7 +1253,7 @@
     </p:spTree>
     <p:extLst>
       <p:ext uri="{BB962C8B-B14F-4D97-AF65-F5344CB8AC3E}">
-        <p14:creationId xmlns:p14="http://schemas.microsoft.com/office/powerpoint/2010/main" xmlns="" val="183309910"/>
+        <p14:creationId xmlns:p14="http://schemas.microsoft.com/office/powerpoint/2010/main" val="183309910"/>
       </p:ext>
     </p:extLst>
   </p:cSld>
@@ -1338,7 +1338,7 @@
     </p:spTree>
     <p:extLst>
       <p:ext uri="{BB962C8B-B14F-4D97-AF65-F5344CB8AC3E}">
-        <p14:creationId xmlns:p14="http://schemas.microsoft.com/office/powerpoint/2010/main" xmlns="" val="1748681489"/>
+        <p14:creationId xmlns:p14="http://schemas.microsoft.com/office/powerpoint/2010/main" val="1748681489"/>
       </p:ext>
     </p:extLst>
   </p:cSld>
@@ -1423,7 +1423,7 @@
     </p:spTree>
     <p:extLst>
       <p:ext uri="{BB962C8B-B14F-4D97-AF65-F5344CB8AC3E}">
-        <p14:creationId xmlns:p14="http://schemas.microsoft.com/office/powerpoint/2010/main" xmlns="" val="3297351362"/>
+        <p14:creationId xmlns:p14="http://schemas.microsoft.com/office/powerpoint/2010/main" val="3297351362"/>
       </p:ext>
     </p:extLst>
   </p:cSld>
@@ -1508,7 +1508,7 @@
     </p:spTree>
     <p:extLst>
       <p:ext uri="{BB962C8B-B14F-4D97-AF65-F5344CB8AC3E}">
-        <p14:creationId xmlns:p14="http://schemas.microsoft.com/office/powerpoint/2010/main" xmlns="" val="784737350"/>
+        <p14:creationId xmlns:p14="http://schemas.microsoft.com/office/powerpoint/2010/main" val="784737350"/>
       </p:ext>
     </p:extLst>
   </p:cSld>
@@ -1593,7 +1593,7 @@
     </p:spTree>
     <p:extLst>
       <p:ext uri="{BB962C8B-B14F-4D97-AF65-F5344CB8AC3E}">
-        <p14:creationId xmlns:p14="http://schemas.microsoft.com/office/powerpoint/2010/main" xmlns="" val="1066156749"/>
+        <p14:creationId xmlns:p14="http://schemas.microsoft.com/office/powerpoint/2010/main" val="1066156749"/>
       </p:ext>
     </p:extLst>
   </p:cSld>
@@ -1678,7 +1678,7 @@
     </p:spTree>
     <p:extLst>
       <p:ext uri="{BB962C8B-B14F-4D97-AF65-F5344CB8AC3E}">
-        <p14:creationId xmlns:p14="http://schemas.microsoft.com/office/powerpoint/2010/main" xmlns="" val="617600904"/>
+        <p14:creationId xmlns:p14="http://schemas.microsoft.com/office/powerpoint/2010/main" val="617600904"/>
       </p:ext>
     </p:extLst>
   </p:cSld>
@@ -1867,7 +1867,7 @@
     </p:spTree>
     <p:extLst>
       <p:ext uri="{BB962C8B-B14F-4D97-AF65-F5344CB8AC3E}">
-        <p14:creationId xmlns:p14="http://schemas.microsoft.com/office/powerpoint/2010/main" xmlns="" val="1928648976"/>
+        <p14:creationId xmlns:p14="http://schemas.microsoft.com/office/powerpoint/2010/main" val="1928648976"/>
       </p:ext>
     </p:extLst>
   </p:cSld>
@@ -2008,7 +2008,7 @@
     </p:spTree>
     <p:extLst>
       <p:ext uri="{BB962C8B-B14F-4D97-AF65-F5344CB8AC3E}">
-        <p14:creationId xmlns:p14="http://schemas.microsoft.com/office/powerpoint/2010/main" xmlns="" val="1928648976"/>
+        <p14:creationId xmlns:p14="http://schemas.microsoft.com/office/powerpoint/2010/main" val="1928648976"/>
       </p:ext>
     </p:extLst>
   </p:cSld>
@@ -2093,7 +2093,7 @@
     </p:spTree>
     <p:extLst>
       <p:ext uri="{BB962C8B-B14F-4D97-AF65-F5344CB8AC3E}">
-        <p14:creationId xmlns:p14="http://schemas.microsoft.com/office/powerpoint/2010/main" xmlns="" val="1928648976"/>
+        <p14:creationId xmlns:p14="http://schemas.microsoft.com/office/powerpoint/2010/main" val="1928648976"/>
       </p:ext>
     </p:extLst>
   </p:cSld>
@@ -2190,7 +2190,7 @@
     </p:spTree>
     <p:extLst>
       <p:ext uri="{BB962C8B-B14F-4D97-AF65-F5344CB8AC3E}">
-        <p14:creationId xmlns:p14="http://schemas.microsoft.com/office/powerpoint/2010/main" xmlns="" val="1928648976"/>
+        <p14:creationId xmlns:p14="http://schemas.microsoft.com/office/powerpoint/2010/main" val="1928648976"/>
       </p:ext>
     </p:extLst>
   </p:cSld>
@@ -2275,7 +2275,7 @@
     </p:spTree>
     <p:extLst>
       <p:ext uri="{BB962C8B-B14F-4D97-AF65-F5344CB8AC3E}">
-        <p14:creationId xmlns:p14="http://schemas.microsoft.com/office/powerpoint/2010/main" xmlns="" val="1705752707"/>
+        <p14:creationId xmlns:p14="http://schemas.microsoft.com/office/powerpoint/2010/main" val="1705752707"/>
       </p:ext>
     </p:extLst>
   </p:cSld>
@@ -2360,7 +2360,7 @@
     </p:spTree>
     <p:extLst>
       <p:ext uri="{BB962C8B-B14F-4D97-AF65-F5344CB8AC3E}">
-        <p14:creationId xmlns:p14="http://schemas.microsoft.com/office/powerpoint/2010/main" xmlns="" val="562466078"/>
+        <p14:creationId xmlns:p14="http://schemas.microsoft.com/office/powerpoint/2010/main" val="562466078"/>
       </p:ext>
     </p:extLst>
   </p:cSld>
@@ -2496,7 +2496,7 @@
     </p:spTree>
     <p:extLst>
       <p:ext uri="{BB962C8B-B14F-4D97-AF65-F5344CB8AC3E}">
-        <p14:creationId xmlns:p14="http://schemas.microsoft.com/office/powerpoint/2010/main" xmlns="" val="3199242385"/>
+        <p14:creationId xmlns:p14="http://schemas.microsoft.com/office/powerpoint/2010/main" val="3199242385"/>
       </p:ext>
     </p:extLst>
   </p:cSld>
@@ -16206,7 +16206,7 @@
           <a:blip r:embed="rId2">
             <a:extLst>
               <a:ext uri="{28A0092B-C50C-407E-A947-70E740481C1C}">
-                <a14:useLocalDpi xmlns:a14="http://schemas.microsoft.com/office/drawing/2010/main" xmlns="" val="0"/>
+                <a14:useLocalDpi xmlns:a14="http://schemas.microsoft.com/office/drawing/2010/main" val="0"/>
               </a:ext>
             </a:extLst>
           </a:blip>
@@ -16227,7 +16227,7 @@
     </p:spTree>
     <p:extLst>
       <p:ext uri="{BB962C8B-B14F-4D97-AF65-F5344CB8AC3E}">
-        <p14:creationId xmlns:p14="http://schemas.microsoft.com/office/powerpoint/2010/main" xmlns="" val="3428906391"/>
+        <p14:creationId xmlns:p14="http://schemas.microsoft.com/office/powerpoint/2010/main" val="3428906391"/>
       </p:ext>
     </p:extLst>
   </p:cSld>
@@ -16375,7 +16375,7 @@
           <a:blip r:embed="rId3">
             <a:extLst>
               <a:ext uri="{28A0092B-C50C-407E-A947-70E740481C1C}">
-                <a14:useLocalDpi xmlns:a14="http://schemas.microsoft.com/office/drawing/2010/main" xmlns="" val="0"/>
+                <a14:useLocalDpi xmlns:a14="http://schemas.microsoft.com/office/drawing/2010/main" val="0"/>
               </a:ext>
             </a:extLst>
           </a:blip>
@@ -16498,18 +16498,18 @@
     </p:spTree>
     <p:extLst>
       <p:ext uri="{BB962C8B-B14F-4D97-AF65-F5344CB8AC3E}">
-        <p14:creationId xmlns:p14="http://schemas.microsoft.com/office/powerpoint/2010/main" xmlns="" val="29256383"/>
+        <p14:creationId xmlns:p14="http://schemas.microsoft.com/office/powerpoint/2010/main" val="29256383"/>
       </p:ext>
     </p:extLst>
   </p:cSld>
   <p:clrMapOvr>
     <a:masterClrMapping/>
   </p:clrMapOvr>
-  <mc:AlternateContent xmlns:mc="http://schemas.openxmlformats.org/markup-compatibility/2006">
-    <mc:Choice xmlns:p14="http://schemas.microsoft.com/office/powerpoint/2010/main" xmlns="" Requires="p14">
+  <mc:AlternateContent xmlns:mc="http://schemas.openxmlformats.org/markup-compatibility/2006" xmlns:p14="http://schemas.microsoft.com/office/powerpoint/2010/main">
+    <mc:Choice Requires="p14">
       <p:transition spd="slow" p14:dur="2000"/>
     </mc:Choice>
-    <mc:Fallback>
+    <mc:Fallback xmlns="">
       <p:transition spd="slow"/>
     </mc:Fallback>
   </mc:AlternateContent>
@@ -16776,7 +16776,7 @@
           <a:blip r:embed="rId3">
             <a:extLst>
               <a:ext uri="{28A0092B-C50C-407E-A947-70E740481C1C}">
-                <a14:useLocalDpi xmlns:a14="http://schemas.microsoft.com/office/drawing/2010/main" xmlns="" val="0"/>
+                <a14:useLocalDpi xmlns:a14="http://schemas.microsoft.com/office/drawing/2010/main" val="0"/>
               </a:ext>
             </a:extLst>
           </a:blip>
@@ -16884,7 +16884,7 @@
           <a:blip r:embed="rId5">
             <a:extLst>
               <a:ext uri="{28A0092B-C50C-407E-A947-70E740481C1C}">
-                <a14:useLocalDpi xmlns:a14="http://schemas.microsoft.com/office/drawing/2010/main" xmlns="" val="0"/>
+                <a14:useLocalDpi xmlns:a14="http://schemas.microsoft.com/office/drawing/2010/main" val="0"/>
               </a:ext>
             </a:extLst>
           </a:blip>
@@ -16907,14 +16907,14 @@
           </a:ln>
           <a:extLst>
             <a:ext uri="{909E8E84-426E-40DD-AFC4-6F175D3DCCD1}">
-              <a14:hiddenFill xmlns:a14="http://schemas.microsoft.com/office/drawing/2010/main" xmlns="">
+              <a14:hiddenFill xmlns:a14="http://schemas.microsoft.com/office/drawing/2010/main">
                 <a:solidFill>
                   <a:srgbClr val="FFFFFF"/>
                 </a:solidFill>
               </a14:hiddenFill>
             </a:ext>
             <a:ext uri="{91240B29-F687-4F45-9708-019B960494DF}">
-              <a14:hiddenLine xmlns:a14="http://schemas.microsoft.com/office/drawing/2010/main" xmlns="" w="9525">
+              <a14:hiddenLine xmlns:a14="http://schemas.microsoft.com/office/drawing/2010/main" w="9525">
                 <a:solidFill>
                   <a:srgbClr val="000000"/>
                 </a:solidFill>
@@ -16929,7 +16929,7 @@
     </p:spTree>
     <p:extLst>
       <p:ext uri="{BB962C8B-B14F-4D97-AF65-F5344CB8AC3E}">
-        <p14:creationId xmlns:p14="http://schemas.microsoft.com/office/powerpoint/2010/main" xmlns="" val="3107900357"/>
+        <p14:creationId xmlns:p14="http://schemas.microsoft.com/office/powerpoint/2010/main" val="3107900357"/>
       </p:ext>
     </p:extLst>
   </p:cSld>
@@ -17170,7 +17170,7 @@
           <a:blip r:embed="rId3">
             <a:extLst>
               <a:ext uri="{28A0092B-C50C-407E-A947-70E740481C1C}">
-                <a14:useLocalDpi xmlns:a14="http://schemas.microsoft.com/office/drawing/2010/main" xmlns="" val="0"/>
+                <a14:useLocalDpi xmlns:a14="http://schemas.microsoft.com/office/drawing/2010/main" val="0"/>
               </a:ext>
             </a:extLst>
           </a:blip>
@@ -17254,7 +17254,7 @@
           <a:blip r:embed="rId4">
             <a:extLst>
               <a:ext uri="{28A0092B-C50C-407E-A947-70E740481C1C}">
-                <a14:useLocalDpi xmlns:a14="http://schemas.microsoft.com/office/drawing/2010/main" xmlns="" val="0"/>
+                <a14:useLocalDpi xmlns:a14="http://schemas.microsoft.com/office/drawing/2010/main" val="0"/>
               </a:ext>
             </a:extLst>
           </a:blip>
@@ -17274,7 +17274,7 @@
           <a:noFill/>
           <a:extLst>
             <a:ext uri="{909E8E84-426E-40DD-AFC4-6F175D3DCCD1}">
-              <a14:hiddenFill xmlns:a14="http://schemas.microsoft.com/office/drawing/2010/main" xmlns="">
+              <a14:hiddenFill xmlns:a14="http://schemas.microsoft.com/office/drawing/2010/main">
                 <a:solidFill>
                   <a:srgbClr val="FFFFFF"/>
                 </a:solidFill>
@@ -17295,7 +17295,7 @@
           <a:blip r:embed="rId5">
             <a:extLst>
               <a:ext uri="{28A0092B-C50C-407E-A947-70E740481C1C}">
-                <a14:useLocalDpi xmlns:a14="http://schemas.microsoft.com/office/drawing/2010/main" xmlns="" val="0"/>
+                <a14:useLocalDpi xmlns:a14="http://schemas.microsoft.com/office/drawing/2010/main" val="0"/>
               </a:ext>
             </a:extLst>
           </a:blip>
@@ -17315,7 +17315,7 @@
           <a:noFill/>
           <a:extLst>
             <a:ext uri="{909E8E84-426E-40DD-AFC4-6F175D3DCCD1}">
-              <a14:hiddenFill xmlns:a14="http://schemas.microsoft.com/office/drawing/2010/main" xmlns="">
+              <a14:hiddenFill xmlns:a14="http://schemas.microsoft.com/office/drawing/2010/main">
                 <a:solidFill>
                   <a:srgbClr val="FFFFFF"/>
                 </a:solidFill>
@@ -17327,7 +17327,7 @@
     </p:spTree>
     <p:extLst>
       <p:ext uri="{BB962C8B-B14F-4D97-AF65-F5344CB8AC3E}">
-        <p14:creationId xmlns:p14="http://schemas.microsoft.com/office/powerpoint/2010/main" xmlns="" val="1376954338"/>
+        <p14:creationId xmlns:p14="http://schemas.microsoft.com/office/powerpoint/2010/main" val="1376954338"/>
       </p:ext>
     </p:extLst>
   </p:cSld>
@@ -17396,7 +17396,7 @@
           <a:blip r:embed="rId3">
             <a:extLst>
               <a:ext uri="{28A0092B-C50C-407E-A947-70E740481C1C}">
-                <a14:useLocalDpi xmlns:a14="http://schemas.microsoft.com/office/drawing/2010/main" xmlns="" val="0"/>
+                <a14:useLocalDpi xmlns:a14="http://schemas.microsoft.com/office/drawing/2010/main" val="0"/>
               </a:ext>
             </a:extLst>
           </a:blip>
@@ -17480,7 +17480,7 @@
           <a:blip r:embed="rId4">
             <a:extLst>
               <a:ext uri="{28A0092B-C50C-407E-A947-70E740481C1C}">
-                <a14:useLocalDpi xmlns:a14="http://schemas.microsoft.com/office/drawing/2010/main" xmlns="" val="0"/>
+                <a14:useLocalDpi xmlns:a14="http://schemas.microsoft.com/office/drawing/2010/main" val="0"/>
               </a:ext>
             </a:extLst>
           </a:blip>
@@ -17500,7 +17500,7 @@
           <a:noFill/>
           <a:extLst>
             <a:ext uri="{909E8E84-426E-40DD-AFC4-6F175D3DCCD1}">
-              <a14:hiddenFill xmlns:a14="http://schemas.microsoft.com/office/drawing/2010/main" xmlns="">
+              <a14:hiddenFill xmlns:a14="http://schemas.microsoft.com/office/drawing/2010/main">
                 <a:solidFill>
                   <a:srgbClr val="FFFFFF"/>
                 </a:solidFill>
@@ -17512,18 +17512,18 @@
     </p:spTree>
     <p:extLst>
       <p:ext uri="{BB962C8B-B14F-4D97-AF65-F5344CB8AC3E}">
-        <p14:creationId xmlns:p14="http://schemas.microsoft.com/office/powerpoint/2010/main" xmlns="" val="3667091251"/>
+        <p14:creationId xmlns:p14="http://schemas.microsoft.com/office/powerpoint/2010/main" val="3667091251"/>
       </p:ext>
     </p:extLst>
   </p:cSld>
   <p:clrMapOvr>
     <a:masterClrMapping/>
   </p:clrMapOvr>
-  <mc:AlternateContent xmlns:mc="http://schemas.openxmlformats.org/markup-compatibility/2006">
-    <mc:Choice xmlns:p14="http://schemas.microsoft.com/office/powerpoint/2010/main" xmlns="" Requires="p14">
+  <mc:AlternateContent xmlns:mc="http://schemas.openxmlformats.org/markup-compatibility/2006" xmlns:p14="http://schemas.microsoft.com/office/powerpoint/2010/main">
+    <mc:Choice Requires="p14">
       <p:transition spd="slow" p14:dur="2000"/>
     </mc:Choice>
-    <mc:Fallback>
+    <mc:Fallback xmlns="">
       <p:transition spd="slow"/>
     </mc:Fallback>
   </mc:AlternateContent>
@@ -17690,7 +17690,7 @@
           <a:blip r:embed="rId3">
             <a:extLst>
               <a:ext uri="{28A0092B-C50C-407E-A947-70E740481C1C}">
-                <a14:useLocalDpi xmlns:a14="http://schemas.microsoft.com/office/drawing/2010/main" xmlns="" val="0"/>
+                <a14:useLocalDpi xmlns:a14="http://schemas.microsoft.com/office/drawing/2010/main" val="0"/>
               </a:ext>
             </a:extLst>
           </a:blip>
@@ -17765,7 +17765,7 @@
     </p:spTree>
     <p:extLst>
       <p:ext uri="{BB962C8B-B14F-4D97-AF65-F5344CB8AC3E}">
-        <p14:creationId xmlns:p14="http://schemas.microsoft.com/office/powerpoint/2010/main" xmlns="" val="3197597498"/>
+        <p14:creationId xmlns:p14="http://schemas.microsoft.com/office/powerpoint/2010/main" val="3197597498"/>
       </p:ext>
     </p:extLst>
   </p:cSld>
@@ -17851,6 +17851,30 @@
           </a:p>
           <a:p>
             <a:r>
+              <a:rPr lang="de-DE" dirty="0"/>
+              <a:t>Klare Aufgabenteilung &amp; rege Kommunikation </a:t>
+            </a:r>
+          </a:p>
+          <a:p>
+            <a:pPr lvl="1"/>
+            <a:r>
+              <a:rPr lang="de-DE" dirty="0"/>
+              <a:t>Nur wenig </a:t>
+            </a:r>
+            <a:r>
+              <a:rPr lang="de-DE" dirty="0" err="1"/>
+              <a:t>Mergekonflikte</a:t>
+            </a:r>
+            <a:endParaRPr lang="de-DE" dirty="0"/>
+          </a:p>
+          <a:p>
+            <a:r>
+              <a:rPr lang="de-DE" dirty="0"/>
+              <a:t>Klare Definition von Deadlines</a:t>
+            </a:r>
+          </a:p>
+          <a:p>
+            <a:r>
               <a:rPr lang="de-DE" dirty="0" smtClean="0"/>
               <a:t>Jeder </a:t>
             </a:r>
@@ -17878,56 +17902,11 @@
             </a:r>
             <a:r>
               <a:rPr lang="de-DE" dirty="0"/>
-              <a:t>&amp; Beheben von Bugs</a:t>
-            </a:r>
-          </a:p>
-          <a:p>
+              <a:t>&amp; Beheben von </a:t>
+            </a:r>
             <a:r>
               <a:rPr lang="de-DE" dirty="0" smtClean="0"/>
-              <a:t>Klare </a:t>
-            </a:r>
-            <a:r>
-              <a:rPr lang="de-DE" dirty="0"/>
-              <a:t>Aufgabenteilung </a:t>
-            </a:r>
-            <a:r>
-              <a:rPr lang="de-DE" dirty="0" smtClean="0"/>
-              <a:t>&amp; </a:t>
-            </a:r>
-            <a:r>
-              <a:rPr lang="de-DE" dirty="0"/>
-              <a:t>rege Kommunikation </a:t>
-            </a:r>
-            <a:endParaRPr lang="de-DE" dirty="0" smtClean="0"/>
-          </a:p>
-          <a:p>
-            <a:pPr lvl="1"/>
-            <a:r>
-              <a:rPr lang="de-DE" dirty="0" smtClean="0"/>
-              <a:t>Nur </a:t>
-            </a:r>
-            <a:r>
-              <a:rPr lang="de-DE" dirty="0"/>
-              <a:t>wenig </a:t>
-            </a:r>
-            <a:r>
-              <a:rPr lang="de-DE" dirty="0" err="1"/>
-              <a:t>Mergekonflikte</a:t>
-            </a:r>
-            <a:endParaRPr lang="de-DE" dirty="0"/>
-          </a:p>
-          <a:p>
-            <a:r>
-              <a:rPr lang="de-DE" dirty="0" smtClean="0"/>
-              <a:t>Klare </a:t>
-            </a:r>
-            <a:r>
-              <a:rPr lang="de-DE" dirty="0"/>
-              <a:t>Definition von </a:t>
-            </a:r>
-            <a:r>
-              <a:rPr lang="de-DE" dirty="0" smtClean="0"/>
-              <a:t>Deadlines</a:t>
+              <a:t>Bugs</a:t>
             </a:r>
             <a:endParaRPr lang="de-DE" dirty="0"/>
           </a:p>
@@ -17945,7 +17924,7 @@
           <a:blip r:embed="rId3">
             <a:extLst>
               <a:ext uri="{28A0092B-C50C-407E-A947-70E740481C1C}">
-                <a14:useLocalDpi xmlns:a14="http://schemas.microsoft.com/office/drawing/2010/main" xmlns="" val="0"/>
+                <a14:useLocalDpi xmlns:a14="http://schemas.microsoft.com/office/drawing/2010/main" val="0"/>
               </a:ext>
             </a:extLst>
           </a:blip>
@@ -18020,7 +17999,7 @@
     </p:spTree>
     <p:extLst>
       <p:ext uri="{BB962C8B-B14F-4D97-AF65-F5344CB8AC3E}">
-        <p14:creationId xmlns:p14="http://schemas.microsoft.com/office/powerpoint/2010/main" xmlns="" val="3509070595"/>
+        <p14:creationId xmlns:p14="http://schemas.microsoft.com/office/powerpoint/2010/main" val="3509070595"/>
       </p:ext>
     </p:extLst>
   </p:cSld>
@@ -18107,19 +18086,33 @@
           <a:p>
             <a:r>
               <a:rPr lang="de-DE" dirty="0" smtClean="0"/>
-              <a:t>Hoher Einarbeitungsaufwand</a:t>
-            </a:r>
+              <a:t>Hoher </a:t>
+            </a:r>
+            <a:r>
+              <a:rPr lang="de-DE" dirty="0" smtClean="0"/>
+              <a:t>Einarbeitungsaufwand</a:t>
+            </a:r>
+          </a:p>
+          <a:p>
+            <a:pPr lvl="1"/>
+            <a:r>
+              <a:rPr lang="de-DE" dirty="0" smtClean="0"/>
+              <a:t>Mit </a:t>
+            </a:r>
+            <a:r>
+              <a:rPr lang="de-DE" dirty="0"/>
+              <a:t>Tutorials &amp; Foren Einblick </a:t>
+            </a:r>
+            <a:r>
+              <a:rPr lang="de-DE" dirty="0" smtClean="0"/>
+              <a:t>verschafft</a:t>
+            </a:r>
+            <a:endParaRPr lang="de-DE" dirty="0" smtClean="0"/>
           </a:p>
           <a:p>
             <a:r>
               <a:rPr lang="de-DE" dirty="0" smtClean="0"/>
               <a:t>Zeitmangel</a:t>
-            </a:r>
-          </a:p>
-          <a:p>
-            <a:r>
-              <a:rPr lang="de-DE" dirty="0" smtClean="0"/>
-              <a:t>Mit Tutorials &amp; Foren Einblick verschafft &amp; Gelerntes umgesetzt</a:t>
             </a:r>
           </a:p>
           <a:p>
@@ -18158,7 +18151,7 @@
           <a:blip r:embed="rId3">
             <a:extLst>
               <a:ext uri="{28A0092B-C50C-407E-A947-70E740481C1C}">
-                <a14:useLocalDpi xmlns:a14="http://schemas.microsoft.com/office/drawing/2010/main" xmlns="" val="0"/>
+                <a14:useLocalDpi xmlns:a14="http://schemas.microsoft.com/office/drawing/2010/main" val="0"/>
               </a:ext>
             </a:extLst>
           </a:blip>
@@ -18233,7 +18226,7 @@
     </p:spTree>
     <p:extLst>
       <p:ext uri="{BB962C8B-B14F-4D97-AF65-F5344CB8AC3E}">
-        <p14:creationId xmlns:p14="http://schemas.microsoft.com/office/powerpoint/2010/main" xmlns="" val="2650556501"/>
+        <p14:creationId xmlns:p14="http://schemas.microsoft.com/office/powerpoint/2010/main" val="2650556501"/>
       </p:ext>
     </p:extLst>
   </p:cSld>
@@ -18399,7 +18392,7 @@
           <a:blip r:embed="rId3">
             <a:extLst>
               <a:ext uri="{28A0092B-C50C-407E-A947-70E740481C1C}">
-                <a14:useLocalDpi xmlns:a14="http://schemas.microsoft.com/office/drawing/2010/main" xmlns="" val="0"/>
+                <a14:useLocalDpi xmlns:a14="http://schemas.microsoft.com/office/drawing/2010/main" val="0"/>
               </a:ext>
             </a:extLst>
           </a:blip>
@@ -18474,7 +18467,7 @@
     </p:spTree>
     <p:extLst>
       <p:ext uri="{BB962C8B-B14F-4D97-AF65-F5344CB8AC3E}">
-        <p14:creationId xmlns:p14="http://schemas.microsoft.com/office/powerpoint/2010/main" xmlns="" val="1648445864"/>
+        <p14:creationId xmlns:p14="http://schemas.microsoft.com/office/powerpoint/2010/main" val="1648445864"/>
       </p:ext>
     </p:extLst>
   </p:cSld>
@@ -18573,7 +18566,7 @@
           <a:blip r:embed="rId3">
             <a:extLst>
               <a:ext uri="{28A0092B-C50C-407E-A947-70E740481C1C}">
-                <a14:useLocalDpi xmlns:a14="http://schemas.microsoft.com/office/drawing/2010/main" xmlns="" val="0"/>
+                <a14:useLocalDpi xmlns:a14="http://schemas.microsoft.com/office/drawing/2010/main" val="0"/>
               </a:ext>
             </a:extLst>
           </a:blip>
@@ -18624,7 +18617,7 @@
     </p:spTree>
     <p:extLst>
       <p:ext uri="{BB962C8B-B14F-4D97-AF65-F5344CB8AC3E}">
-        <p14:creationId xmlns:p14="http://schemas.microsoft.com/office/powerpoint/2010/main" xmlns="" val="1786163146"/>
+        <p14:creationId xmlns:p14="http://schemas.microsoft.com/office/powerpoint/2010/main" val="1786163146"/>
       </p:ext>
     </p:extLst>
   </p:cSld>
@@ -18723,7 +18716,7 @@
           <a:blip r:embed="rId3">
             <a:extLst>
               <a:ext uri="{28A0092B-C50C-407E-A947-70E740481C1C}">
-                <a14:useLocalDpi xmlns:a14="http://schemas.microsoft.com/office/drawing/2010/main" xmlns="" val="0"/>
+                <a14:useLocalDpi xmlns:a14="http://schemas.microsoft.com/office/drawing/2010/main" val="0"/>
               </a:ext>
             </a:extLst>
           </a:blip>
@@ -18774,7 +18767,7 @@
     </p:spTree>
     <p:extLst>
       <p:ext uri="{BB962C8B-B14F-4D97-AF65-F5344CB8AC3E}">
-        <p14:creationId xmlns:p14="http://schemas.microsoft.com/office/powerpoint/2010/main" xmlns="" val="1278744805"/>
+        <p14:creationId xmlns:p14="http://schemas.microsoft.com/office/powerpoint/2010/main" val="1278744805"/>
       </p:ext>
     </p:extLst>
   </p:cSld>
@@ -18843,7 +18836,7 @@
           <a:blip r:embed="rId3">
             <a:extLst>
               <a:ext uri="{28A0092B-C50C-407E-A947-70E740481C1C}">
-                <a14:useLocalDpi xmlns:a14="http://schemas.microsoft.com/office/drawing/2010/main" xmlns="" val="0"/>
+                <a14:useLocalDpi xmlns:a14="http://schemas.microsoft.com/office/drawing/2010/main" val="0"/>
               </a:ext>
             </a:extLst>
           </a:blip>
@@ -18927,7 +18920,7 @@
           <a:blip r:embed="rId4">
             <a:extLst>
               <a:ext uri="{28A0092B-C50C-407E-A947-70E740481C1C}">
-                <a14:useLocalDpi xmlns:a14="http://schemas.microsoft.com/office/drawing/2010/main" xmlns="" val="0"/>
+                <a14:useLocalDpi xmlns:a14="http://schemas.microsoft.com/office/drawing/2010/main" val="0"/>
               </a:ext>
             </a:extLst>
           </a:blip>
@@ -18947,7 +18940,7 @@
           <a:noFill/>
           <a:extLst>
             <a:ext uri="{909E8E84-426E-40DD-AFC4-6F175D3DCCD1}">
-              <a14:hiddenFill xmlns:a14="http://schemas.microsoft.com/office/drawing/2010/main" xmlns="">
+              <a14:hiddenFill xmlns:a14="http://schemas.microsoft.com/office/drawing/2010/main">
                 <a:solidFill>
                   <a:srgbClr val="FFFFFF"/>
                 </a:solidFill>
@@ -18968,7 +18961,7 @@
           <a:blip r:embed="rId5">
             <a:extLst>
               <a:ext uri="{28A0092B-C50C-407E-A947-70E740481C1C}">
-                <a14:useLocalDpi xmlns:a14="http://schemas.microsoft.com/office/drawing/2010/main" xmlns="" val="0"/>
+                <a14:useLocalDpi xmlns:a14="http://schemas.microsoft.com/office/drawing/2010/main" val="0"/>
               </a:ext>
             </a:extLst>
           </a:blip>
@@ -18988,7 +18981,7 @@
           <a:noFill/>
           <a:extLst>
             <a:ext uri="{909E8E84-426E-40DD-AFC4-6F175D3DCCD1}">
-              <a14:hiddenFill xmlns:a14="http://schemas.microsoft.com/office/drawing/2010/main" xmlns="">
+              <a14:hiddenFill xmlns:a14="http://schemas.microsoft.com/office/drawing/2010/main">
                 <a:solidFill>
                   <a:srgbClr val="FFFFFF"/>
                 </a:solidFill>
@@ -19009,7 +19002,7 @@
           <a:blip r:embed="rId6">
             <a:extLst>
               <a:ext uri="{28A0092B-C50C-407E-A947-70E740481C1C}">
-                <a14:useLocalDpi xmlns:a14="http://schemas.microsoft.com/office/drawing/2010/main" xmlns="" val="0"/>
+                <a14:useLocalDpi xmlns:a14="http://schemas.microsoft.com/office/drawing/2010/main" val="0"/>
               </a:ext>
             </a:extLst>
           </a:blip>
@@ -19029,7 +19022,7 @@
           <a:noFill/>
           <a:extLst>
             <a:ext uri="{909E8E84-426E-40DD-AFC4-6F175D3DCCD1}">
-              <a14:hiddenFill xmlns:a14="http://schemas.microsoft.com/office/drawing/2010/main" xmlns="">
+              <a14:hiddenFill xmlns:a14="http://schemas.microsoft.com/office/drawing/2010/main">
                 <a:solidFill>
                   <a:srgbClr val="FFFFFF"/>
                 </a:solidFill>
@@ -19050,7 +19043,7 @@
           <a:blip r:embed="rId7">
             <a:extLst>
               <a:ext uri="{28A0092B-C50C-407E-A947-70E740481C1C}">
-                <a14:useLocalDpi xmlns:a14="http://schemas.microsoft.com/office/drawing/2010/main" xmlns="" val="0"/>
+                <a14:useLocalDpi xmlns:a14="http://schemas.microsoft.com/office/drawing/2010/main" val="0"/>
               </a:ext>
             </a:extLst>
           </a:blip>
@@ -19070,7 +19063,7 @@
           <a:noFill/>
           <a:extLst>
             <a:ext uri="{909E8E84-426E-40DD-AFC4-6F175D3DCCD1}">
-              <a14:hiddenFill xmlns:a14="http://schemas.microsoft.com/office/drawing/2010/main" xmlns="">
+              <a14:hiddenFill xmlns:a14="http://schemas.microsoft.com/office/drawing/2010/main">
                 <a:solidFill>
                   <a:srgbClr val="FFFFFF"/>
                 </a:solidFill>
@@ -19091,7 +19084,7 @@
           <a:blip r:embed="rId8">
             <a:extLst>
               <a:ext uri="{28A0092B-C50C-407E-A947-70E740481C1C}">
-                <a14:useLocalDpi xmlns:a14="http://schemas.microsoft.com/office/drawing/2010/main" xmlns="" val="0"/>
+                <a14:useLocalDpi xmlns:a14="http://schemas.microsoft.com/office/drawing/2010/main" val="0"/>
               </a:ext>
             </a:extLst>
           </a:blip>
@@ -19111,7 +19104,7 @@
           <a:noFill/>
           <a:extLst>
             <a:ext uri="{909E8E84-426E-40DD-AFC4-6F175D3DCCD1}">
-              <a14:hiddenFill xmlns:a14="http://schemas.microsoft.com/office/drawing/2010/main" xmlns="">
+              <a14:hiddenFill xmlns:a14="http://schemas.microsoft.com/office/drawing/2010/main">
                 <a:solidFill>
                   <a:srgbClr val="FFFFFF"/>
                 </a:solidFill>
@@ -19132,7 +19125,7 @@
           <a:blip r:embed="rId9">
             <a:extLst>
               <a:ext uri="{28A0092B-C50C-407E-A947-70E740481C1C}">
-                <a14:useLocalDpi xmlns:a14="http://schemas.microsoft.com/office/drawing/2010/main" xmlns="" val="0"/>
+                <a14:useLocalDpi xmlns:a14="http://schemas.microsoft.com/office/drawing/2010/main" val="0"/>
               </a:ext>
             </a:extLst>
           </a:blip>
@@ -19152,7 +19145,7 @@
           <a:noFill/>
           <a:extLst>
             <a:ext uri="{909E8E84-426E-40DD-AFC4-6F175D3DCCD1}">
-              <a14:hiddenFill xmlns:a14="http://schemas.microsoft.com/office/drawing/2010/main" xmlns="">
+              <a14:hiddenFill xmlns:a14="http://schemas.microsoft.com/office/drawing/2010/main">
                 <a:solidFill>
                   <a:srgbClr val="FFFFFF"/>
                 </a:solidFill>
@@ -19180,7 +19173,7 @@
           <a:noFill/>
           <a:extLst>
             <a:ext uri="{909E8E84-426E-40DD-AFC4-6F175D3DCCD1}">
-              <a14:hiddenFill xmlns:a14="http://schemas.microsoft.com/office/drawing/2010/main" xmlns="">
+              <a14:hiddenFill xmlns:a14="http://schemas.microsoft.com/office/drawing/2010/main">
                 <a:solidFill>
                   <a:srgbClr val="FFFFFF"/>
                 </a:solidFill>
@@ -19219,7 +19212,7 @@
           <a:noFill/>
           <a:extLst>
             <a:ext uri="{909E8E84-426E-40DD-AFC4-6F175D3DCCD1}">
-              <a14:hiddenFill xmlns:a14="http://schemas.microsoft.com/office/drawing/2010/main" xmlns="">
+              <a14:hiddenFill xmlns:a14="http://schemas.microsoft.com/office/drawing/2010/main">
                 <a:solidFill>
                   <a:srgbClr val="FFFFFF"/>
                 </a:solidFill>
@@ -19251,7 +19244,7 @@
           <a:blip r:embed="rId10">
             <a:extLst>
               <a:ext uri="{28A0092B-C50C-407E-A947-70E740481C1C}">
-                <a14:useLocalDpi xmlns:a14="http://schemas.microsoft.com/office/drawing/2010/main" xmlns="" val="0"/>
+                <a14:useLocalDpi xmlns:a14="http://schemas.microsoft.com/office/drawing/2010/main" val="0"/>
               </a:ext>
             </a:extLst>
           </a:blip>
@@ -19271,7 +19264,7 @@
           <a:noFill/>
           <a:extLst>
             <a:ext uri="{909E8E84-426E-40DD-AFC4-6F175D3DCCD1}">
-              <a14:hiddenFill xmlns:a14="http://schemas.microsoft.com/office/drawing/2010/main" xmlns="">
+              <a14:hiddenFill xmlns:a14="http://schemas.microsoft.com/office/drawing/2010/main">
                 <a:solidFill>
                   <a:srgbClr val="FFFFFF"/>
                 </a:solidFill>
@@ -19292,7 +19285,7 @@
           <a:blip r:embed="rId11">
             <a:extLst>
               <a:ext uri="{28A0092B-C50C-407E-A947-70E740481C1C}">
-                <a14:useLocalDpi xmlns:a14="http://schemas.microsoft.com/office/drawing/2010/main" xmlns="" val="0"/>
+                <a14:useLocalDpi xmlns:a14="http://schemas.microsoft.com/office/drawing/2010/main" val="0"/>
               </a:ext>
             </a:extLst>
           </a:blip>
@@ -19312,7 +19305,7 @@
           <a:noFill/>
           <a:extLst>
             <a:ext uri="{909E8E84-426E-40DD-AFC4-6F175D3DCCD1}">
-              <a14:hiddenFill xmlns:a14="http://schemas.microsoft.com/office/drawing/2010/main" xmlns="">
+              <a14:hiddenFill xmlns:a14="http://schemas.microsoft.com/office/drawing/2010/main">
                 <a:solidFill>
                   <a:srgbClr val="FFFFFF"/>
                 </a:solidFill>
@@ -19324,7 +19317,7 @@
     </p:spTree>
     <p:extLst>
       <p:ext uri="{BB962C8B-B14F-4D97-AF65-F5344CB8AC3E}">
-        <p14:creationId xmlns:p14="http://schemas.microsoft.com/office/powerpoint/2010/main" xmlns="" val="1449714526"/>
+        <p14:creationId xmlns:p14="http://schemas.microsoft.com/office/powerpoint/2010/main" val="1449714526"/>
       </p:ext>
     </p:extLst>
   </p:cSld>
@@ -19430,7 +19423,7 @@
           <a:blip r:embed="rId5">
             <a:extLst>
               <a:ext uri="{28A0092B-C50C-407E-A947-70E740481C1C}">
-                <a14:useLocalDpi xmlns:a14="http://schemas.microsoft.com/office/drawing/2010/main" xmlns="" val="0"/>
+                <a14:useLocalDpi xmlns:a14="http://schemas.microsoft.com/office/drawing/2010/main" val="0"/>
               </a:ext>
             </a:extLst>
           </a:blip>
@@ -19505,18 +19498,18 @@
     </p:spTree>
     <p:extLst>
       <p:ext uri="{BB962C8B-B14F-4D97-AF65-F5344CB8AC3E}">
-        <p14:creationId xmlns:p14="http://schemas.microsoft.com/office/powerpoint/2010/main" xmlns="" val="3216998357"/>
+        <p14:creationId xmlns:p14="http://schemas.microsoft.com/office/powerpoint/2010/main" val="3216998357"/>
       </p:ext>
     </p:extLst>
   </p:cSld>
   <p:clrMapOvr>
     <a:masterClrMapping/>
   </p:clrMapOvr>
-  <mc:AlternateContent xmlns:mc="http://schemas.openxmlformats.org/markup-compatibility/2006">
-    <mc:Choice xmlns:p14="http://schemas.microsoft.com/office/powerpoint/2010/main" xmlns="" Requires="p14">
+  <mc:AlternateContent xmlns:mc="http://schemas.openxmlformats.org/markup-compatibility/2006" xmlns:p14="http://schemas.microsoft.com/office/powerpoint/2010/main">
+    <mc:Choice Requires="p14">
       <p:transition spd="slow" p14:dur="2000"/>
     </mc:Choice>
-    <mc:Fallback>
+    <mc:Fallback xmlns="">
       <p:transition spd="slow"/>
     </mc:Fallback>
   </mc:AlternateContent>
@@ -19655,7 +19648,7 @@
           <a:blip r:embed="rId3">
             <a:extLst>
               <a:ext uri="{28A0092B-C50C-407E-A947-70E740481C1C}">
-                <a14:useLocalDpi xmlns:a14="http://schemas.microsoft.com/office/drawing/2010/main" xmlns="" val="0"/>
+                <a14:useLocalDpi xmlns:a14="http://schemas.microsoft.com/office/drawing/2010/main" val="0"/>
               </a:ext>
             </a:extLst>
           </a:blip>
@@ -19730,7 +19723,7 @@
     </p:spTree>
     <p:extLst>
       <p:ext uri="{BB962C8B-B14F-4D97-AF65-F5344CB8AC3E}">
-        <p14:creationId xmlns:p14="http://schemas.microsoft.com/office/powerpoint/2010/main" xmlns="" val="537447969"/>
+        <p14:creationId xmlns:p14="http://schemas.microsoft.com/office/powerpoint/2010/main" val="537447969"/>
       </p:ext>
     </p:extLst>
   </p:cSld>
@@ -19867,7 +19860,7 @@
           <a:blip r:embed="rId3">
             <a:extLst>
               <a:ext uri="{28A0092B-C50C-407E-A947-70E740481C1C}">
-                <a14:useLocalDpi xmlns:a14="http://schemas.microsoft.com/office/drawing/2010/main" xmlns="" val="0"/>
+                <a14:useLocalDpi xmlns:a14="http://schemas.microsoft.com/office/drawing/2010/main" val="0"/>
               </a:ext>
             </a:extLst>
           </a:blip>
@@ -19942,7 +19935,7 @@
     </p:spTree>
     <p:extLst>
       <p:ext uri="{BB962C8B-B14F-4D97-AF65-F5344CB8AC3E}">
-        <p14:creationId xmlns:p14="http://schemas.microsoft.com/office/powerpoint/2010/main" xmlns="" val="4975384"/>
+        <p14:creationId xmlns:p14="http://schemas.microsoft.com/office/powerpoint/2010/main" val="4975384"/>
       </p:ext>
     </p:extLst>
   </p:cSld>
@@ -20064,7 +20057,7 @@
           <a:blip r:embed="rId3">
             <a:extLst>
               <a:ext uri="{28A0092B-C50C-407E-A947-70E740481C1C}">
-                <a14:useLocalDpi xmlns:a14="http://schemas.microsoft.com/office/drawing/2010/main" xmlns="" val="0"/>
+                <a14:useLocalDpi xmlns:a14="http://schemas.microsoft.com/office/drawing/2010/main" val="0"/>
               </a:ext>
             </a:extLst>
           </a:blip>
@@ -20139,7 +20132,7 @@
     </p:spTree>
     <p:extLst>
       <p:ext uri="{BB962C8B-B14F-4D97-AF65-F5344CB8AC3E}">
-        <p14:creationId xmlns:p14="http://schemas.microsoft.com/office/powerpoint/2010/main" xmlns="" val="4975384"/>
+        <p14:creationId xmlns:p14="http://schemas.microsoft.com/office/powerpoint/2010/main" val="4975384"/>
       </p:ext>
     </p:extLst>
   </p:cSld>
@@ -20208,7 +20201,7 @@
           <a:blip r:embed="rId3">
             <a:extLst>
               <a:ext uri="{28A0092B-C50C-407E-A947-70E740481C1C}">
-                <a14:useLocalDpi xmlns:a14="http://schemas.microsoft.com/office/drawing/2010/main" xmlns="" val="0"/>
+                <a14:useLocalDpi xmlns:a14="http://schemas.microsoft.com/office/drawing/2010/main" val="0"/>
               </a:ext>
             </a:extLst>
           </a:blip>
@@ -20460,7 +20453,7 @@
     </p:spTree>
     <p:extLst>
       <p:ext uri="{BB962C8B-B14F-4D97-AF65-F5344CB8AC3E}">
-        <p14:creationId xmlns:p14="http://schemas.microsoft.com/office/powerpoint/2010/main" xmlns="" val="4975384"/>
+        <p14:creationId xmlns:p14="http://schemas.microsoft.com/office/powerpoint/2010/main" val="4975384"/>
       </p:ext>
     </p:extLst>
   </p:cSld>
@@ -20529,7 +20522,7 @@
           <a:blip r:embed="rId3">
             <a:extLst>
               <a:ext uri="{28A0092B-C50C-407E-A947-70E740481C1C}">
-                <a14:useLocalDpi xmlns:a14="http://schemas.microsoft.com/office/drawing/2010/main" xmlns="" val="0"/>
+                <a14:useLocalDpi xmlns:a14="http://schemas.microsoft.com/office/drawing/2010/main" val="0"/>
               </a:ext>
             </a:extLst>
           </a:blip>
@@ -20785,7 +20778,7 @@
     </p:spTree>
     <p:extLst>
       <p:ext uri="{BB962C8B-B14F-4D97-AF65-F5344CB8AC3E}">
-        <p14:creationId xmlns:p14="http://schemas.microsoft.com/office/powerpoint/2010/main" xmlns="" val="4975384"/>
+        <p14:creationId xmlns:p14="http://schemas.microsoft.com/office/powerpoint/2010/main" val="4975384"/>
       </p:ext>
     </p:extLst>
   </p:cSld>
@@ -20915,7 +20908,7 @@
           <a:blip r:embed="rId3">
             <a:extLst>
               <a:ext uri="{28A0092B-C50C-407E-A947-70E740481C1C}">
-                <a14:useLocalDpi xmlns:a14="http://schemas.microsoft.com/office/drawing/2010/main" xmlns="" val="0"/>
+                <a14:useLocalDpi xmlns:a14="http://schemas.microsoft.com/office/drawing/2010/main" val="0"/>
               </a:ext>
             </a:extLst>
           </a:blip>
@@ -20999,7 +20992,7 @@
           <a:blip r:embed="rId4">
             <a:extLst>
               <a:ext uri="{28A0092B-C50C-407E-A947-70E740481C1C}">
-                <a14:useLocalDpi xmlns:a14="http://schemas.microsoft.com/office/drawing/2010/main" xmlns="" val="0"/>
+                <a14:useLocalDpi xmlns:a14="http://schemas.microsoft.com/office/drawing/2010/main" val="0"/>
               </a:ext>
             </a:extLst>
           </a:blip>
@@ -21019,7 +21012,7 @@
           <a:noFill/>
           <a:extLst>
             <a:ext uri="{909E8E84-426E-40DD-AFC4-6F175D3DCCD1}">
-              <a14:hiddenFill xmlns:a14="http://schemas.microsoft.com/office/drawing/2010/main" xmlns="">
+              <a14:hiddenFill xmlns:a14="http://schemas.microsoft.com/office/drawing/2010/main">
                 <a:solidFill>
                   <a:srgbClr val="FFFFFF"/>
                 </a:solidFill>
@@ -21031,7 +21024,7 @@
     </p:spTree>
     <p:extLst>
       <p:ext uri="{BB962C8B-B14F-4D97-AF65-F5344CB8AC3E}">
-        <p14:creationId xmlns:p14="http://schemas.microsoft.com/office/powerpoint/2010/main" xmlns="" val="14036120"/>
+        <p14:creationId xmlns:p14="http://schemas.microsoft.com/office/powerpoint/2010/main" val="14036120"/>
       </p:ext>
     </p:extLst>
   </p:cSld>
@@ -21198,7 +21191,7 @@
           <a:blip r:embed="rId3">
             <a:extLst>
               <a:ext uri="{28A0092B-C50C-407E-A947-70E740481C1C}">
-                <a14:useLocalDpi xmlns:a14="http://schemas.microsoft.com/office/drawing/2010/main" xmlns="" val="0"/>
+                <a14:useLocalDpi xmlns:a14="http://schemas.microsoft.com/office/drawing/2010/main" val="0"/>
               </a:ext>
             </a:extLst>
           </a:blip>
@@ -21282,7 +21275,7 @@
           <a:blip r:embed="rId4">
             <a:extLst>
               <a:ext uri="{28A0092B-C50C-407E-A947-70E740481C1C}">
-                <a14:useLocalDpi xmlns:a14="http://schemas.microsoft.com/office/drawing/2010/main" xmlns="" val="0"/>
+                <a14:useLocalDpi xmlns:a14="http://schemas.microsoft.com/office/drawing/2010/main" val="0"/>
               </a:ext>
             </a:extLst>
           </a:blip>
@@ -21302,7 +21295,7 @@
           <a:noFill/>
           <a:extLst>
             <a:ext uri="{909E8E84-426E-40DD-AFC4-6F175D3DCCD1}">
-              <a14:hiddenFill xmlns:a14="http://schemas.microsoft.com/office/drawing/2010/main" xmlns="">
+              <a14:hiddenFill xmlns:a14="http://schemas.microsoft.com/office/drawing/2010/main">
                 <a:solidFill>
                   <a:srgbClr val="FFFFFF"/>
                 </a:solidFill>
@@ -21323,7 +21316,7 @@
           <a:blip r:embed="rId5">
             <a:extLst>
               <a:ext uri="{28A0092B-C50C-407E-A947-70E740481C1C}">
-                <a14:useLocalDpi xmlns:a14="http://schemas.microsoft.com/office/drawing/2010/main" xmlns="" val="0"/>
+                <a14:useLocalDpi xmlns:a14="http://schemas.microsoft.com/office/drawing/2010/main" val="0"/>
               </a:ext>
             </a:extLst>
           </a:blip>
@@ -21343,7 +21336,7 @@
           <a:noFill/>
           <a:extLst>
             <a:ext uri="{909E8E84-426E-40DD-AFC4-6F175D3DCCD1}">
-              <a14:hiddenFill xmlns:a14="http://schemas.microsoft.com/office/drawing/2010/main" xmlns="">
+              <a14:hiddenFill xmlns:a14="http://schemas.microsoft.com/office/drawing/2010/main">
                 <a:solidFill>
                   <a:srgbClr val="FFFFFF"/>
                 </a:solidFill>
@@ -21355,7 +21348,7 @@
     </p:spTree>
     <p:extLst>
       <p:ext uri="{BB962C8B-B14F-4D97-AF65-F5344CB8AC3E}">
-        <p14:creationId xmlns:p14="http://schemas.microsoft.com/office/powerpoint/2010/main" xmlns="" val="1932109761"/>
+        <p14:creationId xmlns:p14="http://schemas.microsoft.com/office/powerpoint/2010/main" val="1932109761"/>
       </p:ext>
     </p:extLst>
   </p:cSld>
@@ -21631,7 +21624,7 @@
   <a:extraClrSchemeLst/>
   <a:extLst>
     <a:ext uri="{05A4C25C-085E-4340-85A3-A5531E510DB2}">
-      <thm15:themeFamily xmlns:thm15="http://schemas.microsoft.com/office/thememl/2012/main" xmlns="" name="Ion Boardroom" id="{FC33163D-4339-46B1-8EED-24C834239D99}" vid="{A3AB87EF-B655-4FFF-8D05-F333AD7F2789}"/>
+      <thm15:themeFamily xmlns:thm15="http://schemas.microsoft.com/office/thememl/2012/main" name="Ion Boardroom" id="{FC33163D-4339-46B1-8EED-24C834239D99}" vid="{A3AB87EF-B655-4FFF-8D05-F333AD7F2789}"/>
     </a:ext>
   </a:extLst>
 </a:theme>
@@ -21892,7 +21885,7 @@
   <a:extraClrSchemeLst/>
   <a:extLst>
     <a:ext uri="{05A4C25C-085E-4340-85A3-A5531E510DB2}">
-      <thm15:themeFamily xmlns:thm15="http://schemas.microsoft.com/office/thememl/2012/main" xmlns="" name="Office Theme" id="{62F939B6-93AF-4DB8-9C6B-D6C7DFDC589F}" vid="{4A3C46E8-61CC-4603-A589-7422A47A8E4A}"/>
+      <thm15:themeFamily xmlns:thm15="http://schemas.microsoft.com/office/thememl/2012/main" name="Office Theme" id="{62F939B6-93AF-4DB8-9C6B-D6C7DFDC589F}" vid="{4A3C46E8-61CC-4603-A589-7422A47A8E4A}"/>
     </a:ext>
   </a:extLst>
 </a:theme>

</xml_diff>